<commit_message>
adição de novos slides traduzidos
</commit_message>
<xml_diff>
--- a/arduino-bluetooth.pptx
+++ b/arduino-bluetooth.pptx
@@ -16,8 +16,11 @@
     <p:sldId id="266" r:id="rId10"/>
     <p:sldId id="267" r:id="rId11"/>
     <p:sldId id="268" r:id="rId12"/>
-    <p:sldId id="257" r:id="rId13"/>
-    <p:sldId id="258" r:id="rId14"/>
+    <p:sldId id="269" r:id="rId13"/>
+    <p:sldId id="270" r:id="rId14"/>
+    <p:sldId id="271" r:id="rId15"/>
+    <p:sldId id="257" r:id="rId16"/>
+    <p:sldId id="258" r:id="rId17"/>
   </p:sldIdLst>
   <p:sldSz cx="12192000" cy="6858000"/>
   <p:notesSz cx="6858000" cy="9144000"/>
@@ -166,10 +169,9 @@
           </a:lstStyle>
           <a:p>
             <a:r>
-              <a:rPr lang="pt-BR" smtClean="0"/>
+              <a:rPr lang="pt-BR"/>
               <a:t>Clique para editar o título mestre</a:t>
             </a:r>
-            <a:endParaRPr lang="pt-BR"/>
           </a:p>
         </p:txBody>
       </p:sp>
@@ -231,10 +233,9 @@
           </a:lstStyle>
           <a:p>
             <a:r>
-              <a:rPr lang="pt-BR" smtClean="0"/>
+              <a:rPr lang="pt-BR"/>
               <a:t>Clique para editar o estilo do subtítulo Mestre</a:t>
             </a:r>
-            <a:endParaRPr lang="pt-BR"/>
           </a:p>
         </p:txBody>
       </p:sp>
@@ -255,7 +256,7 @@
           <a:p>
             <a:fld id="{2EDF32D7-A802-4CED-A4B7-23DAC1B43898}" type="datetimeFigureOut">
               <a:rPr lang="pt-BR" smtClean="0"/>
-              <a:t>01/11/2019</a:t>
+              <a:t>03/11/2019</a:t>
             </a:fld>
             <a:endParaRPr lang="pt-BR"/>
           </a:p>
@@ -349,10 +350,9 @@
           <a:lstStyle/>
           <a:p>
             <a:r>
-              <a:rPr lang="pt-BR" smtClean="0"/>
+              <a:rPr lang="pt-BR"/>
               <a:t>Clique para editar o título mestre</a:t>
             </a:r>
-            <a:endParaRPr lang="pt-BR"/>
           </a:p>
         </p:txBody>
       </p:sp>
@@ -373,38 +373,37 @@
           <a:p>
             <a:pPr lvl="0"/>
             <a:r>
-              <a:rPr lang="pt-BR" smtClean="0"/>
+              <a:rPr lang="pt-BR"/>
               <a:t>Editar estilos de texto Mestre</a:t>
             </a:r>
           </a:p>
           <a:p>
             <a:pPr lvl="1"/>
             <a:r>
-              <a:rPr lang="pt-BR" smtClean="0"/>
+              <a:rPr lang="pt-BR"/>
               <a:t>Segundo nível</a:t>
             </a:r>
           </a:p>
           <a:p>
             <a:pPr lvl="2"/>
             <a:r>
-              <a:rPr lang="pt-BR" smtClean="0"/>
+              <a:rPr lang="pt-BR"/>
               <a:t>Terceiro nível</a:t>
             </a:r>
           </a:p>
           <a:p>
             <a:pPr lvl="3"/>
             <a:r>
-              <a:rPr lang="pt-BR" smtClean="0"/>
+              <a:rPr lang="pt-BR"/>
               <a:t>Quarto nível</a:t>
             </a:r>
           </a:p>
           <a:p>
             <a:pPr lvl="4"/>
             <a:r>
-              <a:rPr lang="pt-BR" smtClean="0"/>
+              <a:rPr lang="pt-BR"/>
               <a:t>Quinto nível</a:t>
             </a:r>
-            <a:endParaRPr lang="pt-BR"/>
           </a:p>
         </p:txBody>
       </p:sp>
@@ -425,7 +424,7 @@
           <a:p>
             <a:fld id="{2EDF32D7-A802-4CED-A4B7-23DAC1B43898}" type="datetimeFigureOut">
               <a:rPr lang="pt-BR" smtClean="0"/>
-              <a:t>01/11/2019</a:t>
+              <a:t>03/11/2019</a:t>
             </a:fld>
             <a:endParaRPr lang="pt-BR"/>
           </a:p>
@@ -524,10 +523,9 @@
           <a:lstStyle/>
           <a:p>
             <a:r>
-              <a:rPr lang="pt-BR" smtClean="0"/>
+              <a:rPr lang="pt-BR"/>
               <a:t>Clique para editar o título mestre</a:t>
             </a:r>
-            <a:endParaRPr lang="pt-BR"/>
           </a:p>
         </p:txBody>
       </p:sp>
@@ -553,38 +551,37 @@
           <a:p>
             <a:pPr lvl="0"/>
             <a:r>
-              <a:rPr lang="pt-BR" smtClean="0"/>
+              <a:rPr lang="pt-BR"/>
               <a:t>Editar estilos de texto Mestre</a:t>
             </a:r>
           </a:p>
           <a:p>
             <a:pPr lvl="1"/>
             <a:r>
-              <a:rPr lang="pt-BR" smtClean="0"/>
+              <a:rPr lang="pt-BR"/>
               <a:t>Segundo nível</a:t>
             </a:r>
           </a:p>
           <a:p>
             <a:pPr lvl="2"/>
             <a:r>
-              <a:rPr lang="pt-BR" smtClean="0"/>
+              <a:rPr lang="pt-BR"/>
               <a:t>Terceiro nível</a:t>
             </a:r>
           </a:p>
           <a:p>
             <a:pPr lvl="3"/>
             <a:r>
-              <a:rPr lang="pt-BR" smtClean="0"/>
+              <a:rPr lang="pt-BR"/>
               <a:t>Quarto nível</a:t>
             </a:r>
           </a:p>
           <a:p>
             <a:pPr lvl="4"/>
             <a:r>
-              <a:rPr lang="pt-BR" smtClean="0"/>
+              <a:rPr lang="pt-BR"/>
               <a:t>Quinto nível</a:t>
             </a:r>
-            <a:endParaRPr lang="pt-BR"/>
           </a:p>
         </p:txBody>
       </p:sp>
@@ -605,7 +602,7 @@
           <a:p>
             <a:fld id="{2EDF32D7-A802-4CED-A4B7-23DAC1B43898}" type="datetimeFigureOut">
               <a:rPr lang="pt-BR" smtClean="0"/>
-              <a:t>01/11/2019</a:t>
+              <a:t>03/11/2019</a:t>
             </a:fld>
             <a:endParaRPr lang="pt-BR"/>
           </a:p>
@@ -699,10 +696,9 @@
           <a:lstStyle/>
           <a:p>
             <a:r>
-              <a:rPr lang="pt-BR" smtClean="0"/>
+              <a:rPr lang="pt-BR"/>
               <a:t>Clique para editar o título mestre</a:t>
             </a:r>
-            <a:endParaRPr lang="pt-BR"/>
           </a:p>
         </p:txBody>
       </p:sp>
@@ -723,38 +719,37 @@
           <a:p>
             <a:pPr lvl="0"/>
             <a:r>
-              <a:rPr lang="pt-BR" smtClean="0"/>
+              <a:rPr lang="pt-BR"/>
               <a:t>Editar estilos de texto Mestre</a:t>
             </a:r>
           </a:p>
           <a:p>
             <a:pPr lvl="1"/>
             <a:r>
-              <a:rPr lang="pt-BR" smtClean="0"/>
+              <a:rPr lang="pt-BR"/>
               <a:t>Segundo nível</a:t>
             </a:r>
           </a:p>
           <a:p>
             <a:pPr lvl="2"/>
             <a:r>
-              <a:rPr lang="pt-BR" smtClean="0"/>
+              <a:rPr lang="pt-BR"/>
               <a:t>Terceiro nível</a:t>
             </a:r>
           </a:p>
           <a:p>
             <a:pPr lvl="3"/>
             <a:r>
-              <a:rPr lang="pt-BR" smtClean="0"/>
+              <a:rPr lang="pt-BR"/>
               <a:t>Quarto nível</a:t>
             </a:r>
           </a:p>
           <a:p>
             <a:pPr lvl="4"/>
             <a:r>
-              <a:rPr lang="pt-BR" smtClean="0"/>
+              <a:rPr lang="pt-BR"/>
               <a:t>Quinto nível</a:t>
             </a:r>
-            <a:endParaRPr lang="pt-BR"/>
           </a:p>
         </p:txBody>
       </p:sp>
@@ -775,7 +770,7 @@
           <a:p>
             <a:fld id="{2EDF32D7-A802-4CED-A4B7-23DAC1B43898}" type="datetimeFigureOut">
               <a:rPr lang="pt-BR" smtClean="0"/>
-              <a:t>01/11/2019</a:t>
+              <a:t>03/11/2019</a:t>
             </a:fld>
             <a:endParaRPr lang="pt-BR"/>
           </a:p>
@@ -878,10 +873,9 @@
           </a:lstStyle>
           <a:p>
             <a:r>
-              <a:rPr lang="pt-BR" smtClean="0"/>
+              <a:rPr lang="pt-BR"/>
               <a:t>Clique para editar o título mestre</a:t>
             </a:r>
-            <a:endParaRPr lang="pt-BR"/>
           </a:p>
         </p:txBody>
       </p:sp>
@@ -998,7 +992,7 @@
           <a:p>
             <a:pPr lvl="0"/>
             <a:r>
-              <a:rPr lang="pt-BR" smtClean="0"/>
+              <a:rPr lang="pt-BR"/>
               <a:t>Editar estilos de texto Mestre</a:t>
             </a:r>
           </a:p>
@@ -1021,7 +1015,7 @@
           <a:p>
             <a:fld id="{2EDF32D7-A802-4CED-A4B7-23DAC1B43898}" type="datetimeFigureOut">
               <a:rPr lang="pt-BR" smtClean="0"/>
-              <a:t>01/11/2019</a:t>
+              <a:t>03/11/2019</a:t>
             </a:fld>
             <a:endParaRPr lang="pt-BR"/>
           </a:p>
@@ -1115,10 +1109,9 @@
           <a:lstStyle/>
           <a:p>
             <a:r>
-              <a:rPr lang="pt-BR" smtClean="0"/>
+              <a:rPr lang="pt-BR"/>
               <a:t>Clique para editar o título mestre</a:t>
             </a:r>
-            <a:endParaRPr lang="pt-BR"/>
           </a:p>
         </p:txBody>
       </p:sp>
@@ -1144,38 +1137,37 @@
           <a:p>
             <a:pPr lvl="0"/>
             <a:r>
-              <a:rPr lang="pt-BR" smtClean="0"/>
+              <a:rPr lang="pt-BR"/>
               <a:t>Editar estilos de texto Mestre</a:t>
             </a:r>
           </a:p>
           <a:p>
             <a:pPr lvl="1"/>
             <a:r>
-              <a:rPr lang="pt-BR" smtClean="0"/>
+              <a:rPr lang="pt-BR"/>
               <a:t>Segundo nível</a:t>
             </a:r>
           </a:p>
           <a:p>
             <a:pPr lvl="2"/>
             <a:r>
-              <a:rPr lang="pt-BR" smtClean="0"/>
+              <a:rPr lang="pt-BR"/>
               <a:t>Terceiro nível</a:t>
             </a:r>
           </a:p>
           <a:p>
             <a:pPr lvl="3"/>
             <a:r>
-              <a:rPr lang="pt-BR" smtClean="0"/>
+              <a:rPr lang="pt-BR"/>
               <a:t>Quarto nível</a:t>
             </a:r>
           </a:p>
           <a:p>
             <a:pPr lvl="4"/>
             <a:r>
-              <a:rPr lang="pt-BR" smtClean="0"/>
+              <a:rPr lang="pt-BR"/>
               <a:t>Quinto nível</a:t>
             </a:r>
-            <a:endParaRPr lang="pt-BR"/>
           </a:p>
         </p:txBody>
       </p:sp>
@@ -1201,38 +1193,37 @@
           <a:p>
             <a:pPr lvl="0"/>
             <a:r>
-              <a:rPr lang="pt-BR" smtClean="0"/>
+              <a:rPr lang="pt-BR"/>
               <a:t>Editar estilos de texto Mestre</a:t>
             </a:r>
           </a:p>
           <a:p>
             <a:pPr lvl="1"/>
             <a:r>
-              <a:rPr lang="pt-BR" smtClean="0"/>
+              <a:rPr lang="pt-BR"/>
               <a:t>Segundo nível</a:t>
             </a:r>
           </a:p>
           <a:p>
             <a:pPr lvl="2"/>
             <a:r>
-              <a:rPr lang="pt-BR" smtClean="0"/>
+              <a:rPr lang="pt-BR"/>
               <a:t>Terceiro nível</a:t>
             </a:r>
           </a:p>
           <a:p>
             <a:pPr lvl="3"/>
             <a:r>
-              <a:rPr lang="pt-BR" smtClean="0"/>
+              <a:rPr lang="pt-BR"/>
               <a:t>Quarto nível</a:t>
             </a:r>
           </a:p>
           <a:p>
             <a:pPr lvl="4"/>
             <a:r>
-              <a:rPr lang="pt-BR" smtClean="0"/>
+              <a:rPr lang="pt-BR"/>
               <a:t>Quinto nível</a:t>
             </a:r>
-            <a:endParaRPr lang="pt-BR"/>
           </a:p>
         </p:txBody>
       </p:sp>
@@ -1253,7 +1244,7 @@
           <a:p>
             <a:fld id="{2EDF32D7-A802-4CED-A4B7-23DAC1B43898}" type="datetimeFigureOut">
               <a:rPr lang="pt-BR" smtClean="0"/>
-              <a:t>01/11/2019</a:t>
+              <a:t>03/11/2019</a:t>
             </a:fld>
             <a:endParaRPr lang="pt-BR"/>
           </a:p>
@@ -1352,10 +1343,9 @@
           <a:lstStyle/>
           <a:p>
             <a:r>
-              <a:rPr lang="pt-BR" smtClean="0"/>
+              <a:rPr lang="pt-BR"/>
               <a:t>Clique para editar o título mestre</a:t>
             </a:r>
-            <a:endParaRPr lang="pt-BR"/>
           </a:p>
         </p:txBody>
       </p:sp>
@@ -1418,7 +1408,7 @@
           <a:p>
             <a:pPr lvl="0"/>
             <a:r>
-              <a:rPr lang="pt-BR" smtClean="0"/>
+              <a:rPr lang="pt-BR"/>
               <a:t>Editar estilos de texto Mestre</a:t>
             </a:r>
           </a:p>
@@ -1446,38 +1436,37 @@
           <a:p>
             <a:pPr lvl="0"/>
             <a:r>
-              <a:rPr lang="pt-BR" smtClean="0"/>
+              <a:rPr lang="pt-BR"/>
               <a:t>Editar estilos de texto Mestre</a:t>
             </a:r>
           </a:p>
           <a:p>
             <a:pPr lvl="1"/>
             <a:r>
-              <a:rPr lang="pt-BR" smtClean="0"/>
+              <a:rPr lang="pt-BR"/>
               <a:t>Segundo nível</a:t>
             </a:r>
           </a:p>
           <a:p>
             <a:pPr lvl="2"/>
             <a:r>
-              <a:rPr lang="pt-BR" smtClean="0"/>
+              <a:rPr lang="pt-BR"/>
               <a:t>Terceiro nível</a:t>
             </a:r>
           </a:p>
           <a:p>
             <a:pPr lvl="3"/>
             <a:r>
-              <a:rPr lang="pt-BR" smtClean="0"/>
+              <a:rPr lang="pt-BR"/>
               <a:t>Quarto nível</a:t>
             </a:r>
           </a:p>
           <a:p>
             <a:pPr lvl="4"/>
             <a:r>
-              <a:rPr lang="pt-BR" smtClean="0"/>
+              <a:rPr lang="pt-BR"/>
               <a:t>Quinto nível</a:t>
             </a:r>
-            <a:endParaRPr lang="pt-BR"/>
           </a:p>
         </p:txBody>
       </p:sp>
@@ -1540,7 +1529,7 @@
           <a:p>
             <a:pPr lvl="0"/>
             <a:r>
-              <a:rPr lang="pt-BR" smtClean="0"/>
+              <a:rPr lang="pt-BR"/>
               <a:t>Editar estilos de texto Mestre</a:t>
             </a:r>
           </a:p>
@@ -1568,38 +1557,37 @@
           <a:p>
             <a:pPr lvl="0"/>
             <a:r>
-              <a:rPr lang="pt-BR" smtClean="0"/>
+              <a:rPr lang="pt-BR"/>
               <a:t>Editar estilos de texto Mestre</a:t>
             </a:r>
           </a:p>
           <a:p>
             <a:pPr lvl="1"/>
             <a:r>
-              <a:rPr lang="pt-BR" smtClean="0"/>
+              <a:rPr lang="pt-BR"/>
               <a:t>Segundo nível</a:t>
             </a:r>
           </a:p>
           <a:p>
             <a:pPr lvl="2"/>
             <a:r>
-              <a:rPr lang="pt-BR" smtClean="0"/>
+              <a:rPr lang="pt-BR"/>
               <a:t>Terceiro nível</a:t>
             </a:r>
           </a:p>
           <a:p>
             <a:pPr lvl="3"/>
             <a:r>
-              <a:rPr lang="pt-BR" smtClean="0"/>
+              <a:rPr lang="pt-BR"/>
               <a:t>Quarto nível</a:t>
             </a:r>
           </a:p>
           <a:p>
             <a:pPr lvl="4"/>
             <a:r>
-              <a:rPr lang="pt-BR" smtClean="0"/>
+              <a:rPr lang="pt-BR"/>
               <a:t>Quinto nível</a:t>
             </a:r>
-            <a:endParaRPr lang="pt-BR"/>
           </a:p>
         </p:txBody>
       </p:sp>
@@ -1620,7 +1608,7 @@
           <a:p>
             <a:fld id="{2EDF32D7-A802-4CED-A4B7-23DAC1B43898}" type="datetimeFigureOut">
               <a:rPr lang="pt-BR" smtClean="0"/>
-              <a:t>01/11/2019</a:t>
+              <a:t>03/11/2019</a:t>
             </a:fld>
             <a:endParaRPr lang="pt-BR"/>
           </a:p>
@@ -1714,10 +1702,9 @@
           <a:lstStyle/>
           <a:p>
             <a:r>
-              <a:rPr lang="pt-BR" smtClean="0"/>
+              <a:rPr lang="pt-BR"/>
               <a:t>Clique para editar o título mestre</a:t>
             </a:r>
-            <a:endParaRPr lang="pt-BR"/>
           </a:p>
         </p:txBody>
       </p:sp>
@@ -1738,7 +1725,7 @@
           <a:p>
             <a:fld id="{2EDF32D7-A802-4CED-A4B7-23DAC1B43898}" type="datetimeFigureOut">
               <a:rPr lang="pt-BR" smtClean="0"/>
-              <a:t>01/11/2019</a:t>
+              <a:t>03/11/2019</a:t>
             </a:fld>
             <a:endParaRPr lang="pt-BR"/>
           </a:p>
@@ -1833,7 +1820,7 @@
           <a:p>
             <a:fld id="{2EDF32D7-A802-4CED-A4B7-23DAC1B43898}" type="datetimeFigureOut">
               <a:rPr lang="pt-BR" smtClean="0"/>
-              <a:t>01/11/2019</a:t>
+              <a:t>03/11/2019</a:t>
             </a:fld>
             <a:endParaRPr lang="pt-BR"/>
           </a:p>
@@ -1936,10 +1923,9 @@
           </a:lstStyle>
           <a:p>
             <a:r>
-              <a:rPr lang="pt-BR" smtClean="0"/>
+              <a:rPr lang="pt-BR"/>
               <a:t>Clique para editar o título mestre</a:t>
             </a:r>
-            <a:endParaRPr lang="pt-BR"/>
           </a:p>
         </p:txBody>
       </p:sp>
@@ -1993,38 +1979,37 @@
           <a:p>
             <a:pPr lvl="0"/>
             <a:r>
-              <a:rPr lang="pt-BR" smtClean="0"/>
+              <a:rPr lang="pt-BR"/>
               <a:t>Editar estilos de texto Mestre</a:t>
             </a:r>
           </a:p>
           <a:p>
             <a:pPr lvl="1"/>
             <a:r>
-              <a:rPr lang="pt-BR" smtClean="0"/>
+              <a:rPr lang="pt-BR"/>
               <a:t>Segundo nível</a:t>
             </a:r>
           </a:p>
           <a:p>
             <a:pPr lvl="2"/>
             <a:r>
-              <a:rPr lang="pt-BR" smtClean="0"/>
+              <a:rPr lang="pt-BR"/>
               <a:t>Terceiro nível</a:t>
             </a:r>
           </a:p>
           <a:p>
             <a:pPr lvl="3"/>
             <a:r>
-              <a:rPr lang="pt-BR" smtClean="0"/>
+              <a:rPr lang="pt-BR"/>
               <a:t>Quarto nível</a:t>
             </a:r>
           </a:p>
           <a:p>
             <a:pPr lvl="4"/>
             <a:r>
-              <a:rPr lang="pt-BR" smtClean="0"/>
+              <a:rPr lang="pt-BR"/>
               <a:t>Quinto nível</a:t>
             </a:r>
-            <a:endParaRPr lang="pt-BR"/>
           </a:p>
         </p:txBody>
       </p:sp>
@@ -2087,7 +2072,7 @@
           <a:p>
             <a:pPr lvl="0"/>
             <a:r>
-              <a:rPr lang="pt-BR" smtClean="0"/>
+              <a:rPr lang="pt-BR"/>
               <a:t>Editar estilos de texto Mestre</a:t>
             </a:r>
           </a:p>
@@ -2110,7 +2095,7 @@
           <a:p>
             <a:fld id="{2EDF32D7-A802-4CED-A4B7-23DAC1B43898}" type="datetimeFigureOut">
               <a:rPr lang="pt-BR" smtClean="0"/>
-              <a:t>01/11/2019</a:t>
+              <a:t>03/11/2019</a:t>
             </a:fld>
             <a:endParaRPr lang="pt-BR"/>
           </a:p>
@@ -2213,10 +2198,9 @@
           </a:lstStyle>
           <a:p>
             <a:r>
-              <a:rPr lang="pt-BR" smtClean="0"/>
+              <a:rPr lang="pt-BR"/>
               <a:t>Clique para editar o título mestre</a:t>
             </a:r>
-            <a:endParaRPr lang="pt-BR"/>
           </a:p>
         </p:txBody>
       </p:sp>
@@ -2340,7 +2324,7 @@
           <a:p>
             <a:pPr lvl="0"/>
             <a:r>
-              <a:rPr lang="pt-BR" smtClean="0"/>
+              <a:rPr lang="pt-BR"/>
               <a:t>Editar estilos de texto Mestre</a:t>
             </a:r>
           </a:p>
@@ -2363,7 +2347,7 @@
           <a:p>
             <a:fld id="{2EDF32D7-A802-4CED-A4B7-23DAC1B43898}" type="datetimeFigureOut">
               <a:rPr lang="pt-BR" smtClean="0"/>
-              <a:t>01/11/2019</a:t>
+              <a:t>03/11/2019</a:t>
             </a:fld>
             <a:endParaRPr lang="pt-BR"/>
           </a:p>
@@ -2472,10 +2456,9 @@
           <a:lstStyle/>
           <a:p>
             <a:r>
-              <a:rPr lang="pt-BR" smtClean="0"/>
+              <a:rPr lang="pt-BR"/>
               <a:t>Clique para editar o título mestre</a:t>
             </a:r>
-            <a:endParaRPr lang="pt-BR"/>
           </a:p>
         </p:txBody>
       </p:sp>
@@ -2506,38 +2489,37 @@
           <a:p>
             <a:pPr lvl="0"/>
             <a:r>
-              <a:rPr lang="pt-BR" smtClean="0"/>
+              <a:rPr lang="pt-BR"/>
               <a:t>Editar estilos de texto Mestre</a:t>
             </a:r>
           </a:p>
           <a:p>
             <a:pPr lvl="1"/>
             <a:r>
-              <a:rPr lang="pt-BR" smtClean="0"/>
+              <a:rPr lang="pt-BR"/>
               <a:t>Segundo nível</a:t>
             </a:r>
           </a:p>
           <a:p>
             <a:pPr lvl="2"/>
             <a:r>
-              <a:rPr lang="pt-BR" smtClean="0"/>
+              <a:rPr lang="pt-BR"/>
               <a:t>Terceiro nível</a:t>
             </a:r>
           </a:p>
           <a:p>
             <a:pPr lvl="3"/>
             <a:r>
-              <a:rPr lang="pt-BR" smtClean="0"/>
+              <a:rPr lang="pt-BR"/>
               <a:t>Quarto nível</a:t>
             </a:r>
           </a:p>
           <a:p>
             <a:pPr lvl="4"/>
             <a:r>
-              <a:rPr lang="pt-BR" smtClean="0"/>
+              <a:rPr lang="pt-BR"/>
               <a:t>Quinto nível</a:t>
             </a:r>
-            <a:endParaRPr lang="pt-BR"/>
           </a:p>
         </p:txBody>
       </p:sp>
@@ -2576,7 +2558,7 @@
           <a:p>
             <a:fld id="{2EDF32D7-A802-4CED-A4B7-23DAC1B43898}" type="datetimeFigureOut">
               <a:rPr lang="pt-BR" smtClean="0"/>
-              <a:t>01/11/2019</a:t>
+              <a:t>03/11/2019</a:t>
             </a:fld>
             <a:endParaRPr lang="pt-BR"/>
           </a:p>
@@ -2997,10 +2979,9 @@
           <a:lstStyle/>
           <a:p>
             <a:r>
-              <a:rPr lang="pt-BR" dirty="0" smtClean="0"/>
+              <a:rPr lang="pt-BR" dirty="0"/>
               <a:t>Módulo Bluetooth HC-05</a:t>
             </a:r>
-            <a:endParaRPr lang="pt-BR" dirty="0"/>
           </a:p>
         </p:txBody>
       </p:sp>
@@ -3069,10 +3050,9 @@
           <a:lstStyle/>
           <a:p>
             <a:r>
-              <a:rPr lang="pt-BR" dirty="0" smtClean="0"/>
+              <a:rPr lang="pt-BR" dirty="0"/>
               <a:t>Comunicação Bluetooth entre dispositivos</a:t>
             </a:r>
-            <a:endParaRPr lang="pt-BR" dirty="0"/>
           </a:p>
         </p:txBody>
       </p:sp>
@@ -3097,7 +3077,7 @@
               <a:buNone/>
             </a:pPr>
             <a:r>
-              <a:rPr lang="pt-BR" dirty="0" smtClean="0"/>
+              <a:rPr lang="pt-BR" dirty="0"/>
               <a:t>Então, quando queremos uma comunicação com o módulo Bluetooth HC-05 por meio de um celular, conectamos este módulo a um PC via um conversor serial para USB. </a:t>
             </a:r>
           </a:p>
@@ -3106,10 +3086,9 @@
               <a:buNone/>
             </a:pPr>
             <a:r>
-              <a:rPr lang="pt-BR" dirty="0" smtClean="0"/>
+              <a:rPr lang="pt-BR" dirty="0"/>
               <a:t>Antes de estabelecer uma comunicação entre os dois dispositivos Bluetooth, precisamos parear o módulo Bluetooth HC-05 com o celular.</a:t>
             </a:r>
-            <a:endParaRPr lang="pt-BR" dirty="0"/>
           </a:p>
         </p:txBody>
       </p:sp>
@@ -3159,10 +3138,9 @@
           <a:lstStyle/>
           <a:p>
             <a:r>
-              <a:rPr lang="pt-BR" dirty="0" smtClean="0"/>
+              <a:rPr lang="pt-BR" dirty="0"/>
               <a:t>Parear módulo HC-05 e celular</a:t>
             </a:r>
-            <a:endParaRPr lang="pt-BR" dirty="0"/>
           </a:p>
         </p:txBody>
       </p:sp>
@@ -3188,7 +3166,7 @@
               <a:buAutoNum type="arabicPeriod"/>
             </a:pPr>
             <a:r>
-              <a:rPr lang="pt-BR" dirty="0" smtClean="0"/>
+              <a:rPr lang="pt-BR" dirty="0"/>
               <a:t>Procure por um novo dispositivo Bluetooth em seu celular. Ele será encontrado com o nome “HC-05”; e</a:t>
             </a:r>
           </a:p>
@@ -3198,10 +3176,9 @@
               <a:buAutoNum type="arabicPeriod"/>
             </a:pPr>
             <a:r>
-              <a:rPr lang="pt-BR" dirty="0" smtClean="0"/>
+              <a:rPr lang="pt-BR" dirty="0"/>
               <a:t>Clique na opção para parear o dispositivo. O número PIN padrão para o módulo HC-05 é 1234 ou 0000.</a:t>
             </a:r>
-            <a:endParaRPr lang="pt-BR" dirty="0"/>
           </a:p>
         </p:txBody>
       </p:sp>
@@ -3251,10 +3228,690 @@
           <a:lstStyle/>
           <a:p>
             <a:r>
-              <a:rPr lang="pt-BR" dirty="0" smtClean="0"/>
+              <a:rPr lang="pt-BR" dirty="0"/>
+              <a:t>Parear módulo HC-05 e celular</a:t>
+            </a:r>
+          </a:p>
+        </p:txBody>
+      </p:sp>
+      <p:sp>
+        <p:nvSpPr>
+          <p:cNvPr id="3" name="Espaço Reservado para Conteúdo 2"/>
+          <p:cNvSpPr>
+            <a:spLocks noGrp="1"/>
+          </p:cNvSpPr>
+          <p:nvPr>
+            <p:ph idx="1"/>
+          </p:nvPr>
+        </p:nvSpPr>
+        <p:spPr/>
+        <p:txBody>
+          <a:bodyPr>
+            <a:normAutofit lnSpcReduction="10000"/>
+          </a:bodyPr>
+          <a:lstStyle/>
+          <a:p>
+            <a:r>
+              <a:rPr lang="pt-BR" dirty="0"/>
+              <a:t>Depois de parear 2 dispositivos Bluetooth, abra o terminal no PC e selecione a porta USB na qual está conectado o módulo serial. Também selecione o taxa de transmissão padrão de 9600bps.</a:t>
+            </a:r>
+          </a:p>
+          <a:p>
+            <a:r>
+              <a:rPr lang="pt-BR" dirty="0"/>
+              <a:t>No celular, abra o aplicativo de terminal Bluetooth e conecte com o dispositivo pareado HC-05.</a:t>
+            </a:r>
+          </a:p>
+          <a:p>
+            <a:r>
+              <a:rPr lang="pt-BR" dirty="0"/>
+              <a:t>A transmissão de dados é simples, basta digitar no aplicativo terminal Bluetooth do celular. Os caracteres serão enviados pela comunicação sem fio ao módulo Bluetooth HC-05, que os transmitirá automaticamente para o PC, via comunicação serial, que os exibirá no terminal. Da mesma forma é possível transmitir dados do PC para o celular.</a:t>
+            </a:r>
+          </a:p>
+        </p:txBody>
+      </p:sp>
+    </p:spTree>
+    <p:extLst>
+      <p:ext uri="{BB962C8B-B14F-4D97-AF65-F5344CB8AC3E}">
+        <p14:creationId xmlns:p14="http://schemas.microsoft.com/office/powerpoint/2010/main" val="655791202"/>
+      </p:ext>
+    </p:extLst>
+  </p:cSld>
+  <p:clrMapOvr>
+    <a:masterClrMapping/>
+  </p:clrMapOvr>
+</p:sld>
+</file>
+
+<file path=ppt/slides/slide13.xml><?xml version="1.0" encoding="utf-8"?>
+<p:sld xmlns:a="http://schemas.openxmlformats.org/drawingml/2006/main" xmlns:r="http://schemas.openxmlformats.org/officeDocument/2006/relationships" xmlns:p="http://schemas.openxmlformats.org/presentationml/2006/main">
+  <p:cSld>
+    <p:spTree>
+      <p:nvGrpSpPr>
+        <p:cNvPr id="1" name=""/>
+        <p:cNvGrpSpPr/>
+        <p:nvPr/>
+      </p:nvGrpSpPr>
+      <p:grpSpPr>
+        <a:xfrm>
+          <a:off x="0" y="0"/>
+          <a:ext cx="0" cy="0"/>
+          <a:chOff x="0" y="0"/>
+          <a:chExt cx="0" cy="0"/>
+        </a:xfrm>
+      </p:grpSpPr>
+      <p:sp>
+        <p:nvSpPr>
+          <p:cNvPr id="2" name="Título 1"/>
+          <p:cNvSpPr>
+            <a:spLocks noGrp="1"/>
+          </p:cNvSpPr>
+          <p:nvPr>
+            <p:ph type="title"/>
+          </p:nvPr>
+        </p:nvSpPr>
+        <p:spPr/>
+        <p:txBody>
+          <a:bodyPr/>
+          <a:lstStyle/>
+          <a:p>
+            <a:r>
+              <a:rPr lang="pt-BR" dirty="0"/>
+              <a:t>Modo Comando</a:t>
+            </a:r>
+          </a:p>
+        </p:txBody>
+      </p:sp>
+      <p:sp>
+        <p:nvSpPr>
+          <p:cNvPr id="3" name="Espaço Reservado para Conteúdo 2"/>
+          <p:cNvSpPr>
+            <a:spLocks noGrp="1"/>
+          </p:cNvSpPr>
+          <p:nvPr>
+            <p:ph idx="1"/>
+          </p:nvPr>
+        </p:nvSpPr>
+        <p:spPr/>
+        <p:txBody>
+          <a:bodyPr>
+            <a:normAutofit fontScale="92500" lnSpcReduction="20000"/>
+          </a:bodyPr>
+          <a:lstStyle/>
+          <a:p>
+            <a:r>
+              <a:rPr lang="pt-BR" dirty="0"/>
+              <a:t>Quando queremos alterar configurações do módulo Bluetooth HC-05 como senha para conexão, taxa de transmissão, nome, </a:t>
+            </a:r>
+            <a:r>
+              <a:rPr lang="pt-BR" dirty="0" err="1"/>
+              <a:t>etc</a:t>
+            </a:r>
+            <a:r>
+              <a:rPr lang="pt-BR" dirty="0"/>
+              <a:t>;</a:t>
+            </a:r>
+          </a:p>
+          <a:p>
+            <a:r>
+              <a:rPr lang="pt-BR" dirty="0"/>
+              <a:t>Para isso, o módulo HC-05 tem comandos AT;</a:t>
+            </a:r>
+          </a:p>
+          <a:p>
+            <a:r>
+              <a:rPr lang="pt-BR" dirty="0"/>
+              <a:t>Para usar o módulo HC-05 no modo Comando conecte o pino Key/EM a um sinal HIGH (VCC);</a:t>
+            </a:r>
+          </a:p>
+          <a:p>
+            <a:r>
+              <a:rPr lang="pt-BR" dirty="0"/>
+              <a:t>A taxa de transmissão padrão do módulo HC-05 no modo Comando é 38400 </a:t>
+            </a:r>
+            <a:r>
+              <a:rPr lang="pt-BR" dirty="0" err="1"/>
+              <a:t>bps</a:t>
+            </a:r>
+            <a:r>
+              <a:rPr lang="pt-BR" dirty="0"/>
+              <a:t>;</a:t>
+            </a:r>
+          </a:p>
+          <a:p>
+            <a:r>
+              <a:rPr lang="pt-BR" dirty="0"/>
+              <a:t>A seguir são relacionados alguns comandos AT usados para alterar configurações do módulo HC-05;</a:t>
+            </a:r>
+          </a:p>
+          <a:p>
+            <a:r>
+              <a:rPr lang="pt-BR" dirty="0"/>
+              <a:t>Para enviar estes comandos, é necessário conectar o módulo HC-05 ao PC por meio de um conversor serial para USB e transmitir estes comandos através do terminal serial do PC.</a:t>
+            </a:r>
+          </a:p>
+        </p:txBody>
+      </p:sp>
+    </p:spTree>
+    <p:extLst>
+      <p:ext uri="{BB962C8B-B14F-4D97-AF65-F5344CB8AC3E}">
+        <p14:creationId xmlns:p14="http://schemas.microsoft.com/office/powerpoint/2010/main" val="269995166"/>
+      </p:ext>
+    </p:extLst>
+  </p:cSld>
+  <p:clrMapOvr>
+    <a:masterClrMapping/>
+  </p:clrMapOvr>
+</p:sld>
+</file>
+
+<file path=ppt/slides/slide14.xml><?xml version="1.0" encoding="utf-8"?>
+<p:sld xmlns:a="http://schemas.openxmlformats.org/drawingml/2006/main" xmlns:r="http://schemas.openxmlformats.org/officeDocument/2006/relationships" xmlns:p="http://schemas.openxmlformats.org/presentationml/2006/main">
+  <p:cSld>
+    <p:spTree>
+      <p:nvGrpSpPr>
+        <p:cNvPr id="1" name=""/>
+        <p:cNvGrpSpPr/>
+        <p:nvPr/>
+      </p:nvGrpSpPr>
+      <p:grpSpPr>
+        <a:xfrm>
+          <a:off x="0" y="0"/>
+          <a:ext cx="0" cy="0"/>
+          <a:chOff x="0" y="0"/>
+          <a:chExt cx="0" cy="0"/>
+        </a:xfrm>
+      </p:grpSpPr>
+      <p:sp>
+        <p:nvSpPr>
+          <p:cNvPr id="2" name="Título 1"/>
+          <p:cNvSpPr>
+            <a:spLocks noGrp="1"/>
+          </p:cNvSpPr>
+          <p:nvPr>
+            <p:ph type="title"/>
+          </p:nvPr>
+        </p:nvSpPr>
+        <p:spPr/>
+        <p:txBody>
+          <a:bodyPr/>
+          <a:lstStyle/>
+          <a:p>
+            <a:r>
+              <a:rPr lang="pt-BR" dirty="0"/>
+              <a:t>Modo Comando</a:t>
+            </a:r>
+          </a:p>
+        </p:txBody>
+      </p:sp>
+      <p:graphicFrame>
+        <p:nvGraphicFramePr>
+          <p:cNvPr id="4" name="Tabela 4">
+            <a:extLst>
+              <a:ext uri="{FF2B5EF4-FFF2-40B4-BE49-F238E27FC236}">
+                <a16:creationId xmlns:a16="http://schemas.microsoft.com/office/drawing/2014/main" id="{29224EE5-F2BE-4C90-A4BD-22A01B3685EA}"/>
+              </a:ext>
+            </a:extLst>
+          </p:cNvPr>
+          <p:cNvGraphicFramePr>
+            <a:graphicFrameLocks noGrp="1"/>
+          </p:cNvGraphicFramePr>
+          <p:nvPr>
+            <p:ph idx="1"/>
+            <p:extLst>
+              <p:ext uri="{D42A27DB-BD31-4B8C-83A1-F6EECF244321}">
+                <p14:modId xmlns:p14="http://schemas.microsoft.com/office/powerpoint/2010/main" val="1113875400"/>
+              </p:ext>
+            </p:extLst>
+          </p:nvPr>
+        </p:nvGraphicFramePr>
+        <p:xfrm>
+          <a:off x="838200" y="1825625"/>
+          <a:ext cx="10515597" cy="4216400"/>
+        </p:xfrm>
+        <a:graphic>
+          <a:graphicData uri="http://schemas.openxmlformats.org/drawingml/2006/table">
+            <a:tbl>
+              <a:tblPr firstRow="1" bandRow="1">
+                <a:tableStyleId>{5C22544A-7EE6-4342-B048-85BDC9FD1C3A}</a:tableStyleId>
+              </a:tblPr>
+              <a:tblGrid>
+                <a:gridCol w="3505199">
+                  <a:extLst>
+                    <a:ext uri="{9D8B030D-6E8A-4147-A177-3AD203B41FA5}">
+                      <a16:colId xmlns:a16="http://schemas.microsoft.com/office/drawing/2014/main" val="172688435"/>
+                    </a:ext>
+                  </a:extLst>
+                </a:gridCol>
+                <a:gridCol w="3505199">
+                  <a:extLst>
+                    <a:ext uri="{9D8B030D-6E8A-4147-A177-3AD203B41FA5}">
+                      <a16:colId xmlns:a16="http://schemas.microsoft.com/office/drawing/2014/main" val="3499040181"/>
+                    </a:ext>
+                  </a:extLst>
+                </a:gridCol>
+                <a:gridCol w="3505199">
+                  <a:extLst>
+                    <a:ext uri="{9D8B030D-6E8A-4147-A177-3AD203B41FA5}">
+                      <a16:colId xmlns:a16="http://schemas.microsoft.com/office/drawing/2014/main" val="4021505171"/>
+                    </a:ext>
+                  </a:extLst>
+                </a:gridCol>
+              </a:tblGrid>
+              <a:tr h="370840">
+                <a:tc>
+                  <a:txBody>
+                    <a:bodyPr/>
+                    <a:lstStyle/>
+                    <a:p>
+                      <a:r>
+                        <a:rPr lang="pt-BR" noProof="0"/>
+                        <a:t>Comando</a:t>
+                      </a:r>
+                    </a:p>
+                  </a:txBody>
+                  <a:tcPr/>
+                </a:tc>
+                <a:tc>
+                  <a:txBody>
+                    <a:bodyPr/>
+                    <a:lstStyle/>
+                    <a:p>
+                      <a:r>
+                        <a:rPr lang="pt-BR" noProof="0"/>
+                        <a:t>Descrição</a:t>
+                      </a:r>
+                    </a:p>
+                  </a:txBody>
+                  <a:tcPr/>
+                </a:tc>
+                <a:tc>
+                  <a:txBody>
+                    <a:bodyPr/>
+                    <a:lstStyle/>
+                    <a:p>
+                      <a:r>
+                        <a:rPr lang="pt-BR" noProof="0"/>
+                        <a:t>Resposta</a:t>
+                      </a:r>
+                    </a:p>
+                  </a:txBody>
+                  <a:tcPr/>
+                </a:tc>
+                <a:extLst>
+                  <a:ext uri="{0D108BD9-81ED-4DB2-BD59-A6C34878D82A}">
+                    <a16:rowId xmlns:a16="http://schemas.microsoft.com/office/drawing/2014/main" val="2098878999"/>
+                  </a:ext>
+                </a:extLst>
+              </a:tr>
+              <a:tr h="370840">
+                <a:tc>
+                  <a:txBody>
+                    <a:bodyPr/>
+                    <a:lstStyle/>
+                    <a:p>
+                      <a:r>
+                        <a:rPr lang="pt-BR" noProof="0"/>
+                        <a:t>AT</a:t>
+                      </a:r>
+                    </a:p>
+                  </a:txBody>
+                  <a:tcPr/>
+                </a:tc>
+                <a:tc>
+                  <a:txBody>
+                    <a:bodyPr/>
+                    <a:lstStyle/>
+                    <a:p>
+                      <a:r>
+                        <a:rPr lang="pt-BR" noProof="0"/>
+                        <a:t>Verificação de comunicação</a:t>
+                      </a:r>
+                    </a:p>
+                  </a:txBody>
+                  <a:tcPr/>
+                </a:tc>
+                <a:tc>
+                  <a:txBody>
+                    <a:bodyPr/>
+                    <a:lstStyle/>
+                    <a:p>
+                      <a:r>
+                        <a:rPr lang="pt-BR" noProof="0"/>
+                        <a:t>OK</a:t>
+                      </a:r>
+                    </a:p>
+                  </a:txBody>
+                  <a:tcPr/>
+                </a:tc>
+                <a:extLst>
+                  <a:ext uri="{0D108BD9-81ED-4DB2-BD59-A6C34878D82A}">
+                    <a16:rowId xmlns:a16="http://schemas.microsoft.com/office/drawing/2014/main" val="1482021205"/>
+                  </a:ext>
+                </a:extLst>
+              </a:tr>
+              <a:tr h="370840">
+                <a:tc>
+                  <a:txBody>
+                    <a:bodyPr/>
+                    <a:lstStyle/>
+                    <a:p>
+                      <a:r>
+                        <a:rPr lang="pt-BR" noProof="0"/>
+                        <a:t>AT+PSWD=XXXX</a:t>
+                      </a:r>
+                    </a:p>
+                  </a:txBody>
+                  <a:tcPr/>
+                </a:tc>
+                <a:tc>
+                  <a:txBody>
+                    <a:bodyPr/>
+                    <a:lstStyle/>
+                    <a:p>
+                      <a:r>
+                        <a:rPr lang="pt-BR" noProof="0"/>
+                        <a:t>Configurar senha</a:t>
+                      </a:r>
+                      <a:br>
+                        <a:rPr lang="pt-BR" noProof="0"/>
+                      </a:br>
+                      <a:r>
+                        <a:rPr lang="pt-BR" noProof="0"/>
+                        <a:t>(ex.: AT+PSWD=“4567</a:t>
+                      </a:r>
+                      <a:r>
+                        <a:rPr lang="pt-BR" u="none" noProof="0"/>
+                        <a:t>”)</a:t>
+                      </a:r>
+                    </a:p>
+                  </a:txBody>
+                  <a:tcPr/>
+                </a:tc>
+                <a:tc>
+                  <a:txBody>
+                    <a:bodyPr/>
+                    <a:lstStyle/>
+                    <a:p>
+                      <a:r>
+                        <a:rPr lang="pt-BR" noProof="0"/>
+                        <a:t>OK</a:t>
+                      </a:r>
+                    </a:p>
+                  </a:txBody>
+                  <a:tcPr/>
+                </a:tc>
+                <a:extLst>
+                  <a:ext uri="{0D108BD9-81ED-4DB2-BD59-A6C34878D82A}">
+                    <a16:rowId xmlns:a16="http://schemas.microsoft.com/office/drawing/2014/main" val="2397838349"/>
+                  </a:ext>
+                </a:extLst>
+              </a:tr>
+              <a:tr h="370840">
+                <a:tc>
+                  <a:txBody>
+                    <a:bodyPr/>
+                    <a:lstStyle/>
+                    <a:p>
+                      <a:r>
+                        <a:rPr lang="pt-BR" noProof="0"/>
+                        <a:t>AT+NAME=XXXX</a:t>
+                      </a:r>
+                    </a:p>
+                  </a:txBody>
+                  <a:tcPr/>
+                </a:tc>
+                <a:tc>
+                  <a:txBody>
+                    <a:bodyPr/>
+                    <a:lstStyle/>
+                    <a:p>
+                      <a:r>
+                        <a:rPr lang="pt-BR" noProof="0"/>
+                        <a:t>Configurar nome do dispositivo</a:t>
+                      </a:r>
+                      <a:br>
+                        <a:rPr lang="pt-BR" noProof="0"/>
+                      </a:br>
+                      <a:r>
+                        <a:rPr lang="pt-BR" noProof="0"/>
+                        <a:t>(ex.: AT+NAME=MeuHC-05)</a:t>
+                      </a:r>
+                    </a:p>
+                  </a:txBody>
+                  <a:tcPr/>
+                </a:tc>
+                <a:tc>
+                  <a:txBody>
+                    <a:bodyPr/>
+                    <a:lstStyle/>
+                    <a:p>
+                      <a:r>
+                        <a:rPr lang="pt-BR" noProof="0"/>
+                        <a:t>OK</a:t>
+                      </a:r>
+                    </a:p>
+                  </a:txBody>
+                  <a:tcPr/>
+                </a:tc>
+                <a:extLst>
+                  <a:ext uri="{0D108BD9-81ED-4DB2-BD59-A6C34878D82A}">
+                    <a16:rowId xmlns:a16="http://schemas.microsoft.com/office/drawing/2014/main" val="3743083126"/>
+                  </a:ext>
+                </a:extLst>
+              </a:tr>
+              <a:tr h="370840">
+                <a:tc>
+                  <a:txBody>
+                    <a:bodyPr/>
+                    <a:lstStyle/>
+                    <a:p>
+                      <a:r>
+                        <a:rPr lang="pt-BR" noProof="0"/>
+                        <a:t>AT+UART=taxa de transmissão, bit de fim, bit de paridade</a:t>
+                      </a:r>
+                    </a:p>
+                  </a:txBody>
+                  <a:tcPr/>
+                </a:tc>
+                <a:tc>
+                  <a:txBody>
+                    <a:bodyPr/>
+                    <a:lstStyle/>
+                    <a:p>
+                      <a:r>
+                        <a:rPr lang="pt-BR" noProof="0"/>
+                        <a:t>Alterar taxa de transmissão</a:t>
+                      </a:r>
+                      <a:br>
+                        <a:rPr lang="pt-BR" noProof="0"/>
+                      </a:br>
+                      <a:r>
+                        <a:rPr lang="pt-BR" noProof="0"/>
+                        <a:t>(ex.: AT+UART=9600, 1, 0)</a:t>
+                      </a:r>
+                    </a:p>
+                  </a:txBody>
+                  <a:tcPr/>
+                </a:tc>
+                <a:tc>
+                  <a:txBody>
+                    <a:bodyPr/>
+                    <a:lstStyle/>
+                    <a:p>
+                      <a:r>
+                        <a:rPr lang="pt-BR" noProof="0" dirty="0"/>
+                        <a:t>OK</a:t>
+                      </a:r>
+                    </a:p>
+                  </a:txBody>
+                  <a:tcPr/>
+                </a:tc>
+                <a:extLst>
+                  <a:ext uri="{0D108BD9-81ED-4DB2-BD59-A6C34878D82A}">
+                    <a16:rowId xmlns:a16="http://schemas.microsoft.com/office/drawing/2014/main" val="3805797727"/>
+                  </a:ext>
+                </a:extLst>
+              </a:tr>
+              <a:tr h="370840">
+                <a:tc>
+                  <a:txBody>
+                    <a:bodyPr/>
+                    <a:lstStyle/>
+                    <a:p>
+                      <a:r>
+                        <a:rPr lang="pt-BR" noProof="0"/>
+                        <a:t>AT+VERSION?</a:t>
+                      </a:r>
+                    </a:p>
+                  </a:txBody>
+                  <a:tcPr/>
+                </a:tc>
+                <a:tc>
+                  <a:txBody>
+                    <a:bodyPr/>
+                    <a:lstStyle/>
+                    <a:p>
+                      <a:r>
+                        <a:rPr lang="pt-BR" noProof="0" dirty="0"/>
+                        <a:t>Retorna a versão do módulo HC-05</a:t>
+                      </a:r>
+                    </a:p>
+                  </a:txBody>
+                  <a:tcPr/>
+                </a:tc>
+                <a:tc>
+                  <a:txBody>
+                    <a:bodyPr/>
+                    <a:lstStyle/>
+                    <a:p>
+                      <a:r>
+                        <a:rPr lang="en-US" dirty="0"/>
+                        <a:t>+Version: XX OK</a:t>
+                      </a:r>
+                      <a:br>
+                        <a:rPr lang="en-US" dirty="0"/>
+                      </a:br>
+                      <a:r>
+                        <a:rPr lang="en-US" dirty="0"/>
+                        <a:t>(ex.: +Version: 2.0 20130107 OK)</a:t>
+                      </a:r>
+                      <a:endParaRPr lang="pt-BR" dirty="0"/>
+                    </a:p>
+                  </a:txBody>
+                  <a:tcPr/>
+                </a:tc>
+                <a:extLst>
+                  <a:ext uri="{0D108BD9-81ED-4DB2-BD59-A6C34878D82A}">
+                    <a16:rowId xmlns:a16="http://schemas.microsoft.com/office/drawing/2014/main" val="1174517167"/>
+                  </a:ext>
+                </a:extLst>
+              </a:tr>
+              <a:tr h="370840">
+                <a:tc>
+                  <a:txBody>
+                    <a:bodyPr/>
+                    <a:lstStyle/>
+                    <a:p>
+                      <a:r>
+                        <a:rPr lang="en-US" dirty="0"/>
+                        <a:t>AT+ORGL</a:t>
+                      </a:r>
+                      <a:endParaRPr lang="pt-BR" dirty="0"/>
+                    </a:p>
+                  </a:txBody>
+                  <a:tcPr/>
+                </a:tc>
+                <a:tc>
+                  <a:txBody>
+                    <a:bodyPr/>
+                    <a:lstStyle/>
+                    <a:p>
+                      <a:r>
+                        <a:rPr lang="pt-BR" noProof="0" dirty="0"/>
+                        <a:t>Envia detalhes da configuração de fábrica</a:t>
+                      </a:r>
+                    </a:p>
+                  </a:txBody>
+                  <a:tcPr/>
+                </a:tc>
+                <a:tc>
+                  <a:txBody>
+                    <a:bodyPr/>
+                    <a:lstStyle/>
+                    <a:p>
+                      <a:r>
+                        <a:rPr lang="pt-BR" noProof="0" dirty="0"/>
+                        <a:t>Parâmetros: tipo de dispositivo, modo do módulo, parâmetro serial, senha, </a:t>
+                      </a:r>
+                      <a:r>
+                        <a:rPr lang="pt-BR" noProof="0" dirty="0" err="1"/>
+                        <a:t>etc</a:t>
+                      </a:r>
+                      <a:endParaRPr lang="pt-BR" noProof="0" dirty="0"/>
+                    </a:p>
+                  </a:txBody>
+                  <a:tcPr/>
+                </a:tc>
+                <a:extLst>
+                  <a:ext uri="{0D108BD9-81ED-4DB2-BD59-A6C34878D82A}">
+                    <a16:rowId xmlns:a16="http://schemas.microsoft.com/office/drawing/2014/main" val="713704726"/>
+                  </a:ext>
+                </a:extLst>
+              </a:tr>
+            </a:tbl>
+          </a:graphicData>
+        </a:graphic>
+      </p:graphicFrame>
+    </p:spTree>
+    <p:extLst>
+      <p:ext uri="{BB962C8B-B14F-4D97-AF65-F5344CB8AC3E}">
+        <p14:creationId xmlns:p14="http://schemas.microsoft.com/office/powerpoint/2010/main" val="3231072764"/>
+      </p:ext>
+    </p:extLst>
+  </p:cSld>
+  <p:clrMapOvr>
+    <a:masterClrMapping/>
+  </p:clrMapOvr>
+</p:sld>
+</file>
+
+<file path=ppt/slides/slide15.xml><?xml version="1.0" encoding="utf-8"?>
+<p:sld xmlns:a="http://schemas.openxmlformats.org/drawingml/2006/main" xmlns:r="http://schemas.openxmlformats.org/officeDocument/2006/relationships" xmlns:p="http://schemas.openxmlformats.org/presentationml/2006/main">
+  <p:cSld>
+    <p:spTree>
+      <p:nvGrpSpPr>
+        <p:cNvPr id="1" name=""/>
+        <p:cNvGrpSpPr/>
+        <p:nvPr/>
+      </p:nvGrpSpPr>
+      <p:grpSpPr>
+        <a:xfrm>
+          <a:off x="0" y="0"/>
+          <a:ext cx="0" cy="0"/>
+          <a:chOff x="0" y="0"/>
+          <a:chExt cx="0" cy="0"/>
+        </a:xfrm>
+      </p:grpSpPr>
+      <p:sp>
+        <p:nvSpPr>
+          <p:cNvPr id="2" name="Título 1"/>
+          <p:cNvSpPr>
+            <a:spLocks noGrp="1"/>
+          </p:cNvSpPr>
+          <p:nvPr>
+            <p:ph type="title"/>
+          </p:nvPr>
+        </p:nvSpPr>
+        <p:spPr/>
+        <p:txBody>
+          <a:bodyPr/>
+          <a:lstStyle/>
+          <a:p>
+            <a:r>
+              <a:rPr lang="pt-BR" dirty="0"/>
               <a:t>Código de cores de resistores</a:t>
             </a:r>
-            <a:endParaRPr lang="pt-BR" dirty="0"/>
           </a:p>
         </p:txBody>
       </p:sp>
@@ -3300,7 +3957,7 @@
 </p:sld>
 </file>
 
-<file path=ppt/slides/slide13.xml><?xml version="1.0" encoding="utf-8"?>
+<file path=ppt/slides/slide16.xml><?xml version="1.0" encoding="utf-8"?>
 <p:sld xmlns:a="http://schemas.openxmlformats.org/drawingml/2006/main" xmlns:r="http://schemas.openxmlformats.org/officeDocument/2006/relationships" xmlns:p="http://schemas.openxmlformats.org/presentationml/2006/main">
   <p:cSld>
     <p:spTree>
@@ -3333,10 +3990,9 @@
           <a:lstStyle/>
           <a:p>
             <a:r>
-              <a:rPr lang="pt-BR" dirty="0" smtClean="0"/>
+              <a:rPr lang="pt-BR" dirty="0"/>
               <a:t>Referências</a:t>
             </a:r>
-            <a:endParaRPr lang="pt-BR" dirty="0"/>
           </a:p>
         </p:txBody>
       </p:sp>
@@ -3356,27 +4012,27 @@
           <a:lstStyle/>
           <a:p>
             <a:r>
-              <a:rPr lang="pt-BR" dirty="0" smtClean="0">
+              <a:rPr lang="pt-BR" dirty="0">
                 <a:hlinkClick r:id="rId2"/>
               </a:rPr>
               <a:t>https://www.electronicwings.com/sensors-modules/bluetooth-module-hc-05-</a:t>
             </a:r>
-            <a:endParaRPr lang="pt-BR" dirty="0" smtClean="0">
+            <a:endParaRPr lang="pt-BR" dirty="0">
               <a:hlinkClick r:id="rId3"/>
             </a:endParaRPr>
           </a:p>
           <a:p>
             <a:r>
-              <a:rPr lang="pt-BR" dirty="0" smtClean="0">
+              <a:rPr lang="pt-BR" dirty="0">
                 <a:hlinkClick r:id="rId3"/>
               </a:rPr>
               <a:t>https://maker.pro/arduino/tutorial/bluetooth-basics-how-to-control-led-using-smartphone-arduino</a:t>
             </a:r>
-            <a:endParaRPr lang="pt-BR" dirty="0" smtClean="0"/>
-          </a:p>
-          <a:p>
-            <a:r>
-              <a:rPr lang="pt-BR" dirty="0" smtClean="0">
+            <a:endParaRPr lang="pt-BR" dirty="0"/>
+          </a:p>
+          <a:p>
+            <a:r>
+              <a:rPr lang="pt-BR" dirty="0">
                 <a:hlinkClick r:id="rId4"/>
               </a:rPr>
               <a:t>https://howtomechatronics.com/tutorials/arduino/arduino-and-hc-05-bluetooth-module-tutorial/</a:t>
@@ -3431,10 +4087,9 @@
           <a:lstStyle/>
           <a:p>
             <a:r>
-              <a:rPr lang="pt-BR" dirty="0" smtClean="0"/>
+              <a:rPr lang="pt-BR" dirty="0"/>
               <a:t>Introdução</a:t>
             </a:r>
-            <a:endParaRPr lang="pt-BR" dirty="0"/>
           </a:p>
         </p:txBody>
       </p:sp>
@@ -3456,116 +4111,43 @@
           <a:lstStyle/>
           <a:p>
             <a:r>
-              <a:rPr lang="pt-BR" dirty="0" smtClean="0"/>
-              <a:t>É usado </a:t>
-            </a:r>
-            <a:r>
-              <a:rPr lang="pt-BR" dirty="0" smtClean="0"/>
-              <a:t>em </a:t>
-            </a:r>
-            <a:r>
-              <a:rPr lang="pt-BR" dirty="0" smtClean="0"/>
-              <a:t>muitos dispositivos como: fones de ouvido, controles de vídeo game, </a:t>
-            </a:r>
-            <a:r>
-              <a:rPr lang="pt-BR" dirty="0" smtClean="0"/>
-              <a:t>mouse</a:t>
-            </a:r>
-            <a:r>
-              <a:rPr lang="pt-BR" dirty="0"/>
-              <a:t>,</a:t>
-            </a:r>
-            <a:r>
-              <a:rPr lang="pt-BR" dirty="0" smtClean="0"/>
-              <a:t> </a:t>
-            </a:r>
-            <a:r>
-              <a:rPr lang="pt-BR" dirty="0" smtClean="0"/>
-              <a:t>teclado </a:t>
-            </a:r>
-            <a:r>
-              <a:rPr lang="pt-BR" dirty="0" smtClean="0"/>
-              <a:t>e </a:t>
-            </a:r>
-            <a:r>
-              <a:rPr lang="pt-BR" dirty="0" smtClean="0"/>
-              <a:t>outros</a:t>
-            </a:r>
-            <a:r>
-              <a:rPr lang="pt-BR" dirty="0" smtClean="0"/>
-              <a:t>;</a:t>
-            </a:r>
-          </a:p>
-          <a:p>
-            <a:r>
-              <a:rPr lang="pt-BR" dirty="0" smtClean="0"/>
-              <a:t>O sinal pode alcançar até 100 metros, dependendo do transmissor e receptor, atmosfera</a:t>
-            </a:r>
-            <a:r>
-              <a:rPr lang="pt-BR" dirty="0"/>
-              <a:t>, condições </a:t>
-            </a:r>
-            <a:r>
-              <a:rPr lang="pt-BR" dirty="0" smtClean="0"/>
-              <a:t>geográficas </a:t>
-            </a:r>
-            <a:r>
-              <a:rPr lang="pt-BR" dirty="0"/>
-              <a:t>e urbanas</a:t>
-            </a:r>
-            <a:r>
-              <a:rPr lang="pt-BR" dirty="0" smtClean="0"/>
-              <a:t>;</a:t>
-            </a:r>
-          </a:p>
-          <a:p>
-            <a:r>
-              <a:rPr lang="pt-BR" dirty="0" smtClean="0"/>
+              <a:rPr lang="pt-BR" dirty="0"/>
+              <a:t>É usado em muitos dispositivos como: fones de ouvido, controles de vídeo game, mouse, teclado e outros;</a:t>
+            </a:r>
+          </a:p>
+          <a:p>
+            <a:r>
+              <a:rPr lang="pt-BR" dirty="0"/>
+              <a:t>O sinal pode alcançar até 100 metros, dependendo do transmissor e receptor, atmosfera, condições geográficas e urbanas;</a:t>
+            </a:r>
+          </a:p>
+          <a:p>
+            <a:r>
+              <a:rPr lang="pt-BR" dirty="0"/>
               <a:t>É um protocolo padronizado IEEE 802.15.1, por meio do qual pode-se construir redes pessoais sem fio (PAN - </a:t>
             </a:r>
             <a:r>
-              <a:rPr lang="en-US" dirty="0" smtClean="0"/>
-              <a:t>Personal </a:t>
-            </a:r>
-            <a:r>
               <a:rPr lang="en-US" dirty="0"/>
-              <a:t>Area Network</a:t>
-            </a:r>
-            <a:r>
-              <a:rPr lang="pt-BR" dirty="0" smtClean="0"/>
-              <a:t>). Ele usa Espalhamento Espectral </a:t>
-            </a:r>
-            <a:r>
-              <a:rPr lang="pt-BR" dirty="0"/>
-              <a:t>por </a:t>
-            </a:r>
-            <a:r>
-              <a:rPr lang="pt-BR" dirty="0" smtClean="0"/>
-              <a:t>Saltos </a:t>
-            </a:r>
-            <a:r>
-              <a:rPr lang="pt-BR" dirty="0"/>
-              <a:t>em Frequência (FHSS - </a:t>
-            </a:r>
-            <a:r>
-              <a:rPr lang="pt-BR" dirty="0" err="1" smtClean="0"/>
+              <a:t>Personal Area Network</a:t>
+            </a:r>
+            <a:r>
+              <a:rPr lang="pt-BR" dirty="0"/>
+              <a:t>). Ele usa Espalhamento Espectral por Saltos em Frequência (FHSS - </a:t>
+            </a:r>
+            <a:r>
+              <a:rPr lang="pt-BR" dirty="0" err="1"/>
               <a:t>Frequency-Hopping</a:t>
             </a:r>
             <a:r>
-              <a:rPr lang="pt-BR" dirty="0" smtClean="0"/>
+              <a:rPr lang="pt-BR" dirty="0"/>
               <a:t> Spread Spectrum), tecnologia de rádio para enviar dados pelo ar.</a:t>
             </a:r>
           </a:p>
           <a:p>
             <a:r>
-              <a:rPr lang="pt-BR" dirty="0" smtClean="0"/>
-              <a:t>Ele usa comunicação serial para se comunicar com outros dispositivos. </a:t>
-            </a:r>
-            <a:r>
-              <a:rPr lang="pt-BR" dirty="0" smtClean="0"/>
-              <a:t>Ele se comunica com micro controladores usando a portal serial (USART).</a:t>
-            </a:r>
-            <a:endParaRPr lang="pt-BR" dirty="0" smtClean="0"/>
+              <a:rPr lang="pt-BR" dirty="0"/>
+              <a:t>Ele usa comunicação serial para se comunicar com outros dispositivos. Ele se comunica com micro controladores usando a portal serial (USART).</a:t>
+            </a:r>
           </a:p>
           <a:p>
             <a:endParaRPr lang="pt-BR" dirty="0"/>
@@ -3618,10 +4200,9 @@
           <a:lstStyle/>
           <a:p>
             <a:r>
-              <a:rPr lang="pt-BR" dirty="0" smtClean="0"/>
+              <a:rPr lang="pt-BR" dirty="0"/>
               <a:t>Módulo Bluetooth HC-05</a:t>
             </a:r>
-            <a:endParaRPr lang="pt-BR" dirty="0"/>
           </a:p>
         </p:txBody>
       </p:sp>
@@ -3646,10 +4227,9 @@
           <a:lstStyle/>
           <a:p>
             <a:r>
-              <a:rPr lang="pt-BR" dirty="0" smtClean="0"/>
+              <a:rPr lang="pt-BR" dirty="0"/>
               <a:t>HC-05 é um módulo Bluetooth que foi projetado para comunicação sem fio. Este módulo pode ser usado no modo mestre ou escravo.</a:t>
             </a:r>
-            <a:endParaRPr lang="pt-BR" dirty="0"/>
           </a:p>
         </p:txBody>
       </p:sp>
@@ -3740,10 +4320,9 @@
           <a:lstStyle/>
           <a:p>
             <a:r>
-              <a:rPr lang="pt-BR" dirty="0" smtClean="0"/>
+              <a:rPr lang="pt-BR" dirty="0"/>
               <a:t>Descrição dos pinos</a:t>
             </a:r>
-            <a:endParaRPr lang="pt-BR" dirty="0"/>
           </a:p>
         </p:txBody>
       </p:sp>
@@ -3768,10 +4347,9 @@
           <a:lstStyle/>
           <a:p>
             <a:r>
-              <a:rPr lang="pt-BR" dirty="0" smtClean="0"/>
+              <a:rPr lang="pt-BR" dirty="0"/>
               <a:t>Os módulos seriais Bluetooth permitem que todos dispositivos, habilitados para uma comunicação serial, se comuniquem via Bluetooth.</a:t>
             </a:r>
-            <a:endParaRPr lang="pt-BR" dirty="0"/>
           </a:p>
         </p:txBody>
       </p:sp>
@@ -3862,10 +4440,9 @@
           <a:lstStyle/>
           <a:p>
             <a:r>
-              <a:rPr lang="pt-BR" dirty="0" smtClean="0"/>
+              <a:rPr lang="pt-BR" dirty="0"/>
               <a:t>Descrição dos pinos</a:t>
             </a:r>
-            <a:endParaRPr lang="pt-BR" dirty="0"/>
           </a:p>
         </p:txBody>
       </p:sp>
@@ -3888,7 +4465,7 @@
               <a:buNone/>
             </a:pPr>
             <a:r>
-              <a:rPr lang="pt-BR" dirty="0" smtClean="0"/>
+              <a:rPr lang="pt-BR" dirty="0"/>
               <a:t>Ele tem 6 pinos:</a:t>
             </a:r>
           </a:p>
@@ -3898,39 +4475,39 @@
               <a:buAutoNum type="arabicPeriod"/>
             </a:pPr>
             <a:r>
-              <a:rPr lang="pt-BR" dirty="0" smtClean="0"/>
+              <a:rPr lang="pt-BR" dirty="0"/>
               <a:t>Key/EN: é usado para colocar o módulo no modo de comandos AT. Se </a:t>
             </a:r>
             <a:r>
-              <a:rPr lang="pt-BR" dirty="0" err="1" smtClean="0"/>
+              <a:rPr lang="pt-BR" dirty="0" err="1"/>
               <a:t>key</a:t>
             </a:r>
             <a:r>
-              <a:rPr lang="pt-BR" dirty="0" smtClean="0"/>
+              <a:rPr lang="pt-BR" dirty="0"/>
               <a:t>/EN é configurado para HIGH, então o módulo trabalhará no modo </a:t>
             </a:r>
             <a:r>
-              <a:rPr lang="pt-BR" dirty="0" err="1" smtClean="0"/>
+              <a:rPr lang="pt-BR" dirty="0" err="1"/>
               <a:t>Command</a:t>
             </a:r>
             <a:r>
-              <a:rPr lang="pt-BR" dirty="0" smtClean="0"/>
+              <a:rPr lang="pt-BR" dirty="0"/>
               <a:t>. Caso contrário, por padrão, ele permanece no modo Data. A taxa de transmissão padrão do HC-05 no modo </a:t>
             </a:r>
             <a:r>
-              <a:rPr lang="pt-BR" dirty="0" err="1" smtClean="0"/>
+              <a:rPr lang="pt-BR" dirty="0" err="1"/>
               <a:t>Command</a:t>
             </a:r>
             <a:r>
-              <a:rPr lang="pt-BR" dirty="0" smtClean="0"/>
+              <a:rPr lang="pt-BR" dirty="0"/>
               <a:t> é 38400 </a:t>
             </a:r>
             <a:r>
-              <a:rPr lang="pt-BR" dirty="0" err="1" smtClean="0"/>
+              <a:rPr lang="pt-BR" dirty="0" err="1"/>
               <a:t>bps</a:t>
             </a:r>
             <a:r>
-              <a:rPr lang="pt-BR" dirty="0" smtClean="0"/>
+              <a:rPr lang="pt-BR" dirty="0"/>
               <a:t> e 9600 no modo Data.</a:t>
             </a:r>
           </a:p>
@@ -3940,7 +4517,7 @@
               <a:buAutoNum type="alphaLcParenR"/>
             </a:pPr>
             <a:r>
-              <a:rPr lang="pt-BR" dirty="0" smtClean="0"/>
+              <a:rPr lang="pt-BR" dirty="0"/>
               <a:t>Modo Data: troca de dados entre dispositivos; e</a:t>
             </a:r>
           </a:p>
@@ -3950,26 +4527,17 @@
               <a:buAutoNum type="alphaLcParenR"/>
             </a:pPr>
             <a:r>
-              <a:rPr lang="pt-BR" dirty="0" smtClean="0"/>
+              <a:rPr lang="pt-BR" dirty="0"/>
               <a:t>Modo </a:t>
             </a:r>
             <a:r>
-              <a:rPr lang="pt-BR" dirty="0" err="1" smtClean="0"/>
+              <a:rPr lang="pt-BR" dirty="0" err="1"/>
               <a:t>Command</a:t>
             </a:r>
             <a:r>
-              <a:rPr lang="pt-BR" dirty="0" smtClean="0"/>
-              <a:t>: ele usa comandos AT que são usados para alterar configurações do módulo. Esses comandos são enviados pela </a:t>
-            </a:r>
-            <a:r>
-              <a:rPr lang="pt-BR" dirty="0"/>
-              <a:t>porta do módulo serial (USART)</a:t>
-            </a:r>
-            <a:r>
-              <a:rPr lang="pt-BR" dirty="0" smtClean="0"/>
-              <a:t>. </a:t>
-            </a:r>
-            <a:endParaRPr lang="pt-BR" dirty="0"/>
+              <a:rPr lang="pt-BR" dirty="0"/>
+              <a:t>: ele usa comandos AT que são usados para alterar configurações do módulo. Esses comandos são enviados pela porta do módulo serial (USART). </a:t>
+            </a:r>
           </a:p>
         </p:txBody>
       </p:sp>
@@ -4019,10 +4587,9 @@
           <a:lstStyle/>
           <a:p>
             <a:r>
-              <a:rPr lang="pt-BR" dirty="0" smtClean="0"/>
+              <a:rPr lang="pt-BR" dirty="0"/>
               <a:t>Descrição dos pinos</a:t>
             </a:r>
-            <a:endParaRPr lang="pt-BR" dirty="0"/>
           </a:p>
         </p:txBody>
       </p:sp>
@@ -4046,7 +4613,7 @@
               <a:buAutoNum type="arabicPeriod" startAt="2"/>
             </a:pPr>
             <a:r>
-              <a:rPr lang="pt-BR" dirty="0" smtClean="0"/>
+              <a:rPr lang="pt-BR" dirty="0"/>
               <a:t>VCC: conecte 5 ou 3,3 V neste pino;</a:t>
             </a:r>
           </a:p>
@@ -4056,7 +4623,7 @@
               <a:buAutoNum type="arabicPeriod" startAt="2"/>
             </a:pPr>
             <a:r>
-              <a:rPr lang="pt-BR" dirty="0" smtClean="0"/>
+              <a:rPr lang="pt-BR" dirty="0"/>
               <a:t>GND: pino de aterramento do módulo;</a:t>
             </a:r>
           </a:p>
@@ -4066,7 +4633,7 @@
               <a:buAutoNum type="arabicPeriod" startAt="2"/>
             </a:pPr>
             <a:r>
-              <a:rPr lang="pt-BR" dirty="0" smtClean="0"/>
+              <a:rPr lang="pt-BR" dirty="0"/>
               <a:t>TXD: transmite dados serialmente (dados recebidos via Bluetooth são transmitidos serialmente pelo pino TXD);</a:t>
             </a:r>
           </a:p>
@@ -4076,7 +4643,7 @@
               <a:buAutoNum type="arabicPeriod" startAt="2"/>
             </a:pPr>
             <a:r>
-              <a:rPr lang="pt-BR" dirty="0" smtClean="0"/>
+              <a:rPr lang="pt-BR" dirty="0"/>
               <a:t>RXD: recebe dados serialmente (dados recebidos pelo pino RDX são transmitidos via Bluetooth); e</a:t>
             </a:r>
           </a:p>
@@ -4086,14 +4653,13 @@
               <a:buAutoNum type="arabicPeriod" startAt="2"/>
             </a:pPr>
             <a:r>
-              <a:rPr lang="pt-BR" dirty="0" err="1" smtClean="0"/>
+              <a:rPr lang="pt-BR" dirty="0" err="1"/>
               <a:t>State</a:t>
             </a:r>
             <a:r>
-              <a:rPr lang="pt-BR" dirty="0" smtClean="0"/>
+              <a:rPr lang="pt-BR" dirty="0"/>
               <a:t>: ele diz se o módulo está conectado ou não.</a:t>
             </a:r>
-            <a:endParaRPr lang="pt-BR" dirty="0"/>
           </a:p>
         </p:txBody>
       </p:sp>
@@ -4143,10 +4709,9 @@
           <a:lstStyle/>
           <a:p>
             <a:r>
-              <a:rPr lang="pt-BR" dirty="0" smtClean="0"/>
+              <a:rPr lang="pt-BR" dirty="0"/>
               <a:t>Informações</a:t>
             </a:r>
-            <a:endParaRPr lang="pt-BR" dirty="0"/>
           </a:p>
         </p:txBody>
       </p:sp>
@@ -4168,22 +4733,21 @@
           <a:lstStyle/>
           <a:p>
             <a:r>
-              <a:rPr lang="pt-BR" dirty="0" smtClean="0"/>
+              <a:rPr lang="pt-BR" dirty="0"/>
               <a:t>O módulo HC-05 tem um LED vermelho que indica o status da conexão, se o Bluetooth está conectado ou não. Quando o módulo não está conectado, o LED fica piscando continuamente de maneira periódica. Quando está conectado a algum outro dispositivo Bluetooth, ele pisca a cada 2 segundos.</a:t>
             </a:r>
           </a:p>
           <a:p>
             <a:r>
-              <a:rPr lang="pt-BR" dirty="0" smtClean="0"/>
+              <a:rPr lang="pt-BR" dirty="0"/>
               <a:t>Este módulo trabalha em 3,3 V. Contudo, podemos conectá-lo a uma fonte de 5 V, visto que ele tem embutido um regulador de tensão de 5 para 3,3 V.</a:t>
             </a:r>
           </a:p>
           <a:p>
             <a:r>
-              <a:rPr lang="pt-BR" dirty="0" smtClean="0"/>
+              <a:rPr lang="pt-BR" dirty="0"/>
               <a:t>Como o módulo HC-05 trabalha com 3,3 V nos pinos RX/TX e o micro controlador pode detectar níveis de 3,3 V, não é necessário mudar o nível de transmissão do módulo HC-05. Mas nós precisamos mudar a voltagem de transmissão do micro controlador para o pino RX do módulo HC-05.</a:t>
             </a:r>
-            <a:endParaRPr lang="pt-BR" dirty="0"/>
           </a:p>
         </p:txBody>
       </p:sp>
@@ -4233,10 +4797,9 @@
           <a:lstStyle/>
           <a:p>
             <a:r>
-              <a:rPr lang="pt-BR" dirty="0" smtClean="0"/>
+              <a:rPr lang="pt-BR" dirty="0"/>
               <a:t>Comunicação Bluetooth entre dispositivos</a:t>
             </a:r>
-            <a:endParaRPr lang="pt-BR" dirty="0"/>
           </a:p>
         </p:txBody>
       </p:sp>
@@ -4261,7 +4824,7 @@
               <a:buNone/>
             </a:pPr>
             <a:r>
-              <a:rPr lang="pt-BR" dirty="0" smtClean="0"/>
+              <a:rPr lang="pt-BR" dirty="0"/>
               <a:t>Enviar dados do terminal do celular para o módulo Bluetooth HC-05 e ver esses dados no terminal serial do PC e vice-versa.</a:t>
             </a:r>
           </a:p>
@@ -4270,18 +4833,17 @@
               <a:buNone/>
             </a:pPr>
             <a:r>
-              <a:rPr lang="pt-BR" dirty="0" smtClean="0"/>
+              <a:rPr lang="pt-BR" dirty="0"/>
               <a:t>Para que um celular se comunique com o módulo Bluetooth HC-05, ele precisa de um aplicativo terminal Bluetooth para transmitir e receber dados. Aplicativos de terminal Bluetooth para </a:t>
             </a:r>
             <a:r>
-              <a:rPr lang="pt-BR" dirty="0" err="1" smtClean="0"/>
+              <a:rPr lang="pt-BR" dirty="0" err="1"/>
               <a:t>Android</a:t>
             </a:r>
             <a:r>
-              <a:rPr lang="pt-BR" dirty="0" smtClean="0"/>
+              <a:rPr lang="pt-BR" dirty="0"/>
               <a:t> e Windows podem ser encontrados em suas respectivas lojas.</a:t>
             </a:r>
-            <a:endParaRPr lang="pt-BR" dirty="0"/>
           </a:p>
         </p:txBody>
       </p:sp>
@@ -4331,10 +4893,9 @@
           <a:lstStyle/>
           <a:p>
             <a:r>
-              <a:rPr lang="pt-BR" dirty="0" smtClean="0"/>
+              <a:rPr lang="pt-BR" dirty="0"/>
               <a:t>Comunicação Bluetooth entre dispositivos</a:t>
             </a:r>
-            <a:endParaRPr lang="pt-BR" dirty="0"/>
           </a:p>
         </p:txBody>
       </p:sp>

</xml_diff>

<commit_message>
adição de referência para relé
</commit_message>
<xml_diff>
--- a/arduino-bluetooth.pptx
+++ b/arduino-bluetooth.pptx
@@ -274,7 +274,7 @@
           <a:p>
             <a:fld id="{2EDF32D7-A802-4CED-A4B7-23DAC1B43898}" type="datetimeFigureOut">
               <a:rPr lang="pt-BR" smtClean="0"/>
-              <a:t>04/11/2019</a:t>
+              <a:t>05/11/2019</a:t>
             </a:fld>
             <a:endParaRPr lang="pt-BR"/>
           </a:p>
@@ -316,7 +316,7 @@
           <a:p>
             <a:fld id="{90CE46F0-10D9-44E0-9B31-88DCFC46CB51}" type="slidenum">
               <a:rPr lang="pt-BR" smtClean="0"/>
-              <a:t>‹#›</a:t>
+              <a:t>‹nº›</a:t>
             </a:fld>
             <a:endParaRPr lang="pt-BR"/>
           </a:p>
@@ -442,7 +442,7 @@
           <a:p>
             <a:fld id="{2EDF32D7-A802-4CED-A4B7-23DAC1B43898}" type="datetimeFigureOut">
               <a:rPr lang="pt-BR" smtClean="0"/>
-              <a:t>04/11/2019</a:t>
+              <a:t>05/11/2019</a:t>
             </a:fld>
             <a:endParaRPr lang="pt-BR"/>
           </a:p>
@@ -484,7 +484,7 @@
           <a:p>
             <a:fld id="{90CE46F0-10D9-44E0-9B31-88DCFC46CB51}" type="slidenum">
               <a:rPr lang="pt-BR" smtClean="0"/>
-              <a:t>‹#›</a:t>
+              <a:t>‹nº›</a:t>
             </a:fld>
             <a:endParaRPr lang="pt-BR"/>
           </a:p>
@@ -620,7 +620,7 @@
           <a:p>
             <a:fld id="{2EDF32D7-A802-4CED-A4B7-23DAC1B43898}" type="datetimeFigureOut">
               <a:rPr lang="pt-BR" smtClean="0"/>
-              <a:t>04/11/2019</a:t>
+              <a:t>05/11/2019</a:t>
             </a:fld>
             <a:endParaRPr lang="pt-BR"/>
           </a:p>
@@ -662,7 +662,7 @@
           <a:p>
             <a:fld id="{90CE46F0-10D9-44E0-9B31-88DCFC46CB51}" type="slidenum">
               <a:rPr lang="pt-BR" smtClean="0"/>
-              <a:t>‹#›</a:t>
+              <a:t>‹nº›</a:t>
             </a:fld>
             <a:endParaRPr lang="pt-BR"/>
           </a:p>
@@ -788,7 +788,7 @@
           <a:p>
             <a:fld id="{2EDF32D7-A802-4CED-A4B7-23DAC1B43898}" type="datetimeFigureOut">
               <a:rPr lang="pt-BR" smtClean="0"/>
-              <a:t>04/11/2019</a:t>
+              <a:t>05/11/2019</a:t>
             </a:fld>
             <a:endParaRPr lang="pt-BR"/>
           </a:p>
@@ -830,7 +830,7 @@
           <a:p>
             <a:fld id="{90CE46F0-10D9-44E0-9B31-88DCFC46CB51}" type="slidenum">
               <a:rPr lang="pt-BR" smtClean="0"/>
-              <a:t>‹#›</a:t>
+              <a:t>‹nº›</a:t>
             </a:fld>
             <a:endParaRPr lang="pt-BR"/>
           </a:p>
@@ -1033,7 +1033,7 @@
           <a:p>
             <a:fld id="{2EDF32D7-A802-4CED-A4B7-23DAC1B43898}" type="datetimeFigureOut">
               <a:rPr lang="pt-BR" smtClean="0"/>
-              <a:t>04/11/2019</a:t>
+              <a:t>05/11/2019</a:t>
             </a:fld>
             <a:endParaRPr lang="pt-BR"/>
           </a:p>
@@ -1075,7 +1075,7 @@
           <a:p>
             <a:fld id="{90CE46F0-10D9-44E0-9B31-88DCFC46CB51}" type="slidenum">
               <a:rPr lang="pt-BR" smtClean="0"/>
-              <a:t>‹#›</a:t>
+              <a:t>‹nº›</a:t>
             </a:fld>
             <a:endParaRPr lang="pt-BR"/>
           </a:p>
@@ -1262,7 +1262,7 @@
           <a:p>
             <a:fld id="{2EDF32D7-A802-4CED-A4B7-23DAC1B43898}" type="datetimeFigureOut">
               <a:rPr lang="pt-BR" smtClean="0"/>
-              <a:t>04/11/2019</a:t>
+              <a:t>05/11/2019</a:t>
             </a:fld>
             <a:endParaRPr lang="pt-BR"/>
           </a:p>
@@ -1304,7 +1304,7 @@
           <a:p>
             <a:fld id="{90CE46F0-10D9-44E0-9B31-88DCFC46CB51}" type="slidenum">
               <a:rPr lang="pt-BR" smtClean="0"/>
-              <a:t>‹#›</a:t>
+              <a:t>‹nº›</a:t>
             </a:fld>
             <a:endParaRPr lang="pt-BR"/>
           </a:p>
@@ -1626,7 +1626,7 @@
           <a:p>
             <a:fld id="{2EDF32D7-A802-4CED-A4B7-23DAC1B43898}" type="datetimeFigureOut">
               <a:rPr lang="pt-BR" smtClean="0"/>
-              <a:t>04/11/2019</a:t>
+              <a:t>05/11/2019</a:t>
             </a:fld>
             <a:endParaRPr lang="pt-BR"/>
           </a:p>
@@ -1668,7 +1668,7 @@
           <a:p>
             <a:fld id="{90CE46F0-10D9-44E0-9B31-88DCFC46CB51}" type="slidenum">
               <a:rPr lang="pt-BR" smtClean="0"/>
-              <a:t>‹#›</a:t>
+              <a:t>‹nº›</a:t>
             </a:fld>
             <a:endParaRPr lang="pt-BR"/>
           </a:p>
@@ -1743,7 +1743,7 @@
           <a:p>
             <a:fld id="{2EDF32D7-A802-4CED-A4B7-23DAC1B43898}" type="datetimeFigureOut">
               <a:rPr lang="pt-BR" smtClean="0"/>
-              <a:t>04/11/2019</a:t>
+              <a:t>05/11/2019</a:t>
             </a:fld>
             <a:endParaRPr lang="pt-BR"/>
           </a:p>
@@ -1785,7 +1785,7 @@
           <a:p>
             <a:fld id="{90CE46F0-10D9-44E0-9B31-88DCFC46CB51}" type="slidenum">
               <a:rPr lang="pt-BR" smtClean="0"/>
-              <a:t>‹#›</a:t>
+              <a:t>‹nº›</a:t>
             </a:fld>
             <a:endParaRPr lang="pt-BR"/>
           </a:p>
@@ -1838,7 +1838,7 @@
           <a:p>
             <a:fld id="{2EDF32D7-A802-4CED-A4B7-23DAC1B43898}" type="datetimeFigureOut">
               <a:rPr lang="pt-BR" smtClean="0"/>
-              <a:t>04/11/2019</a:t>
+              <a:t>05/11/2019</a:t>
             </a:fld>
             <a:endParaRPr lang="pt-BR"/>
           </a:p>
@@ -1880,7 +1880,7 @@
           <a:p>
             <a:fld id="{90CE46F0-10D9-44E0-9B31-88DCFC46CB51}" type="slidenum">
               <a:rPr lang="pt-BR" smtClean="0"/>
-              <a:t>‹#›</a:t>
+              <a:t>‹nº›</a:t>
             </a:fld>
             <a:endParaRPr lang="pt-BR"/>
           </a:p>
@@ -2113,7 +2113,7 @@
           <a:p>
             <a:fld id="{2EDF32D7-A802-4CED-A4B7-23DAC1B43898}" type="datetimeFigureOut">
               <a:rPr lang="pt-BR" smtClean="0"/>
-              <a:t>04/11/2019</a:t>
+              <a:t>05/11/2019</a:t>
             </a:fld>
             <a:endParaRPr lang="pt-BR"/>
           </a:p>
@@ -2155,7 +2155,7 @@
           <a:p>
             <a:fld id="{90CE46F0-10D9-44E0-9B31-88DCFC46CB51}" type="slidenum">
               <a:rPr lang="pt-BR" smtClean="0"/>
-              <a:t>‹#›</a:t>
+              <a:t>‹nº›</a:t>
             </a:fld>
             <a:endParaRPr lang="pt-BR"/>
           </a:p>
@@ -2365,7 +2365,7 @@
           <a:p>
             <a:fld id="{2EDF32D7-A802-4CED-A4B7-23DAC1B43898}" type="datetimeFigureOut">
               <a:rPr lang="pt-BR" smtClean="0"/>
-              <a:t>04/11/2019</a:t>
+              <a:t>05/11/2019</a:t>
             </a:fld>
             <a:endParaRPr lang="pt-BR"/>
           </a:p>
@@ -2407,7 +2407,7 @@
           <a:p>
             <a:fld id="{90CE46F0-10D9-44E0-9B31-88DCFC46CB51}" type="slidenum">
               <a:rPr lang="pt-BR" smtClean="0"/>
-              <a:t>‹#›</a:t>
+              <a:t>‹nº›</a:t>
             </a:fld>
             <a:endParaRPr lang="pt-BR"/>
           </a:p>
@@ -2576,7 +2576,7 @@
           <a:p>
             <a:fld id="{2EDF32D7-A802-4CED-A4B7-23DAC1B43898}" type="datetimeFigureOut">
               <a:rPr lang="pt-BR" smtClean="0"/>
-              <a:t>04/11/2019</a:t>
+              <a:t>05/11/2019</a:t>
             </a:fld>
             <a:endParaRPr lang="pt-BR"/>
           </a:p>
@@ -2654,7 +2654,7 @@
           <a:p>
             <a:fld id="{90CE46F0-10D9-44E0-9B31-88DCFC46CB51}" type="slidenum">
               <a:rPr lang="pt-BR" smtClean="0"/>
-              <a:t>‹#›</a:t>
+              <a:t>‹nº›</a:t>
             </a:fld>
             <a:endParaRPr lang="pt-BR"/>
           </a:p>
@@ -7634,7 +7634,22 @@
               <a:rPr lang="en-US" dirty="0">
                 <a:hlinkClick r:id="rId2"/>
               </a:rPr>
-              <a:t>https://blogmasterwalkershop.com.br/arduino/como-usar-com-arduino-modulo-rele-5v-1-canal/</a:t>
+              <a:t>https://blogmasterwalkershop.com.br/arduino/como-usar-com-arduino-modulo-rele-5v-1-canal</a:t>
+            </a:r>
+            <a:r>
+              <a:rPr lang="en-US" dirty="0" smtClean="0">
+                <a:hlinkClick r:id="rId2"/>
+              </a:rPr>
+              <a:t>/</a:t>
+            </a:r>
+            <a:endParaRPr lang="en-US" dirty="0" smtClean="0"/>
+          </a:p>
+          <a:p>
+            <a:r>
+              <a:rPr lang="pt-BR" dirty="0">
+                <a:hlinkClick r:id="rId3"/>
+              </a:rPr>
+              <a:t>https://portal.vidadesilicio.com.br/modulo-rele-com-arduino/</a:t>
             </a:r>
             <a:endParaRPr lang="pt-BR" dirty="0"/>
           </a:p>

</xml_diff>

<commit_message>
inserção de slides de experimento com potenciômetro e referências para o sensor de temperatura LM35
</commit_message>
<xml_diff>
--- a/arduino-bluetooth.pptx
+++ b/arduino-bluetooth.pptx
@@ -4,6 +4,9 @@
   <p:sldMasterIdLst>
     <p:sldMasterId id="2147483648" r:id="rId1"/>
   </p:sldMasterIdLst>
+  <p:notesMasterIdLst>
+    <p:notesMasterId r:id="rId45"/>
+  </p:notesMasterIdLst>
   <p:sldIdLst>
     <p:sldId id="256" r:id="rId2"/>
     <p:sldId id="291" r:id="rId3"/>
@@ -37,8 +40,17 @@
     <p:sldId id="288" r:id="rId31"/>
     <p:sldId id="269" r:id="rId32"/>
     <p:sldId id="290" r:id="rId33"/>
-    <p:sldId id="258" r:id="rId34"/>
-    <p:sldId id="292" r:id="rId35"/>
+    <p:sldId id="294" r:id="rId34"/>
+    <p:sldId id="293" r:id="rId35"/>
+    <p:sldId id="295" r:id="rId36"/>
+    <p:sldId id="297" r:id="rId37"/>
+    <p:sldId id="298" r:id="rId38"/>
+    <p:sldId id="299" r:id="rId39"/>
+    <p:sldId id="300" r:id="rId40"/>
+    <p:sldId id="301" r:id="rId41"/>
+    <p:sldId id="296" r:id="rId42"/>
+    <p:sldId id="258" r:id="rId43"/>
+    <p:sldId id="292" r:id="rId44"/>
   </p:sldIdLst>
   <p:sldSz cx="12192000" cy="6858000"/>
   <p:notesSz cx="6858000" cy="9144000"/>
@@ -145,6 +157,629 @@
 </p:presentation>
 </file>
 
+<file path=ppt/commentAuthors.xml><?xml version="1.0" encoding="utf-8"?>
+<p:cmAuthorLst xmlns:a="http://schemas.openxmlformats.org/drawingml/2006/main" xmlns:r="http://schemas.openxmlformats.org/officeDocument/2006/relationships" xmlns:p="http://schemas.openxmlformats.org/presentationml/2006/main">
+  <p:cmAuthor id="1" name="Salmo Marques da Silva Júnior" initials="SMdSJ" lastIdx="1" clrIdx="0">
+    <p:extLst>
+      <p:ext uri="{19B8F6BF-5375-455C-9EA6-DF929625EA0E}">
+        <p15:presenceInfo xmlns:p15="http://schemas.microsoft.com/office/powerpoint/2012/main" userId="a944e0c8047cf7d5" providerId="Windows Live"/>
+      </p:ext>
+    </p:extLst>
+  </p:cmAuthor>
+</p:cmAuthorLst>
+</file>
+
+<file path=ppt/notesMasters/notesMaster1.xml><?xml version="1.0" encoding="utf-8"?>
+<p:notesMaster xmlns:a="http://schemas.openxmlformats.org/drawingml/2006/main" xmlns:r="http://schemas.openxmlformats.org/officeDocument/2006/relationships" xmlns:p="http://schemas.openxmlformats.org/presentationml/2006/main">
+  <p:cSld>
+    <p:bg>
+      <p:bgRef idx="1001">
+        <a:schemeClr val="bg1"/>
+      </p:bgRef>
+    </p:bg>
+    <p:spTree>
+      <p:nvGrpSpPr>
+        <p:cNvPr id="1" name=""/>
+        <p:cNvGrpSpPr/>
+        <p:nvPr/>
+      </p:nvGrpSpPr>
+      <p:grpSpPr>
+        <a:xfrm>
+          <a:off x="0" y="0"/>
+          <a:ext cx="0" cy="0"/>
+          <a:chOff x="0" y="0"/>
+          <a:chExt cx="0" cy="0"/>
+        </a:xfrm>
+      </p:grpSpPr>
+      <p:sp>
+        <p:nvSpPr>
+          <p:cNvPr id="2" name="Header Placeholder 1"/>
+          <p:cNvSpPr>
+            <a:spLocks noGrp="1"/>
+          </p:cNvSpPr>
+          <p:nvPr>
+            <p:ph type="hdr" sz="quarter"/>
+          </p:nvPr>
+        </p:nvSpPr>
+        <p:spPr>
+          <a:xfrm>
+            <a:off x="0" y="0"/>
+            <a:ext cx="2971800" cy="458788"/>
+          </a:xfrm>
+          <a:prstGeom prst="rect">
+            <a:avLst/>
+          </a:prstGeom>
+        </p:spPr>
+        <p:txBody>
+          <a:bodyPr vert="horz" lIns="91440" tIns="45720" rIns="91440" bIns="45720" rtlCol="0"/>
+          <a:lstStyle>
+            <a:lvl1pPr algn="l">
+              <a:defRPr sz="1200"/>
+            </a:lvl1pPr>
+          </a:lstStyle>
+          <a:p>
+            <a:endParaRPr lang="pt-BR"/>
+          </a:p>
+        </p:txBody>
+      </p:sp>
+      <p:sp>
+        <p:nvSpPr>
+          <p:cNvPr id="3" name="Date Placeholder 2"/>
+          <p:cNvSpPr>
+            <a:spLocks noGrp="1"/>
+          </p:cNvSpPr>
+          <p:nvPr>
+            <p:ph type="dt" idx="1"/>
+          </p:nvPr>
+        </p:nvSpPr>
+        <p:spPr>
+          <a:xfrm>
+            <a:off x="3884613" y="0"/>
+            <a:ext cx="2971800" cy="458788"/>
+          </a:xfrm>
+          <a:prstGeom prst="rect">
+            <a:avLst/>
+          </a:prstGeom>
+        </p:spPr>
+        <p:txBody>
+          <a:bodyPr vert="horz" lIns="91440" tIns="45720" rIns="91440" bIns="45720" rtlCol="0"/>
+          <a:lstStyle>
+            <a:lvl1pPr algn="r">
+              <a:defRPr sz="1200"/>
+            </a:lvl1pPr>
+          </a:lstStyle>
+          <a:p>
+            <a:fld id="{3C44614C-A7EC-484E-A837-A5758579D5D4}" type="datetimeFigureOut">
+              <a:rPr lang="pt-BR" smtClean="0"/>
+              <a:t>06/11/2019</a:t>
+            </a:fld>
+            <a:endParaRPr lang="pt-BR"/>
+          </a:p>
+        </p:txBody>
+      </p:sp>
+      <p:sp>
+        <p:nvSpPr>
+          <p:cNvPr id="4" name="Slide Image Placeholder 3"/>
+          <p:cNvSpPr>
+            <a:spLocks noGrp="1" noRot="1" noChangeAspect="1"/>
+          </p:cNvSpPr>
+          <p:nvPr>
+            <p:ph type="sldImg" idx="2"/>
+          </p:nvPr>
+        </p:nvSpPr>
+        <p:spPr>
+          <a:xfrm>
+            <a:off x="685800" y="1143000"/>
+            <a:ext cx="5486400" cy="3086100"/>
+          </a:xfrm>
+          <a:prstGeom prst="rect">
+            <a:avLst/>
+          </a:prstGeom>
+          <a:noFill/>
+          <a:ln w="12700">
+            <a:solidFill>
+              <a:prstClr val="black"/>
+            </a:solidFill>
+          </a:ln>
+        </p:spPr>
+        <p:txBody>
+          <a:bodyPr vert="horz" lIns="91440" tIns="45720" rIns="91440" bIns="45720" rtlCol="0" anchor="ctr"/>
+          <a:lstStyle/>
+          <a:p>
+            <a:endParaRPr lang="pt-BR"/>
+          </a:p>
+        </p:txBody>
+      </p:sp>
+      <p:sp>
+        <p:nvSpPr>
+          <p:cNvPr id="5" name="Notes Placeholder 4"/>
+          <p:cNvSpPr>
+            <a:spLocks noGrp="1"/>
+          </p:cNvSpPr>
+          <p:nvPr>
+            <p:ph type="body" sz="quarter" idx="3"/>
+          </p:nvPr>
+        </p:nvSpPr>
+        <p:spPr>
+          <a:xfrm>
+            <a:off x="685800" y="4400550"/>
+            <a:ext cx="5486400" cy="3600450"/>
+          </a:xfrm>
+          <a:prstGeom prst="rect">
+            <a:avLst/>
+          </a:prstGeom>
+        </p:spPr>
+        <p:txBody>
+          <a:bodyPr vert="horz" lIns="91440" tIns="45720" rIns="91440" bIns="45720" rtlCol="0"/>
+          <a:lstStyle/>
+          <a:p>
+            <a:pPr lvl="0"/>
+            <a:r>
+              <a:rPr lang="en-US"/>
+              <a:t>Click to edit Master text styles</a:t>
+            </a:r>
+          </a:p>
+          <a:p>
+            <a:pPr lvl="1"/>
+            <a:r>
+              <a:rPr lang="en-US"/>
+              <a:t>Second level</a:t>
+            </a:r>
+          </a:p>
+          <a:p>
+            <a:pPr lvl="2"/>
+            <a:r>
+              <a:rPr lang="en-US"/>
+              <a:t>Third level</a:t>
+            </a:r>
+          </a:p>
+          <a:p>
+            <a:pPr lvl="3"/>
+            <a:r>
+              <a:rPr lang="en-US"/>
+              <a:t>Fourth level</a:t>
+            </a:r>
+          </a:p>
+          <a:p>
+            <a:pPr lvl="4"/>
+            <a:r>
+              <a:rPr lang="en-US"/>
+              <a:t>Fifth level</a:t>
+            </a:r>
+            <a:endParaRPr lang="pt-BR"/>
+          </a:p>
+        </p:txBody>
+      </p:sp>
+      <p:sp>
+        <p:nvSpPr>
+          <p:cNvPr id="6" name="Footer Placeholder 5"/>
+          <p:cNvSpPr>
+            <a:spLocks noGrp="1"/>
+          </p:cNvSpPr>
+          <p:nvPr>
+            <p:ph type="ftr" sz="quarter" idx="4"/>
+          </p:nvPr>
+        </p:nvSpPr>
+        <p:spPr>
+          <a:xfrm>
+            <a:off x="0" y="8685213"/>
+            <a:ext cx="2971800" cy="458787"/>
+          </a:xfrm>
+          <a:prstGeom prst="rect">
+            <a:avLst/>
+          </a:prstGeom>
+        </p:spPr>
+        <p:txBody>
+          <a:bodyPr vert="horz" lIns="91440" tIns="45720" rIns="91440" bIns="45720" rtlCol="0" anchor="b"/>
+          <a:lstStyle>
+            <a:lvl1pPr algn="l">
+              <a:defRPr sz="1200"/>
+            </a:lvl1pPr>
+          </a:lstStyle>
+          <a:p>
+            <a:endParaRPr lang="pt-BR"/>
+          </a:p>
+        </p:txBody>
+      </p:sp>
+      <p:sp>
+        <p:nvSpPr>
+          <p:cNvPr id="7" name="Slide Number Placeholder 6"/>
+          <p:cNvSpPr>
+            <a:spLocks noGrp="1"/>
+          </p:cNvSpPr>
+          <p:nvPr>
+            <p:ph type="sldNum" sz="quarter" idx="5"/>
+          </p:nvPr>
+        </p:nvSpPr>
+        <p:spPr>
+          <a:xfrm>
+            <a:off x="3884613" y="8685213"/>
+            <a:ext cx="2971800" cy="458787"/>
+          </a:xfrm>
+          <a:prstGeom prst="rect">
+            <a:avLst/>
+          </a:prstGeom>
+        </p:spPr>
+        <p:txBody>
+          <a:bodyPr vert="horz" lIns="91440" tIns="45720" rIns="91440" bIns="45720" rtlCol="0" anchor="b"/>
+          <a:lstStyle>
+            <a:lvl1pPr algn="r">
+              <a:defRPr sz="1200"/>
+            </a:lvl1pPr>
+          </a:lstStyle>
+          <a:p>
+            <a:fld id="{63C9BDA7-C22B-4A92-921B-5E8BACDF8EBE}" type="slidenum">
+              <a:rPr lang="pt-BR" smtClean="0"/>
+              <a:t>‹#›</a:t>
+            </a:fld>
+            <a:endParaRPr lang="pt-BR"/>
+          </a:p>
+        </p:txBody>
+      </p:sp>
+    </p:spTree>
+    <p:extLst>
+      <p:ext uri="{BB962C8B-B14F-4D97-AF65-F5344CB8AC3E}">
+        <p14:creationId xmlns:p14="http://schemas.microsoft.com/office/powerpoint/2010/main" val="3039116131"/>
+      </p:ext>
+    </p:extLst>
+  </p:cSld>
+  <p:clrMap bg1="lt1" tx1="dk1" bg2="lt2" tx2="dk2" accent1="accent1" accent2="accent2" accent3="accent3" accent4="accent4" accent5="accent5" accent6="accent6" hlink="hlink" folHlink="folHlink"/>
+  <p:notesStyle>
+    <a:lvl1pPr marL="0" algn="l" defTabSz="914400" rtl="0" eaLnBrk="1" latinLnBrk="0" hangingPunct="1">
+      <a:defRPr sz="1200" kern="1200">
+        <a:solidFill>
+          <a:schemeClr val="tx1"/>
+        </a:solidFill>
+        <a:latin typeface="+mn-lt"/>
+        <a:ea typeface="+mn-ea"/>
+        <a:cs typeface="+mn-cs"/>
+      </a:defRPr>
+    </a:lvl1pPr>
+    <a:lvl2pPr marL="457200" algn="l" defTabSz="914400" rtl="0" eaLnBrk="1" latinLnBrk="0" hangingPunct="1">
+      <a:defRPr sz="1200" kern="1200">
+        <a:solidFill>
+          <a:schemeClr val="tx1"/>
+        </a:solidFill>
+        <a:latin typeface="+mn-lt"/>
+        <a:ea typeface="+mn-ea"/>
+        <a:cs typeface="+mn-cs"/>
+      </a:defRPr>
+    </a:lvl2pPr>
+    <a:lvl3pPr marL="914400" algn="l" defTabSz="914400" rtl="0" eaLnBrk="1" latinLnBrk="0" hangingPunct="1">
+      <a:defRPr sz="1200" kern="1200">
+        <a:solidFill>
+          <a:schemeClr val="tx1"/>
+        </a:solidFill>
+        <a:latin typeface="+mn-lt"/>
+        <a:ea typeface="+mn-ea"/>
+        <a:cs typeface="+mn-cs"/>
+      </a:defRPr>
+    </a:lvl3pPr>
+    <a:lvl4pPr marL="1371600" algn="l" defTabSz="914400" rtl="0" eaLnBrk="1" latinLnBrk="0" hangingPunct="1">
+      <a:defRPr sz="1200" kern="1200">
+        <a:solidFill>
+          <a:schemeClr val="tx1"/>
+        </a:solidFill>
+        <a:latin typeface="+mn-lt"/>
+        <a:ea typeface="+mn-ea"/>
+        <a:cs typeface="+mn-cs"/>
+      </a:defRPr>
+    </a:lvl4pPr>
+    <a:lvl5pPr marL="1828800" algn="l" defTabSz="914400" rtl="0" eaLnBrk="1" latinLnBrk="0" hangingPunct="1">
+      <a:defRPr sz="1200" kern="1200">
+        <a:solidFill>
+          <a:schemeClr val="tx1"/>
+        </a:solidFill>
+        <a:latin typeface="+mn-lt"/>
+        <a:ea typeface="+mn-ea"/>
+        <a:cs typeface="+mn-cs"/>
+      </a:defRPr>
+    </a:lvl5pPr>
+    <a:lvl6pPr marL="2286000" algn="l" defTabSz="914400" rtl="0" eaLnBrk="1" latinLnBrk="0" hangingPunct="1">
+      <a:defRPr sz="1200" kern="1200">
+        <a:solidFill>
+          <a:schemeClr val="tx1"/>
+        </a:solidFill>
+        <a:latin typeface="+mn-lt"/>
+        <a:ea typeface="+mn-ea"/>
+        <a:cs typeface="+mn-cs"/>
+      </a:defRPr>
+    </a:lvl6pPr>
+    <a:lvl7pPr marL="2743200" algn="l" defTabSz="914400" rtl="0" eaLnBrk="1" latinLnBrk="0" hangingPunct="1">
+      <a:defRPr sz="1200" kern="1200">
+        <a:solidFill>
+          <a:schemeClr val="tx1"/>
+        </a:solidFill>
+        <a:latin typeface="+mn-lt"/>
+        <a:ea typeface="+mn-ea"/>
+        <a:cs typeface="+mn-cs"/>
+      </a:defRPr>
+    </a:lvl7pPr>
+    <a:lvl8pPr marL="3200400" algn="l" defTabSz="914400" rtl="0" eaLnBrk="1" latinLnBrk="0" hangingPunct="1">
+      <a:defRPr sz="1200" kern="1200">
+        <a:solidFill>
+          <a:schemeClr val="tx1"/>
+        </a:solidFill>
+        <a:latin typeface="+mn-lt"/>
+        <a:ea typeface="+mn-ea"/>
+        <a:cs typeface="+mn-cs"/>
+      </a:defRPr>
+    </a:lvl8pPr>
+    <a:lvl9pPr marL="3657600" algn="l" defTabSz="914400" rtl="0" eaLnBrk="1" latinLnBrk="0" hangingPunct="1">
+      <a:defRPr sz="1200" kern="1200">
+        <a:solidFill>
+          <a:schemeClr val="tx1"/>
+        </a:solidFill>
+        <a:latin typeface="+mn-lt"/>
+        <a:ea typeface="+mn-ea"/>
+        <a:cs typeface="+mn-cs"/>
+      </a:defRPr>
+    </a:lvl9pPr>
+  </p:notesStyle>
+</p:notesMaster>
+</file>
+
+<file path=ppt/notesSlides/notesSlide1.xml><?xml version="1.0" encoding="utf-8"?>
+<p:notes xmlns:a="http://schemas.openxmlformats.org/drawingml/2006/main" xmlns:r="http://schemas.openxmlformats.org/officeDocument/2006/relationships" xmlns:p="http://schemas.openxmlformats.org/presentationml/2006/main">
+  <p:cSld>
+    <p:spTree>
+      <p:nvGrpSpPr>
+        <p:cNvPr id="1" name=""/>
+        <p:cNvGrpSpPr/>
+        <p:nvPr/>
+      </p:nvGrpSpPr>
+      <p:grpSpPr>
+        <a:xfrm>
+          <a:off x="0" y="0"/>
+          <a:ext cx="0" cy="0"/>
+          <a:chOff x="0" y="0"/>
+          <a:chExt cx="0" cy="0"/>
+        </a:xfrm>
+      </p:grpSpPr>
+      <p:sp>
+        <p:nvSpPr>
+          <p:cNvPr id="2" name="Slide Image Placeholder 1"/>
+          <p:cNvSpPr>
+            <a:spLocks noGrp="1" noRot="1" noChangeAspect="1"/>
+          </p:cNvSpPr>
+          <p:nvPr>
+            <p:ph type="sldImg"/>
+          </p:nvPr>
+        </p:nvSpPr>
+        <p:spPr/>
+      </p:sp>
+      <p:sp>
+        <p:nvSpPr>
+          <p:cNvPr id="3" name="Notes Placeholder 2"/>
+          <p:cNvSpPr>
+            <a:spLocks noGrp="1"/>
+          </p:cNvSpPr>
+          <p:nvPr>
+            <p:ph type="body" idx="1"/>
+          </p:nvPr>
+        </p:nvSpPr>
+        <p:spPr/>
+        <p:txBody>
+          <a:bodyPr/>
+          <a:lstStyle/>
+          <a:p>
+            <a:r>
+              <a:rPr lang="pt-BR" dirty="0"/>
+              <a:t>A resistência do potenciômetro também é medida em ohms. Há diversos valores de potenciômetros no mercado, contudo o mais comum é o de 10K (varia a resistência de 0 a 10000 ohms).</a:t>
+            </a:r>
+          </a:p>
+        </p:txBody>
+      </p:sp>
+      <p:sp>
+        <p:nvSpPr>
+          <p:cNvPr id="4" name="Slide Number Placeholder 3"/>
+          <p:cNvSpPr>
+            <a:spLocks noGrp="1"/>
+          </p:cNvSpPr>
+          <p:nvPr>
+            <p:ph type="sldNum" sz="quarter" idx="5"/>
+          </p:nvPr>
+        </p:nvSpPr>
+        <p:spPr/>
+        <p:txBody>
+          <a:bodyPr/>
+          <a:lstStyle/>
+          <a:p>
+            <a:fld id="{63C9BDA7-C22B-4A92-921B-5E8BACDF8EBE}" type="slidenum">
+              <a:rPr lang="pt-BR" smtClean="0"/>
+              <a:t>34</a:t>
+            </a:fld>
+            <a:endParaRPr lang="pt-BR"/>
+          </a:p>
+        </p:txBody>
+      </p:sp>
+    </p:spTree>
+    <p:extLst>
+      <p:ext uri="{BB962C8B-B14F-4D97-AF65-F5344CB8AC3E}">
+        <p14:creationId xmlns:p14="http://schemas.microsoft.com/office/powerpoint/2010/main" val="3113251062"/>
+      </p:ext>
+    </p:extLst>
+  </p:cSld>
+  <p:clrMapOvr>
+    <a:masterClrMapping/>
+  </p:clrMapOvr>
+</p:notes>
+</file>
+
+<file path=ppt/notesSlides/notesSlide2.xml><?xml version="1.0" encoding="utf-8"?>
+<p:notes xmlns:a="http://schemas.openxmlformats.org/drawingml/2006/main" xmlns:r="http://schemas.openxmlformats.org/officeDocument/2006/relationships" xmlns:p="http://schemas.openxmlformats.org/presentationml/2006/main">
+  <p:cSld>
+    <p:spTree>
+      <p:nvGrpSpPr>
+        <p:cNvPr id="1" name=""/>
+        <p:cNvGrpSpPr/>
+        <p:nvPr/>
+      </p:nvGrpSpPr>
+      <p:grpSpPr>
+        <a:xfrm>
+          <a:off x="0" y="0"/>
+          <a:ext cx="0" cy="0"/>
+          <a:chOff x="0" y="0"/>
+          <a:chExt cx="0" cy="0"/>
+        </a:xfrm>
+      </p:grpSpPr>
+      <p:sp>
+        <p:nvSpPr>
+          <p:cNvPr id="2" name="Slide Image Placeholder 1"/>
+          <p:cNvSpPr>
+            <a:spLocks noGrp="1" noRot="1" noChangeAspect="1"/>
+          </p:cNvSpPr>
+          <p:nvPr>
+            <p:ph type="sldImg"/>
+          </p:nvPr>
+        </p:nvSpPr>
+        <p:spPr/>
+      </p:sp>
+      <p:sp>
+        <p:nvSpPr>
+          <p:cNvPr id="3" name="Notes Placeholder 2"/>
+          <p:cNvSpPr>
+            <a:spLocks noGrp="1"/>
+          </p:cNvSpPr>
+          <p:nvPr>
+            <p:ph type="body" idx="1"/>
+          </p:nvPr>
+        </p:nvSpPr>
+        <p:spPr/>
+        <p:txBody>
+          <a:bodyPr/>
+          <a:lstStyle/>
+          <a:p>
+            <a:r>
+              <a:rPr lang="pt-BR" dirty="0"/>
+              <a:t>A resistência do potenciômetro também é medida em ohms. Há diversos valores de potenciômetros no mercado, contudo o mais comum é o de 10K (varia a resistência de 0 a 10000 ohms).</a:t>
+            </a:r>
+          </a:p>
+        </p:txBody>
+      </p:sp>
+      <p:sp>
+        <p:nvSpPr>
+          <p:cNvPr id="4" name="Slide Number Placeholder 3"/>
+          <p:cNvSpPr>
+            <a:spLocks noGrp="1"/>
+          </p:cNvSpPr>
+          <p:nvPr>
+            <p:ph type="sldNum" sz="quarter" idx="5"/>
+          </p:nvPr>
+        </p:nvSpPr>
+        <p:spPr/>
+        <p:txBody>
+          <a:bodyPr/>
+          <a:lstStyle/>
+          <a:p>
+            <a:fld id="{63C9BDA7-C22B-4A92-921B-5E8BACDF8EBE}" type="slidenum">
+              <a:rPr lang="pt-BR" smtClean="0"/>
+              <a:t>35</a:t>
+            </a:fld>
+            <a:endParaRPr lang="pt-BR"/>
+          </a:p>
+        </p:txBody>
+      </p:sp>
+    </p:spTree>
+    <p:extLst>
+      <p:ext uri="{BB962C8B-B14F-4D97-AF65-F5344CB8AC3E}">
+        <p14:creationId xmlns:p14="http://schemas.microsoft.com/office/powerpoint/2010/main" val="2697806380"/>
+      </p:ext>
+    </p:extLst>
+  </p:cSld>
+  <p:clrMapOvr>
+    <a:masterClrMapping/>
+  </p:clrMapOvr>
+</p:notes>
+</file>
+
+<file path=ppt/notesSlides/notesSlide3.xml><?xml version="1.0" encoding="utf-8"?>
+<p:notes xmlns:a="http://schemas.openxmlformats.org/drawingml/2006/main" xmlns:r="http://schemas.openxmlformats.org/officeDocument/2006/relationships" xmlns:p="http://schemas.openxmlformats.org/presentationml/2006/main">
+  <p:cSld>
+    <p:spTree>
+      <p:nvGrpSpPr>
+        <p:cNvPr id="1" name=""/>
+        <p:cNvGrpSpPr/>
+        <p:nvPr/>
+      </p:nvGrpSpPr>
+      <p:grpSpPr>
+        <a:xfrm>
+          <a:off x="0" y="0"/>
+          <a:ext cx="0" cy="0"/>
+          <a:chOff x="0" y="0"/>
+          <a:chExt cx="0" cy="0"/>
+        </a:xfrm>
+      </p:grpSpPr>
+      <p:sp>
+        <p:nvSpPr>
+          <p:cNvPr id="2" name="Slide Image Placeholder 1"/>
+          <p:cNvSpPr>
+            <a:spLocks noGrp="1" noRot="1" noChangeAspect="1"/>
+          </p:cNvSpPr>
+          <p:nvPr>
+            <p:ph type="sldImg"/>
+          </p:nvPr>
+        </p:nvSpPr>
+        <p:spPr/>
+      </p:sp>
+      <p:sp>
+        <p:nvSpPr>
+          <p:cNvPr id="3" name="Notes Placeholder 2"/>
+          <p:cNvSpPr>
+            <a:spLocks noGrp="1"/>
+          </p:cNvSpPr>
+          <p:nvPr>
+            <p:ph type="body" idx="1"/>
+          </p:nvPr>
+        </p:nvSpPr>
+        <p:spPr/>
+        <p:txBody>
+          <a:bodyPr/>
+          <a:lstStyle/>
+          <a:p>
+            <a:r>
+              <a:rPr lang="pt-BR" dirty="0"/>
+              <a:t>A resistência do potenciômetro também é medida em ohms. Há diversos valores de potenciômetros no mercado, contudo o mais comum é o de 10K (varia a resistência de 0 a 10000 ohms).</a:t>
+            </a:r>
+          </a:p>
+        </p:txBody>
+      </p:sp>
+      <p:sp>
+        <p:nvSpPr>
+          <p:cNvPr id="4" name="Slide Number Placeholder 3"/>
+          <p:cNvSpPr>
+            <a:spLocks noGrp="1"/>
+          </p:cNvSpPr>
+          <p:nvPr>
+            <p:ph type="sldNum" sz="quarter" idx="5"/>
+          </p:nvPr>
+        </p:nvSpPr>
+        <p:spPr/>
+        <p:txBody>
+          <a:bodyPr/>
+          <a:lstStyle/>
+          <a:p>
+            <a:fld id="{63C9BDA7-C22B-4A92-921B-5E8BACDF8EBE}" type="slidenum">
+              <a:rPr lang="pt-BR" smtClean="0"/>
+              <a:t>41</a:t>
+            </a:fld>
+            <a:endParaRPr lang="pt-BR"/>
+          </a:p>
+        </p:txBody>
+      </p:sp>
+    </p:spTree>
+    <p:extLst>
+      <p:ext uri="{BB962C8B-B14F-4D97-AF65-F5344CB8AC3E}">
+        <p14:creationId xmlns:p14="http://schemas.microsoft.com/office/powerpoint/2010/main" val="796456426"/>
+      </p:ext>
+    </p:extLst>
+  </p:cSld>
+  <p:clrMapOvr>
+    <a:masterClrMapping/>
+  </p:clrMapOvr>
+</p:notes>
+</file>
+
 <file path=ppt/slideLayouts/slideLayout1.xml><?xml version="1.0" encoding="utf-8"?>
 <p:sldLayout xmlns:a="http://schemas.openxmlformats.org/drawingml/2006/main" xmlns:r="http://schemas.openxmlformats.org/officeDocument/2006/relationships" xmlns:p="http://schemas.openxmlformats.org/presentationml/2006/main" type="title" preserve="1">
   <p:cSld name="Slide de Título">
@@ -274,7 +909,7 @@
           <a:p>
             <a:fld id="{2EDF32D7-A802-4CED-A4B7-23DAC1B43898}" type="datetimeFigureOut">
               <a:rPr lang="pt-BR" smtClean="0"/>
-              <a:t>05/11/2019</a:t>
+              <a:t>06/11/2019</a:t>
             </a:fld>
             <a:endParaRPr lang="pt-BR"/>
           </a:p>
@@ -316,7 +951,7 @@
           <a:p>
             <a:fld id="{90CE46F0-10D9-44E0-9B31-88DCFC46CB51}" type="slidenum">
               <a:rPr lang="pt-BR" smtClean="0"/>
-              <a:t>‹nº›</a:t>
+              <a:t>‹#›</a:t>
             </a:fld>
             <a:endParaRPr lang="pt-BR"/>
           </a:p>
@@ -442,7 +1077,7 @@
           <a:p>
             <a:fld id="{2EDF32D7-A802-4CED-A4B7-23DAC1B43898}" type="datetimeFigureOut">
               <a:rPr lang="pt-BR" smtClean="0"/>
-              <a:t>05/11/2019</a:t>
+              <a:t>06/11/2019</a:t>
             </a:fld>
             <a:endParaRPr lang="pt-BR"/>
           </a:p>
@@ -484,7 +1119,7 @@
           <a:p>
             <a:fld id="{90CE46F0-10D9-44E0-9B31-88DCFC46CB51}" type="slidenum">
               <a:rPr lang="pt-BR" smtClean="0"/>
-              <a:t>‹nº›</a:t>
+              <a:t>‹#›</a:t>
             </a:fld>
             <a:endParaRPr lang="pt-BR"/>
           </a:p>
@@ -620,7 +1255,7 @@
           <a:p>
             <a:fld id="{2EDF32D7-A802-4CED-A4B7-23DAC1B43898}" type="datetimeFigureOut">
               <a:rPr lang="pt-BR" smtClean="0"/>
-              <a:t>05/11/2019</a:t>
+              <a:t>06/11/2019</a:t>
             </a:fld>
             <a:endParaRPr lang="pt-BR"/>
           </a:p>
@@ -662,7 +1297,7 @@
           <a:p>
             <a:fld id="{90CE46F0-10D9-44E0-9B31-88DCFC46CB51}" type="slidenum">
               <a:rPr lang="pt-BR" smtClean="0"/>
-              <a:t>‹nº›</a:t>
+              <a:t>‹#›</a:t>
             </a:fld>
             <a:endParaRPr lang="pt-BR"/>
           </a:p>
@@ -788,7 +1423,7 @@
           <a:p>
             <a:fld id="{2EDF32D7-A802-4CED-A4B7-23DAC1B43898}" type="datetimeFigureOut">
               <a:rPr lang="pt-BR" smtClean="0"/>
-              <a:t>05/11/2019</a:t>
+              <a:t>06/11/2019</a:t>
             </a:fld>
             <a:endParaRPr lang="pt-BR"/>
           </a:p>
@@ -830,7 +1465,7 @@
           <a:p>
             <a:fld id="{90CE46F0-10D9-44E0-9B31-88DCFC46CB51}" type="slidenum">
               <a:rPr lang="pt-BR" smtClean="0"/>
-              <a:t>‹nº›</a:t>
+              <a:t>‹#›</a:t>
             </a:fld>
             <a:endParaRPr lang="pt-BR"/>
           </a:p>
@@ -1033,7 +1668,7 @@
           <a:p>
             <a:fld id="{2EDF32D7-A802-4CED-A4B7-23DAC1B43898}" type="datetimeFigureOut">
               <a:rPr lang="pt-BR" smtClean="0"/>
-              <a:t>05/11/2019</a:t>
+              <a:t>06/11/2019</a:t>
             </a:fld>
             <a:endParaRPr lang="pt-BR"/>
           </a:p>
@@ -1075,7 +1710,7 @@
           <a:p>
             <a:fld id="{90CE46F0-10D9-44E0-9B31-88DCFC46CB51}" type="slidenum">
               <a:rPr lang="pt-BR" smtClean="0"/>
-              <a:t>‹nº›</a:t>
+              <a:t>‹#›</a:t>
             </a:fld>
             <a:endParaRPr lang="pt-BR"/>
           </a:p>
@@ -1262,7 +1897,7 @@
           <a:p>
             <a:fld id="{2EDF32D7-A802-4CED-A4B7-23DAC1B43898}" type="datetimeFigureOut">
               <a:rPr lang="pt-BR" smtClean="0"/>
-              <a:t>05/11/2019</a:t>
+              <a:t>06/11/2019</a:t>
             </a:fld>
             <a:endParaRPr lang="pt-BR"/>
           </a:p>
@@ -1304,7 +1939,7 @@
           <a:p>
             <a:fld id="{90CE46F0-10D9-44E0-9B31-88DCFC46CB51}" type="slidenum">
               <a:rPr lang="pt-BR" smtClean="0"/>
-              <a:t>‹nº›</a:t>
+              <a:t>‹#›</a:t>
             </a:fld>
             <a:endParaRPr lang="pt-BR"/>
           </a:p>
@@ -1626,7 +2261,7 @@
           <a:p>
             <a:fld id="{2EDF32D7-A802-4CED-A4B7-23DAC1B43898}" type="datetimeFigureOut">
               <a:rPr lang="pt-BR" smtClean="0"/>
-              <a:t>05/11/2019</a:t>
+              <a:t>06/11/2019</a:t>
             </a:fld>
             <a:endParaRPr lang="pt-BR"/>
           </a:p>
@@ -1668,7 +2303,7 @@
           <a:p>
             <a:fld id="{90CE46F0-10D9-44E0-9B31-88DCFC46CB51}" type="slidenum">
               <a:rPr lang="pt-BR" smtClean="0"/>
-              <a:t>‹nº›</a:t>
+              <a:t>‹#›</a:t>
             </a:fld>
             <a:endParaRPr lang="pt-BR"/>
           </a:p>
@@ -1743,7 +2378,7 @@
           <a:p>
             <a:fld id="{2EDF32D7-A802-4CED-A4B7-23DAC1B43898}" type="datetimeFigureOut">
               <a:rPr lang="pt-BR" smtClean="0"/>
-              <a:t>05/11/2019</a:t>
+              <a:t>06/11/2019</a:t>
             </a:fld>
             <a:endParaRPr lang="pt-BR"/>
           </a:p>
@@ -1785,7 +2420,7 @@
           <a:p>
             <a:fld id="{90CE46F0-10D9-44E0-9B31-88DCFC46CB51}" type="slidenum">
               <a:rPr lang="pt-BR" smtClean="0"/>
-              <a:t>‹nº›</a:t>
+              <a:t>‹#›</a:t>
             </a:fld>
             <a:endParaRPr lang="pt-BR"/>
           </a:p>
@@ -1838,7 +2473,7 @@
           <a:p>
             <a:fld id="{2EDF32D7-A802-4CED-A4B7-23DAC1B43898}" type="datetimeFigureOut">
               <a:rPr lang="pt-BR" smtClean="0"/>
-              <a:t>05/11/2019</a:t>
+              <a:t>06/11/2019</a:t>
             </a:fld>
             <a:endParaRPr lang="pt-BR"/>
           </a:p>
@@ -1880,7 +2515,7 @@
           <a:p>
             <a:fld id="{90CE46F0-10D9-44E0-9B31-88DCFC46CB51}" type="slidenum">
               <a:rPr lang="pt-BR" smtClean="0"/>
-              <a:t>‹nº›</a:t>
+              <a:t>‹#›</a:t>
             </a:fld>
             <a:endParaRPr lang="pt-BR"/>
           </a:p>
@@ -2113,7 +2748,7 @@
           <a:p>
             <a:fld id="{2EDF32D7-A802-4CED-A4B7-23DAC1B43898}" type="datetimeFigureOut">
               <a:rPr lang="pt-BR" smtClean="0"/>
-              <a:t>05/11/2019</a:t>
+              <a:t>06/11/2019</a:t>
             </a:fld>
             <a:endParaRPr lang="pt-BR"/>
           </a:p>
@@ -2155,7 +2790,7 @@
           <a:p>
             <a:fld id="{90CE46F0-10D9-44E0-9B31-88DCFC46CB51}" type="slidenum">
               <a:rPr lang="pt-BR" smtClean="0"/>
-              <a:t>‹nº›</a:t>
+              <a:t>‹#›</a:t>
             </a:fld>
             <a:endParaRPr lang="pt-BR"/>
           </a:p>
@@ -2365,7 +3000,7 @@
           <a:p>
             <a:fld id="{2EDF32D7-A802-4CED-A4B7-23DAC1B43898}" type="datetimeFigureOut">
               <a:rPr lang="pt-BR" smtClean="0"/>
-              <a:t>05/11/2019</a:t>
+              <a:t>06/11/2019</a:t>
             </a:fld>
             <a:endParaRPr lang="pt-BR"/>
           </a:p>
@@ -2407,7 +3042,7 @@
           <a:p>
             <a:fld id="{90CE46F0-10D9-44E0-9B31-88DCFC46CB51}" type="slidenum">
               <a:rPr lang="pt-BR" smtClean="0"/>
-              <a:t>‹nº›</a:t>
+              <a:t>‹#›</a:t>
             </a:fld>
             <a:endParaRPr lang="pt-BR"/>
           </a:p>
@@ -2576,7 +3211,7 @@
           <a:p>
             <a:fld id="{2EDF32D7-A802-4CED-A4B7-23DAC1B43898}" type="datetimeFigureOut">
               <a:rPr lang="pt-BR" smtClean="0"/>
-              <a:t>05/11/2019</a:t>
+              <a:t>06/11/2019</a:t>
             </a:fld>
             <a:endParaRPr lang="pt-BR"/>
           </a:p>
@@ -2654,7 +3289,7 @@
           <a:p>
             <a:fld id="{90CE46F0-10D9-44E0-9B31-88DCFC46CB51}" type="slidenum">
               <a:rPr lang="pt-BR" smtClean="0"/>
-              <a:t>‹nº›</a:t>
+              <a:t>‹#›</a:t>
             </a:fld>
             <a:endParaRPr lang="pt-BR"/>
           </a:p>
@@ -7476,7 +8111,13 @@
       </p:grpSpPr>
       <p:sp>
         <p:nvSpPr>
-          <p:cNvPr id="2" name="Título 1"/>
+          <p:cNvPr id="2" name="Title 1">
+            <a:extLst>
+              <a:ext uri="{FF2B5EF4-FFF2-40B4-BE49-F238E27FC236}">
+                <a16:creationId xmlns:a16="http://schemas.microsoft.com/office/drawing/2014/main" id="{134EE882-775F-449F-8E7B-B8730705E915}"/>
+              </a:ext>
+            </a:extLst>
+          </p:cNvPr>
           <p:cNvSpPr>
             <a:spLocks noGrp="1"/>
           </p:cNvSpPr>
@@ -7491,80 +8132,40 @@
           <a:p>
             <a:r>
               <a:rPr lang="pt-BR" dirty="0"/>
-              <a:t>Referências Bluetooth</a:t>
-            </a:r>
-          </a:p>
-        </p:txBody>
-      </p:sp>
-      <p:sp>
-        <p:nvSpPr>
-          <p:cNvPr id="3" name="Espaço Reservado para Conteúdo 2"/>
-          <p:cNvSpPr>
-            <a:spLocks noGrp="1"/>
-          </p:cNvSpPr>
-          <p:nvPr>
-            <p:ph idx="1"/>
-          </p:nvPr>
-        </p:nvSpPr>
-        <p:spPr/>
-        <p:txBody>
-          <a:bodyPr>
-            <a:normAutofit lnSpcReduction="10000"/>
-          </a:bodyPr>
-          <a:lstStyle/>
-          <a:p>
-            <a:r>
-              <a:rPr lang="pt-BR" dirty="0">
-                <a:hlinkClick r:id="rId2"/>
-              </a:rPr>
-              <a:t>https://www.electronicwings.com/sensors-modules/bluetooth-module-hc-05-</a:t>
-            </a:r>
-            <a:endParaRPr lang="pt-BR" dirty="0">
-              <a:hlinkClick r:id="rId3"/>
-            </a:endParaRPr>
-          </a:p>
-          <a:p>
-            <a:r>
-              <a:rPr lang="pt-BR" dirty="0">
-                <a:hlinkClick r:id="rId3"/>
-              </a:rPr>
-              <a:t>https://maker.pro/arduino/tutorial/bluetooth-basics-how-to-control-led-using-smartphone-arduino</a:t>
-            </a:r>
-            <a:endParaRPr lang="pt-BR" dirty="0"/>
-          </a:p>
-          <a:p>
-            <a:r>
-              <a:rPr lang="pt-BR" dirty="0">
-                <a:hlinkClick r:id="rId4"/>
-              </a:rPr>
-              <a:t>https://howtomechatronics.com/tutorials/arduino/arduino-and-hc-05-bluetooth-module-tutorial/</a:t>
-            </a:r>
-            <a:endParaRPr lang="pt-BR" dirty="0"/>
-          </a:p>
-          <a:p>
-            <a:r>
-              <a:rPr lang="pt-BR" dirty="0">
-                <a:hlinkClick r:id="rId5"/>
-              </a:rPr>
-              <a:t>http://www.instructables.com/id/Tutorial-Using-HC06-Bluetooth-to-Serial-Wireless-U/</a:t>
-            </a:r>
-            <a:endParaRPr lang="pt-BR" dirty="0"/>
-          </a:p>
-          <a:p>
-            <a:r>
-              <a:rPr lang="en-US" dirty="0">
-                <a:hlinkClick r:id="rId6"/>
-              </a:rPr>
-              <a:t>https://www.instructables.com/id/AT-command-mode-of-HC-05-Bluetooth-module/</a:t>
-            </a:r>
-            <a:endParaRPr lang="pt-BR" dirty="0"/>
+              <a:t>Transmissão de dados analógicos</a:t>
+            </a:r>
+          </a:p>
+        </p:txBody>
+      </p:sp>
+      <p:sp>
+        <p:nvSpPr>
+          <p:cNvPr id="3" name="Text Placeholder 2">
+            <a:extLst>
+              <a:ext uri="{FF2B5EF4-FFF2-40B4-BE49-F238E27FC236}">
+                <a16:creationId xmlns:a16="http://schemas.microsoft.com/office/drawing/2014/main" id="{039ADD77-C902-451E-8F73-BC23561850C1}"/>
+              </a:ext>
+            </a:extLst>
+          </p:cNvPr>
+          <p:cNvSpPr>
+            <a:spLocks noGrp="1"/>
+          </p:cNvSpPr>
+          <p:nvPr>
+            <p:ph type="body" idx="1"/>
+          </p:nvPr>
+        </p:nvSpPr>
+        <p:spPr/>
+        <p:txBody>
+          <a:bodyPr/>
+          <a:lstStyle/>
+          <a:p>
+            <a:endParaRPr lang="pt-BR"/>
           </a:p>
         </p:txBody>
       </p:sp>
     </p:spTree>
     <p:extLst>
       <p:ext uri="{BB962C8B-B14F-4D97-AF65-F5344CB8AC3E}">
-        <p14:creationId xmlns:p14="http://schemas.microsoft.com/office/powerpoint/2010/main" val="2022734056"/>
+        <p14:creationId xmlns:p14="http://schemas.microsoft.com/office/powerpoint/2010/main" val="589473131"/>
       </p:ext>
     </p:extLst>
   </p:cSld>
@@ -7593,6 +8194,317 @@
       </p:grpSpPr>
       <p:sp>
         <p:nvSpPr>
+          <p:cNvPr id="2" name="Title 1">
+            <a:extLst>
+              <a:ext uri="{FF2B5EF4-FFF2-40B4-BE49-F238E27FC236}">
+                <a16:creationId xmlns:a16="http://schemas.microsoft.com/office/drawing/2014/main" id="{73EB6254-D2FE-450C-BF62-8E3C8917644A}"/>
+              </a:ext>
+            </a:extLst>
+          </p:cNvPr>
+          <p:cNvSpPr>
+            <a:spLocks noGrp="1"/>
+          </p:cNvSpPr>
+          <p:nvPr>
+            <p:ph type="title"/>
+          </p:nvPr>
+        </p:nvSpPr>
+        <p:spPr/>
+        <p:txBody>
+          <a:bodyPr/>
+          <a:lstStyle/>
+          <a:p>
+            <a:r>
+              <a:rPr lang="pt-BR" dirty="0"/>
+              <a:t>Leitura de um potenciômetro</a:t>
+            </a:r>
+          </a:p>
+        </p:txBody>
+      </p:sp>
+      <p:sp>
+        <p:nvSpPr>
+          <p:cNvPr id="3" name="Content Placeholder 2">
+            <a:extLst>
+              <a:ext uri="{FF2B5EF4-FFF2-40B4-BE49-F238E27FC236}">
+                <a16:creationId xmlns:a16="http://schemas.microsoft.com/office/drawing/2014/main" id="{25387385-EBFE-4E55-9819-4259EAFF99C1}"/>
+              </a:ext>
+            </a:extLst>
+          </p:cNvPr>
+          <p:cNvSpPr>
+            <a:spLocks noGrp="1"/>
+          </p:cNvSpPr>
+          <p:nvPr>
+            <p:ph idx="1"/>
+          </p:nvPr>
+        </p:nvSpPr>
+        <p:spPr/>
+        <p:txBody>
+          <a:bodyPr/>
+          <a:lstStyle/>
+          <a:p>
+            <a:pPr marL="0" indent="0">
+              <a:buNone/>
+            </a:pPr>
+            <a:r>
+              <a:rPr lang="pt-BR" dirty="0"/>
+              <a:t>O Potenciômetro é um componente eletrônico que tem como função variar a resistência elétrica. Assim como o resistor, o potenciômetro também impõe resistência elétrica em um circuito, contudo esta resistência pode ser variada manualmente.</a:t>
+            </a:r>
+          </a:p>
+        </p:txBody>
+      </p:sp>
+      <p:pic>
+        <p:nvPicPr>
+          <p:cNvPr id="1026" name="Picture 2" descr="img00_arduino_utilizando_potenciômetro_linear_10k_nodemcu_esp8266_raspberry">
+            <a:extLst>
+              <a:ext uri="{FF2B5EF4-FFF2-40B4-BE49-F238E27FC236}">
+                <a16:creationId xmlns:a16="http://schemas.microsoft.com/office/drawing/2014/main" id="{0F0C2C84-BB61-4BF2-818C-9C07E4C5D00E}"/>
+              </a:ext>
+            </a:extLst>
+          </p:cNvPr>
+          <p:cNvPicPr>
+            <a:picLocks noChangeAspect="1" noChangeArrowheads="1"/>
+          </p:cNvPicPr>
+          <p:nvPr/>
+        </p:nvPicPr>
+        <p:blipFill>
+          <a:blip r:embed="rId3">
+            <a:extLst>
+              <a:ext uri="{28A0092B-C50C-407E-A947-70E740481C1C}">
+                <a14:useLocalDpi xmlns:a14="http://schemas.microsoft.com/office/drawing/2010/main" val="0"/>
+              </a:ext>
+            </a:extLst>
+          </a:blip>
+          <a:srcRect/>
+          <a:stretch>
+            <a:fillRect/>
+          </a:stretch>
+        </p:blipFill>
+        <p:spPr bwMode="auto">
+          <a:xfrm>
+            <a:off x="4662170" y="3429000"/>
+            <a:ext cx="2867660" cy="3071845"/>
+          </a:xfrm>
+          <a:prstGeom prst="rect">
+            <a:avLst/>
+          </a:prstGeom>
+          <a:noFill/>
+          <a:extLst>
+            <a:ext uri="{909E8E84-426E-40DD-AFC4-6F175D3DCCD1}">
+              <a14:hiddenFill xmlns:a14="http://schemas.microsoft.com/office/drawing/2010/main">
+                <a:solidFill>
+                  <a:srgbClr val="FFFFFF"/>
+                </a:solidFill>
+              </a14:hiddenFill>
+            </a:ext>
+          </a:extLst>
+        </p:spPr>
+      </p:pic>
+    </p:spTree>
+    <p:extLst>
+      <p:ext uri="{BB962C8B-B14F-4D97-AF65-F5344CB8AC3E}">
+        <p14:creationId xmlns:p14="http://schemas.microsoft.com/office/powerpoint/2010/main" val="2665639051"/>
+      </p:ext>
+    </p:extLst>
+  </p:cSld>
+  <p:clrMapOvr>
+    <a:masterClrMapping/>
+  </p:clrMapOvr>
+</p:sld>
+</file>
+
+<file path=ppt/slides/slide35.xml><?xml version="1.0" encoding="utf-8"?>
+<p:sld xmlns:a="http://schemas.openxmlformats.org/drawingml/2006/main" xmlns:r="http://schemas.openxmlformats.org/officeDocument/2006/relationships" xmlns:p="http://schemas.openxmlformats.org/presentationml/2006/main">
+  <p:cSld>
+    <p:spTree>
+      <p:nvGrpSpPr>
+        <p:cNvPr id="1" name=""/>
+        <p:cNvGrpSpPr/>
+        <p:nvPr/>
+      </p:nvGrpSpPr>
+      <p:grpSpPr>
+        <a:xfrm>
+          <a:off x="0" y="0"/>
+          <a:ext cx="0" cy="0"/>
+          <a:chOff x="0" y="0"/>
+          <a:chExt cx="0" cy="0"/>
+        </a:xfrm>
+      </p:grpSpPr>
+      <p:sp>
+        <p:nvSpPr>
+          <p:cNvPr id="2" name="Title 1">
+            <a:extLst>
+              <a:ext uri="{FF2B5EF4-FFF2-40B4-BE49-F238E27FC236}">
+                <a16:creationId xmlns:a16="http://schemas.microsoft.com/office/drawing/2014/main" id="{73EB6254-D2FE-450C-BF62-8E3C8917644A}"/>
+              </a:ext>
+            </a:extLst>
+          </p:cNvPr>
+          <p:cNvSpPr>
+            <a:spLocks noGrp="1"/>
+          </p:cNvSpPr>
+          <p:nvPr>
+            <p:ph type="title"/>
+          </p:nvPr>
+        </p:nvSpPr>
+        <p:spPr/>
+        <p:txBody>
+          <a:bodyPr/>
+          <a:lstStyle/>
+          <a:p>
+            <a:r>
+              <a:rPr lang="pt-BR" dirty="0"/>
+              <a:t>Leitura de um potenciômetro</a:t>
+            </a:r>
+          </a:p>
+        </p:txBody>
+      </p:sp>
+      <p:sp>
+        <p:nvSpPr>
+          <p:cNvPr id="3" name="Content Placeholder 2">
+            <a:extLst>
+              <a:ext uri="{FF2B5EF4-FFF2-40B4-BE49-F238E27FC236}">
+                <a16:creationId xmlns:a16="http://schemas.microsoft.com/office/drawing/2014/main" id="{25387385-EBFE-4E55-9819-4259EAFF99C1}"/>
+              </a:ext>
+            </a:extLst>
+          </p:cNvPr>
+          <p:cNvSpPr>
+            <a:spLocks noGrp="1"/>
+          </p:cNvSpPr>
+          <p:nvPr>
+            <p:ph idx="1"/>
+          </p:nvPr>
+        </p:nvSpPr>
+        <p:spPr/>
+        <p:txBody>
+          <a:bodyPr/>
+          <a:lstStyle/>
+          <a:p>
+            <a:pPr marL="0" indent="0">
+              <a:buNone/>
+            </a:pPr>
+            <a:r>
+              <a:rPr lang="pt-BR" dirty="0"/>
+              <a:t>Os terminais das extremidades têm função igual aos dos terminais de um resistor de valor fixo. O terminal do meio será ligado a uma entrada analógica e fornecerá um valor entre 0 e 1023, dependendo da posição do botão </a:t>
+            </a:r>
+          </a:p>
+        </p:txBody>
+      </p:sp>
+    </p:spTree>
+    <p:extLst>
+      <p:ext uri="{BB962C8B-B14F-4D97-AF65-F5344CB8AC3E}">
+        <p14:creationId xmlns:p14="http://schemas.microsoft.com/office/powerpoint/2010/main" val="789392566"/>
+      </p:ext>
+    </p:extLst>
+  </p:cSld>
+  <p:clrMapOvr>
+    <a:masterClrMapping/>
+  </p:clrMapOvr>
+</p:sld>
+</file>
+
+<file path=ppt/slides/slide36.xml><?xml version="1.0" encoding="utf-8"?>
+<p:sld xmlns:a="http://schemas.openxmlformats.org/drawingml/2006/main" xmlns:r="http://schemas.openxmlformats.org/officeDocument/2006/relationships" xmlns:p="http://schemas.openxmlformats.org/presentationml/2006/main">
+  <p:cSld>
+    <p:spTree>
+      <p:nvGrpSpPr>
+        <p:cNvPr id="1" name=""/>
+        <p:cNvGrpSpPr/>
+        <p:nvPr/>
+      </p:nvGrpSpPr>
+      <p:grpSpPr>
+        <a:xfrm>
+          <a:off x="0" y="0"/>
+          <a:ext cx="0" cy="0"/>
+          <a:chOff x="0" y="0"/>
+          <a:chExt cx="0" cy="0"/>
+        </a:xfrm>
+      </p:grpSpPr>
+      <p:sp>
+        <p:nvSpPr>
+          <p:cNvPr id="2" name="Title 1">
+            <a:extLst>
+              <a:ext uri="{FF2B5EF4-FFF2-40B4-BE49-F238E27FC236}">
+                <a16:creationId xmlns:a16="http://schemas.microsoft.com/office/drawing/2014/main" id="{EE5DFBEC-C5C0-4A47-B2A2-B67A2C4F8EFB}"/>
+              </a:ext>
+            </a:extLst>
+          </p:cNvPr>
+          <p:cNvSpPr>
+            <a:spLocks noGrp="1"/>
+          </p:cNvSpPr>
+          <p:nvPr>
+            <p:ph type="title"/>
+          </p:nvPr>
+        </p:nvSpPr>
+        <p:spPr/>
+        <p:txBody>
+          <a:bodyPr/>
+          <a:lstStyle/>
+          <a:p>
+            <a:r>
+              <a:rPr lang="pt-BR" dirty="0"/>
+              <a:t>Prática</a:t>
+            </a:r>
+          </a:p>
+        </p:txBody>
+      </p:sp>
+      <p:sp>
+        <p:nvSpPr>
+          <p:cNvPr id="3" name="Text Placeholder 2">
+            <a:extLst>
+              <a:ext uri="{FF2B5EF4-FFF2-40B4-BE49-F238E27FC236}">
+                <a16:creationId xmlns:a16="http://schemas.microsoft.com/office/drawing/2014/main" id="{943BA417-7434-4470-8E02-3AF8FDA269F6}"/>
+              </a:ext>
+            </a:extLst>
+          </p:cNvPr>
+          <p:cNvSpPr>
+            <a:spLocks noGrp="1"/>
+          </p:cNvSpPr>
+          <p:nvPr>
+            <p:ph type="body" idx="1"/>
+          </p:nvPr>
+        </p:nvSpPr>
+        <p:spPr/>
+        <p:txBody>
+          <a:bodyPr/>
+          <a:lstStyle/>
+          <a:p>
+            <a:r>
+              <a:rPr lang="pt-BR" dirty="0"/>
+              <a:t>Transmissão de dados analógicos para um celular</a:t>
+            </a:r>
+          </a:p>
+        </p:txBody>
+      </p:sp>
+    </p:spTree>
+    <p:extLst>
+      <p:ext uri="{BB962C8B-B14F-4D97-AF65-F5344CB8AC3E}">
+        <p14:creationId xmlns:p14="http://schemas.microsoft.com/office/powerpoint/2010/main" val="4277046059"/>
+      </p:ext>
+    </p:extLst>
+  </p:cSld>
+  <p:clrMapOvr>
+    <a:masterClrMapping/>
+  </p:clrMapOvr>
+</p:sld>
+</file>
+
+<file path=ppt/slides/slide37.xml><?xml version="1.0" encoding="utf-8"?>
+<p:sld xmlns:a="http://schemas.openxmlformats.org/drawingml/2006/main" xmlns:r="http://schemas.openxmlformats.org/officeDocument/2006/relationships" xmlns:p="http://schemas.openxmlformats.org/presentationml/2006/main">
+  <p:cSld>
+    <p:spTree>
+      <p:nvGrpSpPr>
+        <p:cNvPr id="1" name=""/>
+        <p:cNvGrpSpPr/>
+        <p:nvPr/>
+      </p:nvGrpSpPr>
+      <p:grpSpPr>
+        <a:xfrm>
+          <a:off x="0" y="0"/>
+          <a:ext cx="0" cy="0"/>
+          <a:chOff x="0" y="0"/>
+          <a:chExt cx="0" cy="0"/>
+        </a:xfrm>
+      </p:grpSpPr>
+      <p:sp>
+        <p:nvSpPr>
           <p:cNvPr id="2" name="Título 1"/>
           <p:cNvSpPr>
             <a:spLocks noGrp="1"/>
@@ -7608,7 +8520,379 @@
           <a:p>
             <a:r>
               <a:rPr lang="pt-BR" dirty="0"/>
-              <a:t>Referências Relé</a:t>
+              <a:t>Montagem do circuito - componentes</a:t>
+            </a:r>
+          </a:p>
+        </p:txBody>
+      </p:sp>
+      <p:sp>
+        <p:nvSpPr>
+          <p:cNvPr id="3" name="Espaço Reservado para Conteúdo 2"/>
+          <p:cNvSpPr>
+            <a:spLocks noGrp="1"/>
+          </p:cNvSpPr>
+          <p:nvPr>
+            <p:ph idx="1"/>
+          </p:nvPr>
+        </p:nvSpPr>
+        <p:spPr/>
+        <p:txBody>
+          <a:bodyPr/>
+          <a:lstStyle/>
+          <a:p>
+            <a:r>
+              <a:rPr lang="pt-BR" dirty="0"/>
+              <a:t>1 Arduino Uno</a:t>
+            </a:r>
+          </a:p>
+          <a:p>
+            <a:r>
+              <a:rPr lang="pt-BR" dirty="0"/>
+              <a:t>1 </a:t>
+            </a:r>
+            <a:r>
+              <a:rPr lang="en-US" dirty="0" err="1"/>
+              <a:t>potenciômetro</a:t>
+            </a:r>
+            <a:r>
+              <a:rPr lang="en-US" dirty="0"/>
+              <a:t>; e</a:t>
+            </a:r>
+          </a:p>
+          <a:p>
+            <a:r>
+              <a:rPr lang="en-US" dirty="0"/>
+              <a:t>3 jumpers macho-</a:t>
+            </a:r>
+            <a:r>
+              <a:rPr lang="en-US" dirty="0" err="1"/>
+              <a:t>fêmea</a:t>
+            </a:r>
+            <a:r>
+              <a:rPr lang="pt-BR" dirty="0"/>
+              <a:t>.</a:t>
+            </a:r>
+          </a:p>
+        </p:txBody>
+      </p:sp>
+    </p:spTree>
+    <p:extLst>
+      <p:ext uri="{BB962C8B-B14F-4D97-AF65-F5344CB8AC3E}">
+        <p14:creationId xmlns:p14="http://schemas.microsoft.com/office/powerpoint/2010/main" val="1858611252"/>
+      </p:ext>
+    </p:extLst>
+  </p:cSld>
+  <p:clrMapOvr>
+    <a:masterClrMapping/>
+  </p:clrMapOvr>
+</p:sld>
+</file>
+
+<file path=ppt/slides/slide38.xml><?xml version="1.0" encoding="utf-8"?>
+<p:sld xmlns:a="http://schemas.openxmlformats.org/drawingml/2006/main" xmlns:r="http://schemas.openxmlformats.org/officeDocument/2006/relationships" xmlns:p="http://schemas.openxmlformats.org/presentationml/2006/main">
+  <p:cSld>
+    <p:spTree>
+      <p:nvGrpSpPr>
+        <p:cNvPr id="1" name=""/>
+        <p:cNvGrpSpPr/>
+        <p:nvPr/>
+      </p:nvGrpSpPr>
+      <p:grpSpPr>
+        <a:xfrm>
+          <a:off x="0" y="0"/>
+          <a:ext cx="0" cy="0"/>
+          <a:chOff x="0" y="0"/>
+          <a:chExt cx="0" cy="0"/>
+        </a:xfrm>
+      </p:grpSpPr>
+      <p:sp>
+        <p:nvSpPr>
+          <p:cNvPr id="2" name="Título 1"/>
+          <p:cNvSpPr>
+            <a:spLocks noGrp="1"/>
+          </p:cNvSpPr>
+          <p:nvPr>
+            <p:ph type="title"/>
+          </p:nvPr>
+        </p:nvSpPr>
+        <p:spPr/>
+        <p:txBody>
+          <a:bodyPr/>
+          <a:lstStyle/>
+          <a:p>
+            <a:r>
+              <a:rPr lang="pt-BR" dirty="0"/>
+              <a:t>Montagem do circuito - conexões</a:t>
+            </a:r>
+          </a:p>
+        </p:txBody>
+      </p:sp>
+      <p:graphicFrame>
+        <p:nvGraphicFramePr>
+          <p:cNvPr id="6" name="Table 6">
+            <a:extLst>
+              <a:ext uri="{FF2B5EF4-FFF2-40B4-BE49-F238E27FC236}">
+                <a16:creationId xmlns:a16="http://schemas.microsoft.com/office/drawing/2014/main" id="{7B51FD96-09BB-45DA-B03E-0FD109EC320F}"/>
+              </a:ext>
+            </a:extLst>
+          </p:cNvPr>
+          <p:cNvGraphicFramePr>
+            <a:graphicFrameLocks noGrp="1"/>
+          </p:cNvGraphicFramePr>
+          <p:nvPr>
+            <p:ph idx="1"/>
+            <p:extLst>
+              <p:ext uri="{D42A27DB-BD31-4B8C-83A1-F6EECF244321}">
+                <p14:modId xmlns:p14="http://schemas.microsoft.com/office/powerpoint/2010/main" val="2706979981"/>
+              </p:ext>
+            </p:extLst>
+          </p:nvPr>
+        </p:nvGraphicFramePr>
+        <p:xfrm>
+          <a:off x="838200" y="1825625"/>
+          <a:ext cx="4502426" cy="1486360"/>
+        </p:xfrm>
+        <a:graphic>
+          <a:graphicData uri="http://schemas.openxmlformats.org/drawingml/2006/table">
+            <a:tbl>
+              <a:tblPr firstRow="1" bandRow="1">
+                <a:tableStyleId>{5C22544A-7EE6-4342-B048-85BDC9FD1C3A}</a:tableStyleId>
+              </a:tblPr>
+              <a:tblGrid>
+                <a:gridCol w="2251213">
+                  <a:extLst>
+                    <a:ext uri="{9D8B030D-6E8A-4147-A177-3AD203B41FA5}">
+                      <a16:colId xmlns:a16="http://schemas.microsoft.com/office/drawing/2014/main" val="3118275097"/>
+                    </a:ext>
+                  </a:extLst>
+                </a:gridCol>
+                <a:gridCol w="2251213">
+                  <a:extLst>
+                    <a:ext uri="{9D8B030D-6E8A-4147-A177-3AD203B41FA5}">
+                      <a16:colId xmlns:a16="http://schemas.microsoft.com/office/drawing/2014/main" val="2325954684"/>
+                    </a:ext>
+                  </a:extLst>
+                </a:gridCol>
+              </a:tblGrid>
+              <a:tr h="371590">
+                <a:tc>
+                  <a:txBody>
+                    <a:bodyPr/>
+                    <a:lstStyle/>
+                    <a:p>
+                      <a:r>
+                        <a:rPr lang="pt-BR" dirty="0"/>
+                        <a:t>Arduino</a:t>
+                      </a:r>
+                    </a:p>
+                  </a:txBody>
+                  <a:tcPr/>
+                </a:tc>
+                <a:tc>
+                  <a:txBody>
+                    <a:bodyPr/>
+                    <a:lstStyle/>
+                    <a:p>
+                      <a:r>
+                        <a:rPr lang="pt-BR" dirty="0"/>
+                        <a:t>Potenciômetro</a:t>
+                      </a:r>
+                    </a:p>
+                  </a:txBody>
+                  <a:tcPr/>
+                </a:tc>
+                <a:extLst>
+                  <a:ext uri="{0D108BD9-81ED-4DB2-BD59-A6C34878D82A}">
+                    <a16:rowId xmlns:a16="http://schemas.microsoft.com/office/drawing/2014/main" val="2846402877"/>
+                  </a:ext>
+                </a:extLst>
+              </a:tr>
+              <a:tr h="371590">
+                <a:tc>
+                  <a:txBody>
+                    <a:bodyPr/>
+                    <a:lstStyle/>
+                    <a:p>
+                      <a:r>
+                        <a:rPr lang="pt-BR" dirty="0"/>
+                        <a:t>5 V</a:t>
+                      </a:r>
+                    </a:p>
+                  </a:txBody>
+                  <a:tcPr/>
+                </a:tc>
+                <a:tc>
+                  <a:txBody>
+                    <a:bodyPr/>
+                    <a:lstStyle/>
+                    <a:p>
+                      <a:r>
+                        <a:rPr lang="pt-BR" dirty="0"/>
+                        <a:t>Terminal 1</a:t>
+                      </a:r>
+                    </a:p>
+                  </a:txBody>
+                  <a:tcPr/>
+                </a:tc>
+                <a:extLst>
+                  <a:ext uri="{0D108BD9-81ED-4DB2-BD59-A6C34878D82A}">
+                    <a16:rowId xmlns:a16="http://schemas.microsoft.com/office/drawing/2014/main" val="3387589238"/>
+                  </a:ext>
+                </a:extLst>
+              </a:tr>
+              <a:tr h="371590">
+                <a:tc>
+                  <a:txBody>
+                    <a:bodyPr/>
+                    <a:lstStyle/>
+                    <a:p>
+                      <a:r>
+                        <a:rPr lang="pt-BR" dirty="0"/>
+                        <a:t>A0</a:t>
+                      </a:r>
+                    </a:p>
+                  </a:txBody>
+                  <a:tcPr/>
+                </a:tc>
+                <a:tc>
+                  <a:txBody>
+                    <a:bodyPr/>
+                    <a:lstStyle/>
+                    <a:p>
+                      <a:r>
+                        <a:rPr lang="pt-BR" dirty="0"/>
+                        <a:t>Terminal 2</a:t>
+                      </a:r>
+                    </a:p>
+                  </a:txBody>
+                  <a:tcPr/>
+                </a:tc>
+                <a:extLst>
+                  <a:ext uri="{0D108BD9-81ED-4DB2-BD59-A6C34878D82A}">
+                    <a16:rowId xmlns:a16="http://schemas.microsoft.com/office/drawing/2014/main" val="4078284695"/>
+                  </a:ext>
+                </a:extLst>
+              </a:tr>
+              <a:tr h="371590">
+                <a:tc>
+                  <a:txBody>
+                    <a:bodyPr/>
+                    <a:lstStyle/>
+                    <a:p>
+                      <a:r>
+                        <a:rPr lang="pt-BR" dirty="0"/>
+                        <a:t>GND</a:t>
+                      </a:r>
+                    </a:p>
+                  </a:txBody>
+                  <a:tcPr/>
+                </a:tc>
+                <a:tc>
+                  <a:txBody>
+                    <a:bodyPr/>
+                    <a:lstStyle/>
+                    <a:p>
+                      <a:r>
+                        <a:rPr lang="pt-BR" dirty="0"/>
+                        <a:t>Terminal 3</a:t>
+                      </a:r>
+                    </a:p>
+                  </a:txBody>
+                  <a:tcPr/>
+                </a:tc>
+                <a:extLst>
+                  <a:ext uri="{0D108BD9-81ED-4DB2-BD59-A6C34878D82A}">
+                    <a16:rowId xmlns:a16="http://schemas.microsoft.com/office/drawing/2014/main" val="494648561"/>
+                  </a:ext>
+                </a:extLst>
+              </a:tr>
+            </a:tbl>
+          </a:graphicData>
+        </a:graphic>
+      </p:graphicFrame>
+      <p:pic>
+        <p:nvPicPr>
+          <p:cNvPr id="4" name="Picture 3" descr="A close up of a device&#10;&#10;Description automatically generated">
+            <a:extLst>
+              <a:ext uri="{FF2B5EF4-FFF2-40B4-BE49-F238E27FC236}">
+                <a16:creationId xmlns:a16="http://schemas.microsoft.com/office/drawing/2014/main" id="{32094A82-1E42-44ED-B817-35D44258B8CB}"/>
+              </a:ext>
+            </a:extLst>
+          </p:cNvPr>
+          <p:cNvPicPr>
+            <a:picLocks noChangeAspect="1"/>
+          </p:cNvPicPr>
+          <p:nvPr/>
+        </p:nvPicPr>
+        <p:blipFill rotWithShape="1">
+          <a:blip r:embed="rId2">
+            <a:extLst>
+              <a:ext uri="{28A0092B-C50C-407E-A947-70E740481C1C}">
+                <a14:useLocalDpi xmlns:a14="http://schemas.microsoft.com/office/drawing/2010/main" val="0"/>
+              </a:ext>
+            </a:extLst>
+          </a:blip>
+          <a:srcRect l="18750" t="4106" r="18663" b="3791"/>
+          <a:stretch/>
+        </p:blipFill>
+        <p:spPr>
+          <a:xfrm>
+            <a:off x="5939238" y="1825625"/>
+            <a:ext cx="5414562" cy="3266637"/>
+          </a:xfrm>
+          <a:prstGeom prst="rect">
+            <a:avLst/>
+          </a:prstGeom>
+        </p:spPr>
+      </p:pic>
+    </p:spTree>
+    <p:extLst>
+      <p:ext uri="{BB962C8B-B14F-4D97-AF65-F5344CB8AC3E}">
+        <p14:creationId xmlns:p14="http://schemas.microsoft.com/office/powerpoint/2010/main" val="952713372"/>
+      </p:ext>
+    </p:extLst>
+  </p:cSld>
+  <p:clrMapOvr>
+    <a:masterClrMapping/>
+  </p:clrMapOvr>
+</p:sld>
+</file>
+
+<file path=ppt/slides/slide39.xml><?xml version="1.0" encoding="utf-8"?>
+<p:sld xmlns:a="http://schemas.openxmlformats.org/drawingml/2006/main" xmlns:r="http://schemas.openxmlformats.org/officeDocument/2006/relationships" xmlns:p="http://schemas.openxmlformats.org/presentationml/2006/main">
+  <p:cSld>
+    <p:spTree>
+      <p:nvGrpSpPr>
+        <p:cNvPr id="1" name=""/>
+        <p:cNvGrpSpPr/>
+        <p:nvPr/>
+      </p:nvGrpSpPr>
+      <p:grpSpPr>
+        <a:xfrm>
+          <a:off x="0" y="0"/>
+          <a:ext cx="0" cy="0"/>
+          <a:chOff x="0" y="0"/>
+          <a:chExt cx="0" cy="0"/>
+        </a:xfrm>
+      </p:grpSpPr>
+      <p:sp>
+        <p:nvSpPr>
+          <p:cNvPr id="2" name="Título 1"/>
+          <p:cNvSpPr>
+            <a:spLocks noGrp="1"/>
+          </p:cNvSpPr>
+          <p:nvPr>
+            <p:ph type="title"/>
+          </p:nvPr>
+        </p:nvSpPr>
+        <p:spPr/>
+        <p:txBody>
+          <a:bodyPr/>
+          <a:lstStyle/>
+          <a:p>
+            <a:r>
+              <a:rPr lang="pt-BR" dirty="0"/>
+              <a:t>Enviar código</a:t>
             </a:r>
           </a:p>
         </p:txBody>
@@ -7630,35 +8914,219 @@
           </a:bodyPr>
           <a:lstStyle/>
           <a:p>
-            <a:r>
-              <a:rPr lang="en-US" dirty="0">
-                <a:hlinkClick r:id="rId2"/>
-              </a:rPr>
-              <a:t>https://blogmasterwalkershop.com.br/arduino/como-usar-com-arduino-modulo-rele-5v-1-canal</a:t>
-            </a:r>
-            <a:r>
-              <a:rPr lang="en-US" dirty="0" smtClean="0">
-                <a:hlinkClick r:id="rId2"/>
-              </a:rPr>
-              <a:t>/</a:t>
-            </a:r>
-            <a:endParaRPr lang="en-US" dirty="0" smtClean="0"/>
-          </a:p>
-          <a:p>
+            <a:pPr marL="0" indent="0">
+              <a:buNone/>
+            </a:pPr>
             <a:r>
               <a:rPr lang="pt-BR" dirty="0">
-                <a:hlinkClick r:id="rId3"/>
-              </a:rPr>
-              <a:t>https://portal.vidadesilicio.com.br/modulo-rele-com-arduino/</a:t>
-            </a:r>
-            <a:endParaRPr lang="pt-BR" dirty="0"/>
+                <a:latin typeface="Courier New" panose="02070309020205020404" pitchFamily="49" charset="0"/>
+                <a:cs typeface="Courier New" panose="02070309020205020404" pitchFamily="49" charset="0"/>
+              </a:rPr>
+              <a:t>#include &lt;</a:t>
+            </a:r>
+            <a:r>
+              <a:rPr lang="pt-BR" dirty="0" err="1">
+                <a:latin typeface="Courier New" panose="02070309020205020404" pitchFamily="49" charset="0"/>
+                <a:cs typeface="Courier New" panose="02070309020205020404" pitchFamily="49" charset="0"/>
+              </a:rPr>
+              <a:t>SoftwareSerial.h</a:t>
+            </a:r>
+            <a:r>
+              <a:rPr lang="pt-BR" dirty="0">
+                <a:latin typeface="Courier New" panose="02070309020205020404" pitchFamily="49" charset="0"/>
+                <a:cs typeface="Courier New" panose="02070309020205020404" pitchFamily="49" charset="0"/>
+              </a:rPr>
+              <a:t>&gt;</a:t>
+            </a:r>
+          </a:p>
+          <a:p>
+            <a:pPr marL="0" indent="0">
+              <a:buNone/>
+            </a:pPr>
+            <a:r>
+              <a:rPr lang="pt-BR" dirty="0" err="1">
+                <a:latin typeface="Courier New" panose="02070309020205020404" pitchFamily="49" charset="0"/>
+                <a:cs typeface="Courier New" panose="02070309020205020404" pitchFamily="49" charset="0"/>
+              </a:rPr>
+              <a:t>SoftwareSerial</a:t>
+            </a:r>
+            <a:r>
+              <a:rPr lang="pt-BR" dirty="0">
+                <a:latin typeface="Courier New" panose="02070309020205020404" pitchFamily="49" charset="0"/>
+                <a:cs typeface="Courier New" panose="02070309020205020404" pitchFamily="49" charset="0"/>
+              </a:rPr>
+              <a:t> BT(0, 1);</a:t>
+            </a:r>
+          </a:p>
+          <a:p>
+            <a:pPr marL="0" indent="0">
+              <a:buNone/>
+            </a:pPr>
+            <a:r>
+              <a:rPr lang="pt-BR" b="1" dirty="0" err="1">
+                <a:latin typeface="Courier New" panose="02070309020205020404" pitchFamily="49" charset="0"/>
+                <a:cs typeface="Courier New" panose="02070309020205020404" pitchFamily="49" charset="0"/>
+              </a:rPr>
+              <a:t>const</a:t>
+            </a:r>
+            <a:r>
+              <a:rPr lang="pt-BR" b="1" dirty="0">
+                <a:latin typeface="Courier New" panose="02070309020205020404" pitchFamily="49" charset="0"/>
+                <a:cs typeface="Courier New" panose="02070309020205020404" pitchFamily="49" charset="0"/>
+              </a:rPr>
+              <a:t> </a:t>
+            </a:r>
+            <a:r>
+              <a:rPr lang="pt-BR" b="1" dirty="0" err="1">
+                <a:latin typeface="Courier New" panose="02070309020205020404" pitchFamily="49" charset="0"/>
+                <a:cs typeface="Courier New" panose="02070309020205020404" pitchFamily="49" charset="0"/>
+              </a:rPr>
+              <a:t>int</a:t>
+            </a:r>
+            <a:r>
+              <a:rPr lang="pt-BR" b="1" dirty="0">
+                <a:latin typeface="Courier New" panose="02070309020205020404" pitchFamily="49" charset="0"/>
+                <a:cs typeface="Courier New" panose="02070309020205020404" pitchFamily="49" charset="0"/>
+              </a:rPr>
+              <a:t> </a:t>
+            </a:r>
+            <a:r>
+              <a:rPr lang="pt-BR" b="1" dirty="0" err="1">
+                <a:latin typeface="Courier New" panose="02070309020205020404" pitchFamily="49" charset="0"/>
+                <a:cs typeface="Courier New" panose="02070309020205020404" pitchFamily="49" charset="0"/>
+              </a:rPr>
+              <a:t>pot</a:t>
+            </a:r>
+            <a:r>
+              <a:rPr lang="pt-BR" b="1" dirty="0">
+                <a:latin typeface="Courier New" panose="02070309020205020404" pitchFamily="49" charset="0"/>
+                <a:cs typeface="Courier New" panose="02070309020205020404" pitchFamily="49" charset="0"/>
+              </a:rPr>
+              <a:t> = A0;</a:t>
+            </a:r>
+          </a:p>
+          <a:p>
+            <a:pPr marL="0" indent="0">
+              <a:buNone/>
+            </a:pPr>
+            <a:r>
+              <a:rPr lang="pt-BR" b="1" dirty="0" err="1">
+                <a:latin typeface="Courier New" panose="02070309020205020404" pitchFamily="49" charset="0"/>
+                <a:cs typeface="Courier New" panose="02070309020205020404" pitchFamily="49" charset="0"/>
+              </a:rPr>
+              <a:t>float</a:t>
+            </a:r>
+            <a:r>
+              <a:rPr lang="pt-BR" b="1" dirty="0">
+                <a:latin typeface="Courier New" panose="02070309020205020404" pitchFamily="49" charset="0"/>
+                <a:cs typeface="Courier New" panose="02070309020205020404" pitchFamily="49" charset="0"/>
+              </a:rPr>
+              <a:t> </a:t>
+            </a:r>
+            <a:r>
+              <a:rPr lang="pt-BR" b="1" dirty="0" err="1">
+                <a:latin typeface="Courier New" panose="02070309020205020404" pitchFamily="49" charset="0"/>
+                <a:cs typeface="Courier New" panose="02070309020205020404" pitchFamily="49" charset="0"/>
+              </a:rPr>
+              <a:t>valPot</a:t>
+            </a:r>
+            <a:r>
+              <a:rPr lang="pt-BR" b="1" dirty="0">
+                <a:latin typeface="Courier New" panose="02070309020205020404" pitchFamily="49" charset="0"/>
+                <a:cs typeface="Courier New" panose="02070309020205020404" pitchFamily="49" charset="0"/>
+              </a:rPr>
+              <a:t>;</a:t>
+            </a:r>
+          </a:p>
+          <a:p>
+            <a:pPr marL="0" indent="0">
+              <a:buNone/>
+            </a:pPr>
+            <a:r>
+              <a:rPr lang="pt-BR" dirty="0">
+                <a:latin typeface="Courier New" panose="02070309020205020404" pitchFamily="49" charset="0"/>
+                <a:cs typeface="Courier New" panose="02070309020205020404" pitchFamily="49" charset="0"/>
+              </a:rPr>
+              <a:t>...</a:t>
+            </a:r>
+          </a:p>
+          <a:p>
+            <a:pPr marL="0" indent="0">
+              <a:buNone/>
+            </a:pPr>
+            <a:r>
+              <a:rPr lang="pt-BR" dirty="0" err="1">
+                <a:latin typeface="Courier New" panose="02070309020205020404" pitchFamily="49" charset="0"/>
+                <a:cs typeface="Courier New" panose="02070309020205020404" pitchFamily="49" charset="0"/>
+              </a:rPr>
+              <a:t>void</a:t>
+            </a:r>
+            <a:r>
+              <a:rPr lang="pt-BR" dirty="0">
+                <a:latin typeface="Courier New" panose="02070309020205020404" pitchFamily="49" charset="0"/>
+                <a:cs typeface="Courier New" panose="02070309020205020404" pitchFamily="49" charset="0"/>
+              </a:rPr>
+              <a:t> setup(){</a:t>
+            </a:r>
+          </a:p>
+          <a:p>
+            <a:pPr marL="0" indent="0">
+              <a:buNone/>
+            </a:pPr>
+            <a:r>
+              <a:rPr lang="pt-BR" dirty="0">
+                <a:latin typeface="Courier New" panose="02070309020205020404" pitchFamily="49" charset="0"/>
+                <a:cs typeface="Courier New" panose="02070309020205020404" pitchFamily="49" charset="0"/>
+              </a:rPr>
+              <a:t>  </a:t>
+            </a:r>
+            <a:r>
+              <a:rPr lang="pt-BR" b="1" dirty="0" err="1">
+                <a:latin typeface="Courier New" panose="02070309020205020404" pitchFamily="49" charset="0"/>
+                <a:cs typeface="Courier New" panose="02070309020205020404" pitchFamily="49" charset="0"/>
+              </a:rPr>
+              <a:t>pinMode</a:t>
+            </a:r>
+            <a:r>
+              <a:rPr lang="pt-BR" b="1" dirty="0">
+                <a:latin typeface="Courier New" panose="02070309020205020404" pitchFamily="49" charset="0"/>
+                <a:cs typeface="Courier New" panose="02070309020205020404" pitchFamily="49" charset="0"/>
+              </a:rPr>
+              <a:t>(</a:t>
+            </a:r>
+            <a:r>
+              <a:rPr lang="pt-BR" b="1" dirty="0" err="1">
+                <a:latin typeface="Courier New" panose="02070309020205020404" pitchFamily="49" charset="0"/>
+                <a:cs typeface="Courier New" panose="02070309020205020404" pitchFamily="49" charset="0"/>
+              </a:rPr>
+              <a:t>pot</a:t>
+            </a:r>
+            <a:r>
+              <a:rPr lang="pt-BR" b="1" dirty="0">
+                <a:latin typeface="Courier New" panose="02070309020205020404" pitchFamily="49" charset="0"/>
+                <a:cs typeface="Courier New" panose="02070309020205020404" pitchFamily="49" charset="0"/>
+              </a:rPr>
+              <a:t>, INPUT);</a:t>
+            </a:r>
+          </a:p>
+          <a:p>
+            <a:pPr marL="0" indent="0">
+              <a:buNone/>
+            </a:pPr>
+            <a:r>
+              <a:rPr lang="pt-BR" dirty="0">
+                <a:latin typeface="Courier New" panose="02070309020205020404" pitchFamily="49" charset="0"/>
+                <a:cs typeface="Courier New" panose="02070309020205020404" pitchFamily="49" charset="0"/>
+              </a:rPr>
+              <a:t>...</a:t>
+            </a:r>
           </a:p>
         </p:txBody>
       </p:sp>
     </p:spTree>
     <p:extLst>
       <p:ext uri="{BB962C8B-B14F-4D97-AF65-F5344CB8AC3E}">
-        <p14:creationId xmlns:p14="http://schemas.microsoft.com/office/powerpoint/2010/main" val="1716499950"/>
+        <p14:creationId xmlns:p14="http://schemas.microsoft.com/office/powerpoint/2010/main" val="389201300"/>
       </p:ext>
     </p:extLst>
   </p:cSld>
@@ -7779,6 +9247,585 @@
     <p:extLst>
       <p:ext uri="{BB962C8B-B14F-4D97-AF65-F5344CB8AC3E}">
         <p14:creationId xmlns:p14="http://schemas.microsoft.com/office/powerpoint/2010/main" val="1877610935"/>
+      </p:ext>
+    </p:extLst>
+  </p:cSld>
+  <p:clrMapOvr>
+    <a:masterClrMapping/>
+  </p:clrMapOvr>
+</p:sld>
+</file>
+
+<file path=ppt/slides/slide40.xml><?xml version="1.0" encoding="utf-8"?>
+<p:sld xmlns:a="http://schemas.openxmlformats.org/drawingml/2006/main" xmlns:r="http://schemas.openxmlformats.org/officeDocument/2006/relationships" xmlns:p="http://schemas.openxmlformats.org/presentationml/2006/main">
+  <p:cSld>
+    <p:spTree>
+      <p:nvGrpSpPr>
+        <p:cNvPr id="1" name=""/>
+        <p:cNvGrpSpPr/>
+        <p:nvPr/>
+      </p:nvGrpSpPr>
+      <p:grpSpPr>
+        <a:xfrm>
+          <a:off x="0" y="0"/>
+          <a:ext cx="0" cy="0"/>
+          <a:chOff x="0" y="0"/>
+          <a:chExt cx="0" cy="0"/>
+        </a:xfrm>
+      </p:grpSpPr>
+      <p:sp>
+        <p:nvSpPr>
+          <p:cNvPr id="2" name="Título 1"/>
+          <p:cNvSpPr>
+            <a:spLocks noGrp="1"/>
+          </p:cNvSpPr>
+          <p:nvPr>
+            <p:ph type="title"/>
+          </p:nvPr>
+        </p:nvSpPr>
+        <p:spPr/>
+        <p:txBody>
+          <a:bodyPr/>
+          <a:lstStyle/>
+          <a:p>
+            <a:r>
+              <a:rPr lang="pt-BR" dirty="0"/>
+              <a:t>Enviar código</a:t>
+            </a:r>
+          </a:p>
+        </p:txBody>
+      </p:sp>
+      <p:sp>
+        <p:nvSpPr>
+          <p:cNvPr id="3" name="Espaço Reservado para Conteúdo 2"/>
+          <p:cNvSpPr>
+            <a:spLocks noGrp="1"/>
+          </p:cNvSpPr>
+          <p:nvPr>
+            <p:ph idx="1"/>
+          </p:nvPr>
+        </p:nvSpPr>
+        <p:spPr/>
+        <p:txBody>
+          <a:bodyPr>
+            <a:normAutofit/>
+          </a:bodyPr>
+          <a:lstStyle/>
+          <a:p>
+            <a:pPr marL="0" indent="0">
+              <a:buNone/>
+            </a:pPr>
+            <a:r>
+              <a:rPr lang="en-US" dirty="0">
+                <a:latin typeface="Courier New" panose="02070309020205020404" pitchFamily="49" charset="0"/>
+                <a:cs typeface="Courier New" panose="02070309020205020404" pitchFamily="49" charset="0"/>
+              </a:rPr>
+              <a:t>void loop() {</a:t>
+            </a:r>
+          </a:p>
+          <a:p>
+            <a:pPr marL="0" indent="0">
+              <a:buNone/>
+            </a:pPr>
+            <a:r>
+              <a:rPr lang="en-US" dirty="0">
+                <a:latin typeface="Courier New" panose="02070309020205020404" pitchFamily="49" charset="0"/>
+                <a:cs typeface="Courier New" panose="02070309020205020404" pitchFamily="49" charset="0"/>
+              </a:rPr>
+              <a:t>  </a:t>
+            </a:r>
+            <a:r>
+              <a:rPr lang="en-US" b="1" dirty="0">
+                <a:latin typeface="Courier New" panose="02070309020205020404" pitchFamily="49" charset="0"/>
+                <a:cs typeface="Courier New" panose="02070309020205020404" pitchFamily="49" charset="0"/>
+              </a:rPr>
+              <a:t>delay(2000);</a:t>
+            </a:r>
+          </a:p>
+          <a:p>
+            <a:pPr marL="0" indent="0">
+              <a:buNone/>
+            </a:pPr>
+            <a:r>
+              <a:rPr lang="en-US" b="1" dirty="0">
+                <a:latin typeface="Courier New" panose="02070309020205020404" pitchFamily="49" charset="0"/>
+                <a:cs typeface="Courier New" panose="02070309020205020404" pitchFamily="49" charset="0"/>
+              </a:rPr>
+              <a:t>  </a:t>
+            </a:r>
+            <a:r>
+              <a:rPr lang="en-US" b="1" dirty="0" err="1">
+                <a:latin typeface="Courier New" panose="02070309020205020404" pitchFamily="49" charset="0"/>
+                <a:cs typeface="Courier New" panose="02070309020205020404" pitchFamily="49" charset="0"/>
+              </a:rPr>
+              <a:t>valPot</a:t>
+            </a:r>
+            <a:r>
+              <a:rPr lang="en-US" b="1" dirty="0">
+                <a:latin typeface="Courier New" panose="02070309020205020404" pitchFamily="49" charset="0"/>
+                <a:cs typeface="Courier New" panose="02070309020205020404" pitchFamily="49" charset="0"/>
+              </a:rPr>
+              <a:t> = </a:t>
+            </a:r>
+            <a:r>
+              <a:rPr lang="en-US" b="1" dirty="0" err="1">
+                <a:latin typeface="Courier New" panose="02070309020205020404" pitchFamily="49" charset="0"/>
+                <a:cs typeface="Courier New" panose="02070309020205020404" pitchFamily="49" charset="0"/>
+              </a:rPr>
+              <a:t>analogRead</a:t>
+            </a:r>
+            <a:r>
+              <a:rPr lang="en-US" b="1" dirty="0">
+                <a:latin typeface="Courier New" panose="02070309020205020404" pitchFamily="49" charset="0"/>
+                <a:cs typeface="Courier New" panose="02070309020205020404" pitchFamily="49" charset="0"/>
+              </a:rPr>
+              <a:t>(pot);</a:t>
+            </a:r>
+          </a:p>
+          <a:p>
+            <a:pPr marL="0" indent="0">
+              <a:buNone/>
+            </a:pPr>
+            <a:r>
+              <a:rPr lang="en-US" b="1" dirty="0">
+                <a:latin typeface="Courier New" panose="02070309020205020404" pitchFamily="49" charset="0"/>
+                <a:cs typeface="Courier New" panose="02070309020205020404" pitchFamily="49" charset="0"/>
+              </a:rPr>
+              <a:t>  </a:t>
+            </a:r>
+            <a:r>
+              <a:rPr lang="en-US" b="1" dirty="0" err="1">
+                <a:latin typeface="Courier New" panose="02070309020205020404" pitchFamily="49" charset="0"/>
+                <a:cs typeface="Courier New" panose="02070309020205020404" pitchFamily="49" charset="0"/>
+              </a:rPr>
+              <a:t>Serial.println</a:t>
+            </a:r>
+            <a:r>
+              <a:rPr lang="en-US" b="1" dirty="0">
+                <a:latin typeface="Courier New" panose="02070309020205020404" pitchFamily="49" charset="0"/>
+                <a:cs typeface="Courier New" panose="02070309020205020404" pitchFamily="49" charset="0"/>
+              </a:rPr>
+              <a:t>(</a:t>
+            </a:r>
+            <a:r>
+              <a:rPr lang="en-US" b="1" dirty="0" err="1">
+                <a:latin typeface="Courier New" panose="02070309020205020404" pitchFamily="49" charset="0"/>
+                <a:cs typeface="Courier New" panose="02070309020205020404" pitchFamily="49" charset="0"/>
+              </a:rPr>
+              <a:t>valPot</a:t>
+            </a:r>
+            <a:r>
+              <a:rPr lang="en-US" b="1" dirty="0">
+                <a:latin typeface="Courier New" panose="02070309020205020404" pitchFamily="49" charset="0"/>
+                <a:cs typeface="Courier New" panose="02070309020205020404" pitchFamily="49" charset="0"/>
+              </a:rPr>
+              <a:t>);</a:t>
+            </a:r>
+          </a:p>
+          <a:p>
+            <a:pPr marL="0" indent="0">
+              <a:buNone/>
+            </a:pPr>
+            <a:r>
+              <a:rPr lang="en-US" dirty="0">
+                <a:latin typeface="Courier New" panose="02070309020205020404" pitchFamily="49" charset="0"/>
+                <a:cs typeface="Courier New" panose="02070309020205020404" pitchFamily="49" charset="0"/>
+              </a:rPr>
+              <a:t>  if (</a:t>
+            </a:r>
+            <a:r>
+              <a:rPr lang="en-US" dirty="0" err="1">
+                <a:latin typeface="Courier New" panose="02070309020205020404" pitchFamily="49" charset="0"/>
+                <a:cs typeface="Courier New" panose="02070309020205020404" pitchFamily="49" charset="0"/>
+              </a:rPr>
+              <a:t>BT.available</a:t>
+            </a:r>
+            <a:r>
+              <a:rPr lang="en-US" dirty="0">
+                <a:latin typeface="Courier New" panose="02070309020205020404" pitchFamily="49" charset="0"/>
+                <a:cs typeface="Courier New" panose="02070309020205020404" pitchFamily="49" charset="0"/>
+              </a:rPr>
+              <a:t>()){</a:t>
+            </a:r>
+          </a:p>
+          <a:p>
+            <a:pPr marL="0" indent="0">
+              <a:buNone/>
+            </a:pPr>
+            <a:r>
+              <a:rPr lang="en-US" dirty="0">
+                <a:latin typeface="Courier New" panose="02070309020205020404" pitchFamily="49" charset="0"/>
+                <a:cs typeface="Courier New" panose="02070309020205020404" pitchFamily="49" charset="0"/>
+              </a:rPr>
+              <a:t>    </a:t>
+            </a:r>
+            <a:r>
+              <a:rPr lang="en-US" b="1" dirty="0" err="1">
+                <a:latin typeface="Courier New" panose="02070309020205020404" pitchFamily="49" charset="0"/>
+                <a:cs typeface="Courier New" panose="02070309020205020404" pitchFamily="49" charset="0"/>
+              </a:rPr>
+              <a:t>BT.println</a:t>
+            </a:r>
+            <a:r>
+              <a:rPr lang="en-US" b="1" dirty="0">
+                <a:latin typeface="Courier New" panose="02070309020205020404" pitchFamily="49" charset="0"/>
+                <a:cs typeface="Courier New" panose="02070309020205020404" pitchFamily="49" charset="0"/>
+              </a:rPr>
+              <a:t>(</a:t>
+            </a:r>
+            <a:r>
+              <a:rPr lang="en-US" b="1" dirty="0" err="1">
+                <a:latin typeface="Courier New" panose="02070309020205020404" pitchFamily="49" charset="0"/>
+                <a:cs typeface="Courier New" panose="02070309020205020404" pitchFamily="49" charset="0"/>
+              </a:rPr>
+              <a:t>valPot</a:t>
+            </a:r>
+            <a:r>
+              <a:rPr lang="en-US" b="1" dirty="0">
+                <a:latin typeface="Courier New" panose="02070309020205020404" pitchFamily="49" charset="0"/>
+                <a:cs typeface="Courier New" panose="02070309020205020404" pitchFamily="49" charset="0"/>
+              </a:rPr>
+              <a:t>);</a:t>
+            </a:r>
+          </a:p>
+          <a:p>
+            <a:pPr marL="0" indent="0">
+              <a:buNone/>
+            </a:pPr>
+            <a:r>
+              <a:rPr lang="en-US" b="1" dirty="0">
+                <a:latin typeface="Courier New" panose="02070309020205020404" pitchFamily="49" charset="0"/>
+                <a:cs typeface="Courier New" panose="02070309020205020404" pitchFamily="49" charset="0"/>
+              </a:rPr>
+              <a:t>...</a:t>
+            </a:r>
+          </a:p>
+        </p:txBody>
+      </p:sp>
+    </p:spTree>
+    <p:extLst>
+      <p:ext uri="{BB962C8B-B14F-4D97-AF65-F5344CB8AC3E}">
+        <p14:creationId xmlns:p14="http://schemas.microsoft.com/office/powerpoint/2010/main" val="2249117619"/>
+      </p:ext>
+    </p:extLst>
+  </p:cSld>
+  <p:clrMapOvr>
+    <a:masterClrMapping/>
+  </p:clrMapOvr>
+</p:sld>
+</file>
+
+<file path=ppt/slides/slide41.xml><?xml version="1.0" encoding="utf-8"?>
+<p:sld xmlns:a="http://schemas.openxmlformats.org/drawingml/2006/main" xmlns:r="http://schemas.openxmlformats.org/officeDocument/2006/relationships" xmlns:p="http://schemas.openxmlformats.org/presentationml/2006/main">
+  <p:cSld>
+    <p:spTree>
+      <p:nvGrpSpPr>
+        <p:cNvPr id="1" name=""/>
+        <p:cNvGrpSpPr/>
+        <p:nvPr/>
+      </p:nvGrpSpPr>
+      <p:grpSpPr>
+        <a:xfrm>
+          <a:off x="0" y="0"/>
+          <a:ext cx="0" cy="0"/>
+          <a:chOff x="0" y="0"/>
+          <a:chExt cx="0" cy="0"/>
+        </a:xfrm>
+      </p:grpSpPr>
+      <p:sp>
+        <p:nvSpPr>
+          <p:cNvPr id="2" name="Title 1">
+            <a:extLst>
+              <a:ext uri="{FF2B5EF4-FFF2-40B4-BE49-F238E27FC236}">
+                <a16:creationId xmlns:a16="http://schemas.microsoft.com/office/drawing/2014/main" id="{73EB6254-D2FE-450C-BF62-8E3C8917644A}"/>
+              </a:ext>
+            </a:extLst>
+          </p:cNvPr>
+          <p:cNvSpPr>
+            <a:spLocks noGrp="1"/>
+          </p:cNvSpPr>
+          <p:nvPr>
+            <p:ph type="title"/>
+          </p:nvPr>
+        </p:nvSpPr>
+        <p:spPr/>
+        <p:txBody>
+          <a:bodyPr/>
+          <a:lstStyle/>
+          <a:p>
+            <a:r>
+              <a:rPr lang="pt-BR" dirty="0"/>
+              <a:t>Recebendo os dados no celular</a:t>
+            </a:r>
+          </a:p>
+        </p:txBody>
+      </p:sp>
+      <p:sp>
+        <p:nvSpPr>
+          <p:cNvPr id="3" name="Content Placeholder 2">
+            <a:extLst>
+              <a:ext uri="{FF2B5EF4-FFF2-40B4-BE49-F238E27FC236}">
+                <a16:creationId xmlns:a16="http://schemas.microsoft.com/office/drawing/2014/main" id="{25387385-EBFE-4E55-9819-4259EAFF99C1}"/>
+              </a:ext>
+            </a:extLst>
+          </p:cNvPr>
+          <p:cNvSpPr>
+            <a:spLocks noGrp="1"/>
+          </p:cNvSpPr>
+          <p:nvPr>
+            <p:ph idx="1"/>
+          </p:nvPr>
+        </p:nvSpPr>
+        <p:spPr/>
+        <p:txBody>
+          <a:bodyPr/>
+          <a:lstStyle/>
+          <a:p>
+            <a:r>
+              <a:rPr lang="pt-BR" dirty="0"/>
+              <a:t>Conecte o celular ao módulo HC-05 usando o aplicativo Bluetooth Terminal HC-05; e</a:t>
+            </a:r>
+          </a:p>
+          <a:p>
+            <a:r>
+              <a:rPr lang="pt-BR" dirty="0"/>
+              <a:t>Gire o botão do potenciômetro para diferentes posições.</a:t>
+            </a:r>
+          </a:p>
+          <a:p>
+            <a:endParaRPr lang="pt-BR" dirty="0"/>
+          </a:p>
+        </p:txBody>
+      </p:sp>
+    </p:spTree>
+    <p:extLst>
+      <p:ext uri="{BB962C8B-B14F-4D97-AF65-F5344CB8AC3E}">
+        <p14:creationId xmlns:p14="http://schemas.microsoft.com/office/powerpoint/2010/main" val="2824913367"/>
+      </p:ext>
+    </p:extLst>
+  </p:cSld>
+  <p:clrMapOvr>
+    <a:masterClrMapping/>
+  </p:clrMapOvr>
+</p:sld>
+</file>
+
+<file path=ppt/slides/slide42.xml><?xml version="1.0" encoding="utf-8"?>
+<p:sld xmlns:a="http://schemas.openxmlformats.org/drawingml/2006/main" xmlns:r="http://schemas.openxmlformats.org/officeDocument/2006/relationships" xmlns:p="http://schemas.openxmlformats.org/presentationml/2006/main">
+  <p:cSld>
+    <p:spTree>
+      <p:nvGrpSpPr>
+        <p:cNvPr id="1" name=""/>
+        <p:cNvGrpSpPr/>
+        <p:nvPr/>
+      </p:nvGrpSpPr>
+      <p:grpSpPr>
+        <a:xfrm>
+          <a:off x="0" y="0"/>
+          <a:ext cx="0" cy="0"/>
+          <a:chOff x="0" y="0"/>
+          <a:chExt cx="0" cy="0"/>
+        </a:xfrm>
+      </p:grpSpPr>
+      <p:sp>
+        <p:nvSpPr>
+          <p:cNvPr id="2" name="Título 1"/>
+          <p:cNvSpPr>
+            <a:spLocks noGrp="1"/>
+          </p:cNvSpPr>
+          <p:nvPr>
+            <p:ph type="title"/>
+          </p:nvPr>
+        </p:nvSpPr>
+        <p:spPr/>
+        <p:txBody>
+          <a:bodyPr/>
+          <a:lstStyle/>
+          <a:p>
+            <a:r>
+              <a:rPr lang="pt-BR" dirty="0"/>
+              <a:t>Referências Bluetooth</a:t>
+            </a:r>
+          </a:p>
+        </p:txBody>
+      </p:sp>
+      <p:sp>
+        <p:nvSpPr>
+          <p:cNvPr id="3" name="Espaço Reservado para Conteúdo 2"/>
+          <p:cNvSpPr>
+            <a:spLocks noGrp="1"/>
+          </p:cNvSpPr>
+          <p:nvPr>
+            <p:ph idx="1"/>
+          </p:nvPr>
+        </p:nvSpPr>
+        <p:spPr/>
+        <p:txBody>
+          <a:bodyPr>
+            <a:normAutofit lnSpcReduction="10000"/>
+          </a:bodyPr>
+          <a:lstStyle/>
+          <a:p>
+            <a:r>
+              <a:rPr lang="pt-BR" dirty="0">
+                <a:hlinkClick r:id="rId2"/>
+              </a:rPr>
+              <a:t>https://www.electronicwings.com/sensors-modules/bluetooth-module-hc-05-</a:t>
+            </a:r>
+            <a:endParaRPr lang="pt-BR" dirty="0">
+              <a:hlinkClick r:id="rId3"/>
+            </a:endParaRPr>
+          </a:p>
+          <a:p>
+            <a:r>
+              <a:rPr lang="pt-BR" dirty="0">
+                <a:hlinkClick r:id="rId3"/>
+              </a:rPr>
+              <a:t>https://maker.pro/arduino/tutorial/bluetooth-basics-how-to-control-led-using-smartphone-arduino</a:t>
+            </a:r>
+            <a:endParaRPr lang="pt-BR" dirty="0"/>
+          </a:p>
+          <a:p>
+            <a:r>
+              <a:rPr lang="pt-BR" dirty="0">
+                <a:hlinkClick r:id="rId4"/>
+              </a:rPr>
+              <a:t>https://howtomechatronics.com/tutorials/arduino/arduino-and-hc-05-bluetooth-module-tutorial/</a:t>
+            </a:r>
+            <a:endParaRPr lang="pt-BR" dirty="0"/>
+          </a:p>
+          <a:p>
+            <a:r>
+              <a:rPr lang="pt-BR" dirty="0">
+                <a:hlinkClick r:id="rId5"/>
+              </a:rPr>
+              <a:t>http://www.instructables.com/id/Tutorial-Using-HC06-Bluetooth-to-Serial-Wireless-U/</a:t>
+            </a:r>
+            <a:endParaRPr lang="pt-BR" dirty="0"/>
+          </a:p>
+          <a:p>
+            <a:r>
+              <a:rPr lang="en-US" dirty="0">
+                <a:hlinkClick r:id="rId6"/>
+              </a:rPr>
+              <a:t>https://www.instructables.com/id/AT-command-mode-of-HC-05-Bluetooth-module/</a:t>
+            </a:r>
+            <a:endParaRPr lang="pt-BR" dirty="0"/>
+          </a:p>
+        </p:txBody>
+      </p:sp>
+    </p:spTree>
+    <p:extLst>
+      <p:ext uri="{BB962C8B-B14F-4D97-AF65-F5344CB8AC3E}">
+        <p14:creationId xmlns:p14="http://schemas.microsoft.com/office/powerpoint/2010/main" val="2022734056"/>
+      </p:ext>
+    </p:extLst>
+  </p:cSld>
+  <p:clrMapOvr>
+    <a:masterClrMapping/>
+  </p:clrMapOvr>
+</p:sld>
+</file>
+
+<file path=ppt/slides/slide43.xml><?xml version="1.0" encoding="utf-8"?>
+<p:sld xmlns:a="http://schemas.openxmlformats.org/drawingml/2006/main" xmlns:r="http://schemas.openxmlformats.org/officeDocument/2006/relationships" xmlns:p="http://schemas.openxmlformats.org/presentationml/2006/main">
+  <p:cSld>
+    <p:spTree>
+      <p:nvGrpSpPr>
+        <p:cNvPr id="1" name=""/>
+        <p:cNvGrpSpPr/>
+        <p:nvPr/>
+      </p:nvGrpSpPr>
+      <p:grpSpPr>
+        <a:xfrm>
+          <a:off x="0" y="0"/>
+          <a:ext cx="0" cy="0"/>
+          <a:chOff x="0" y="0"/>
+          <a:chExt cx="0" cy="0"/>
+        </a:xfrm>
+      </p:grpSpPr>
+      <p:sp>
+        <p:nvSpPr>
+          <p:cNvPr id="2" name="Título 1"/>
+          <p:cNvSpPr>
+            <a:spLocks noGrp="1"/>
+          </p:cNvSpPr>
+          <p:nvPr>
+            <p:ph type="title"/>
+          </p:nvPr>
+        </p:nvSpPr>
+        <p:spPr/>
+        <p:txBody>
+          <a:bodyPr/>
+          <a:lstStyle/>
+          <a:p>
+            <a:r>
+              <a:rPr lang="pt-BR" dirty="0"/>
+              <a:t>Referências Relé</a:t>
+            </a:r>
+          </a:p>
+        </p:txBody>
+      </p:sp>
+      <p:sp>
+        <p:nvSpPr>
+          <p:cNvPr id="3" name="Espaço Reservado para Conteúdo 2"/>
+          <p:cNvSpPr>
+            <a:spLocks noGrp="1"/>
+          </p:cNvSpPr>
+          <p:nvPr>
+            <p:ph idx="1"/>
+          </p:nvPr>
+        </p:nvSpPr>
+        <p:spPr/>
+        <p:txBody>
+          <a:bodyPr>
+            <a:normAutofit/>
+          </a:bodyPr>
+          <a:lstStyle/>
+          <a:p>
+            <a:r>
+              <a:rPr lang="en-US" dirty="0">
+                <a:hlinkClick r:id="rId2"/>
+              </a:rPr>
+              <a:t>https://blogmasterwalkershop.com.br/arduino/arduino-utilizando-o-potenciometro-linear/</a:t>
+            </a:r>
+            <a:endParaRPr lang="en-US" dirty="0"/>
+          </a:p>
+          <a:p>
+            <a:r>
+              <a:rPr lang="en-US" dirty="0">
+                <a:hlinkClick r:id="rId3"/>
+              </a:rPr>
+              <a:t>https://portal.vidadesilicio.com.br/lm35-medindo-temperatura-com-arduino/</a:t>
+            </a:r>
+            <a:endParaRPr lang="en-US" dirty="0">
+              <a:hlinkClick r:id="rId4"/>
+            </a:endParaRPr>
+          </a:p>
+          <a:p>
+            <a:r>
+              <a:rPr lang="en-US" dirty="0">
+                <a:hlinkClick r:id="rId4"/>
+              </a:rPr>
+              <a:t>https://blogmasterwalkershop.com.br/arduino/como-usar-com-arduino-modulo-rele-5v-1-canal/</a:t>
+            </a:r>
+            <a:endParaRPr lang="en-US" dirty="0"/>
+          </a:p>
+          <a:p>
+            <a:r>
+              <a:rPr lang="pt-BR" dirty="0">
+                <a:hlinkClick r:id="rId5"/>
+              </a:rPr>
+              <a:t>https://portal.vidadesilicio.com.br/modulo-rele-com-arduino/</a:t>
+            </a:r>
+            <a:endParaRPr lang="pt-BR" dirty="0"/>
+          </a:p>
+        </p:txBody>
+      </p:sp>
+    </p:spTree>
+    <p:extLst>
+      <p:ext uri="{BB962C8B-B14F-4D97-AF65-F5344CB8AC3E}">
+        <p14:creationId xmlns:p14="http://schemas.microsoft.com/office/powerpoint/2010/main" val="1716499950"/>
       </p:ext>
     </p:extLst>
   </p:cSld>
@@ -8632,4 +10679,299 @@
     </a:ext>
   </a:extLst>
 </a:theme>
+</file>
+
+<file path=ppt/theme/theme2.xml><?xml version="1.0" encoding="utf-8"?>
+<a:theme xmlns:a="http://schemas.openxmlformats.org/drawingml/2006/main" name="Office Theme">
+  <a:themeElements>
+    <a:clrScheme name="Office">
+      <a:dk1>
+        <a:sysClr val="windowText" lastClr="000000"/>
+      </a:dk1>
+      <a:lt1>
+        <a:sysClr val="window" lastClr="FFFFFF"/>
+      </a:lt1>
+      <a:dk2>
+        <a:srgbClr val="44546A"/>
+      </a:dk2>
+      <a:lt2>
+        <a:srgbClr val="E7E6E6"/>
+      </a:lt2>
+      <a:accent1>
+        <a:srgbClr val="4472C4"/>
+      </a:accent1>
+      <a:accent2>
+        <a:srgbClr val="ED7D31"/>
+      </a:accent2>
+      <a:accent3>
+        <a:srgbClr val="A5A5A5"/>
+      </a:accent3>
+      <a:accent4>
+        <a:srgbClr val="FFC000"/>
+      </a:accent4>
+      <a:accent5>
+        <a:srgbClr val="5B9BD5"/>
+      </a:accent5>
+      <a:accent6>
+        <a:srgbClr val="70AD47"/>
+      </a:accent6>
+      <a:hlink>
+        <a:srgbClr val="0563C1"/>
+      </a:hlink>
+      <a:folHlink>
+        <a:srgbClr val="954F72"/>
+      </a:folHlink>
+    </a:clrScheme>
+    <a:fontScheme name="Office">
+      <a:majorFont>
+        <a:latin typeface="Calibri Light" panose="020F0302020204030204"/>
+        <a:ea typeface=""/>
+        <a:cs typeface=""/>
+        <a:font script="Jpan" typeface="游ゴシック Light"/>
+        <a:font script="Hang" typeface="맑은 고딕"/>
+        <a:font script="Hans" typeface="等线 Light"/>
+        <a:font script="Hant" typeface="新細明體"/>
+        <a:font script="Arab" typeface="Times New Roman"/>
+        <a:font script="Hebr" typeface="Times New Roman"/>
+        <a:font script="Thai" typeface="Angsana New"/>
+        <a:font script="Ethi" typeface="Nyala"/>
+        <a:font script="Beng" typeface="Vrinda"/>
+        <a:font script="Gujr" typeface="Shruti"/>
+        <a:font script="Khmr" typeface="MoolBoran"/>
+        <a:font script="Knda" typeface="Tunga"/>
+        <a:font script="Guru" typeface="Raavi"/>
+        <a:font script="Cans" typeface="Euphemia"/>
+        <a:font script="Cher" typeface="Plantagenet Cherokee"/>
+        <a:font script="Yiii" typeface="Microsoft Yi Baiti"/>
+        <a:font script="Tibt" typeface="Microsoft Himalaya"/>
+        <a:font script="Thaa" typeface="MV Boli"/>
+        <a:font script="Deva" typeface="Mangal"/>
+        <a:font script="Telu" typeface="Gautami"/>
+        <a:font script="Taml" typeface="Latha"/>
+        <a:font script="Syrc" typeface="Estrangelo Edessa"/>
+        <a:font script="Orya" typeface="Kalinga"/>
+        <a:font script="Mlym" typeface="Kartika"/>
+        <a:font script="Laoo" typeface="DokChampa"/>
+        <a:font script="Sinh" typeface="Iskoola Pota"/>
+        <a:font script="Mong" typeface="Mongolian Baiti"/>
+        <a:font script="Viet" typeface="Times New Roman"/>
+        <a:font script="Uigh" typeface="Microsoft Uighur"/>
+        <a:font script="Geor" typeface="Sylfaen"/>
+        <a:font script="Armn" typeface="Arial"/>
+        <a:font script="Bugi" typeface="Leelawadee UI"/>
+        <a:font script="Bopo" typeface="Microsoft JhengHei"/>
+        <a:font script="Java" typeface="Javanese Text"/>
+        <a:font script="Lisu" typeface="Segoe UI"/>
+        <a:font script="Mymr" typeface="Myanmar Text"/>
+        <a:font script="Nkoo" typeface="Ebrima"/>
+        <a:font script="Olck" typeface="Nirmala UI"/>
+        <a:font script="Osma" typeface="Ebrima"/>
+        <a:font script="Phag" typeface="Phagspa"/>
+        <a:font script="Syrn" typeface="Estrangelo Edessa"/>
+        <a:font script="Syrj" typeface="Estrangelo Edessa"/>
+        <a:font script="Syre" typeface="Estrangelo Edessa"/>
+        <a:font script="Sora" typeface="Nirmala UI"/>
+        <a:font script="Tale" typeface="Microsoft Tai Le"/>
+        <a:font script="Talu" typeface="Microsoft New Tai Lue"/>
+        <a:font script="Tfng" typeface="Ebrima"/>
+      </a:majorFont>
+      <a:minorFont>
+        <a:latin typeface="Calibri" panose="020F0502020204030204"/>
+        <a:ea typeface=""/>
+        <a:cs typeface=""/>
+        <a:font script="Jpan" typeface="游ゴシック"/>
+        <a:font script="Hang" typeface="맑은 고딕"/>
+        <a:font script="Hans" typeface="等线"/>
+        <a:font script="Hant" typeface="新細明體"/>
+        <a:font script="Arab" typeface="Arial"/>
+        <a:font script="Hebr" typeface="Arial"/>
+        <a:font script="Thai" typeface="Cordia New"/>
+        <a:font script="Ethi" typeface="Nyala"/>
+        <a:font script="Beng" typeface="Vrinda"/>
+        <a:font script="Gujr" typeface="Shruti"/>
+        <a:font script="Khmr" typeface="DaunPenh"/>
+        <a:font script="Knda" typeface="Tunga"/>
+        <a:font script="Guru" typeface="Raavi"/>
+        <a:font script="Cans" typeface="Euphemia"/>
+        <a:font script="Cher" typeface="Plantagenet Cherokee"/>
+        <a:font script="Yiii" typeface="Microsoft Yi Baiti"/>
+        <a:font script="Tibt" typeface="Microsoft Himalaya"/>
+        <a:font script="Thaa" typeface="MV Boli"/>
+        <a:font script="Deva" typeface="Mangal"/>
+        <a:font script="Telu" typeface="Gautami"/>
+        <a:font script="Taml" typeface="Latha"/>
+        <a:font script="Syrc" typeface="Estrangelo Edessa"/>
+        <a:font script="Orya" typeface="Kalinga"/>
+        <a:font script="Mlym" typeface="Kartika"/>
+        <a:font script="Laoo" typeface="DokChampa"/>
+        <a:font script="Sinh" typeface="Iskoola Pota"/>
+        <a:font script="Mong" typeface="Mongolian Baiti"/>
+        <a:font script="Viet" typeface="Arial"/>
+        <a:font script="Uigh" typeface="Microsoft Uighur"/>
+        <a:font script="Geor" typeface="Sylfaen"/>
+        <a:font script="Armn" typeface="Arial"/>
+        <a:font script="Bugi" typeface="Leelawadee UI"/>
+        <a:font script="Bopo" typeface="Microsoft JhengHei"/>
+        <a:font script="Java" typeface="Javanese Text"/>
+        <a:font script="Lisu" typeface="Segoe UI"/>
+        <a:font script="Mymr" typeface="Myanmar Text"/>
+        <a:font script="Nkoo" typeface="Ebrima"/>
+        <a:font script="Olck" typeface="Nirmala UI"/>
+        <a:font script="Osma" typeface="Ebrima"/>
+        <a:font script="Phag" typeface="Phagspa"/>
+        <a:font script="Syrn" typeface="Estrangelo Edessa"/>
+        <a:font script="Syrj" typeface="Estrangelo Edessa"/>
+        <a:font script="Syre" typeface="Estrangelo Edessa"/>
+        <a:font script="Sora" typeface="Nirmala UI"/>
+        <a:font script="Tale" typeface="Microsoft Tai Le"/>
+        <a:font script="Talu" typeface="Microsoft New Tai Lue"/>
+        <a:font script="Tfng" typeface="Ebrima"/>
+      </a:minorFont>
+    </a:fontScheme>
+    <a:fmtScheme name="Office">
+      <a:fillStyleLst>
+        <a:solidFill>
+          <a:schemeClr val="phClr"/>
+        </a:solidFill>
+        <a:gradFill rotWithShape="1">
+          <a:gsLst>
+            <a:gs pos="0">
+              <a:schemeClr val="phClr">
+                <a:lumMod val="110000"/>
+                <a:satMod val="105000"/>
+                <a:tint val="67000"/>
+              </a:schemeClr>
+            </a:gs>
+            <a:gs pos="50000">
+              <a:schemeClr val="phClr">
+                <a:lumMod val="105000"/>
+                <a:satMod val="103000"/>
+                <a:tint val="73000"/>
+              </a:schemeClr>
+            </a:gs>
+            <a:gs pos="100000">
+              <a:schemeClr val="phClr">
+                <a:lumMod val="105000"/>
+                <a:satMod val="109000"/>
+                <a:tint val="81000"/>
+              </a:schemeClr>
+            </a:gs>
+          </a:gsLst>
+          <a:lin ang="5400000" scaled="0"/>
+        </a:gradFill>
+        <a:gradFill rotWithShape="1">
+          <a:gsLst>
+            <a:gs pos="0">
+              <a:schemeClr val="phClr">
+                <a:satMod val="103000"/>
+                <a:lumMod val="102000"/>
+                <a:tint val="94000"/>
+              </a:schemeClr>
+            </a:gs>
+            <a:gs pos="50000">
+              <a:schemeClr val="phClr">
+                <a:satMod val="110000"/>
+                <a:lumMod val="100000"/>
+                <a:shade val="100000"/>
+              </a:schemeClr>
+            </a:gs>
+            <a:gs pos="100000">
+              <a:schemeClr val="phClr">
+                <a:lumMod val="99000"/>
+                <a:satMod val="120000"/>
+                <a:shade val="78000"/>
+              </a:schemeClr>
+            </a:gs>
+          </a:gsLst>
+          <a:lin ang="5400000" scaled="0"/>
+        </a:gradFill>
+      </a:fillStyleLst>
+      <a:lnStyleLst>
+        <a:ln w="6350" cap="flat" cmpd="sng" algn="ctr">
+          <a:solidFill>
+            <a:schemeClr val="phClr"/>
+          </a:solidFill>
+          <a:prstDash val="solid"/>
+          <a:miter lim="800000"/>
+        </a:ln>
+        <a:ln w="12700" cap="flat" cmpd="sng" algn="ctr">
+          <a:solidFill>
+            <a:schemeClr val="phClr"/>
+          </a:solidFill>
+          <a:prstDash val="solid"/>
+          <a:miter lim="800000"/>
+        </a:ln>
+        <a:ln w="19050" cap="flat" cmpd="sng" algn="ctr">
+          <a:solidFill>
+            <a:schemeClr val="phClr"/>
+          </a:solidFill>
+          <a:prstDash val="solid"/>
+          <a:miter lim="800000"/>
+        </a:ln>
+      </a:lnStyleLst>
+      <a:effectStyleLst>
+        <a:effectStyle>
+          <a:effectLst/>
+        </a:effectStyle>
+        <a:effectStyle>
+          <a:effectLst/>
+        </a:effectStyle>
+        <a:effectStyle>
+          <a:effectLst>
+            <a:outerShdw blurRad="57150" dist="19050" dir="5400000" algn="ctr" rotWithShape="0">
+              <a:srgbClr val="000000">
+                <a:alpha val="63000"/>
+              </a:srgbClr>
+            </a:outerShdw>
+          </a:effectLst>
+        </a:effectStyle>
+      </a:effectStyleLst>
+      <a:bgFillStyleLst>
+        <a:solidFill>
+          <a:schemeClr val="phClr"/>
+        </a:solidFill>
+        <a:solidFill>
+          <a:schemeClr val="phClr">
+            <a:tint val="95000"/>
+            <a:satMod val="170000"/>
+          </a:schemeClr>
+        </a:solidFill>
+        <a:gradFill rotWithShape="1">
+          <a:gsLst>
+            <a:gs pos="0">
+              <a:schemeClr val="phClr">
+                <a:tint val="93000"/>
+                <a:satMod val="150000"/>
+                <a:shade val="98000"/>
+                <a:lumMod val="102000"/>
+              </a:schemeClr>
+            </a:gs>
+            <a:gs pos="50000">
+              <a:schemeClr val="phClr">
+                <a:tint val="98000"/>
+                <a:satMod val="130000"/>
+                <a:shade val="90000"/>
+                <a:lumMod val="103000"/>
+              </a:schemeClr>
+            </a:gs>
+            <a:gs pos="100000">
+              <a:schemeClr val="phClr">
+                <a:shade val="63000"/>
+                <a:satMod val="120000"/>
+              </a:schemeClr>
+            </a:gs>
+          </a:gsLst>
+          <a:lin ang="5400000" scaled="0"/>
+        </a:gradFill>
+      </a:bgFillStyleLst>
+    </a:fmtScheme>
+  </a:themeElements>
+  <a:objectDefaults/>
+  <a:extraClrSchemeLst/>
+  <a:extLst>
+    <a:ext uri="{05A4C25C-085E-4340-85A3-A5531E510DB2}">
+      <thm15:themeFamily xmlns:thm15="http://schemas.microsoft.com/office/thememl/2012/main" name="Office Theme" id="{62F939B6-93AF-4DB8-9C6B-D6C7DFDC589F}" vid="{4A3C46E8-61CC-4603-A589-7422A47A8E4A}"/>
+    </a:ext>
+  </a:extLst>
+</a:theme>
 </file>
</xml_diff>

<commit_message>
adição dos slides da prática com o sensor de temperatura LM35
</commit_message>
<xml_diff>
--- a/arduino-bluetooth.pptx
+++ b/arduino-bluetooth.pptx
@@ -5,7 +5,7 @@
     <p:sldMasterId id="2147483648" r:id="rId1"/>
   </p:sldMasterIdLst>
   <p:notesMasterIdLst>
-    <p:notesMasterId r:id="rId45"/>
+    <p:notesMasterId r:id="rId50"/>
   </p:notesMasterIdLst>
   <p:sldIdLst>
     <p:sldId id="256" r:id="rId2"/>
@@ -49,8 +49,13 @@
     <p:sldId id="300" r:id="rId40"/>
     <p:sldId id="301" r:id="rId41"/>
     <p:sldId id="296" r:id="rId42"/>
-    <p:sldId id="258" r:id="rId43"/>
-    <p:sldId id="292" r:id="rId44"/>
+    <p:sldId id="302" r:id="rId43"/>
+    <p:sldId id="303" r:id="rId44"/>
+    <p:sldId id="304" r:id="rId45"/>
+    <p:sldId id="305" r:id="rId46"/>
+    <p:sldId id="306" r:id="rId47"/>
+    <p:sldId id="258" r:id="rId48"/>
+    <p:sldId id="292" r:id="rId49"/>
   </p:sldIdLst>
   <p:sldSz cx="12192000" cy="6858000"/>
   <p:notesSz cx="6858000" cy="9144000"/>
@@ -251,7 +256,7 @@
           <a:p>
             <a:fld id="{3C44614C-A7EC-484E-A837-A5758579D5D4}" type="datetimeFigureOut">
               <a:rPr lang="pt-BR" smtClean="0"/>
-              <a:t>06/11/2019</a:t>
+              <a:t>07/11/2019</a:t>
             </a:fld>
             <a:endParaRPr lang="pt-BR"/>
           </a:p>
@@ -650,10 +655,7 @@
           <a:bodyPr/>
           <a:lstStyle/>
           <a:p>
-            <a:r>
-              <a:rPr lang="pt-BR" dirty="0"/>
-              <a:t>A resistência do potenciômetro também é medida em ohms. Há diversos valores de potenciômetros no mercado, contudo o mais comum é o de 10K (varia a resistência de 0 a 10000 ohms).</a:t>
-            </a:r>
+            <a:endParaRPr lang="pt-BR" dirty="0"/>
           </a:p>
         </p:txBody>
       </p:sp>
@@ -737,10 +739,7 @@
           <a:bodyPr/>
           <a:lstStyle/>
           <a:p>
-            <a:r>
-              <a:rPr lang="pt-BR" dirty="0"/>
-              <a:t>A resistência do potenciômetro também é medida em ohms. Há diversos valores de potenciômetros no mercado, contudo o mais comum é o de 10K (varia a resistência de 0 a 10000 ohms).</a:t>
-            </a:r>
+            <a:endParaRPr lang="pt-BR" dirty="0"/>
           </a:p>
         </p:txBody>
       </p:sp>
@@ -771,6 +770,505 @@
     <p:extLst>
       <p:ext uri="{BB962C8B-B14F-4D97-AF65-F5344CB8AC3E}">
         <p14:creationId xmlns:p14="http://schemas.microsoft.com/office/powerpoint/2010/main" val="796456426"/>
+      </p:ext>
+    </p:extLst>
+  </p:cSld>
+  <p:clrMapOvr>
+    <a:masterClrMapping/>
+  </p:clrMapOvr>
+</p:notes>
+</file>
+
+<file path=ppt/notesSlides/notesSlide4.xml><?xml version="1.0" encoding="utf-8"?>
+<p:notes xmlns:a="http://schemas.openxmlformats.org/drawingml/2006/main" xmlns:r="http://schemas.openxmlformats.org/officeDocument/2006/relationships" xmlns:p="http://schemas.openxmlformats.org/presentationml/2006/main">
+  <p:cSld>
+    <p:spTree>
+      <p:nvGrpSpPr>
+        <p:cNvPr id="1" name=""/>
+        <p:cNvGrpSpPr/>
+        <p:nvPr/>
+      </p:nvGrpSpPr>
+      <p:grpSpPr>
+        <a:xfrm>
+          <a:off x="0" y="0"/>
+          <a:ext cx="0" cy="0"/>
+          <a:chOff x="0" y="0"/>
+          <a:chExt cx="0" cy="0"/>
+        </a:xfrm>
+      </p:grpSpPr>
+      <p:sp>
+        <p:nvSpPr>
+          <p:cNvPr id="2" name="Slide Image Placeholder 1"/>
+          <p:cNvSpPr>
+            <a:spLocks noGrp="1" noRot="1" noChangeAspect="1"/>
+          </p:cNvSpPr>
+          <p:nvPr>
+            <p:ph type="sldImg"/>
+          </p:nvPr>
+        </p:nvSpPr>
+        <p:spPr/>
+      </p:sp>
+      <p:sp>
+        <p:nvSpPr>
+          <p:cNvPr id="3" name="Notes Placeholder 2"/>
+          <p:cNvSpPr>
+            <a:spLocks noGrp="1"/>
+          </p:cNvSpPr>
+          <p:nvPr>
+            <p:ph type="body" idx="1"/>
+          </p:nvPr>
+        </p:nvSpPr>
+        <p:spPr/>
+        <p:txBody>
+          <a:bodyPr/>
+          <a:lstStyle/>
+          <a:p>
+            <a:endParaRPr lang="pt-BR" dirty="0"/>
+          </a:p>
+        </p:txBody>
+      </p:sp>
+      <p:sp>
+        <p:nvSpPr>
+          <p:cNvPr id="4" name="Slide Number Placeholder 3"/>
+          <p:cNvSpPr>
+            <a:spLocks noGrp="1"/>
+          </p:cNvSpPr>
+          <p:nvPr>
+            <p:ph type="sldNum" sz="quarter" idx="5"/>
+          </p:nvPr>
+        </p:nvSpPr>
+        <p:spPr/>
+        <p:txBody>
+          <a:bodyPr/>
+          <a:lstStyle/>
+          <a:p>
+            <a:fld id="{63C9BDA7-C22B-4A92-921B-5E8BACDF8EBE}" type="slidenum">
+              <a:rPr lang="pt-BR" smtClean="0"/>
+              <a:t>42</a:t>
+            </a:fld>
+            <a:endParaRPr lang="pt-BR"/>
+          </a:p>
+        </p:txBody>
+      </p:sp>
+    </p:spTree>
+    <p:extLst>
+      <p:ext uri="{BB962C8B-B14F-4D97-AF65-F5344CB8AC3E}">
+        <p14:creationId xmlns:p14="http://schemas.microsoft.com/office/powerpoint/2010/main" val="2586249590"/>
+      </p:ext>
+    </p:extLst>
+  </p:cSld>
+  <p:clrMapOvr>
+    <a:masterClrMapping/>
+  </p:clrMapOvr>
+</p:notes>
+</file>
+
+<file path=ppt/notesSlides/notesSlide5.xml><?xml version="1.0" encoding="utf-8"?>
+<p:notes xmlns:a="http://schemas.openxmlformats.org/drawingml/2006/main" xmlns:r="http://schemas.openxmlformats.org/officeDocument/2006/relationships" xmlns:p="http://schemas.openxmlformats.org/presentationml/2006/main">
+  <p:cSld>
+    <p:spTree>
+      <p:nvGrpSpPr>
+        <p:cNvPr id="1" name=""/>
+        <p:cNvGrpSpPr/>
+        <p:nvPr/>
+      </p:nvGrpSpPr>
+      <p:grpSpPr>
+        <a:xfrm>
+          <a:off x="0" y="0"/>
+          <a:ext cx="0" cy="0"/>
+          <a:chOff x="0" y="0"/>
+          <a:chExt cx="0" cy="0"/>
+        </a:xfrm>
+      </p:grpSpPr>
+      <p:sp>
+        <p:nvSpPr>
+          <p:cNvPr id="2" name="Slide Image Placeholder 1"/>
+          <p:cNvSpPr>
+            <a:spLocks noGrp="1" noRot="1" noChangeAspect="1"/>
+          </p:cNvSpPr>
+          <p:nvPr>
+            <p:ph type="sldImg"/>
+          </p:nvPr>
+        </p:nvSpPr>
+        <p:spPr/>
+      </p:sp>
+      <p:sp>
+        <p:nvSpPr>
+          <p:cNvPr id="3" name="Notes Placeholder 2"/>
+          <p:cNvSpPr>
+            <a:spLocks noGrp="1"/>
+          </p:cNvSpPr>
+          <p:nvPr>
+            <p:ph type="body" idx="1"/>
+          </p:nvPr>
+        </p:nvSpPr>
+        <p:spPr/>
+        <p:txBody>
+          <a:bodyPr/>
+          <a:lstStyle/>
+          <a:p>
+            <a:endParaRPr lang="pt-BR" dirty="0"/>
+          </a:p>
+        </p:txBody>
+      </p:sp>
+      <p:sp>
+        <p:nvSpPr>
+          <p:cNvPr id="4" name="Slide Number Placeholder 3"/>
+          <p:cNvSpPr>
+            <a:spLocks noGrp="1"/>
+          </p:cNvSpPr>
+          <p:nvPr>
+            <p:ph type="sldNum" sz="quarter" idx="5"/>
+          </p:nvPr>
+        </p:nvSpPr>
+        <p:spPr/>
+        <p:txBody>
+          <a:bodyPr/>
+          <a:lstStyle/>
+          <a:p>
+            <a:fld id="{63C9BDA7-C22B-4A92-921B-5E8BACDF8EBE}" type="slidenum">
+              <a:rPr lang="pt-BR" smtClean="0"/>
+              <a:t>43</a:t>
+            </a:fld>
+            <a:endParaRPr lang="pt-BR"/>
+          </a:p>
+        </p:txBody>
+      </p:sp>
+    </p:spTree>
+    <p:extLst>
+      <p:ext uri="{BB962C8B-B14F-4D97-AF65-F5344CB8AC3E}">
+        <p14:creationId xmlns:p14="http://schemas.microsoft.com/office/powerpoint/2010/main" val="4237375368"/>
+      </p:ext>
+    </p:extLst>
+  </p:cSld>
+  <p:clrMapOvr>
+    <a:masterClrMapping/>
+  </p:clrMapOvr>
+</p:notes>
+</file>
+
+<file path=ppt/notesSlides/notesSlide6.xml><?xml version="1.0" encoding="utf-8"?>
+<p:notes xmlns:a="http://schemas.openxmlformats.org/drawingml/2006/main" xmlns:r="http://schemas.openxmlformats.org/officeDocument/2006/relationships" xmlns:p="http://schemas.openxmlformats.org/presentationml/2006/main">
+  <p:cSld>
+    <p:spTree>
+      <p:nvGrpSpPr>
+        <p:cNvPr id="1" name=""/>
+        <p:cNvGrpSpPr/>
+        <p:nvPr/>
+      </p:nvGrpSpPr>
+      <p:grpSpPr>
+        <a:xfrm>
+          <a:off x="0" y="0"/>
+          <a:ext cx="0" cy="0"/>
+          <a:chOff x="0" y="0"/>
+          <a:chExt cx="0" cy="0"/>
+        </a:xfrm>
+      </p:grpSpPr>
+      <p:sp>
+        <p:nvSpPr>
+          <p:cNvPr id="2" name="Slide Image Placeholder 1"/>
+          <p:cNvSpPr>
+            <a:spLocks noGrp="1" noRot="1" noChangeAspect="1"/>
+          </p:cNvSpPr>
+          <p:nvPr>
+            <p:ph type="sldImg"/>
+          </p:nvPr>
+        </p:nvSpPr>
+        <p:spPr/>
+      </p:sp>
+      <p:sp>
+        <p:nvSpPr>
+          <p:cNvPr id="3" name="Notes Placeholder 2"/>
+          <p:cNvSpPr>
+            <a:spLocks noGrp="1"/>
+          </p:cNvSpPr>
+          <p:nvPr>
+            <p:ph type="body" idx="1"/>
+          </p:nvPr>
+        </p:nvSpPr>
+        <p:spPr/>
+        <p:txBody>
+          <a:bodyPr/>
+          <a:lstStyle/>
+          <a:p>
+            <a:endParaRPr lang="pt-BR" dirty="0"/>
+          </a:p>
+        </p:txBody>
+      </p:sp>
+      <p:sp>
+        <p:nvSpPr>
+          <p:cNvPr id="4" name="Slide Number Placeholder 3"/>
+          <p:cNvSpPr>
+            <a:spLocks noGrp="1"/>
+          </p:cNvSpPr>
+          <p:nvPr>
+            <p:ph type="sldNum" sz="quarter" idx="5"/>
+          </p:nvPr>
+        </p:nvSpPr>
+        <p:spPr/>
+        <p:txBody>
+          <a:bodyPr/>
+          <a:lstStyle/>
+          <a:p>
+            <a:fld id="{63C9BDA7-C22B-4A92-921B-5E8BACDF8EBE}" type="slidenum">
+              <a:rPr lang="pt-BR" smtClean="0"/>
+              <a:t>44</a:t>
+            </a:fld>
+            <a:endParaRPr lang="pt-BR"/>
+          </a:p>
+        </p:txBody>
+      </p:sp>
+    </p:spTree>
+    <p:extLst>
+      <p:ext uri="{BB962C8B-B14F-4D97-AF65-F5344CB8AC3E}">
+        <p14:creationId xmlns:p14="http://schemas.microsoft.com/office/powerpoint/2010/main" val="73759493"/>
+      </p:ext>
+    </p:extLst>
+  </p:cSld>
+  <p:clrMapOvr>
+    <a:masterClrMapping/>
+  </p:clrMapOvr>
+</p:notes>
+</file>
+
+<file path=ppt/notesSlides/notesSlide7.xml><?xml version="1.0" encoding="utf-8"?>
+<p:notes xmlns:a="http://schemas.openxmlformats.org/drawingml/2006/main" xmlns:r="http://schemas.openxmlformats.org/officeDocument/2006/relationships" xmlns:p="http://schemas.openxmlformats.org/presentationml/2006/main">
+  <p:cSld>
+    <p:spTree>
+      <p:nvGrpSpPr>
+        <p:cNvPr id="1" name=""/>
+        <p:cNvGrpSpPr/>
+        <p:nvPr/>
+      </p:nvGrpSpPr>
+      <p:grpSpPr>
+        <a:xfrm>
+          <a:off x="0" y="0"/>
+          <a:ext cx="0" cy="0"/>
+          <a:chOff x="0" y="0"/>
+          <a:chExt cx="0" cy="0"/>
+        </a:xfrm>
+      </p:grpSpPr>
+      <p:sp>
+        <p:nvSpPr>
+          <p:cNvPr id="2" name="Slide Image Placeholder 1"/>
+          <p:cNvSpPr>
+            <a:spLocks noGrp="1" noRot="1" noChangeAspect="1"/>
+          </p:cNvSpPr>
+          <p:nvPr>
+            <p:ph type="sldImg"/>
+          </p:nvPr>
+        </p:nvSpPr>
+        <p:spPr/>
+      </p:sp>
+      <p:sp>
+        <p:nvSpPr>
+          <p:cNvPr id="3" name="Notes Placeholder 2"/>
+          <p:cNvSpPr>
+            <a:spLocks noGrp="1"/>
+          </p:cNvSpPr>
+          <p:nvPr>
+            <p:ph type="body" idx="1"/>
+          </p:nvPr>
+        </p:nvSpPr>
+        <p:spPr/>
+        <p:txBody>
+          <a:bodyPr/>
+          <a:lstStyle/>
+          <a:p>
+            <a:r>
+              <a:rPr lang="pt-BR" sz="1200" b="0" i="1" kern="1200" dirty="0">
+                <a:solidFill>
+                  <a:schemeClr val="tx1"/>
+                </a:solidFill>
+                <a:effectLst/>
+                <a:latin typeface="+mn-lt"/>
+                <a:ea typeface="+mn-ea"/>
+                <a:cs typeface="+mn-cs"/>
+              </a:rPr>
+              <a:t>Tensão em A0 = (Valor lido em A0)*(5/1023)</a:t>
+            </a:r>
+            <a:endParaRPr lang="pt-BR" sz="1200" b="0" i="0" kern="1200" dirty="0">
+              <a:solidFill>
+                <a:schemeClr val="tx1"/>
+              </a:solidFill>
+              <a:effectLst/>
+              <a:latin typeface="+mn-lt"/>
+              <a:ea typeface="+mn-ea"/>
+              <a:cs typeface="+mn-cs"/>
+            </a:endParaRPr>
+          </a:p>
+          <a:p>
+            <a:r>
+              <a:rPr lang="pt-BR" sz="1200" b="0" i="1" kern="1200" dirty="0">
+                <a:solidFill>
+                  <a:schemeClr val="tx1"/>
+                </a:solidFill>
+                <a:effectLst/>
+                <a:latin typeface="+mn-lt"/>
+                <a:ea typeface="+mn-ea"/>
+                <a:cs typeface="+mn-cs"/>
+              </a:rPr>
+              <a:t>Temperatura = Tensão em A0/10mV</a:t>
+            </a:r>
+            <a:endParaRPr lang="pt-BR" sz="1200" b="0" i="0" kern="1200" dirty="0">
+              <a:solidFill>
+                <a:schemeClr val="tx1"/>
+              </a:solidFill>
+              <a:effectLst/>
+              <a:latin typeface="+mn-lt"/>
+              <a:ea typeface="+mn-ea"/>
+              <a:cs typeface="+mn-cs"/>
+            </a:endParaRPr>
+          </a:p>
+          <a:p>
+            <a:r>
+              <a:rPr lang="pt-BR" sz="1200" b="0" i="0" kern="1200" dirty="0">
+                <a:solidFill>
+                  <a:schemeClr val="tx1"/>
+                </a:solidFill>
+                <a:effectLst/>
+                <a:latin typeface="+mn-lt"/>
+                <a:ea typeface="+mn-ea"/>
+                <a:cs typeface="+mn-cs"/>
+              </a:rPr>
+              <a:t>Logo:</a:t>
+            </a:r>
+          </a:p>
+          <a:p>
+            <a:r>
+              <a:rPr lang="pt-BR" sz="1200" b="0" i="0" kern="1200" dirty="0">
+                <a:solidFill>
+                  <a:schemeClr val="tx1"/>
+                </a:solidFill>
+                <a:effectLst/>
+                <a:latin typeface="+mn-lt"/>
+                <a:ea typeface="+mn-ea"/>
+                <a:cs typeface="+mn-cs"/>
+              </a:rPr>
+              <a:t>Temperatura =  [(Valor lido em A0)*(5/1023)]/10mV</a:t>
+            </a:r>
+          </a:p>
+          <a:p>
+            <a:r>
+              <a:rPr lang="pt-BR" sz="1200" b="0" i="0" kern="1200" dirty="0">
+                <a:solidFill>
+                  <a:schemeClr val="tx1"/>
+                </a:solidFill>
+                <a:effectLst/>
+                <a:latin typeface="+mn-lt"/>
+                <a:ea typeface="+mn-ea"/>
+                <a:cs typeface="+mn-cs"/>
+              </a:rPr>
+              <a:t>Em linguagem de programação, ficará:</a:t>
+            </a:r>
+          </a:p>
+          <a:p>
+            <a:pPr rtl="0" fontAlgn="t"/>
+            <a:endParaRPr lang="pt-BR" sz="1200" b="1" i="0" kern="1200" dirty="0">
+              <a:solidFill>
+                <a:schemeClr val="tx1"/>
+              </a:solidFill>
+              <a:effectLst/>
+              <a:latin typeface="+mn-lt"/>
+              <a:ea typeface="+mn-ea"/>
+              <a:cs typeface="+mn-cs"/>
+            </a:endParaRPr>
+          </a:p>
+          <a:p>
+            <a:pPr rtl="0" fontAlgn="t"/>
+            <a:r>
+              <a:rPr lang="pt-BR" sz="1200" b="1" i="0" kern="1200" dirty="0">
+                <a:solidFill>
+                  <a:schemeClr val="tx1"/>
+                </a:solidFill>
+                <a:effectLst/>
+                <a:latin typeface="+mn-lt"/>
+                <a:ea typeface="+mn-ea"/>
+                <a:cs typeface="+mn-cs"/>
+              </a:rPr>
+              <a:t>temperatura = (</a:t>
+            </a:r>
+            <a:r>
+              <a:rPr lang="pt-BR" sz="1200" b="1" i="0" kern="1200" dirty="0" err="1">
+                <a:solidFill>
+                  <a:schemeClr val="tx1"/>
+                </a:solidFill>
+                <a:effectLst/>
+                <a:latin typeface="+mn-lt"/>
+                <a:ea typeface="+mn-ea"/>
+                <a:cs typeface="+mn-cs"/>
+              </a:rPr>
+              <a:t>float</a:t>
+            </a:r>
+            <a:r>
+              <a:rPr lang="pt-BR" sz="1200" b="1" i="0" kern="1200" dirty="0">
+                <a:solidFill>
+                  <a:schemeClr val="tx1"/>
+                </a:solidFill>
+                <a:effectLst/>
+                <a:latin typeface="+mn-lt"/>
+                <a:ea typeface="+mn-ea"/>
+                <a:cs typeface="+mn-cs"/>
+              </a:rPr>
+              <a:t>(</a:t>
+            </a:r>
+            <a:r>
+              <a:rPr lang="pt-BR" sz="1200" b="1" i="0" kern="1200" dirty="0" err="1">
+                <a:solidFill>
+                  <a:schemeClr val="tx1"/>
+                </a:solidFill>
+                <a:effectLst/>
+                <a:latin typeface="+mn-lt"/>
+                <a:ea typeface="+mn-ea"/>
+                <a:cs typeface="+mn-cs"/>
+              </a:rPr>
+              <a:t>analogRead</a:t>
+            </a:r>
+            <a:r>
+              <a:rPr lang="pt-BR" sz="1200" b="1" i="0" kern="1200" dirty="0">
+                <a:solidFill>
+                  <a:schemeClr val="tx1"/>
+                </a:solidFill>
+                <a:effectLst/>
+                <a:latin typeface="+mn-lt"/>
+                <a:ea typeface="+mn-ea"/>
+                <a:cs typeface="+mn-cs"/>
+              </a:rPr>
+              <a:t>(LM35))*5/(1023))/0.01;</a:t>
+            </a:r>
+          </a:p>
+          <a:p>
+            <a:endParaRPr lang="pt-BR" dirty="0"/>
+          </a:p>
+        </p:txBody>
+      </p:sp>
+      <p:sp>
+        <p:nvSpPr>
+          <p:cNvPr id="4" name="Slide Number Placeholder 3"/>
+          <p:cNvSpPr>
+            <a:spLocks noGrp="1"/>
+          </p:cNvSpPr>
+          <p:nvPr>
+            <p:ph type="sldNum" sz="quarter" idx="5"/>
+          </p:nvPr>
+        </p:nvSpPr>
+        <p:spPr/>
+        <p:txBody>
+          <a:bodyPr/>
+          <a:lstStyle/>
+          <a:p>
+            <a:fld id="{63C9BDA7-C22B-4A92-921B-5E8BACDF8EBE}" type="slidenum">
+              <a:rPr lang="pt-BR" smtClean="0"/>
+              <a:t>46</a:t>
+            </a:fld>
+            <a:endParaRPr lang="pt-BR"/>
+          </a:p>
+        </p:txBody>
+      </p:sp>
+    </p:spTree>
+    <p:extLst>
+      <p:ext uri="{BB962C8B-B14F-4D97-AF65-F5344CB8AC3E}">
+        <p14:creationId xmlns:p14="http://schemas.microsoft.com/office/powerpoint/2010/main" val="599117953"/>
       </p:ext>
     </p:extLst>
   </p:cSld>
@@ -909,7 +1407,7 @@
           <a:p>
             <a:fld id="{2EDF32D7-A802-4CED-A4B7-23DAC1B43898}" type="datetimeFigureOut">
               <a:rPr lang="pt-BR" smtClean="0"/>
-              <a:t>06/11/2019</a:t>
+              <a:t>07/11/2019</a:t>
             </a:fld>
             <a:endParaRPr lang="pt-BR"/>
           </a:p>
@@ -1077,7 +1575,7 @@
           <a:p>
             <a:fld id="{2EDF32D7-A802-4CED-A4B7-23DAC1B43898}" type="datetimeFigureOut">
               <a:rPr lang="pt-BR" smtClean="0"/>
-              <a:t>06/11/2019</a:t>
+              <a:t>07/11/2019</a:t>
             </a:fld>
             <a:endParaRPr lang="pt-BR"/>
           </a:p>
@@ -1255,7 +1753,7 @@
           <a:p>
             <a:fld id="{2EDF32D7-A802-4CED-A4B7-23DAC1B43898}" type="datetimeFigureOut">
               <a:rPr lang="pt-BR" smtClean="0"/>
-              <a:t>06/11/2019</a:t>
+              <a:t>07/11/2019</a:t>
             </a:fld>
             <a:endParaRPr lang="pt-BR"/>
           </a:p>
@@ -1423,7 +1921,7 @@
           <a:p>
             <a:fld id="{2EDF32D7-A802-4CED-A4B7-23DAC1B43898}" type="datetimeFigureOut">
               <a:rPr lang="pt-BR" smtClean="0"/>
-              <a:t>06/11/2019</a:t>
+              <a:t>07/11/2019</a:t>
             </a:fld>
             <a:endParaRPr lang="pt-BR"/>
           </a:p>
@@ -1668,7 +2166,7 @@
           <a:p>
             <a:fld id="{2EDF32D7-A802-4CED-A4B7-23DAC1B43898}" type="datetimeFigureOut">
               <a:rPr lang="pt-BR" smtClean="0"/>
-              <a:t>06/11/2019</a:t>
+              <a:t>07/11/2019</a:t>
             </a:fld>
             <a:endParaRPr lang="pt-BR"/>
           </a:p>
@@ -1897,7 +2395,7 @@
           <a:p>
             <a:fld id="{2EDF32D7-A802-4CED-A4B7-23DAC1B43898}" type="datetimeFigureOut">
               <a:rPr lang="pt-BR" smtClean="0"/>
-              <a:t>06/11/2019</a:t>
+              <a:t>07/11/2019</a:t>
             </a:fld>
             <a:endParaRPr lang="pt-BR"/>
           </a:p>
@@ -2261,7 +2759,7 @@
           <a:p>
             <a:fld id="{2EDF32D7-A802-4CED-A4B7-23DAC1B43898}" type="datetimeFigureOut">
               <a:rPr lang="pt-BR" smtClean="0"/>
-              <a:t>06/11/2019</a:t>
+              <a:t>07/11/2019</a:t>
             </a:fld>
             <a:endParaRPr lang="pt-BR"/>
           </a:p>
@@ -2378,7 +2876,7 @@
           <a:p>
             <a:fld id="{2EDF32D7-A802-4CED-A4B7-23DAC1B43898}" type="datetimeFigureOut">
               <a:rPr lang="pt-BR" smtClean="0"/>
-              <a:t>06/11/2019</a:t>
+              <a:t>07/11/2019</a:t>
             </a:fld>
             <a:endParaRPr lang="pt-BR"/>
           </a:p>
@@ -2473,7 +2971,7 @@
           <a:p>
             <a:fld id="{2EDF32D7-A802-4CED-A4B7-23DAC1B43898}" type="datetimeFigureOut">
               <a:rPr lang="pt-BR" smtClean="0"/>
-              <a:t>06/11/2019</a:t>
+              <a:t>07/11/2019</a:t>
             </a:fld>
             <a:endParaRPr lang="pt-BR"/>
           </a:p>
@@ -2748,7 +3246,7 @@
           <a:p>
             <a:fld id="{2EDF32D7-A802-4CED-A4B7-23DAC1B43898}" type="datetimeFigureOut">
               <a:rPr lang="pt-BR" smtClean="0"/>
-              <a:t>06/11/2019</a:t>
+              <a:t>07/11/2019</a:t>
             </a:fld>
             <a:endParaRPr lang="pt-BR"/>
           </a:p>
@@ -3000,7 +3498,7 @@
           <a:p>
             <a:fld id="{2EDF32D7-A802-4CED-A4B7-23DAC1B43898}" type="datetimeFigureOut">
               <a:rPr lang="pt-BR" smtClean="0"/>
-              <a:t>06/11/2019</a:t>
+              <a:t>07/11/2019</a:t>
             </a:fld>
             <a:endParaRPr lang="pt-BR"/>
           </a:p>
@@ -3211,7 +3709,7 @@
           <a:p>
             <a:fld id="{2EDF32D7-A802-4CED-A4B7-23DAC1B43898}" type="datetimeFigureOut">
               <a:rPr lang="pt-BR" smtClean="0"/>
-              <a:t>06/11/2019</a:t>
+              <a:t>07/11/2019</a:t>
             </a:fld>
             <a:endParaRPr lang="pt-BR"/>
           </a:p>
@@ -9629,6 +10127,847 @@
       </p:grpSpPr>
       <p:sp>
         <p:nvSpPr>
+          <p:cNvPr id="2" name="Title 1">
+            <a:extLst>
+              <a:ext uri="{FF2B5EF4-FFF2-40B4-BE49-F238E27FC236}">
+                <a16:creationId xmlns:a16="http://schemas.microsoft.com/office/drawing/2014/main" id="{73EB6254-D2FE-450C-BF62-8E3C8917644A}"/>
+              </a:ext>
+            </a:extLst>
+          </p:cNvPr>
+          <p:cNvSpPr>
+            <a:spLocks noGrp="1"/>
+          </p:cNvSpPr>
+          <p:nvPr>
+            <p:ph type="title"/>
+          </p:nvPr>
+        </p:nvSpPr>
+        <p:spPr/>
+        <p:txBody>
+          <a:bodyPr/>
+          <a:lstStyle/>
+          <a:p>
+            <a:r>
+              <a:rPr lang="pt-BR" dirty="0"/>
+              <a:t>Trocando o </a:t>
+            </a:r>
+            <a:r>
+              <a:rPr lang="pt-BR" dirty="0" err="1"/>
+              <a:t>Potenci</a:t>
+            </a:r>
+            <a:r>
+              <a:rPr lang="en-US" dirty="0"/>
+              <a:t>ô</a:t>
+            </a:r>
+            <a:r>
+              <a:rPr lang="pt-BR" dirty="0"/>
+              <a:t>metro por um sensor</a:t>
+            </a:r>
+          </a:p>
+        </p:txBody>
+      </p:sp>
+      <p:sp>
+        <p:nvSpPr>
+          <p:cNvPr id="3" name="Content Placeholder 2">
+            <a:extLst>
+              <a:ext uri="{FF2B5EF4-FFF2-40B4-BE49-F238E27FC236}">
+                <a16:creationId xmlns:a16="http://schemas.microsoft.com/office/drawing/2014/main" id="{25387385-EBFE-4E55-9819-4259EAFF99C1}"/>
+              </a:ext>
+            </a:extLst>
+          </p:cNvPr>
+          <p:cNvSpPr>
+            <a:spLocks noGrp="1"/>
+          </p:cNvSpPr>
+          <p:nvPr>
+            <p:ph idx="1"/>
+          </p:nvPr>
+        </p:nvSpPr>
+        <p:spPr/>
+        <p:txBody>
+          <a:bodyPr/>
+          <a:lstStyle/>
+          <a:p>
+            <a:pPr marL="0" indent="0">
+              <a:buNone/>
+            </a:pPr>
+            <a:r>
+              <a:rPr lang="pt-BR" dirty="0"/>
+              <a:t>É possível substituir o potenciômetro por um sensor de leitura analógica e manter o resto do circuito inalterado.</a:t>
+            </a:r>
+          </a:p>
+          <a:p>
+            <a:pPr marL="0" indent="0">
+              <a:buNone/>
+            </a:pPr>
+            <a:r>
+              <a:rPr lang="pt-BR" dirty="0"/>
+              <a:t> </a:t>
+            </a:r>
+          </a:p>
+          <a:p>
+            <a:endParaRPr lang="pt-BR" dirty="0"/>
+          </a:p>
+        </p:txBody>
+      </p:sp>
+    </p:spTree>
+    <p:extLst>
+      <p:ext uri="{BB962C8B-B14F-4D97-AF65-F5344CB8AC3E}">
+        <p14:creationId xmlns:p14="http://schemas.microsoft.com/office/powerpoint/2010/main" val="1435866029"/>
+      </p:ext>
+    </p:extLst>
+  </p:cSld>
+  <p:clrMapOvr>
+    <a:masterClrMapping/>
+  </p:clrMapOvr>
+</p:sld>
+</file>
+
+<file path=ppt/slides/slide43.xml><?xml version="1.0" encoding="utf-8"?>
+<p:sld xmlns:a="http://schemas.openxmlformats.org/drawingml/2006/main" xmlns:r="http://schemas.openxmlformats.org/officeDocument/2006/relationships" xmlns:p="http://schemas.openxmlformats.org/presentationml/2006/main">
+  <p:cSld>
+    <p:spTree>
+      <p:nvGrpSpPr>
+        <p:cNvPr id="1" name=""/>
+        <p:cNvGrpSpPr/>
+        <p:nvPr/>
+      </p:nvGrpSpPr>
+      <p:grpSpPr>
+        <a:xfrm>
+          <a:off x="0" y="0"/>
+          <a:ext cx="0" cy="0"/>
+          <a:chOff x="0" y="0"/>
+          <a:chExt cx="0" cy="0"/>
+        </a:xfrm>
+      </p:grpSpPr>
+      <p:sp>
+        <p:nvSpPr>
+          <p:cNvPr id="2" name="Title 1">
+            <a:extLst>
+              <a:ext uri="{FF2B5EF4-FFF2-40B4-BE49-F238E27FC236}">
+                <a16:creationId xmlns:a16="http://schemas.microsoft.com/office/drawing/2014/main" id="{73EB6254-D2FE-450C-BF62-8E3C8917644A}"/>
+              </a:ext>
+            </a:extLst>
+          </p:cNvPr>
+          <p:cNvSpPr>
+            <a:spLocks noGrp="1"/>
+          </p:cNvSpPr>
+          <p:nvPr>
+            <p:ph type="title"/>
+          </p:nvPr>
+        </p:nvSpPr>
+        <p:spPr/>
+        <p:txBody>
+          <a:bodyPr/>
+          <a:lstStyle/>
+          <a:p>
+            <a:r>
+              <a:rPr lang="en-US" dirty="0"/>
+              <a:t>Sensor de temperature LM35</a:t>
+            </a:r>
+            <a:endParaRPr lang="pt-BR" dirty="0"/>
+          </a:p>
+        </p:txBody>
+      </p:sp>
+      <p:sp>
+        <p:nvSpPr>
+          <p:cNvPr id="3" name="Content Placeholder 2">
+            <a:extLst>
+              <a:ext uri="{FF2B5EF4-FFF2-40B4-BE49-F238E27FC236}">
+                <a16:creationId xmlns:a16="http://schemas.microsoft.com/office/drawing/2014/main" id="{25387385-EBFE-4E55-9819-4259EAFF99C1}"/>
+              </a:ext>
+            </a:extLst>
+          </p:cNvPr>
+          <p:cNvSpPr>
+            <a:spLocks noGrp="1"/>
+          </p:cNvSpPr>
+          <p:nvPr>
+            <p:ph idx="1"/>
+          </p:nvPr>
+        </p:nvSpPr>
+        <p:spPr/>
+        <p:txBody>
+          <a:bodyPr/>
+          <a:lstStyle/>
+          <a:p>
+            <a:pPr marL="0" indent="0">
+              <a:buNone/>
+            </a:pPr>
+            <a:r>
+              <a:rPr lang="pt-BR" dirty="0"/>
+              <a:t>O sensor LM35 é um sensor de precisão que apresenta uma saída de tensão linear proporcional à temperatura em que ele se encontrar no momento, tendo em sua saída um sinal de 10 </a:t>
+            </a:r>
+            <a:r>
+              <a:rPr lang="pt-BR" dirty="0" err="1"/>
+              <a:t>mV</a:t>
+            </a:r>
+            <a:r>
+              <a:rPr lang="pt-BR" dirty="0"/>
+              <a:t> para cada Grau Célsius de temperatura.</a:t>
+            </a:r>
+          </a:p>
+          <a:p>
+            <a:endParaRPr lang="pt-BR" dirty="0"/>
+          </a:p>
+        </p:txBody>
+      </p:sp>
+      <p:pic>
+        <p:nvPicPr>
+          <p:cNvPr id="1026" name="Picture 2" descr="sensor de temperatura LM35">
+            <a:extLst>
+              <a:ext uri="{FF2B5EF4-FFF2-40B4-BE49-F238E27FC236}">
+                <a16:creationId xmlns:a16="http://schemas.microsoft.com/office/drawing/2014/main" id="{DAED364E-545A-440F-AE65-0C9C07B0DFEE}"/>
+              </a:ext>
+            </a:extLst>
+          </p:cNvPr>
+          <p:cNvPicPr>
+            <a:picLocks noChangeAspect="1" noChangeArrowheads="1"/>
+          </p:cNvPicPr>
+          <p:nvPr/>
+        </p:nvPicPr>
+        <p:blipFill>
+          <a:blip r:embed="rId3">
+            <a:extLst>
+              <a:ext uri="{28A0092B-C50C-407E-A947-70E740481C1C}">
+                <a14:useLocalDpi xmlns:a14="http://schemas.microsoft.com/office/drawing/2010/main" val="0"/>
+              </a:ext>
+            </a:extLst>
+          </a:blip>
+          <a:srcRect/>
+          <a:stretch>
+            <a:fillRect/>
+          </a:stretch>
+        </p:blipFill>
+        <p:spPr bwMode="auto">
+          <a:xfrm>
+            <a:off x="4667250" y="3319463"/>
+            <a:ext cx="2857500" cy="2857500"/>
+          </a:xfrm>
+          <a:prstGeom prst="rect">
+            <a:avLst/>
+          </a:prstGeom>
+          <a:noFill/>
+          <a:extLst>
+            <a:ext uri="{909E8E84-426E-40DD-AFC4-6F175D3DCCD1}">
+              <a14:hiddenFill xmlns:a14="http://schemas.microsoft.com/office/drawing/2010/main">
+                <a:solidFill>
+                  <a:srgbClr val="FFFFFF"/>
+                </a:solidFill>
+              </a14:hiddenFill>
+            </a:ext>
+          </a:extLst>
+        </p:spPr>
+      </p:pic>
+    </p:spTree>
+    <p:extLst>
+      <p:ext uri="{BB962C8B-B14F-4D97-AF65-F5344CB8AC3E}">
+        <p14:creationId xmlns:p14="http://schemas.microsoft.com/office/powerpoint/2010/main" val="1704181888"/>
+      </p:ext>
+    </p:extLst>
+  </p:cSld>
+  <p:clrMapOvr>
+    <a:masterClrMapping/>
+  </p:clrMapOvr>
+</p:sld>
+</file>
+
+<file path=ppt/slides/slide44.xml><?xml version="1.0" encoding="utf-8"?>
+<p:sld xmlns:a="http://schemas.openxmlformats.org/drawingml/2006/main" xmlns:r="http://schemas.openxmlformats.org/officeDocument/2006/relationships" xmlns:p="http://schemas.openxmlformats.org/presentationml/2006/main">
+  <p:cSld>
+    <p:spTree>
+      <p:nvGrpSpPr>
+        <p:cNvPr id="1" name=""/>
+        <p:cNvGrpSpPr/>
+        <p:nvPr/>
+      </p:nvGrpSpPr>
+      <p:grpSpPr>
+        <a:xfrm>
+          <a:off x="0" y="0"/>
+          <a:ext cx="0" cy="0"/>
+          <a:chOff x="0" y="0"/>
+          <a:chExt cx="0" cy="0"/>
+        </a:xfrm>
+      </p:grpSpPr>
+      <p:sp>
+        <p:nvSpPr>
+          <p:cNvPr id="2" name="Title 1">
+            <a:extLst>
+              <a:ext uri="{FF2B5EF4-FFF2-40B4-BE49-F238E27FC236}">
+                <a16:creationId xmlns:a16="http://schemas.microsoft.com/office/drawing/2014/main" id="{73EB6254-D2FE-450C-BF62-8E3C8917644A}"/>
+              </a:ext>
+            </a:extLst>
+          </p:cNvPr>
+          <p:cNvSpPr>
+            <a:spLocks noGrp="1"/>
+          </p:cNvSpPr>
+          <p:nvPr>
+            <p:ph type="title"/>
+          </p:nvPr>
+        </p:nvSpPr>
+        <p:spPr/>
+        <p:txBody>
+          <a:bodyPr/>
+          <a:lstStyle/>
+          <a:p>
+            <a:r>
+              <a:rPr lang="en-US" dirty="0"/>
+              <a:t>Sensor de temperature LM35</a:t>
+            </a:r>
+            <a:endParaRPr lang="pt-BR" dirty="0"/>
+          </a:p>
+        </p:txBody>
+      </p:sp>
+      <p:sp>
+        <p:nvSpPr>
+          <p:cNvPr id="3" name="Content Placeholder 2">
+            <a:extLst>
+              <a:ext uri="{FF2B5EF4-FFF2-40B4-BE49-F238E27FC236}">
+                <a16:creationId xmlns:a16="http://schemas.microsoft.com/office/drawing/2014/main" id="{25387385-EBFE-4E55-9819-4259EAFF99C1}"/>
+              </a:ext>
+            </a:extLst>
+          </p:cNvPr>
+          <p:cNvSpPr>
+            <a:spLocks noGrp="1"/>
+          </p:cNvSpPr>
+          <p:nvPr>
+            <p:ph idx="1"/>
+          </p:nvPr>
+        </p:nvSpPr>
+        <p:spPr/>
+        <p:txBody>
+          <a:bodyPr/>
+          <a:lstStyle/>
+          <a:p>
+            <a:pPr marL="0" indent="0">
+              <a:buNone/>
+            </a:pPr>
+            <a:r>
+              <a:rPr lang="pt-BR" dirty="0"/>
+              <a:t>O sensor LM35 é um sensor de precisão que apresenta uma saída de tensão linear proporcional à temperatura em que ele se encontrar no momento, tendo em sua saída um sinal de 10 </a:t>
+            </a:r>
+            <a:r>
+              <a:rPr lang="pt-BR" dirty="0" err="1"/>
+              <a:t>mV</a:t>
+            </a:r>
+            <a:r>
+              <a:rPr lang="pt-BR" dirty="0"/>
+              <a:t> para cada Grau Célsius de temperatura.</a:t>
+            </a:r>
+          </a:p>
+          <a:p>
+            <a:endParaRPr lang="pt-BR" dirty="0"/>
+          </a:p>
+        </p:txBody>
+      </p:sp>
+    </p:spTree>
+    <p:extLst>
+      <p:ext uri="{BB962C8B-B14F-4D97-AF65-F5344CB8AC3E}">
+        <p14:creationId xmlns:p14="http://schemas.microsoft.com/office/powerpoint/2010/main" val="1149719836"/>
+      </p:ext>
+    </p:extLst>
+  </p:cSld>
+  <p:clrMapOvr>
+    <a:masterClrMapping/>
+  </p:clrMapOvr>
+</p:sld>
+</file>
+
+<file path=ppt/slides/slide45.xml><?xml version="1.0" encoding="utf-8"?>
+<p:sld xmlns:a="http://schemas.openxmlformats.org/drawingml/2006/main" xmlns:r="http://schemas.openxmlformats.org/officeDocument/2006/relationships" xmlns:p="http://schemas.openxmlformats.org/presentationml/2006/main">
+  <p:cSld>
+    <p:spTree>
+      <p:nvGrpSpPr>
+        <p:cNvPr id="1" name=""/>
+        <p:cNvGrpSpPr/>
+        <p:nvPr/>
+      </p:nvGrpSpPr>
+      <p:grpSpPr>
+        <a:xfrm>
+          <a:off x="0" y="0"/>
+          <a:ext cx="0" cy="0"/>
+          <a:chOff x="0" y="0"/>
+          <a:chExt cx="0" cy="0"/>
+        </a:xfrm>
+      </p:grpSpPr>
+      <p:sp>
+        <p:nvSpPr>
+          <p:cNvPr id="2" name="Título 1"/>
+          <p:cNvSpPr>
+            <a:spLocks noGrp="1"/>
+          </p:cNvSpPr>
+          <p:nvPr>
+            <p:ph type="title"/>
+          </p:nvPr>
+        </p:nvSpPr>
+        <p:spPr/>
+        <p:txBody>
+          <a:bodyPr/>
+          <a:lstStyle/>
+          <a:p>
+            <a:r>
+              <a:rPr lang="pt-BR" dirty="0"/>
+              <a:t>Montagem do circuito - conexões</a:t>
+            </a:r>
+          </a:p>
+        </p:txBody>
+      </p:sp>
+      <p:graphicFrame>
+        <p:nvGraphicFramePr>
+          <p:cNvPr id="6" name="Table 6">
+            <a:extLst>
+              <a:ext uri="{FF2B5EF4-FFF2-40B4-BE49-F238E27FC236}">
+                <a16:creationId xmlns:a16="http://schemas.microsoft.com/office/drawing/2014/main" id="{7B51FD96-09BB-45DA-B03E-0FD109EC320F}"/>
+              </a:ext>
+            </a:extLst>
+          </p:cNvPr>
+          <p:cNvGraphicFramePr>
+            <a:graphicFrameLocks noGrp="1"/>
+          </p:cNvGraphicFramePr>
+          <p:nvPr>
+            <p:ph idx="1"/>
+            <p:extLst>
+              <p:ext uri="{D42A27DB-BD31-4B8C-83A1-F6EECF244321}">
+                <p14:modId xmlns:p14="http://schemas.microsoft.com/office/powerpoint/2010/main" val="233519275"/>
+              </p:ext>
+            </p:extLst>
+          </p:nvPr>
+        </p:nvGraphicFramePr>
+        <p:xfrm>
+          <a:off x="838200" y="1825625"/>
+          <a:ext cx="4502426" cy="1486360"/>
+        </p:xfrm>
+        <a:graphic>
+          <a:graphicData uri="http://schemas.openxmlformats.org/drawingml/2006/table">
+            <a:tbl>
+              <a:tblPr firstRow="1" bandRow="1">
+                <a:tableStyleId>{5C22544A-7EE6-4342-B048-85BDC9FD1C3A}</a:tableStyleId>
+              </a:tblPr>
+              <a:tblGrid>
+                <a:gridCol w="2251213">
+                  <a:extLst>
+                    <a:ext uri="{9D8B030D-6E8A-4147-A177-3AD203B41FA5}">
+                      <a16:colId xmlns:a16="http://schemas.microsoft.com/office/drawing/2014/main" val="3118275097"/>
+                    </a:ext>
+                  </a:extLst>
+                </a:gridCol>
+                <a:gridCol w="2251213">
+                  <a:extLst>
+                    <a:ext uri="{9D8B030D-6E8A-4147-A177-3AD203B41FA5}">
+                      <a16:colId xmlns:a16="http://schemas.microsoft.com/office/drawing/2014/main" val="2325954684"/>
+                    </a:ext>
+                  </a:extLst>
+                </a:gridCol>
+              </a:tblGrid>
+              <a:tr h="371590">
+                <a:tc>
+                  <a:txBody>
+                    <a:bodyPr/>
+                    <a:lstStyle/>
+                    <a:p>
+                      <a:r>
+                        <a:rPr lang="pt-BR" dirty="0"/>
+                        <a:t>Arduino</a:t>
+                      </a:r>
+                    </a:p>
+                  </a:txBody>
+                  <a:tcPr/>
+                </a:tc>
+                <a:tc>
+                  <a:txBody>
+                    <a:bodyPr/>
+                    <a:lstStyle/>
+                    <a:p>
+                      <a:r>
+                        <a:rPr lang="pt-BR" dirty="0"/>
+                        <a:t>Potenciômetro</a:t>
+                      </a:r>
+                    </a:p>
+                  </a:txBody>
+                  <a:tcPr/>
+                </a:tc>
+                <a:extLst>
+                  <a:ext uri="{0D108BD9-81ED-4DB2-BD59-A6C34878D82A}">
+                    <a16:rowId xmlns:a16="http://schemas.microsoft.com/office/drawing/2014/main" val="2846402877"/>
+                  </a:ext>
+                </a:extLst>
+              </a:tr>
+              <a:tr h="371590">
+                <a:tc>
+                  <a:txBody>
+                    <a:bodyPr/>
+                    <a:lstStyle/>
+                    <a:p>
+                      <a:r>
+                        <a:rPr lang="pt-BR" dirty="0"/>
+                        <a:t>5 V</a:t>
+                      </a:r>
+                    </a:p>
+                  </a:txBody>
+                  <a:tcPr/>
+                </a:tc>
+                <a:tc>
+                  <a:txBody>
+                    <a:bodyPr/>
+                    <a:lstStyle/>
+                    <a:p>
+                      <a:r>
+                        <a:rPr lang="pt-BR" dirty="0" err="1"/>
+                        <a:t>Vs</a:t>
+                      </a:r>
+                      <a:endParaRPr lang="pt-BR" dirty="0"/>
+                    </a:p>
+                  </a:txBody>
+                  <a:tcPr/>
+                </a:tc>
+                <a:extLst>
+                  <a:ext uri="{0D108BD9-81ED-4DB2-BD59-A6C34878D82A}">
+                    <a16:rowId xmlns:a16="http://schemas.microsoft.com/office/drawing/2014/main" val="3387589238"/>
+                  </a:ext>
+                </a:extLst>
+              </a:tr>
+              <a:tr h="371590">
+                <a:tc>
+                  <a:txBody>
+                    <a:bodyPr/>
+                    <a:lstStyle/>
+                    <a:p>
+                      <a:r>
+                        <a:rPr lang="pt-BR" dirty="0"/>
+                        <a:t>A0</a:t>
+                      </a:r>
+                    </a:p>
+                  </a:txBody>
+                  <a:tcPr/>
+                </a:tc>
+                <a:tc>
+                  <a:txBody>
+                    <a:bodyPr/>
+                    <a:lstStyle/>
+                    <a:p>
+                      <a:r>
+                        <a:rPr lang="en-US" dirty="0"/>
+                        <a:t>V</a:t>
+                      </a:r>
+                      <a:r>
+                        <a:rPr lang="pt-BR" dirty="0"/>
+                        <a:t>out</a:t>
+                      </a:r>
+                    </a:p>
+                  </a:txBody>
+                  <a:tcPr/>
+                </a:tc>
+                <a:extLst>
+                  <a:ext uri="{0D108BD9-81ED-4DB2-BD59-A6C34878D82A}">
+                    <a16:rowId xmlns:a16="http://schemas.microsoft.com/office/drawing/2014/main" val="4078284695"/>
+                  </a:ext>
+                </a:extLst>
+              </a:tr>
+              <a:tr h="371590">
+                <a:tc>
+                  <a:txBody>
+                    <a:bodyPr/>
+                    <a:lstStyle/>
+                    <a:p>
+                      <a:r>
+                        <a:rPr lang="pt-BR" dirty="0"/>
+                        <a:t>GND</a:t>
+                      </a:r>
+                    </a:p>
+                  </a:txBody>
+                  <a:tcPr/>
+                </a:tc>
+                <a:tc>
+                  <a:txBody>
+                    <a:bodyPr/>
+                    <a:lstStyle/>
+                    <a:p>
+                      <a:r>
+                        <a:rPr lang="pt-BR" dirty="0"/>
+                        <a:t>GND</a:t>
+                      </a:r>
+                    </a:p>
+                  </a:txBody>
+                  <a:tcPr/>
+                </a:tc>
+                <a:extLst>
+                  <a:ext uri="{0D108BD9-81ED-4DB2-BD59-A6C34878D82A}">
+                    <a16:rowId xmlns:a16="http://schemas.microsoft.com/office/drawing/2014/main" val="494648561"/>
+                  </a:ext>
+                </a:extLst>
+              </a:tr>
+            </a:tbl>
+          </a:graphicData>
+        </a:graphic>
+      </p:graphicFrame>
+      <p:pic>
+        <p:nvPicPr>
+          <p:cNvPr id="3" name="Picture 2">
+            <a:extLst>
+              <a:ext uri="{FF2B5EF4-FFF2-40B4-BE49-F238E27FC236}">
+                <a16:creationId xmlns:a16="http://schemas.microsoft.com/office/drawing/2014/main" id="{956C4D1A-83E3-4A1B-8EA8-C511A8721601}"/>
+              </a:ext>
+            </a:extLst>
+          </p:cNvPr>
+          <p:cNvPicPr>
+            <a:picLocks noChangeAspect="1"/>
+          </p:cNvPicPr>
+          <p:nvPr/>
+        </p:nvPicPr>
+        <p:blipFill>
+          <a:blip r:embed="rId2"/>
+          <a:stretch>
+            <a:fillRect/>
+          </a:stretch>
+        </p:blipFill>
+        <p:spPr>
+          <a:xfrm>
+            <a:off x="2103836" y="3841062"/>
+            <a:ext cx="1971154" cy="2226411"/>
+          </a:xfrm>
+          <a:prstGeom prst="rect">
+            <a:avLst/>
+          </a:prstGeom>
+        </p:spPr>
+      </p:pic>
+      <p:pic>
+        <p:nvPicPr>
+          <p:cNvPr id="7" name="Picture 6" descr="A circuit board&#10;&#10;Description automatically generated">
+            <a:extLst>
+              <a:ext uri="{FF2B5EF4-FFF2-40B4-BE49-F238E27FC236}">
+                <a16:creationId xmlns:a16="http://schemas.microsoft.com/office/drawing/2014/main" id="{B741AA5B-5880-49CB-86CC-3B4DE137A093}"/>
+              </a:ext>
+            </a:extLst>
+          </p:cNvPr>
+          <p:cNvPicPr>
+            <a:picLocks noChangeAspect="1"/>
+          </p:cNvPicPr>
+          <p:nvPr/>
+        </p:nvPicPr>
+        <p:blipFill rotWithShape="1">
+          <a:blip r:embed="rId3">
+            <a:extLst>
+              <a:ext uri="{28A0092B-C50C-407E-A947-70E740481C1C}">
+                <a14:useLocalDpi xmlns:a14="http://schemas.microsoft.com/office/drawing/2010/main" val="0"/>
+              </a:ext>
+            </a:extLst>
+          </a:blip>
+          <a:srcRect l="17587" t="4106" r="17887" b="3791"/>
+          <a:stretch/>
+        </p:blipFill>
+        <p:spPr>
+          <a:xfrm>
+            <a:off x="5939238" y="1825625"/>
+            <a:ext cx="5414562" cy="3168441"/>
+          </a:xfrm>
+          <a:prstGeom prst="rect">
+            <a:avLst/>
+          </a:prstGeom>
+        </p:spPr>
+      </p:pic>
+    </p:spTree>
+    <p:extLst>
+      <p:ext uri="{BB962C8B-B14F-4D97-AF65-F5344CB8AC3E}">
+        <p14:creationId xmlns:p14="http://schemas.microsoft.com/office/powerpoint/2010/main" val="1608453105"/>
+      </p:ext>
+    </p:extLst>
+  </p:cSld>
+  <p:clrMapOvr>
+    <a:masterClrMapping/>
+  </p:clrMapOvr>
+</p:sld>
+</file>
+
+<file path=ppt/slides/slide46.xml><?xml version="1.0" encoding="utf-8"?>
+<p:sld xmlns:a="http://schemas.openxmlformats.org/drawingml/2006/main" xmlns:r="http://schemas.openxmlformats.org/officeDocument/2006/relationships" xmlns:p="http://schemas.openxmlformats.org/presentationml/2006/main">
+  <p:cSld>
+    <p:spTree>
+      <p:nvGrpSpPr>
+        <p:cNvPr id="1" name=""/>
+        <p:cNvGrpSpPr/>
+        <p:nvPr/>
+      </p:nvGrpSpPr>
+      <p:grpSpPr>
+        <a:xfrm>
+          <a:off x="0" y="0"/>
+          <a:ext cx="0" cy="0"/>
+          <a:chOff x="0" y="0"/>
+          <a:chExt cx="0" cy="0"/>
+        </a:xfrm>
+      </p:grpSpPr>
+      <p:sp>
+        <p:nvSpPr>
+          <p:cNvPr id="2" name="Título 1"/>
+          <p:cNvSpPr>
+            <a:spLocks noGrp="1"/>
+          </p:cNvSpPr>
+          <p:nvPr>
+            <p:ph type="title"/>
+          </p:nvPr>
+        </p:nvSpPr>
+        <p:spPr/>
+        <p:txBody>
+          <a:bodyPr/>
+          <a:lstStyle/>
+          <a:p>
+            <a:r>
+              <a:rPr lang="pt-BR" dirty="0"/>
+              <a:t>Enviar código</a:t>
+            </a:r>
+          </a:p>
+        </p:txBody>
+      </p:sp>
+      <p:sp>
+        <p:nvSpPr>
+          <p:cNvPr id="3" name="Espaço Reservado para Conteúdo 2"/>
+          <p:cNvSpPr>
+            <a:spLocks noGrp="1"/>
+          </p:cNvSpPr>
+          <p:nvPr>
+            <p:ph idx="1"/>
+          </p:nvPr>
+        </p:nvSpPr>
+        <p:spPr/>
+        <p:txBody>
+          <a:bodyPr>
+            <a:normAutofit/>
+          </a:bodyPr>
+          <a:lstStyle/>
+          <a:p>
+            <a:pPr marL="0" indent="0">
+              <a:buNone/>
+            </a:pPr>
+            <a:r>
+              <a:rPr lang="en-US" dirty="0">
+                <a:latin typeface="Courier New" panose="02070309020205020404" pitchFamily="49" charset="0"/>
+                <a:cs typeface="Courier New" panose="02070309020205020404" pitchFamily="49" charset="0"/>
+              </a:rPr>
+              <a:t>void loop() </a:t>
+            </a:r>
+          </a:p>
+          <a:p>
+            <a:pPr marL="0" indent="0">
+              <a:buNone/>
+            </a:pPr>
+            <a:r>
+              <a:rPr lang="en-US" dirty="0">
+                <a:latin typeface="Courier New" panose="02070309020205020404" pitchFamily="49" charset="0"/>
+                <a:cs typeface="Courier New" panose="02070309020205020404" pitchFamily="49" charset="0"/>
+              </a:rPr>
+              <a:t>{</a:t>
+            </a:r>
+          </a:p>
+          <a:p>
+            <a:pPr marL="0" indent="0">
+              <a:buNone/>
+            </a:pPr>
+            <a:r>
+              <a:rPr lang="en-US" dirty="0">
+                <a:latin typeface="Courier New" panose="02070309020205020404" pitchFamily="49" charset="0"/>
+                <a:cs typeface="Courier New" panose="02070309020205020404" pitchFamily="49" charset="0"/>
+              </a:rPr>
+              <a:t>  delay(2000);</a:t>
+            </a:r>
+          </a:p>
+          <a:p>
+            <a:pPr marL="0" indent="0">
+              <a:buNone/>
+            </a:pPr>
+            <a:r>
+              <a:rPr lang="en-US" dirty="0">
+                <a:latin typeface="Courier New" panose="02070309020205020404" pitchFamily="49" charset="0"/>
+                <a:cs typeface="Courier New" panose="02070309020205020404" pitchFamily="49" charset="0"/>
+              </a:rPr>
+              <a:t>  </a:t>
+            </a:r>
+            <a:r>
+              <a:rPr lang="en-US" b="1" dirty="0" err="1">
+                <a:latin typeface="Courier New" panose="02070309020205020404" pitchFamily="49" charset="0"/>
+                <a:cs typeface="Courier New" panose="02070309020205020404" pitchFamily="49" charset="0"/>
+              </a:rPr>
+              <a:t>valPot</a:t>
+            </a:r>
+            <a:r>
+              <a:rPr lang="en-US" b="1" dirty="0">
+                <a:latin typeface="Courier New" panose="02070309020205020404" pitchFamily="49" charset="0"/>
+                <a:cs typeface="Courier New" panose="02070309020205020404" pitchFamily="49" charset="0"/>
+              </a:rPr>
+              <a:t> = (</a:t>
+            </a:r>
+            <a:r>
+              <a:rPr lang="en-US" b="1" dirty="0" err="1">
+                <a:latin typeface="Courier New" panose="02070309020205020404" pitchFamily="49" charset="0"/>
+                <a:cs typeface="Courier New" panose="02070309020205020404" pitchFamily="49" charset="0"/>
+              </a:rPr>
+              <a:t>analogRead</a:t>
+            </a:r>
+            <a:r>
+              <a:rPr lang="en-US" b="1" dirty="0">
+                <a:latin typeface="Courier New" panose="02070309020205020404" pitchFamily="49" charset="0"/>
+                <a:cs typeface="Courier New" panose="02070309020205020404" pitchFamily="49" charset="0"/>
+              </a:rPr>
+              <a:t>(pot) *</a:t>
+            </a:r>
+          </a:p>
+          <a:p>
+            <a:pPr marL="0" indent="0">
+              <a:buNone/>
+            </a:pPr>
+            <a:r>
+              <a:rPr lang="en-US" b="1" dirty="0">
+                <a:latin typeface="Courier New" panose="02070309020205020404" pitchFamily="49" charset="0"/>
+                <a:cs typeface="Courier New" panose="02070309020205020404" pitchFamily="49" charset="0"/>
+              </a:rPr>
+              <a:t>  (5.0 / 1023.0)) / 0.01;</a:t>
+            </a:r>
+            <a:endParaRPr lang="pt-BR" b="1" dirty="0">
+              <a:latin typeface="Courier New" panose="02070309020205020404" pitchFamily="49" charset="0"/>
+              <a:cs typeface="Courier New" panose="02070309020205020404" pitchFamily="49" charset="0"/>
+            </a:endParaRPr>
+          </a:p>
+          <a:p>
+            <a:pPr marL="0" indent="0">
+              <a:buNone/>
+            </a:pPr>
+            <a:r>
+              <a:rPr lang="pt-BR" dirty="0">
+                <a:latin typeface="Courier New" panose="02070309020205020404" pitchFamily="49" charset="0"/>
+                <a:cs typeface="Courier New" panose="02070309020205020404" pitchFamily="49" charset="0"/>
+              </a:rPr>
+              <a:t>...</a:t>
+            </a:r>
+          </a:p>
+        </p:txBody>
+      </p:sp>
+    </p:spTree>
+    <p:extLst>
+      <p:ext uri="{BB962C8B-B14F-4D97-AF65-F5344CB8AC3E}">
+        <p14:creationId xmlns:p14="http://schemas.microsoft.com/office/powerpoint/2010/main" val="4076477049"/>
+      </p:ext>
+    </p:extLst>
+  </p:cSld>
+  <p:clrMapOvr>
+    <a:masterClrMapping/>
+  </p:clrMapOvr>
+</p:sld>
+</file>
+
+<file path=ppt/slides/slide47.xml><?xml version="1.0" encoding="utf-8"?>
+<p:sld xmlns:a="http://schemas.openxmlformats.org/drawingml/2006/main" xmlns:r="http://schemas.openxmlformats.org/officeDocument/2006/relationships" xmlns:p="http://schemas.openxmlformats.org/presentationml/2006/main">
+  <p:cSld>
+    <p:spTree>
+      <p:nvGrpSpPr>
+        <p:cNvPr id="1" name=""/>
+        <p:cNvGrpSpPr/>
+        <p:nvPr/>
+      </p:nvGrpSpPr>
+      <p:grpSpPr>
+        <a:xfrm>
+          <a:off x="0" y="0"/>
+          <a:ext cx="0" cy="0"/>
+          <a:chOff x="0" y="0"/>
+          <a:chExt cx="0" cy="0"/>
+        </a:xfrm>
+      </p:grpSpPr>
+      <p:sp>
+        <p:nvSpPr>
           <p:cNvPr id="2" name="Título 1"/>
           <p:cNvSpPr>
             <a:spLocks noGrp="1"/>
@@ -9727,7 +11066,7 @@
 </p:sld>
 </file>
 
-<file path=ppt/slides/slide43.xml><?xml version="1.0" encoding="utf-8"?>
+<file path=ppt/slides/slide48.xml><?xml version="1.0" encoding="utf-8"?>
 <p:sld xmlns:a="http://schemas.openxmlformats.org/drawingml/2006/main" xmlns:r="http://schemas.openxmlformats.org/officeDocument/2006/relationships" xmlns:p="http://schemas.openxmlformats.org/presentationml/2006/main">
   <p:cSld>
     <p:spTree>

</xml_diff>

<commit_message>
adição de slides para relé
</commit_message>
<xml_diff>
--- a/arduino-bluetooth.pptx
+++ b/arduino-bluetooth.pptx
@@ -5,7 +5,7 @@
     <p:sldMasterId id="2147483648" r:id="rId1"/>
   </p:sldMasterIdLst>
   <p:notesMasterIdLst>
-    <p:notesMasterId r:id="rId50"/>
+    <p:notesMasterId r:id="rId54"/>
   </p:notesMasterIdLst>
   <p:sldIdLst>
     <p:sldId id="256" r:id="rId2"/>
@@ -54,8 +54,12 @@
     <p:sldId id="304" r:id="rId45"/>
     <p:sldId id="305" r:id="rId46"/>
     <p:sldId id="306" r:id="rId47"/>
-    <p:sldId id="258" r:id="rId48"/>
-    <p:sldId id="292" r:id="rId49"/>
+    <p:sldId id="307" r:id="rId48"/>
+    <p:sldId id="308" r:id="rId49"/>
+    <p:sldId id="309" r:id="rId50"/>
+    <p:sldId id="310" r:id="rId51"/>
+    <p:sldId id="258" r:id="rId52"/>
+    <p:sldId id="292" r:id="rId53"/>
   </p:sldIdLst>
   <p:sldSz cx="12192000" cy="6858000"/>
   <p:notesSz cx="6858000" cy="9144000"/>
@@ -415,7 +419,7 @@
           <a:p>
             <a:fld id="{63C9BDA7-C22B-4A92-921B-5E8BACDF8EBE}" type="slidenum">
               <a:rPr lang="pt-BR" smtClean="0"/>
-              <a:t>‹#›</a:t>
+              <a:t>‹nº›</a:t>
             </a:fld>
             <a:endParaRPr lang="pt-BR"/>
           </a:p>
@@ -1449,7 +1453,7 @@
           <a:p>
             <a:fld id="{90CE46F0-10D9-44E0-9B31-88DCFC46CB51}" type="slidenum">
               <a:rPr lang="pt-BR" smtClean="0"/>
-              <a:t>‹#›</a:t>
+              <a:t>‹nº›</a:t>
             </a:fld>
             <a:endParaRPr lang="pt-BR"/>
           </a:p>
@@ -1617,7 +1621,7 @@
           <a:p>
             <a:fld id="{90CE46F0-10D9-44E0-9B31-88DCFC46CB51}" type="slidenum">
               <a:rPr lang="pt-BR" smtClean="0"/>
-              <a:t>‹#›</a:t>
+              <a:t>‹nº›</a:t>
             </a:fld>
             <a:endParaRPr lang="pt-BR"/>
           </a:p>
@@ -1795,7 +1799,7 @@
           <a:p>
             <a:fld id="{90CE46F0-10D9-44E0-9B31-88DCFC46CB51}" type="slidenum">
               <a:rPr lang="pt-BR" smtClean="0"/>
-              <a:t>‹#›</a:t>
+              <a:t>‹nº›</a:t>
             </a:fld>
             <a:endParaRPr lang="pt-BR"/>
           </a:p>
@@ -1963,7 +1967,7 @@
           <a:p>
             <a:fld id="{90CE46F0-10D9-44E0-9B31-88DCFC46CB51}" type="slidenum">
               <a:rPr lang="pt-BR" smtClean="0"/>
-              <a:t>‹#›</a:t>
+              <a:t>‹nº›</a:t>
             </a:fld>
             <a:endParaRPr lang="pt-BR"/>
           </a:p>
@@ -2208,7 +2212,7 @@
           <a:p>
             <a:fld id="{90CE46F0-10D9-44E0-9B31-88DCFC46CB51}" type="slidenum">
               <a:rPr lang="pt-BR" smtClean="0"/>
-              <a:t>‹#›</a:t>
+              <a:t>‹nº›</a:t>
             </a:fld>
             <a:endParaRPr lang="pt-BR"/>
           </a:p>
@@ -2437,7 +2441,7 @@
           <a:p>
             <a:fld id="{90CE46F0-10D9-44E0-9B31-88DCFC46CB51}" type="slidenum">
               <a:rPr lang="pt-BR" smtClean="0"/>
-              <a:t>‹#›</a:t>
+              <a:t>‹nº›</a:t>
             </a:fld>
             <a:endParaRPr lang="pt-BR"/>
           </a:p>
@@ -2801,7 +2805,7 @@
           <a:p>
             <a:fld id="{90CE46F0-10D9-44E0-9B31-88DCFC46CB51}" type="slidenum">
               <a:rPr lang="pt-BR" smtClean="0"/>
-              <a:t>‹#›</a:t>
+              <a:t>‹nº›</a:t>
             </a:fld>
             <a:endParaRPr lang="pt-BR"/>
           </a:p>
@@ -2918,7 +2922,7 @@
           <a:p>
             <a:fld id="{90CE46F0-10D9-44E0-9B31-88DCFC46CB51}" type="slidenum">
               <a:rPr lang="pt-BR" smtClean="0"/>
-              <a:t>‹#›</a:t>
+              <a:t>‹nº›</a:t>
             </a:fld>
             <a:endParaRPr lang="pt-BR"/>
           </a:p>
@@ -3013,7 +3017,7 @@
           <a:p>
             <a:fld id="{90CE46F0-10D9-44E0-9B31-88DCFC46CB51}" type="slidenum">
               <a:rPr lang="pt-BR" smtClean="0"/>
-              <a:t>‹#›</a:t>
+              <a:t>‹nº›</a:t>
             </a:fld>
             <a:endParaRPr lang="pt-BR"/>
           </a:p>
@@ -3288,7 +3292,7 @@
           <a:p>
             <a:fld id="{90CE46F0-10D9-44E0-9B31-88DCFC46CB51}" type="slidenum">
               <a:rPr lang="pt-BR" smtClean="0"/>
-              <a:t>‹#›</a:t>
+              <a:t>‹nº›</a:t>
             </a:fld>
             <a:endParaRPr lang="pt-BR"/>
           </a:p>
@@ -3540,7 +3544,7 @@
           <a:p>
             <a:fld id="{90CE46F0-10D9-44E0-9B31-88DCFC46CB51}" type="slidenum">
               <a:rPr lang="pt-BR" smtClean="0"/>
-              <a:t>‹#›</a:t>
+              <a:t>‹nº›</a:t>
             </a:fld>
             <a:endParaRPr lang="pt-BR"/>
           </a:p>
@@ -3787,7 +3791,7 @@
           <a:p>
             <a:fld id="{90CE46F0-10D9-44E0-9B31-88DCFC46CB51}" type="slidenum">
               <a:rPr lang="pt-BR" smtClean="0"/>
-              <a:t>‹#›</a:t>
+              <a:t>‹nº›</a:t>
             </a:fld>
             <a:endParaRPr lang="pt-BR"/>
           </a:p>
@@ -10982,72 +10986,35 @@
           <a:lstStyle/>
           <a:p>
             <a:r>
-              <a:rPr lang="pt-BR" dirty="0"/>
-              <a:t>Referências Bluetooth</a:t>
-            </a:r>
-          </a:p>
-        </p:txBody>
-      </p:sp>
-      <p:sp>
-        <p:nvSpPr>
-          <p:cNvPr id="3" name="Espaço Reservado para Conteúdo 2"/>
-          <p:cNvSpPr>
-            <a:spLocks noGrp="1"/>
-          </p:cNvSpPr>
-          <p:nvPr>
-            <p:ph idx="1"/>
-          </p:nvPr>
-        </p:nvSpPr>
-        <p:spPr/>
-        <p:txBody>
-          <a:bodyPr>
-            <a:normAutofit lnSpcReduction="10000"/>
-          </a:bodyPr>
-          <a:lstStyle/>
-          <a:p>
-            <a:r>
-              <a:rPr lang="pt-BR" dirty="0">
-                <a:hlinkClick r:id="rId2"/>
-              </a:rPr>
-              <a:t>https://www.electronicwings.com/sensors-modules/bluetooth-module-hc-05-</a:t>
-            </a:r>
-            <a:endParaRPr lang="pt-BR" dirty="0">
-              <a:hlinkClick r:id="rId3"/>
-            </a:endParaRPr>
-          </a:p>
-          <a:p>
-            <a:r>
-              <a:rPr lang="pt-BR" dirty="0">
-                <a:hlinkClick r:id="rId3"/>
-              </a:rPr>
-              <a:t>https://maker.pro/arduino/tutorial/bluetooth-basics-how-to-control-led-using-smartphone-arduino</a:t>
+              <a:rPr lang="pt-BR" dirty="0" smtClean="0"/>
+              <a:t>Acionando equipamentos de alta tensão ou corrente</a:t>
             </a:r>
             <a:endParaRPr lang="pt-BR" dirty="0"/>
           </a:p>
-          <a:p>
-            <a:r>
-              <a:rPr lang="pt-BR" dirty="0">
-                <a:hlinkClick r:id="rId4"/>
-              </a:rPr>
-              <a:t>https://howtomechatronics.com/tutorials/arduino/arduino-and-hc-05-bluetooth-module-tutorial/</a:t>
-            </a:r>
-            <a:endParaRPr lang="pt-BR" dirty="0"/>
-          </a:p>
-          <a:p>
-            <a:r>
-              <a:rPr lang="pt-BR" dirty="0">
-                <a:hlinkClick r:id="rId5"/>
-              </a:rPr>
-              <a:t>http://www.instructables.com/id/Tutorial-Using-HC06-Bluetooth-to-Serial-Wireless-U/</a:t>
-            </a:r>
-            <a:endParaRPr lang="pt-BR" dirty="0"/>
-          </a:p>
-          <a:p>
-            <a:r>
-              <a:rPr lang="en-US" dirty="0">
-                <a:hlinkClick r:id="rId6"/>
-              </a:rPr>
-              <a:t>https://www.instructables.com/id/AT-command-mode-of-HC-05-Bluetooth-module/</a:t>
+        </p:txBody>
+      </p:sp>
+      <p:sp>
+        <p:nvSpPr>
+          <p:cNvPr id="3" name="Espaço Reservado para Texto 2"/>
+          <p:cNvSpPr>
+            <a:spLocks noGrp="1"/>
+          </p:cNvSpPr>
+          <p:nvPr>
+            <p:ph type="body" idx="1"/>
+          </p:nvPr>
+        </p:nvSpPr>
+        <p:spPr/>
+        <p:txBody>
+          <a:bodyPr/>
+          <a:lstStyle/>
+          <a:p>
+            <a:r>
+              <a:rPr lang="pt-BR" dirty="0" smtClean="0"/>
+              <a:t>Usando módulo relé com </a:t>
+            </a:r>
+            <a:r>
+              <a:rPr lang="pt-BR" dirty="0" err="1" smtClean="0"/>
+              <a:t>Arduino</a:t>
             </a:r>
             <a:endParaRPr lang="pt-BR" dirty="0"/>
           </a:p>
@@ -11056,7 +11023,7 @@
     </p:spTree>
     <p:extLst>
       <p:ext uri="{BB962C8B-B14F-4D97-AF65-F5344CB8AC3E}">
-        <p14:creationId xmlns:p14="http://schemas.microsoft.com/office/powerpoint/2010/main" val="2022734056"/>
+        <p14:creationId xmlns:p14="http://schemas.microsoft.com/office/powerpoint/2010/main" val="2380665011"/>
       </p:ext>
     </p:extLst>
   </p:cSld>
@@ -11100,7 +11067,15 @@
           <a:p>
             <a:r>
               <a:rPr lang="pt-BR" dirty="0"/>
-              <a:t>Referências Relé</a:t>
+              <a:t>Módulo Relé </a:t>
+            </a:r>
+            <a:r>
+              <a:rPr lang="pt-BR" dirty="0" smtClean="0"/>
+              <a:t>5 V </a:t>
+            </a:r>
+            <a:r>
+              <a:rPr lang="pt-BR" dirty="0"/>
+              <a:t>1 Canal</a:t>
             </a:r>
           </a:p>
         </p:txBody>
@@ -11117,45 +11092,64 @@
         </p:nvSpPr>
         <p:spPr/>
         <p:txBody>
-          <a:bodyPr>
-            <a:normAutofit/>
-          </a:bodyPr>
-          <a:lstStyle/>
-          <a:p>
-            <a:r>
-              <a:rPr lang="en-US" dirty="0">
-                <a:hlinkClick r:id="rId2"/>
-              </a:rPr>
-              <a:t>https://blogmasterwalkershop.com.br/arduino/arduino-utilizando-o-potenciometro-linear/</a:t>
-            </a:r>
-            <a:endParaRPr lang="en-US" dirty="0"/>
-          </a:p>
-          <a:p>
-            <a:r>
-              <a:rPr lang="en-US" dirty="0">
-                <a:hlinkClick r:id="rId3"/>
-              </a:rPr>
-              <a:t>https://portal.vidadesilicio.com.br/lm35-medindo-temperatura-com-arduino/</a:t>
-            </a:r>
-            <a:endParaRPr lang="en-US" dirty="0">
-              <a:hlinkClick r:id="rId4"/>
-            </a:endParaRPr>
-          </a:p>
-          <a:p>
-            <a:r>
-              <a:rPr lang="en-US" dirty="0">
-                <a:hlinkClick r:id="rId4"/>
-              </a:rPr>
-              <a:t>https://blogmasterwalkershop.com.br/arduino/como-usar-com-arduino-modulo-rele-5v-1-canal/</a:t>
-            </a:r>
-            <a:endParaRPr lang="en-US" dirty="0"/>
-          </a:p>
-          <a:p>
-            <a:r>
-              <a:rPr lang="pt-BR" dirty="0">
-                <a:hlinkClick r:id="rId5"/>
-              </a:rPr>
-              <a:t>https://portal.vidadesilicio.com.br/modulo-rele-com-arduino/</a:t>
+          <a:bodyPr/>
+          <a:lstStyle/>
+          <a:p>
+            <a:pPr marL="0" indent="0">
+              <a:buNone/>
+            </a:pPr>
+            <a:r>
+              <a:rPr lang="pt-BR" dirty="0"/>
+              <a:t>Os relés são componentes eletromecânicos capazes de controlar circuitos externos de grandes correntes a partir de pequenas correntes ou tensões, ou seja, acionando um relé com uma pilha podemos controlar um motor que esteja ligado em 110 ou 220 </a:t>
+            </a:r>
+            <a:r>
+              <a:rPr lang="pt-BR" dirty="0" smtClean="0"/>
+              <a:t>V, </a:t>
+            </a:r>
+            <a:r>
+              <a:rPr lang="pt-BR" dirty="0"/>
+              <a:t>por </a:t>
+            </a:r>
+            <a:r>
+              <a:rPr lang="pt-BR" dirty="0" smtClean="0"/>
+              <a:t>exemplo.</a:t>
+            </a:r>
+          </a:p>
+          <a:p>
+            <a:pPr marL="0" indent="0">
+              <a:buNone/>
+            </a:pPr>
+            <a:r>
+              <a:rPr lang="pt-BR" dirty="0"/>
+              <a:t>O Módulo Relé 5V 1 Canal permite </a:t>
+            </a:r>
+            <a:r>
+              <a:rPr lang="pt-BR" dirty="0" smtClean="0"/>
+              <a:t>controlar </a:t>
+            </a:r>
+            <a:r>
+              <a:rPr lang="pt-BR" dirty="0"/>
+              <a:t>cargas AC (alternada) de forma simples e </a:t>
+            </a:r>
+            <a:r>
+              <a:rPr lang="pt-BR" dirty="0" smtClean="0"/>
+              <a:t>prática, usando uma plataforma </a:t>
+            </a:r>
+            <a:r>
+              <a:rPr lang="pt-BR" dirty="0" err="1" smtClean="0"/>
+              <a:t>microcontrolada</a:t>
+            </a:r>
+            <a:r>
+              <a:rPr lang="pt-BR" dirty="0" smtClean="0"/>
+              <a:t> (</a:t>
+            </a:r>
+            <a:r>
+              <a:rPr lang="pt-BR" dirty="0" err="1" smtClean="0"/>
+              <a:t>Arduino</a:t>
+            </a:r>
+            <a:r>
+              <a:rPr lang="pt-BR" dirty="0" smtClean="0"/>
+              <a:t>, por exemplo).</a:t>
             </a:r>
             <a:endParaRPr lang="pt-BR" dirty="0"/>
           </a:p>
@@ -11164,7 +11158,131 @@
     </p:spTree>
     <p:extLst>
       <p:ext uri="{BB962C8B-B14F-4D97-AF65-F5344CB8AC3E}">
-        <p14:creationId xmlns:p14="http://schemas.microsoft.com/office/powerpoint/2010/main" val="1716499950"/>
+        <p14:creationId xmlns:p14="http://schemas.microsoft.com/office/powerpoint/2010/main" val="1981493022"/>
+      </p:ext>
+    </p:extLst>
+  </p:cSld>
+  <p:clrMapOvr>
+    <a:masterClrMapping/>
+  </p:clrMapOvr>
+</p:sld>
+</file>
+
+<file path=ppt/slides/slide49.xml><?xml version="1.0" encoding="utf-8"?>
+<p:sld xmlns:a="http://schemas.openxmlformats.org/drawingml/2006/main" xmlns:r="http://schemas.openxmlformats.org/officeDocument/2006/relationships" xmlns:p="http://schemas.openxmlformats.org/presentationml/2006/main">
+  <p:cSld>
+    <p:spTree>
+      <p:nvGrpSpPr>
+        <p:cNvPr id="1" name=""/>
+        <p:cNvGrpSpPr/>
+        <p:nvPr/>
+      </p:nvGrpSpPr>
+      <p:grpSpPr>
+        <a:xfrm>
+          <a:off x="0" y="0"/>
+          <a:ext cx="0" cy="0"/>
+          <a:chOff x="0" y="0"/>
+          <a:chExt cx="0" cy="0"/>
+        </a:xfrm>
+      </p:grpSpPr>
+      <p:sp>
+        <p:nvSpPr>
+          <p:cNvPr id="2" name="Título 1"/>
+          <p:cNvSpPr>
+            <a:spLocks noGrp="1"/>
+          </p:cNvSpPr>
+          <p:nvPr>
+            <p:ph type="title"/>
+          </p:nvPr>
+        </p:nvSpPr>
+        <p:spPr/>
+        <p:txBody>
+          <a:bodyPr/>
+          <a:lstStyle/>
+          <a:p>
+            <a:r>
+              <a:rPr lang="pt-BR" dirty="0" smtClean="0"/>
+              <a:t>Entendendo um interruptor</a:t>
+            </a:r>
+            <a:endParaRPr lang="pt-BR" dirty="0"/>
+          </a:p>
+        </p:txBody>
+      </p:sp>
+      <p:sp>
+        <p:nvSpPr>
+          <p:cNvPr id="3" name="Espaço Reservado para Conteúdo 2"/>
+          <p:cNvSpPr>
+            <a:spLocks noGrp="1"/>
+          </p:cNvSpPr>
+          <p:nvPr>
+            <p:ph idx="1"/>
+          </p:nvPr>
+        </p:nvSpPr>
+        <p:spPr/>
+        <p:txBody>
+          <a:bodyPr/>
+          <a:lstStyle/>
+          <a:p>
+            <a:pPr marL="0" indent="0">
+              <a:buNone/>
+            </a:pPr>
+            <a:r>
+              <a:rPr lang="pt-BR" dirty="0"/>
+              <a:t>Tal como o nome já diz, ele tem a capacidade de interromper o fluxo de energia e </a:t>
+            </a:r>
+            <a:r>
+              <a:rPr lang="pt-BR" dirty="0" smtClean="0"/>
+              <a:t>vice-versa.</a:t>
+            </a:r>
+            <a:endParaRPr lang="pt-BR" dirty="0"/>
+          </a:p>
+        </p:txBody>
+      </p:sp>
+      <p:pic>
+        <p:nvPicPr>
+          <p:cNvPr id="1026" name="Picture 2" descr="Interruptor residencial"/>
+          <p:cNvPicPr>
+            <a:picLocks noChangeAspect="1" noChangeArrowheads="1"/>
+          </p:cNvPicPr>
+          <p:nvPr/>
+        </p:nvPicPr>
+        <p:blipFill>
+          <a:blip r:embed="rId2">
+            <a:extLst>
+              <a:ext uri="{28A0092B-C50C-407E-A947-70E740481C1C}">
+                <a14:useLocalDpi xmlns:a14="http://schemas.microsoft.com/office/drawing/2010/main" val="0"/>
+              </a:ext>
+            </a:extLst>
+          </a:blip>
+          <a:srcRect/>
+          <a:stretch>
+            <a:fillRect/>
+          </a:stretch>
+        </p:blipFill>
+        <p:spPr bwMode="auto">
+          <a:xfrm>
+            <a:off x="4295775" y="2909888"/>
+            <a:ext cx="3600450" cy="3267075"/>
+          </a:xfrm>
+          <a:prstGeom prst="rect">
+            <a:avLst/>
+          </a:prstGeom>
+          <a:noFill/>
+          <a:extLst>
+            <a:ext uri="{909E8E84-426E-40DD-AFC4-6F175D3DCCD1}">
+              <a14:hiddenFill xmlns:a14="http://schemas.microsoft.com/office/drawing/2010/main">
+                <a:solidFill>
+                  <a:srgbClr val="FFFFFF"/>
+                </a:solidFill>
+              </a14:hiddenFill>
+            </a:ext>
+          </a:extLst>
+        </p:spPr>
+      </p:pic>
+    </p:spTree>
+    <p:extLst>
+      <p:ext uri="{BB962C8B-B14F-4D97-AF65-F5344CB8AC3E}">
+        <p14:creationId xmlns:p14="http://schemas.microsoft.com/office/powerpoint/2010/main" val="628887274"/>
       </p:ext>
     </p:extLst>
   </p:cSld>
@@ -11285,6 +11403,395 @@
     <p:extLst>
       <p:ext uri="{BB962C8B-B14F-4D97-AF65-F5344CB8AC3E}">
         <p14:creationId xmlns:p14="http://schemas.microsoft.com/office/powerpoint/2010/main" val="434719965"/>
+      </p:ext>
+    </p:extLst>
+  </p:cSld>
+  <p:clrMapOvr>
+    <a:masterClrMapping/>
+  </p:clrMapOvr>
+</p:sld>
+</file>
+
+<file path=ppt/slides/slide50.xml><?xml version="1.0" encoding="utf-8"?>
+<p:sld xmlns:a="http://schemas.openxmlformats.org/drawingml/2006/main" xmlns:r="http://schemas.openxmlformats.org/officeDocument/2006/relationships" xmlns:p="http://schemas.openxmlformats.org/presentationml/2006/main">
+  <p:cSld>
+    <p:spTree>
+      <p:nvGrpSpPr>
+        <p:cNvPr id="1" name=""/>
+        <p:cNvGrpSpPr/>
+        <p:nvPr/>
+      </p:nvGrpSpPr>
+      <p:grpSpPr>
+        <a:xfrm>
+          <a:off x="0" y="0"/>
+          <a:ext cx="0" cy="0"/>
+          <a:chOff x="0" y="0"/>
+          <a:chExt cx="0" cy="0"/>
+        </a:xfrm>
+      </p:grpSpPr>
+      <p:sp>
+        <p:nvSpPr>
+          <p:cNvPr id="2" name="Título 1"/>
+          <p:cNvSpPr>
+            <a:spLocks noGrp="1"/>
+          </p:cNvSpPr>
+          <p:nvPr>
+            <p:ph type="title"/>
+          </p:nvPr>
+        </p:nvSpPr>
+        <p:spPr/>
+        <p:txBody>
+          <a:bodyPr/>
+          <a:lstStyle/>
+          <a:p>
+            <a:r>
+              <a:rPr lang="pt-BR" dirty="0" smtClean="0"/>
+              <a:t>Entendendo um relé</a:t>
+            </a:r>
+            <a:endParaRPr lang="pt-BR" dirty="0"/>
+          </a:p>
+        </p:txBody>
+      </p:sp>
+      <p:sp>
+        <p:nvSpPr>
+          <p:cNvPr id="3" name="Espaço Reservado para Conteúdo 2"/>
+          <p:cNvSpPr>
+            <a:spLocks noGrp="1"/>
+          </p:cNvSpPr>
+          <p:nvPr>
+            <p:ph idx="1"/>
+          </p:nvPr>
+        </p:nvSpPr>
+        <p:spPr/>
+        <p:txBody>
+          <a:bodyPr/>
+          <a:lstStyle/>
+          <a:p>
+            <a:pPr marL="0" indent="0">
+              <a:buNone/>
+            </a:pPr>
+            <a:r>
+              <a:rPr lang="pt-BR" dirty="0" smtClean="0"/>
+              <a:t>O relé </a:t>
+            </a:r>
+            <a:r>
+              <a:rPr lang="pt-BR" dirty="0"/>
+              <a:t>possui um eletroímã, ou </a:t>
+            </a:r>
+            <a:r>
+              <a:rPr lang="pt-BR" dirty="0" smtClean="0"/>
+              <a:t>seja, uma </a:t>
+            </a:r>
+            <a:r>
+              <a:rPr lang="pt-BR" dirty="0"/>
+              <a:t>bobina que quando energizada </a:t>
+            </a:r>
+            <a:r>
+              <a:rPr lang="pt-BR" dirty="0" smtClean="0"/>
+              <a:t>cria </a:t>
+            </a:r>
+            <a:r>
+              <a:rPr lang="pt-BR" dirty="0"/>
+              <a:t>um campo </a:t>
+            </a:r>
+            <a:r>
+              <a:rPr lang="pt-BR" dirty="0" smtClean="0"/>
+              <a:t>eletromagnético. </a:t>
+            </a:r>
+            <a:r>
+              <a:rPr lang="pt-BR" dirty="0"/>
+              <a:t>Devido a força de atração magnética do </a:t>
+            </a:r>
+            <a:r>
+              <a:rPr lang="pt-BR" dirty="0" smtClean="0"/>
+              <a:t>eletroímã, </a:t>
+            </a:r>
+            <a:r>
+              <a:rPr lang="pt-BR" dirty="0"/>
+              <a:t>teremos a movimentação </a:t>
+            </a:r>
+            <a:r>
+              <a:rPr lang="pt-BR" dirty="0" smtClean="0"/>
+              <a:t>de um </a:t>
+            </a:r>
+            <a:r>
+              <a:rPr lang="pt-BR" smtClean="0"/>
+              <a:t>interruptor interno.</a:t>
+            </a:r>
+            <a:endParaRPr lang="pt-BR" dirty="0"/>
+          </a:p>
+        </p:txBody>
+      </p:sp>
+      <p:pic>
+        <p:nvPicPr>
+          <p:cNvPr id="2050" name="Picture 2" descr="Dentro de um relé"/>
+          <p:cNvPicPr>
+            <a:picLocks noChangeAspect="1" noChangeArrowheads="1"/>
+          </p:cNvPicPr>
+          <p:nvPr/>
+        </p:nvPicPr>
+        <p:blipFill>
+          <a:blip r:embed="rId2">
+            <a:extLst>
+              <a:ext uri="{28A0092B-C50C-407E-A947-70E740481C1C}">
+                <a14:useLocalDpi xmlns:a14="http://schemas.microsoft.com/office/drawing/2010/main" val="0"/>
+              </a:ext>
+            </a:extLst>
+          </a:blip>
+          <a:srcRect/>
+          <a:stretch>
+            <a:fillRect/>
+          </a:stretch>
+        </p:blipFill>
+        <p:spPr bwMode="auto">
+          <a:xfrm>
+            <a:off x="4471988" y="3509963"/>
+            <a:ext cx="3248025" cy="2667000"/>
+          </a:xfrm>
+          <a:prstGeom prst="rect">
+            <a:avLst/>
+          </a:prstGeom>
+          <a:noFill/>
+          <a:extLst>
+            <a:ext uri="{909E8E84-426E-40DD-AFC4-6F175D3DCCD1}">
+              <a14:hiddenFill xmlns:a14="http://schemas.microsoft.com/office/drawing/2010/main">
+                <a:solidFill>
+                  <a:srgbClr val="FFFFFF"/>
+                </a:solidFill>
+              </a14:hiddenFill>
+            </a:ext>
+          </a:extLst>
+        </p:spPr>
+      </p:pic>
+    </p:spTree>
+    <p:extLst>
+      <p:ext uri="{BB962C8B-B14F-4D97-AF65-F5344CB8AC3E}">
+        <p14:creationId xmlns:p14="http://schemas.microsoft.com/office/powerpoint/2010/main" val="1552913730"/>
+      </p:ext>
+    </p:extLst>
+  </p:cSld>
+  <p:clrMapOvr>
+    <a:masterClrMapping/>
+  </p:clrMapOvr>
+</p:sld>
+</file>
+
+<file path=ppt/slides/slide51.xml><?xml version="1.0" encoding="utf-8"?>
+<p:sld xmlns:a="http://schemas.openxmlformats.org/drawingml/2006/main" xmlns:r="http://schemas.openxmlformats.org/officeDocument/2006/relationships" xmlns:p="http://schemas.openxmlformats.org/presentationml/2006/main">
+  <p:cSld>
+    <p:spTree>
+      <p:nvGrpSpPr>
+        <p:cNvPr id="1" name=""/>
+        <p:cNvGrpSpPr/>
+        <p:nvPr/>
+      </p:nvGrpSpPr>
+      <p:grpSpPr>
+        <a:xfrm>
+          <a:off x="0" y="0"/>
+          <a:ext cx="0" cy="0"/>
+          <a:chOff x="0" y="0"/>
+          <a:chExt cx="0" cy="0"/>
+        </a:xfrm>
+      </p:grpSpPr>
+      <p:sp>
+        <p:nvSpPr>
+          <p:cNvPr id="2" name="Título 1"/>
+          <p:cNvSpPr>
+            <a:spLocks noGrp="1"/>
+          </p:cNvSpPr>
+          <p:nvPr>
+            <p:ph type="title"/>
+          </p:nvPr>
+        </p:nvSpPr>
+        <p:spPr/>
+        <p:txBody>
+          <a:bodyPr/>
+          <a:lstStyle/>
+          <a:p>
+            <a:r>
+              <a:rPr lang="pt-BR" dirty="0"/>
+              <a:t>Referências Bluetooth</a:t>
+            </a:r>
+          </a:p>
+        </p:txBody>
+      </p:sp>
+      <p:sp>
+        <p:nvSpPr>
+          <p:cNvPr id="3" name="Espaço Reservado para Conteúdo 2"/>
+          <p:cNvSpPr>
+            <a:spLocks noGrp="1"/>
+          </p:cNvSpPr>
+          <p:nvPr>
+            <p:ph idx="1"/>
+          </p:nvPr>
+        </p:nvSpPr>
+        <p:spPr/>
+        <p:txBody>
+          <a:bodyPr>
+            <a:normAutofit lnSpcReduction="10000"/>
+          </a:bodyPr>
+          <a:lstStyle/>
+          <a:p>
+            <a:r>
+              <a:rPr lang="pt-BR" dirty="0">
+                <a:hlinkClick r:id="rId2"/>
+              </a:rPr>
+              <a:t>https://www.electronicwings.com/sensors-modules/bluetooth-module-hc-05-</a:t>
+            </a:r>
+            <a:endParaRPr lang="pt-BR" dirty="0">
+              <a:hlinkClick r:id="rId3"/>
+            </a:endParaRPr>
+          </a:p>
+          <a:p>
+            <a:r>
+              <a:rPr lang="pt-BR" dirty="0">
+                <a:hlinkClick r:id="rId3"/>
+              </a:rPr>
+              <a:t>https://maker.pro/arduino/tutorial/bluetooth-basics-how-to-control-led-using-smartphone-arduino</a:t>
+            </a:r>
+            <a:endParaRPr lang="pt-BR" dirty="0"/>
+          </a:p>
+          <a:p>
+            <a:r>
+              <a:rPr lang="pt-BR" dirty="0">
+                <a:hlinkClick r:id="rId4"/>
+              </a:rPr>
+              <a:t>https://howtomechatronics.com/tutorials/arduino/arduino-and-hc-05-bluetooth-module-tutorial/</a:t>
+            </a:r>
+            <a:endParaRPr lang="pt-BR" dirty="0"/>
+          </a:p>
+          <a:p>
+            <a:r>
+              <a:rPr lang="pt-BR" dirty="0">
+                <a:hlinkClick r:id="rId5"/>
+              </a:rPr>
+              <a:t>http://www.instructables.com/id/Tutorial-Using-HC06-Bluetooth-to-Serial-Wireless-U/</a:t>
+            </a:r>
+            <a:endParaRPr lang="pt-BR" dirty="0"/>
+          </a:p>
+          <a:p>
+            <a:r>
+              <a:rPr lang="en-US" dirty="0">
+                <a:hlinkClick r:id="rId6"/>
+              </a:rPr>
+              <a:t>https://www.instructables.com/id/AT-command-mode-of-HC-05-Bluetooth-module/</a:t>
+            </a:r>
+            <a:endParaRPr lang="pt-BR" dirty="0"/>
+          </a:p>
+        </p:txBody>
+      </p:sp>
+    </p:spTree>
+    <p:extLst>
+      <p:ext uri="{BB962C8B-B14F-4D97-AF65-F5344CB8AC3E}">
+        <p14:creationId xmlns:p14="http://schemas.microsoft.com/office/powerpoint/2010/main" val="2022734056"/>
+      </p:ext>
+    </p:extLst>
+  </p:cSld>
+  <p:clrMapOvr>
+    <a:masterClrMapping/>
+  </p:clrMapOvr>
+</p:sld>
+</file>
+
+<file path=ppt/slides/slide52.xml><?xml version="1.0" encoding="utf-8"?>
+<p:sld xmlns:a="http://schemas.openxmlformats.org/drawingml/2006/main" xmlns:r="http://schemas.openxmlformats.org/officeDocument/2006/relationships" xmlns:p="http://schemas.openxmlformats.org/presentationml/2006/main">
+  <p:cSld>
+    <p:spTree>
+      <p:nvGrpSpPr>
+        <p:cNvPr id="1" name=""/>
+        <p:cNvGrpSpPr/>
+        <p:nvPr/>
+      </p:nvGrpSpPr>
+      <p:grpSpPr>
+        <a:xfrm>
+          <a:off x="0" y="0"/>
+          <a:ext cx="0" cy="0"/>
+          <a:chOff x="0" y="0"/>
+          <a:chExt cx="0" cy="0"/>
+        </a:xfrm>
+      </p:grpSpPr>
+      <p:sp>
+        <p:nvSpPr>
+          <p:cNvPr id="2" name="Título 1"/>
+          <p:cNvSpPr>
+            <a:spLocks noGrp="1"/>
+          </p:cNvSpPr>
+          <p:nvPr>
+            <p:ph type="title"/>
+          </p:nvPr>
+        </p:nvSpPr>
+        <p:spPr/>
+        <p:txBody>
+          <a:bodyPr/>
+          <a:lstStyle/>
+          <a:p>
+            <a:r>
+              <a:rPr lang="pt-BR" dirty="0"/>
+              <a:t>Referências Relé</a:t>
+            </a:r>
+          </a:p>
+        </p:txBody>
+      </p:sp>
+      <p:sp>
+        <p:nvSpPr>
+          <p:cNvPr id="3" name="Espaço Reservado para Conteúdo 2"/>
+          <p:cNvSpPr>
+            <a:spLocks noGrp="1"/>
+          </p:cNvSpPr>
+          <p:nvPr>
+            <p:ph idx="1"/>
+          </p:nvPr>
+        </p:nvSpPr>
+        <p:spPr/>
+        <p:txBody>
+          <a:bodyPr>
+            <a:normAutofit/>
+          </a:bodyPr>
+          <a:lstStyle/>
+          <a:p>
+            <a:r>
+              <a:rPr lang="en-US" dirty="0">
+                <a:hlinkClick r:id="rId2"/>
+              </a:rPr>
+              <a:t>https://blogmasterwalkershop.com.br/arduino/arduino-utilizando-o-potenciometro-linear/</a:t>
+            </a:r>
+            <a:endParaRPr lang="en-US" dirty="0"/>
+          </a:p>
+          <a:p>
+            <a:r>
+              <a:rPr lang="en-US" dirty="0">
+                <a:hlinkClick r:id="rId3"/>
+              </a:rPr>
+              <a:t>https://portal.vidadesilicio.com.br/lm35-medindo-temperatura-com-arduino/</a:t>
+            </a:r>
+            <a:endParaRPr lang="en-US" dirty="0">
+              <a:hlinkClick r:id="rId4"/>
+            </a:endParaRPr>
+          </a:p>
+          <a:p>
+            <a:r>
+              <a:rPr lang="en-US" dirty="0">
+                <a:hlinkClick r:id="rId4"/>
+              </a:rPr>
+              <a:t>https://blogmasterwalkershop.com.br/arduino/como-usar-com-arduino-modulo-rele-5v-1-canal/</a:t>
+            </a:r>
+            <a:endParaRPr lang="en-US" dirty="0"/>
+          </a:p>
+          <a:p>
+            <a:r>
+              <a:rPr lang="pt-BR" dirty="0">
+                <a:hlinkClick r:id="rId5"/>
+              </a:rPr>
+              <a:t>https://portal.vidadesilicio.com.br/modulo-rele-com-arduino/</a:t>
+            </a:r>
+            <a:endParaRPr lang="pt-BR" dirty="0"/>
+          </a:p>
+        </p:txBody>
+      </p:sp>
+    </p:spTree>
+    <p:extLst>
+      <p:ext uri="{BB962C8B-B14F-4D97-AF65-F5344CB8AC3E}">
+        <p14:creationId xmlns:p14="http://schemas.microsoft.com/office/powerpoint/2010/main" val="1716499950"/>
       </p:ext>
     </p:extLst>
   </p:cSld>

</xml_diff>

<commit_message>
adição dos slides sobre o funcionamento e a prática com o módulo relé
</commit_message>
<xml_diff>
--- a/arduino-bluetooth.pptx
+++ b/arduino-bluetooth.pptx
@@ -5,7 +5,7 @@
     <p:sldMasterId id="2147483648" r:id="rId1"/>
   </p:sldMasterIdLst>
   <p:notesMasterIdLst>
-    <p:notesMasterId r:id="rId54"/>
+    <p:notesMasterId r:id="rId62"/>
   </p:notesMasterIdLst>
   <p:sldIdLst>
     <p:sldId id="256" r:id="rId2"/>
@@ -58,8 +58,16 @@
     <p:sldId id="308" r:id="rId49"/>
     <p:sldId id="309" r:id="rId50"/>
     <p:sldId id="310" r:id="rId51"/>
-    <p:sldId id="258" r:id="rId52"/>
-    <p:sldId id="292" r:id="rId53"/>
+    <p:sldId id="311" r:id="rId52"/>
+    <p:sldId id="312" r:id="rId53"/>
+    <p:sldId id="313" r:id="rId54"/>
+    <p:sldId id="314" r:id="rId55"/>
+    <p:sldId id="315" r:id="rId56"/>
+    <p:sldId id="317" r:id="rId57"/>
+    <p:sldId id="318" r:id="rId58"/>
+    <p:sldId id="316" r:id="rId59"/>
+    <p:sldId id="258" r:id="rId60"/>
+    <p:sldId id="292" r:id="rId61"/>
   </p:sldIdLst>
   <p:sldSz cx="12192000" cy="6858000"/>
   <p:notesSz cx="6858000" cy="9144000"/>
@@ -260,7 +268,7 @@
           <a:p>
             <a:fld id="{3C44614C-A7EC-484E-A837-A5758579D5D4}" type="datetimeFigureOut">
               <a:rPr lang="pt-BR" smtClean="0"/>
-              <a:t>07/11/2019</a:t>
+              <a:t>08/11/2019</a:t>
             </a:fld>
             <a:endParaRPr lang="pt-BR"/>
           </a:p>
@@ -419,7 +427,7 @@
           <a:p>
             <a:fld id="{63C9BDA7-C22B-4A92-921B-5E8BACDF8EBE}" type="slidenum">
               <a:rPr lang="pt-BR" smtClean="0"/>
-              <a:t>‹nº›</a:t>
+              <a:t>‹#›</a:t>
             </a:fld>
             <a:endParaRPr lang="pt-BR"/>
           </a:p>
@@ -1282,6 +1290,380 @@
 </p:notes>
 </file>
 
+<file path=ppt/notesSlides/notesSlide8.xml><?xml version="1.0" encoding="utf-8"?>
+<p:notes xmlns:a="http://schemas.openxmlformats.org/drawingml/2006/main" xmlns:r="http://schemas.openxmlformats.org/officeDocument/2006/relationships" xmlns:p="http://schemas.openxmlformats.org/presentationml/2006/main">
+  <p:cSld>
+    <p:spTree>
+      <p:nvGrpSpPr>
+        <p:cNvPr id="1" name=""/>
+        <p:cNvGrpSpPr/>
+        <p:nvPr/>
+      </p:nvGrpSpPr>
+      <p:grpSpPr>
+        <a:xfrm>
+          <a:off x="0" y="0"/>
+          <a:ext cx="0" cy="0"/>
+          <a:chOff x="0" y="0"/>
+          <a:chExt cx="0" cy="0"/>
+        </a:xfrm>
+      </p:grpSpPr>
+      <p:sp>
+        <p:nvSpPr>
+          <p:cNvPr id="2" name="Slide Image Placeholder 1"/>
+          <p:cNvSpPr>
+            <a:spLocks noGrp="1" noRot="1" noChangeAspect="1"/>
+          </p:cNvSpPr>
+          <p:nvPr>
+            <p:ph type="sldImg"/>
+          </p:nvPr>
+        </p:nvSpPr>
+        <p:spPr/>
+      </p:sp>
+      <p:sp>
+        <p:nvSpPr>
+          <p:cNvPr id="3" name="Notes Placeholder 2"/>
+          <p:cNvSpPr>
+            <a:spLocks noGrp="1"/>
+          </p:cNvSpPr>
+          <p:nvPr>
+            <p:ph type="body" idx="1"/>
+          </p:nvPr>
+        </p:nvSpPr>
+        <p:spPr/>
+        <p:txBody>
+          <a:bodyPr/>
+          <a:lstStyle/>
+          <a:p>
+            <a:pPr marL="0" marR="0" lvl="0" indent="0" algn="l" defTabSz="914400" rtl="0" eaLnBrk="1" fontAlgn="auto" latinLnBrk="0" hangingPunct="1">
+              <a:lnSpc>
+                <a:spcPct val="100000"/>
+              </a:lnSpc>
+              <a:spcBef>
+                <a:spcPts val="0"/>
+              </a:spcBef>
+              <a:spcAft>
+                <a:spcPts val="0"/>
+              </a:spcAft>
+              <a:buClrTx/>
+              <a:buSzTx/>
+              <a:buFontTx/>
+              <a:buNone/>
+              <a:tabLst/>
+              <a:defRPr/>
+            </a:pPr>
+            <a:r>
+              <a:rPr lang="pt-BR" dirty="0"/>
+              <a:t>Apesar de a bobina relé demandar uma corrente e uma tensão baixa, ainda assim o relé precisa de mais energia do que uma porta digital da sua placa Arduino pode fornecer.</a:t>
+            </a:r>
+          </a:p>
+          <a:p>
+            <a:pPr marL="0" marR="0" lvl="0" indent="0" algn="l" defTabSz="914400" rtl="0" eaLnBrk="1" fontAlgn="auto" latinLnBrk="0" hangingPunct="1">
+              <a:lnSpc>
+                <a:spcPct val="100000"/>
+              </a:lnSpc>
+              <a:spcBef>
+                <a:spcPts val="0"/>
+              </a:spcBef>
+              <a:spcAft>
+                <a:spcPts val="0"/>
+              </a:spcAft>
+              <a:buClrTx/>
+              <a:buSzTx/>
+              <a:buFontTx/>
+              <a:buNone/>
+              <a:tabLst/>
+              <a:defRPr/>
+            </a:pPr>
+            <a:r>
+              <a:rPr lang="pt-BR" dirty="0"/>
+              <a:t>, não é trivial, mas já pode ser encontrado pronto nos módulos relés muito usados com Arduino. Esse tipo de módulo poupa tempo e é muito simples de usar</a:t>
+            </a:r>
+          </a:p>
+        </p:txBody>
+      </p:sp>
+      <p:sp>
+        <p:nvSpPr>
+          <p:cNvPr id="4" name="Slide Number Placeholder 3"/>
+          <p:cNvSpPr>
+            <a:spLocks noGrp="1"/>
+          </p:cNvSpPr>
+          <p:nvPr>
+            <p:ph type="sldNum" sz="quarter" idx="5"/>
+          </p:nvPr>
+        </p:nvSpPr>
+        <p:spPr/>
+        <p:txBody>
+          <a:bodyPr/>
+          <a:lstStyle/>
+          <a:p>
+            <a:fld id="{63C9BDA7-C22B-4A92-921B-5E8BACDF8EBE}" type="slidenum">
+              <a:rPr lang="pt-BR" smtClean="0"/>
+              <a:t>51</a:t>
+            </a:fld>
+            <a:endParaRPr lang="pt-BR"/>
+          </a:p>
+        </p:txBody>
+      </p:sp>
+    </p:spTree>
+    <p:extLst>
+      <p:ext uri="{BB962C8B-B14F-4D97-AF65-F5344CB8AC3E}">
+        <p14:creationId xmlns:p14="http://schemas.microsoft.com/office/powerpoint/2010/main" val="3755982363"/>
+      </p:ext>
+    </p:extLst>
+  </p:cSld>
+  <p:clrMapOvr>
+    <a:masterClrMapping/>
+  </p:clrMapOvr>
+</p:notes>
+</file>
+
+<file path=ppt/notesSlides/notesSlide9.xml><?xml version="1.0" encoding="utf-8"?>
+<p:notes xmlns:a="http://schemas.openxmlformats.org/drawingml/2006/main" xmlns:r="http://schemas.openxmlformats.org/officeDocument/2006/relationships" xmlns:p="http://schemas.openxmlformats.org/presentationml/2006/main">
+  <p:cSld>
+    <p:spTree>
+      <p:nvGrpSpPr>
+        <p:cNvPr id="1" name=""/>
+        <p:cNvGrpSpPr/>
+        <p:nvPr/>
+      </p:nvGrpSpPr>
+      <p:grpSpPr>
+        <a:xfrm>
+          <a:off x="0" y="0"/>
+          <a:ext cx="0" cy="0"/>
+          <a:chOff x="0" y="0"/>
+          <a:chExt cx="0" cy="0"/>
+        </a:xfrm>
+      </p:grpSpPr>
+      <p:sp>
+        <p:nvSpPr>
+          <p:cNvPr id="2" name="Slide Image Placeholder 1"/>
+          <p:cNvSpPr>
+            <a:spLocks noGrp="1" noRot="1" noChangeAspect="1"/>
+          </p:cNvSpPr>
+          <p:nvPr>
+            <p:ph type="sldImg"/>
+          </p:nvPr>
+        </p:nvSpPr>
+        <p:spPr/>
+      </p:sp>
+      <p:sp>
+        <p:nvSpPr>
+          <p:cNvPr id="3" name="Notes Placeholder 2"/>
+          <p:cNvSpPr>
+            <a:spLocks noGrp="1"/>
+          </p:cNvSpPr>
+          <p:nvPr>
+            <p:ph type="body" idx="1"/>
+          </p:nvPr>
+        </p:nvSpPr>
+        <p:spPr/>
+        <p:txBody>
+          <a:bodyPr/>
+          <a:lstStyle/>
+          <a:p>
+            <a:r>
+              <a:rPr lang="pt-BR" sz="1200" b="0" i="1" kern="1200" dirty="0">
+                <a:solidFill>
+                  <a:schemeClr val="tx1"/>
+                </a:solidFill>
+                <a:effectLst/>
+                <a:latin typeface="+mn-lt"/>
+                <a:ea typeface="+mn-ea"/>
+                <a:cs typeface="+mn-cs"/>
+              </a:rPr>
+              <a:t>Tensão em A0 = (Valor lido em A0)*(5/1023)</a:t>
+            </a:r>
+            <a:endParaRPr lang="pt-BR" sz="1200" b="0" i="0" kern="1200" dirty="0">
+              <a:solidFill>
+                <a:schemeClr val="tx1"/>
+              </a:solidFill>
+              <a:effectLst/>
+              <a:latin typeface="+mn-lt"/>
+              <a:ea typeface="+mn-ea"/>
+              <a:cs typeface="+mn-cs"/>
+            </a:endParaRPr>
+          </a:p>
+          <a:p>
+            <a:r>
+              <a:rPr lang="pt-BR" sz="1200" b="0" i="1" kern="1200" dirty="0">
+                <a:solidFill>
+                  <a:schemeClr val="tx1"/>
+                </a:solidFill>
+                <a:effectLst/>
+                <a:latin typeface="+mn-lt"/>
+                <a:ea typeface="+mn-ea"/>
+                <a:cs typeface="+mn-cs"/>
+              </a:rPr>
+              <a:t>Temperatura = Tensão em A0/10mV</a:t>
+            </a:r>
+            <a:endParaRPr lang="pt-BR" sz="1200" b="0" i="0" kern="1200" dirty="0">
+              <a:solidFill>
+                <a:schemeClr val="tx1"/>
+              </a:solidFill>
+              <a:effectLst/>
+              <a:latin typeface="+mn-lt"/>
+              <a:ea typeface="+mn-ea"/>
+              <a:cs typeface="+mn-cs"/>
+            </a:endParaRPr>
+          </a:p>
+          <a:p>
+            <a:r>
+              <a:rPr lang="pt-BR" sz="1200" b="0" i="0" kern="1200" dirty="0">
+                <a:solidFill>
+                  <a:schemeClr val="tx1"/>
+                </a:solidFill>
+                <a:effectLst/>
+                <a:latin typeface="+mn-lt"/>
+                <a:ea typeface="+mn-ea"/>
+                <a:cs typeface="+mn-cs"/>
+              </a:rPr>
+              <a:t>Logo:</a:t>
+            </a:r>
+          </a:p>
+          <a:p>
+            <a:r>
+              <a:rPr lang="pt-BR" sz="1200" b="0" i="0" kern="1200" dirty="0">
+                <a:solidFill>
+                  <a:schemeClr val="tx1"/>
+                </a:solidFill>
+                <a:effectLst/>
+                <a:latin typeface="+mn-lt"/>
+                <a:ea typeface="+mn-ea"/>
+                <a:cs typeface="+mn-cs"/>
+              </a:rPr>
+              <a:t>Temperatura =  [(Valor lido em A0)*(5/1023)]/10mV</a:t>
+            </a:r>
+          </a:p>
+          <a:p>
+            <a:r>
+              <a:rPr lang="pt-BR" sz="1200" b="0" i="0" kern="1200" dirty="0">
+                <a:solidFill>
+                  <a:schemeClr val="tx1"/>
+                </a:solidFill>
+                <a:effectLst/>
+                <a:latin typeface="+mn-lt"/>
+                <a:ea typeface="+mn-ea"/>
+                <a:cs typeface="+mn-cs"/>
+              </a:rPr>
+              <a:t>Em linguagem de programação, ficará:</a:t>
+            </a:r>
+          </a:p>
+          <a:p>
+            <a:pPr rtl="0" fontAlgn="t"/>
+            <a:endParaRPr lang="pt-BR" sz="1200" b="1" i="0" kern="1200" dirty="0">
+              <a:solidFill>
+                <a:schemeClr val="tx1"/>
+              </a:solidFill>
+              <a:effectLst/>
+              <a:latin typeface="+mn-lt"/>
+              <a:ea typeface="+mn-ea"/>
+              <a:cs typeface="+mn-cs"/>
+            </a:endParaRPr>
+          </a:p>
+          <a:p>
+            <a:pPr rtl="0" fontAlgn="t"/>
+            <a:r>
+              <a:rPr lang="pt-BR" sz="1200" b="1" i="0" kern="1200" dirty="0">
+                <a:solidFill>
+                  <a:schemeClr val="tx1"/>
+                </a:solidFill>
+                <a:effectLst/>
+                <a:latin typeface="+mn-lt"/>
+                <a:ea typeface="+mn-ea"/>
+                <a:cs typeface="+mn-cs"/>
+              </a:rPr>
+              <a:t>temperatura = (</a:t>
+            </a:r>
+            <a:r>
+              <a:rPr lang="pt-BR" sz="1200" b="1" i="0" kern="1200" dirty="0" err="1">
+                <a:solidFill>
+                  <a:schemeClr val="tx1"/>
+                </a:solidFill>
+                <a:effectLst/>
+                <a:latin typeface="+mn-lt"/>
+                <a:ea typeface="+mn-ea"/>
+                <a:cs typeface="+mn-cs"/>
+              </a:rPr>
+              <a:t>float</a:t>
+            </a:r>
+            <a:r>
+              <a:rPr lang="pt-BR" sz="1200" b="1" i="0" kern="1200" dirty="0">
+                <a:solidFill>
+                  <a:schemeClr val="tx1"/>
+                </a:solidFill>
+                <a:effectLst/>
+                <a:latin typeface="+mn-lt"/>
+                <a:ea typeface="+mn-ea"/>
+                <a:cs typeface="+mn-cs"/>
+              </a:rPr>
+              <a:t>(</a:t>
+            </a:r>
+            <a:r>
+              <a:rPr lang="pt-BR" sz="1200" b="1" i="0" kern="1200" dirty="0" err="1">
+                <a:solidFill>
+                  <a:schemeClr val="tx1"/>
+                </a:solidFill>
+                <a:effectLst/>
+                <a:latin typeface="+mn-lt"/>
+                <a:ea typeface="+mn-ea"/>
+                <a:cs typeface="+mn-cs"/>
+              </a:rPr>
+              <a:t>analogRead</a:t>
+            </a:r>
+            <a:r>
+              <a:rPr lang="pt-BR" sz="1200" b="1" i="0" kern="1200" dirty="0">
+                <a:solidFill>
+                  <a:schemeClr val="tx1"/>
+                </a:solidFill>
+                <a:effectLst/>
+                <a:latin typeface="+mn-lt"/>
+                <a:ea typeface="+mn-ea"/>
+                <a:cs typeface="+mn-cs"/>
+              </a:rPr>
+              <a:t>(LM35))*5/(1023))/0.01;</a:t>
+            </a:r>
+          </a:p>
+          <a:p>
+            <a:endParaRPr lang="pt-BR" dirty="0"/>
+          </a:p>
+        </p:txBody>
+      </p:sp>
+      <p:sp>
+        <p:nvSpPr>
+          <p:cNvPr id="4" name="Slide Number Placeholder 3"/>
+          <p:cNvSpPr>
+            <a:spLocks noGrp="1"/>
+          </p:cNvSpPr>
+          <p:nvPr>
+            <p:ph type="sldNum" sz="quarter" idx="5"/>
+          </p:nvPr>
+        </p:nvSpPr>
+        <p:spPr/>
+        <p:txBody>
+          <a:bodyPr/>
+          <a:lstStyle/>
+          <a:p>
+            <a:fld id="{63C9BDA7-C22B-4A92-921B-5E8BACDF8EBE}" type="slidenum">
+              <a:rPr lang="pt-BR" smtClean="0"/>
+              <a:t>57</a:t>
+            </a:fld>
+            <a:endParaRPr lang="pt-BR"/>
+          </a:p>
+        </p:txBody>
+      </p:sp>
+    </p:spTree>
+    <p:extLst>
+      <p:ext uri="{BB962C8B-B14F-4D97-AF65-F5344CB8AC3E}">
+        <p14:creationId xmlns:p14="http://schemas.microsoft.com/office/powerpoint/2010/main" val="1650877894"/>
+      </p:ext>
+    </p:extLst>
+  </p:cSld>
+  <p:clrMapOvr>
+    <a:masterClrMapping/>
+  </p:clrMapOvr>
+</p:notes>
+</file>
+
 <file path=ppt/slideLayouts/slideLayout1.xml><?xml version="1.0" encoding="utf-8"?>
 <p:sldLayout xmlns:a="http://schemas.openxmlformats.org/drawingml/2006/main" xmlns:r="http://schemas.openxmlformats.org/officeDocument/2006/relationships" xmlns:p="http://schemas.openxmlformats.org/presentationml/2006/main" type="title" preserve="1">
   <p:cSld name="Slide de Título">
@@ -1411,7 +1793,7 @@
           <a:p>
             <a:fld id="{2EDF32D7-A802-4CED-A4B7-23DAC1B43898}" type="datetimeFigureOut">
               <a:rPr lang="pt-BR" smtClean="0"/>
-              <a:t>07/11/2019</a:t>
+              <a:t>08/11/2019</a:t>
             </a:fld>
             <a:endParaRPr lang="pt-BR"/>
           </a:p>
@@ -1453,7 +1835,7 @@
           <a:p>
             <a:fld id="{90CE46F0-10D9-44E0-9B31-88DCFC46CB51}" type="slidenum">
               <a:rPr lang="pt-BR" smtClean="0"/>
-              <a:t>‹nº›</a:t>
+              <a:t>‹#›</a:t>
             </a:fld>
             <a:endParaRPr lang="pt-BR"/>
           </a:p>
@@ -1579,7 +1961,7 @@
           <a:p>
             <a:fld id="{2EDF32D7-A802-4CED-A4B7-23DAC1B43898}" type="datetimeFigureOut">
               <a:rPr lang="pt-BR" smtClean="0"/>
-              <a:t>07/11/2019</a:t>
+              <a:t>08/11/2019</a:t>
             </a:fld>
             <a:endParaRPr lang="pt-BR"/>
           </a:p>
@@ -1621,7 +2003,7 @@
           <a:p>
             <a:fld id="{90CE46F0-10D9-44E0-9B31-88DCFC46CB51}" type="slidenum">
               <a:rPr lang="pt-BR" smtClean="0"/>
-              <a:t>‹nº›</a:t>
+              <a:t>‹#›</a:t>
             </a:fld>
             <a:endParaRPr lang="pt-BR"/>
           </a:p>
@@ -1757,7 +2139,7 @@
           <a:p>
             <a:fld id="{2EDF32D7-A802-4CED-A4B7-23DAC1B43898}" type="datetimeFigureOut">
               <a:rPr lang="pt-BR" smtClean="0"/>
-              <a:t>07/11/2019</a:t>
+              <a:t>08/11/2019</a:t>
             </a:fld>
             <a:endParaRPr lang="pt-BR"/>
           </a:p>
@@ -1799,7 +2181,7 @@
           <a:p>
             <a:fld id="{90CE46F0-10D9-44E0-9B31-88DCFC46CB51}" type="slidenum">
               <a:rPr lang="pt-BR" smtClean="0"/>
-              <a:t>‹nº›</a:t>
+              <a:t>‹#›</a:t>
             </a:fld>
             <a:endParaRPr lang="pt-BR"/>
           </a:p>
@@ -1925,7 +2307,7 @@
           <a:p>
             <a:fld id="{2EDF32D7-A802-4CED-A4B7-23DAC1B43898}" type="datetimeFigureOut">
               <a:rPr lang="pt-BR" smtClean="0"/>
-              <a:t>07/11/2019</a:t>
+              <a:t>08/11/2019</a:t>
             </a:fld>
             <a:endParaRPr lang="pt-BR"/>
           </a:p>
@@ -1967,7 +2349,7 @@
           <a:p>
             <a:fld id="{90CE46F0-10D9-44E0-9B31-88DCFC46CB51}" type="slidenum">
               <a:rPr lang="pt-BR" smtClean="0"/>
-              <a:t>‹nº›</a:t>
+              <a:t>‹#›</a:t>
             </a:fld>
             <a:endParaRPr lang="pt-BR"/>
           </a:p>
@@ -2170,7 +2552,7 @@
           <a:p>
             <a:fld id="{2EDF32D7-A802-4CED-A4B7-23DAC1B43898}" type="datetimeFigureOut">
               <a:rPr lang="pt-BR" smtClean="0"/>
-              <a:t>07/11/2019</a:t>
+              <a:t>08/11/2019</a:t>
             </a:fld>
             <a:endParaRPr lang="pt-BR"/>
           </a:p>
@@ -2212,7 +2594,7 @@
           <a:p>
             <a:fld id="{90CE46F0-10D9-44E0-9B31-88DCFC46CB51}" type="slidenum">
               <a:rPr lang="pt-BR" smtClean="0"/>
-              <a:t>‹nº›</a:t>
+              <a:t>‹#›</a:t>
             </a:fld>
             <a:endParaRPr lang="pt-BR"/>
           </a:p>
@@ -2399,7 +2781,7 @@
           <a:p>
             <a:fld id="{2EDF32D7-A802-4CED-A4B7-23DAC1B43898}" type="datetimeFigureOut">
               <a:rPr lang="pt-BR" smtClean="0"/>
-              <a:t>07/11/2019</a:t>
+              <a:t>08/11/2019</a:t>
             </a:fld>
             <a:endParaRPr lang="pt-BR"/>
           </a:p>
@@ -2441,7 +2823,7 @@
           <a:p>
             <a:fld id="{90CE46F0-10D9-44E0-9B31-88DCFC46CB51}" type="slidenum">
               <a:rPr lang="pt-BR" smtClean="0"/>
-              <a:t>‹nº›</a:t>
+              <a:t>‹#›</a:t>
             </a:fld>
             <a:endParaRPr lang="pt-BR"/>
           </a:p>
@@ -2763,7 +3145,7 @@
           <a:p>
             <a:fld id="{2EDF32D7-A802-4CED-A4B7-23DAC1B43898}" type="datetimeFigureOut">
               <a:rPr lang="pt-BR" smtClean="0"/>
-              <a:t>07/11/2019</a:t>
+              <a:t>08/11/2019</a:t>
             </a:fld>
             <a:endParaRPr lang="pt-BR"/>
           </a:p>
@@ -2805,7 +3187,7 @@
           <a:p>
             <a:fld id="{90CE46F0-10D9-44E0-9B31-88DCFC46CB51}" type="slidenum">
               <a:rPr lang="pt-BR" smtClean="0"/>
-              <a:t>‹nº›</a:t>
+              <a:t>‹#›</a:t>
             </a:fld>
             <a:endParaRPr lang="pt-BR"/>
           </a:p>
@@ -2880,7 +3262,7 @@
           <a:p>
             <a:fld id="{2EDF32D7-A802-4CED-A4B7-23DAC1B43898}" type="datetimeFigureOut">
               <a:rPr lang="pt-BR" smtClean="0"/>
-              <a:t>07/11/2019</a:t>
+              <a:t>08/11/2019</a:t>
             </a:fld>
             <a:endParaRPr lang="pt-BR"/>
           </a:p>
@@ -2922,7 +3304,7 @@
           <a:p>
             <a:fld id="{90CE46F0-10D9-44E0-9B31-88DCFC46CB51}" type="slidenum">
               <a:rPr lang="pt-BR" smtClean="0"/>
-              <a:t>‹nº›</a:t>
+              <a:t>‹#›</a:t>
             </a:fld>
             <a:endParaRPr lang="pt-BR"/>
           </a:p>
@@ -2975,7 +3357,7 @@
           <a:p>
             <a:fld id="{2EDF32D7-A802-4CED-A4B7-23DAC1B43898}" type="datetimeFigureOut">
               <a:rPr lang="pt-BR" smtClean="0"/>
-              <a:t>07/11/2019</a:t>
+              <a:t>08/11/2019</a:t>
             </a:fld>
             <a:endParaRPr lang="pt-BR"/>
           </a:p>
@@ -3017,7 +3399,7 @@
           <a:p>
             <a:fld id="{90CE46F0-10D9-44E0-9B31-88DCFC46CB51}" type="slidenum">
               <a:rPr lang="pt-BR" smtClean="0"/>
-              <a:t>‹nº›</a:t>
+              <a:t>‹#›</a:t>
             </a:fld>
             <a:endParaRPr lang="pt-BR"/>
           </a:p>
@@ -3250,7 +3632,7 @@
           <a:p>
             <a:fld id="{2EDF32D7-A802-4CED-A4B7-23DAC1B43898}" type="datetimeFigureOut">
               <a:rPr lang="pt-BR" smtClean="0"/>
-              <a:t>07/11/2019</a:t>
+              <a:t>08/11/2019</a:t>
             </a:fld>
             <a:endParaRPr lang="pt-BR"/>
           </a:p>
@@ -3292,7 +3674,7 @@
           <a:p>
             <a:fld id="{90CE46F0-10D9-44E0-9B31-88DCFC46CB51}" type="slidenum">
               <a:rPr lang="pt-BR" smtClean="0"/>
-              <a:t>‹nº›</a:t>
+              <a:t>‹#›</a:t>
             </a:fld>
             <a:endParaRPr lang="pt-BR"/>
           </a:p>
@@ -3502,7 +3884,7 @@
           <a:p>
             <a:fld id="{2EDF32D7-A802-4CED-A4B7-23DAC1B43898}" type="datetimeFigureOut">
               <a:rPr lang="pt-BR" smtClean="0"/>
-              <a:t>07/11/2019</a:t>
+              <a:t>08/11/2019</a:t>
             </a:fld>
             <a:endParaRPr lang="pt-BR"/>
           </a:p>
@@ -3544,7 +3926,7 @@
           <a:p>
             <a:fld id="{90CE46F0-10D9-44E0-9B31-88DCFC46CB51}" type="slidenum">
               <a:rPr lang="pt-BR" smtClean="0"/>
-              <a:t>‹nº›</a:t>
+              <a:t>‹#›</a:t>
             </a:fld>
             <a:endParaRPr lang="pt-BR"/>
           </a:p>
@@ -3713,7 +4095,7 @@
           <a:p>
             <a:fld id="{2EDF32D7-A802-4CED-A4B7-23DAC1B43898}" type="datetimeFigureOut">
               <a:rPr lang="pt-BR" smtClean="0"/>
-              <a:t>07/11/2019</a:t>
+              <a:t>08/11/2019</a:t>
             </a:fld>
             <a:endParaRPr lang="pt-BR"/>
           </a:p>
@@ -3791,7 +4173,7 @@
           <a:p>
             <a:fld id="{90CE46F0-10D9-44E0-9B31-88DCFC46CB51}" type="slidenum">
               <a:rPr lang="pt-BR" smtClean="0"/>
-              <a:t>‹nº›</a:t>
+              <a:t>‹#›</a:t>
             </a:fld>
             <a:endParaRPr lang="pt-BR"/>
           </a:p>
@@ -10986,10 +11368,9 @@
           <a:lstStyle/>
           <a:p>
             <a:r>
-              <a:rPr lang="pt-BR" dirty="0" smtClean="0"/>
+              <a:rPr lang="pt-BR" dirty="0"/>
               <a:t>Acionando equipamentos de alta tensão ou corrente</a:t>
             </a:r>
-            <a:endParaRPr lang="pt-BR" dirty="0"/>
           </a:p>
         </p:txBody>
       </p:sp>
@@ -11009,11 +11390,11 @@
           <a:lstStyle/>
           <a:p>
             <a:r>
-              <a:rPr lang="pt-BR" dirty="0" smtClean="0"/>
+              <a:rPr lang="pt-BR" dirty="0"/>
               <a:t>Usando módulo relé com </a:t>
             </a:r>
             <a:r>
-              <a:rPr lang="pt-BR" dirty="0" err="1" smtClean="0"/>
+              <a:rPr lang="pt-BR" dirty="0" err="1"/>
               <a:t>Arduino</a:t>
             </a:r>
             <a:endParaRPr lang="pt-BR" dirty="0"/>
@@ -11067,15 +11448,7 @@
           <a:p>
             <a:r>
               <a:rPr lang="pt-BR" dirty="0"/>
-              <a:t>Módulo Relé </a:t>
-            </a:r>
-            <a:r>
-              <a:rPr lang="pt-BR" dirty="0" smtClean="0"/>
-              <a:t>5 V </a:t>
-            </a:r>
-            <a:r>
-              <a:rPr lang="pt-BR" dirty="0"/>
-              <a:t>1 Canal</a:t>
+              <a:t>Módulo Relé 5 V 1 Canal</a:t>
             </a:r>
           </a:p>
         </p:txBody>
@@ -11100,19 +11473,7 @@
             </a:pPr>
             <a:r>
               <a:rPr lang="pt-BR" dirty="0"/>
-              <a:t>Os relés são componentes eletromecânicos capazes de controlar circuitos externos de grandes correntes a partir de pequenas correntes ou tensões, ou seja, acionando um relé com uma pilha podemos controlar um motor que esteja ligado em 110 ou 220 </a:t>
-            </a:r>
-            <a:r>
-              <a:rPr lang="pt-BR" dirty="0" smtClean="0"/>
-              <a:t>V, </a:t>
-            </a:r>
-            <a:r>
-              <a:rPr lang="pt-BR" dirty="0"/>
-              <a:t>por </a:t>
-            </a:r>
-            <a:r>
-              <a:rPr lang="pt-BR" dirty="0" smtClean="0"/>
-              <a:t>exemplo.</a:t>
+              <a:t>Os relés são componentes eletromecânicos capazes de controlar circuitos externos de grandes correntes a partir de pequenas correntes ou tensões, ou seja, acionando um relé com uma pilha podemos controlar um motor que esteja ligado em 110 ou 220 V, por exemplo.</a:t>
             </a:r>
           </a:p>
           <a:p>
@@ -11121,37 +11482,24 @@
             </a:pPr>
             <a:r>
               <a:rPr lang="pt-BR" dirty="0"/>
-              <a:t>O Módulo Relé 5V 1 Canal permite </a:t>
-            </a:r>
-            <a:r>
-              <a:rPr lang="pt-BR" dirty="0" smtClean="0"/>
-              <a:t>controlar </a:t>
-            </a:r>
-            <a:r>
-              <a:rPr lang="pt-BR" dirty="0"/>
-              <a:t>cargas AC (alternada) de forma simples e </a:t>
-            </a:r>
-            <a:r>
-              <a:rPr lang="pt-BR" dirty="0" smtClean="0"/>
-              <a:t>prática, usando uma plataforma </a:t>
-            </a:r>
-            <a:r>
-              <a:rPr lang="pt-BR" dirty="0" err="1" smtClean="0"/>
+              <a:t>O Módulo Relé 5V 1 Canal permite controlar cargas AC (alternada) de forma simples e prática, usando uma plataforma </a:t>
+            </a:r>
+            <a:r>
+              <a:rPr lang="pt-BR" dirty="0" err="1"/>
               <a:t>microcontrolada</a:t>
             </a:r>
             <a:r>
-              <a:rPr lang="pt-BR" dirty="0" smtClean="0"/>
+              <a:rPr lang="pt-BR" dirty="0"/>
               <a:t> (</a:t>
             </a:r>
             <a:r>
-              <a:rPr lang="pt-BR" dirty="0" err="1" smtClean="0"/>
+              <a:rPr lang="pt-BR" dirty="0" err="1"/>
               <a:t>Arduino</a:t>
             </a:r>
             <a:r>
-              <a:rPr lang="pt-BR" dirty="0" smtClean="0"/>
+              <a:rPr lang="pt-BR" dirty="0"/>
               <a:t>, por exemplo).</a:t>
             </a:r>
-            <a:endParaRPr lang="pt-BR" dirty="0"/>
           </a:p>
         </p:txBody>
       </p:sp>
@@ -11201,10 +11549,9 @@
           <a:lstStyle/>
           <a:p>
             <a:r>
-              <a:rPr lang="pt-BR" dirty="0" smtClean="0"/>
+              <a:rPr lang="pt-BR" dirty="0"/>
               <a:t>Entendendo um interruptor</a:t>
             </a:r>
-            <a:endParaRPr lang="pt-BR" dirty="0"/>
           </a:p>
         </p:txBody>
       </p:sp>
@@ -11228,13 +11575,8 @@
             </a:pPr>
             <a:r>
               <a:rPr lang="pt-BR" dirty="0"/>
-              <a:t>Tal como o nome já diz, ele tem a capacidade de interromper o fluxo de energia e </a:t>
-            </a:r>
-            <a:r>
-              <a:rPr lang="pt-BR" dirty="0" smtClean="0"/>
-              <a:t>vice-versa.</a:t>
-            </a:r>
-            <a:endParaRPr lang="pt-BR" dirty="0"/>
+              <a:t>Tal como o nome já diz, ele tem a capacidade de interromper o fluxo de energia e vice-versa.</a:t>
+            </a:r>
           </a:p>
         </p:txBody>
       </p:sp>
@@ -11445,10 +11787,9 @@
           <a:lstStyle/>
           <a:p>
             <a:r>
-              <a:rPr lang="pt-BR" dirty="0" smtClean="0"/>
+              <a:rPr lang="pt-BR" dirty="0"/>
               <a:t>Entendendo um relé</a:t>
             </a:r>
-            <a:endParaRPr lang="pt-BR" dirty="0"/>
           </a:p>
         </p:txBody>
       </p:sp>
@@ -11471,54 +11812,9 @@
               <a:buNone/>
             </a:pPr>
             <a:r>
-              <a:rPr lang="pt-BR" dirty="0" smtClean="0"/>
-              <a:t>O relé </a:t>
-            </a:r>
-            <a:r>
-              <a:rPr lang="pt-BR" dirty="0"/>
-              <a:t>possui um eletroímã, ou </a:t>
-            </a:r>
-            <a:r>
-              <a:rPr lang="pt-BR" dirty="0" smtClean="0"/>
-              <a:t>seja, uma </a:t>
-            </a:r>
-            <a:r>
-              <a:rPr lang="pt-BR" dirty="0"/>
-              <a:t>bobina que quando energizada </a:t>
-            </a:r>
-            <a:r>
-              <a:rPr lang="pt-BR" dirty="0" smtClean="0"/>
-              <a:t>cria </a:t>
-            </a:r>
-            <a:r>
-              <a:rPr lang="pt-BR" dirty="0"/>
-              <a:t>um campo </a:t>
-            </a:r>
-            <a:r>
-              <a:rPr lang="pt-BR" dirty="0" smtClean="0"/>
-              <a:t>eletromagnético. </a:t>
-            </a:r>
-            <a:r>
-              <a:rPr lang="pt-BR" dirty="0"/>
-              <a:t>Devido a força de atração magnética do </a:t>
-            </a:r>
-            <a:r>
-              <a:rPr lang="pt-BR" dirty="0" smtClean="0"/>
-              <a:t>eletroímã, </a:t>
-            </a:r>
-            <a:r>
-              <a:rPr lang="pt-BR" dirty="0"/>
-              <a:t>teremos a movimentação </a:t>
-            </a:r>
-            <a:r>
-              <a:rPr lang="pt-BR" dirty="0" smtClean="0"/>
-              <a:t>de um </a:t>
-            </a:r>
-            <a:r>
-              <a:rPr lang="pt-BR" smtClean="0"/>
-              <a:t>interruptor interno.</a:t>
-            </a:r>
-            <a:endParaRPr lang="pt-BR" dirty="0"/>
+              <a:rPr lang="pt-BR" dirty="0"/>
+              <a:t>O relé possui um eletroímã, ou seja, uma bobina que quando energizada cria um campo eletromagnético. Devido a força de atração magnética do eletroímã, teremos a movimentação de um interruptor interno.</a:t>
+            </a:r>
           </a:p>
         </p:txBody>
       </p:sp>
@@ -11610,7 +11906,7 @@
           <a:p>
             <a:r>
               <a:rPr lang="pt-BR" dirty="0"/>
-              <a:t>Referências Bluetooth</a:t>
+              <a:t>Módulo relé</a:t>
             </a:r>
           </a:p>
         </p:txBody>
@@ -11627,63 +11923,70 @@
         </p:nvSpPr>
         <p:spPr/>
         <p:txBody>
-          <a:bodyPr>
-            <a:normAutofit lnSpcReduction="10000"/>
-          </a:bodyPr>
-          <a:lstStyle/>
-          <a:p>
-            <a:r>
-              <a:rPr lang="pt-BR" dirty="0">
-                <a:hlinkClick r:id="rId2"/>
-              </a:rPr>
-              <a:t>https://www.electronicwings.com/sensors-modules/bluetooth-module-hc-05-</a:t>
-            </a:r>
-            <a:endParaRPr lang="pt-BR" dirty="0">
-              <a:hlinkClick r:id="rId3"/>
-            </a:endParaRPr>
-          </a:p>
-          <a:p>
-            <a:r>
-              <a:rPr lang="pt-BR" dirty="0">
-                <a:hlinkClick r:id="rId3"/>
-              </a:rPr>
-              <a:t>https://maker.pro/arduino/tutorial/bluetooth-basics-how-to-control-led-using-smartphone-arduino</a:t>
-            </a:r>
-            <a:endParaRPr lang="pt-BR" dirty="0"/>
-          </a:p>
-          <a:p>
-            <a:r>
-              <a:rPr lang="pt-BR" dirty="0">
-                <a:hlinkClick r:id="rId4"/>
-              </a:rPr>
-              <a:t>https://howtomechatronics.com/tutorials/arduino/arduino-and-hc-05-bluetooth-module-tutorial/</a:t>
-            </a:r>
-            <a:endParaRPr lang="pt-BR" dirty="0"/>
-          </a:p>
-          <a:p>
-            <a:r>
-              <a:rPr lang="pt-BR" dirty="0">
-                <a:hlinkClick r:id="rId5"/>
-              </a:rPr>
-              <a:t>http://www.instructables.com/id/Tutorial-Using-HC06-Bluetooth-to-Serial-Wireless-U/</a:t>
-            </a:r>
-            <a:endParaRPr lang="pt-BR" dirty="0"/>
-          </a:p>
-          <a:p>
-            <a:r>
-              <a:rPr lang="en-US" dirty="0">
-                <a:hlinkClick r:id="rId6"/>
-              </a:rPr>
-              <a:t>https://www.instructables.com/id/AT-command-mode-of-HC-05-Bluetooth-module/</a:t>
-            </a:r>
-            <a:endParaRPr lang="pt-BR" dirty="0"/>
-          </a:p>
-        </p:txBody>
-      </p:sp>
+          <a:bodyPr/>
+          <a:lstStyle/>
+          <a:p>
+            <a:pPr marL="0" indent="0">
+              <a:buNone/>
+            </a:pPr>
+            <a:r>
+              <a:rPr lang="pt-BR" dirty="0"/>
+              <a:t>Possui um circuito auxiliar para o acionamento do relé. Esse circuito usa uma fonte de alimentação que pode ser a própria saída de 5 V do Arduino.</a:t>
+            </a:r>
+          </a:p>
+        </p:txBody>
+      </p:sp>
+      <p:pic>
+        <p:nvPicPr>
+          <p:cNvPr id="1026" name="Picture 2" descr="Módulo relé de 1 canal.">
+            <a:extLst>
+              <a:ext uri="{FF2B5EF4-FFF2-40B4-BE49-F238E27FC236}">
+                <a16:creationId xmlns:a16="http://schemas.microsoft.com/office/drawing/2014/main" id="{11717441-6699-4424-A40E-04C718DFBBC5}"/>
+              </a:ext>
+            </a:extLst>
+          </p:cNvPr>
+          <p:cNvPicPr>
+            <a:picLocks noChangeAspect="1" noChangeArrowheads="1"/>
+          </p:cNvPicPr>
+          <p:nvPr/>
+        </p:nvPicPr>
+        <p:blipFill>
+          <a:blip r:embed="rId3">
+            <a:extLst>
+              <a:ext uri="{28A0092B-C50C-407E-A947-70E740481C1C}">
+                <a14:useLocalDpi xmlns:a14="http://schemas.microsoft.com/office/drawing/2010/main" val="0"/>
+              </a:ext>
+            </a:extLst>
+          </a:blip>
+          <a:srcRect/>
+          <a:stretch>
+            <a:fillRect/>
+          </a:stretch>
+        </p:blipFill>
+        <p:spPr bwMode="auto">
+          <a:xfrm>
+            <a:off x="4667250" y="3319463"/>
+            <a:ext cx="2857500" cy="2857500"/>
+          </a:xfrm>
+          <a:prstGeom prst="rect">
+            <a:avLst/>
+          </a:prstGeom>
+          <a:noFill/>
+          <a:extLst>
+            <a:ext uri="{909E8E84-426E-40DD-AFC4-6F175D3DCCD1}">
+              <a14:hiddenFill xmlns:a14="http://schemas.microsoft.com/office/drawing/2010/main">
+                <a:solidFill>
+                  <a:srgbClr val="FFFFFF"/>
+                </a:solidFill>
+              </a14:hiddenFill>
+            </a:ext>
+          </a:extLst>
+        </p:spPr>
+      </p:pic>
     </p:spTree>
     <p:extLst>
       <p:ext uri="{BB962C8B-B14F-4D97-AF65-F5344CB8AC3E}">
-        <p14:creationId xmlns:p14="http://schemas.microsoft.com/office/powerpoint/2010/main" val="2022734056"/>
+        <p14:creationId xmlns:p14="http://schemas.microsoft.com/office/powerpoint/2010/main" val="1718288451"/>
       </p:ext>
     </p:extLst>
   </p:cSld>
@@ -11727,7 +12030,7 @@
           <a:p>
             <a:r>
               <a:rPr lang="pt-BR" dirty="0"/>
-              <a:t>Referências Relé</a:t>
+              <a:t>Descrição dos pinos</a:t>
             </a:r>
           </a:p>
         </p:txBody>
@@ -11744,54 +12047,1310 @@
         </p:nvSpPr>
         <p:spPr/>
         <p:txBody>
-          <a:bodyPr>
-            <a:normAutofit/>
-          </a:bodyPr>
-          <a:lstStyle/>
-          <a:p>
-            <a:r>
-              <a:rPr lang="en-US" dirty="0">
-                <a:hlinkClick r:id="rId2"/>
-              </a:rPr>
-              <a:t>https://blogmasterwalkershop.com.br/arduino/arduino-utilizando-o-potenciometro-linear/</a:t>
-            </a:r>
-            <a:endParaRPr lang="en-US" dirty="0"/>
-          </a:p>
-          <a:p>
-            <a:r>
-              <a:rPr lang="en-US" dirty="0">
-                <a:hlinkClick r:id="rId3"/>
-              </a:rPr>
-              <a:t>https://portal.vidadesilicio.com.br/lm35-medindo-temperatura-com-arduino/</a:t>
-            </a:r>
-            <a:endParaRPr lang="en-US" dirty="0">
-              <a:hlinkClick r:id="rId4"/>
-            </a:endParaRPr>
-          </a:p>
-          <a:p>
-            <a:r>
-              <a:rPr lang="en-US" dirty="0">
-                <a:hlinkClick r:id="rId4"/>
-              </a:rPr>
-              <a:t>https://blogmasterwalkershop.com.br/arduino/como-usar-com-arduino-modulo-rele-5v-1-canal/</a:t>
-            </a:r>
-            <a:endParaRPr lang="en-US" dirty="0"/>
-          </a:p>
-          <a:p>
-            <a:r>
-              <a:rPr lang="pt-BR" dirty="0">
-                <a:hlinkClick r:id="rId5"/>
-              </a:rPr>
-              <a:t>https://portal.vidadesilicio.com.br/modulo-rele-com-arduino/</a:t>
-            </a:r>
-            <a:endParaRPr lang="pt-BR" dirty="0"/>
+          <a:bodyPr/>
+          <a:lstStyle/>
+          <a:p>
+            <a:pPr marL="0" indent="0">
+              <a:buNone/>
+            </a:pPr>
+            <a:r>
+              <a:rPr lang="pt-BR" dirty="0"/>
+              <a:t>Ele tem 3 pinos:</a:t>
+            </a:r>
+          </a:p>
+          <a:p>
+            <a:pPr marL="514350" indent="-514350">
+              <a:buFont typeface="+mj-lt"/>
+              <a:buAutoNum type="arabicPeriod"/>
+            </a:pPr>
+            <a:r>
+              <a:rPr lang="pt-BR" dirty="0" err="1"/>
+              <a:t>Vcc</a:t>
+            </a:r>
+            <a:r>
+              <a:rPr lang="pt-BR" dirty="0"/>
+              <a:t>: pino de alimentação 5 V;</a:t>
+            </a:r>
+          </a:p>
+          <a:p>
+            <a:pPr marL="514350" indent="-514350">
+              <a:buFont typeface="+mj-lt"/>
+              <a:buAutoNum type="arabicPeriod"/>
+            </a:pPr>
+            <a:r>
+              <a:rPr lang="pt-BR" dirty="0"/>
+              <a:t>GND: pino de aterramento do módulo;</a:t>
+            </a:r>
+          </a:p>
+          <a:p>
+            <a:pPr marL="514350" indent="-514350">
+              <a:buFont typeface="+mj-lt"/>
+              <a:buAutoNum type="arabicPeriod"/>
+            </a:pPr>
+            <a:r>
+              <a:rPr lang="pt-BR" dirty="0"/>
+              <a:t>IN: pino de comando do módulo. Esse é o pino responsável por ligar ou desligar o relé.</a:t>
+            </a:r>
           </a:p>
         </p:txBody>
       </p:sp>
     </p:spTree>
     <p:extLst>
       <p:ext uri="{BB962C8B-B14F-4D97-AF65-F5344CB8AC3E}">
-        <p14:creationId xmlns:p14="http://schemas.microsoft.com/office/powerpoint/2010/main" val="1716499950"/>
+        <p14:creationId xmlns:p14="http://schemas.microsoft.com/office/powerpoint/2010/main" val="3521570304"/>
+      </p:ext>
+    </p:extLst>
+  </p:cSld>
+  <p:clrMapOvr>
+    <a:masterClrMapping/>
+  </p:clrMapOvr>
+</p:sld>
+</file>
+
+<file path=ppt/slides/slide53.xml><?xml version="1.0" encoding="utf-8"?>
+<p:sld xmlns:a="http://schemas.openxmlformats.org/drawingml/2006/main" xmlns:r="http://schemas.openxmlformats.org/officeDocument/2006/relationships" xmlns:p="http://schemas.openxmlformats.org/presentationml/2006/main">
+  <p:cSld>
+    <p:spTree>
+      <p:nvGrpSpPr>
+        <p:cNvPr id="1" name=""/>
+        <p:cNvGrpSpPr/>
+        <p:nvPr/>
+      </p:nvGrpSpPr>
+      <p:grpSpPr>
+        <a:xfrm>
+          <a:off x="0" y="0"/>
+          <a:ext cx="0" cy="0"/>
+          <a:chOff x="0" y="0"/>
+          <a:chExt cx="0" cy="0"/>
+        </a:xfrm>
+      </p:grpSpPr>
+      <p:sp>
+        <p:nvSpPr>
+          <p:cNvPr id="2" name="Título 1"/>
+          <p:cNvSpPr>
+            <a:spLocks noGrp="1"/>
+          </p:cNvSpPr>
+          <p:nvPr>
+            <p:ph type="title"/>
+          </p:nvPr>
+        </p:nvSpPr>
+        <p:spPr/>
+        <p:txBody>
+          <a:bodyPr/>
+          <a:lstStyle/>
+          <a:p>
+            <a:r>
+              <a:rPr lang="pt-BR" dirty="0"/>
+              <a:t>Especificações e características</a:t>
+            </a:r>
+          </a:p>
+        </p:txBody>
+      </p:sp>
+      <p:sp>
+        <p:nvSpPr>
+          <p:cNvPr id="3" name="Espaço Reservado para Conteúdo 2"/>
+          <p:cNvSpPr>
+            <a:spLocks noGrp="1"/>
+          </p:cNvSpPr>
+          <p:nvPr>
+            <p:ph idx="1"/>
+          </p:nvPr>
+        </p:nvSpPr>
+        <p:spPr/>
+        <p:txBody>
+          <a:bodyPr/>
+          <a:lstStyle/>
+          <a:p>
+            <a:r>
+              <a:rPr lang="pt-BR" dirty="0"/>
+              <a:t>Tensão de operação: 3,3 - 5 VDC</a:t>
+            </a:r>
+          </a:p>
+          <a:p>
+            <a:r>
+              <a:rPr lang="pt-BR" dirty="0"/>
+              <a:t>Corrente de operação: 15 ~ 20 </a:t>
+            </a:r>
+            <a:r>
+              <a:rPr lang="pt-BR" dirty="0" err="1"/>
+              <a:t>mA</a:t>
+            </a:r>
+            <a:endParaRPr lang="pt-BR" dirty="0"/>
+          </a:p>
+          <a:p>
+            <a:r>
+              <a:rPr lang="pt-BR" dirty="0"/>
+              <a:t>Capacidade do relé: 30 VDC/10 A e 250 VAC/10 A</a:t>
+            </a:r>
+          </a:p>
+          <a:p>
+            <a:r>
+              <a:rPr lang="pt-BR" dirty="0"/>
+              <a:t>1 canal</a:t>
+            </a:r>
+          </a:p>
+          <a:p>
+            <a:r>
+              <a:rPr lang="pt-BR" dirty="0"/>
+              <a:t>LED indicador para  presença de tensão</a:t>
+            </a:r>
+          </a:p>
+          <a:p>
+            <a:r>
+              <a:rPr lang="pt-BR" dirty="0"/>
+              <a:t>LED indicador para acionamento do relé</a:t>
+            </a:r>
+          </a:p>
+          <a:p>
+            <a:r>
+              <a:rPr lang="pt-BR" dirty="0"/>
+              <a:t>Tempo de resposta: 5 ~ 10 </a:t>
+            </a:r>
+            <a:r>
+              <a:rPr lang="pt-BR" dirty="0" err="1"/>
+              <a:t>ms</a:t>
+            </a:r>
+            <a:endParaRPr lang="pt-BR" dirty="0"/>
+          </a:p>
+        </p:txBody>
+      </p:sp>
+    </p:spTree>
+    <p:extLst>
+      <p:ext uri="{BB962C8B-B14F-4D97-AF65-F5344CB8AC3E}">
+        <p14:creationId xmlns:p14="http://schemas.microsoft.com/office/powerpoint/2010/main" val="2071431009"/>
+      </p:ext>
+    </p:extLst>
+  </p:cSld>
+  <p:clrMapOvr>
+    <a:masterClrMapping/>
+  </p:clrMapOvr>
+</p:sld>
+</file>
+
+<file path=ppt/slides/slide54.xml><?xml version="1.0" encoding="utf-8"?>
+<p:sld xmlns:a="http://schemas.openxmlformats.org/drawingml/2006/main" xmlns:r="http://schemas.openxmlformats.org/officeDocument/2006/relationships" xmlns:p="http://schemas.openxmlformats.org/presentationml/2006/main">
+  <p:cSld>
+    <p:spTree>
+      <p:nvGrpSpPr>
+        <p:cNvPr id="1" name=""/>
+        <p:cNvGrpSpPr/>
+        <p:nvPr/>
+      </p:nvGrpSpPr>
+      <p:grpSpPr>
+        <a:xfrm>
+          <a:off x="0" y="0"/>
+          <a:ext cx="0" cy="0"/>
+          <a:chOff x="0" y="0"/>
+          <a:chExt cx="0" cy="0"/>
+        </a:xfrm>
+      </p:grpSpPr>
+      <p:sp>
+        <p:nvSpPr>
+          <p:cNvPr id="2" name="Title 1">
+            <a:extLst>
+              <a:ext uri="{FF2B5EF4-FFF2-40B4-BE49-F238E27FC236}">
+                <a16:creationId xmlns:a16="http://schemas.microsoft.com/office/drawing/2014/main" id="{4E18D874-4F51-4080-9D9E-224452D858DD}"/>
+              </a:ext>
+            </a:extLst>
+          </p:cNvPr>
+          <p:cNvSpPr>
+            <a:spLocks noGrp="1"/>
+          </p:cNvSpPr>
+          <p:nvPr>
+            <p:ph type="title"/>
+          </p:nvPr>
+        </p:nvSpPr>
+        <p:spPr/>
+        <p:txBody>
+          <a:bodyPr/>
+          <a:lstStyle/>
+          <a:p>
+            <a:r>
+              <a:rPr lang="pt-BR" dirty="0"/>
+              <a:t>Prática</a:t>
+            </a:r>
+          </a:p>
+        </p:txBody>
+      </p:sp>
+      <p:sp>
+        <p:nvSpPr>
+          <p:cNvPr id="3" name="Text Placeholder 2">
+            <a:extLst>
+              <a:ext uri="{FF2B5EF4-FFF2-40B4-BE49-F238E27FC236}">
+                <a16:creationId xmlns:a16="http://schemas.microsoft.com/office/drawing/2014/main" id="{DA19812D-83AA-4EE0-9E9E-05E75C168F8F}"/>
+              </a:ext>
+            </a:extLst>
+          </p:cNvPr>
+          <p:cNvSpPr>
+            <a:spLocks noGrp="1"/>
+          </p:cNvSpPr>
+          <p:nvPr>
+            <p:ph type="body" idx="1"/>
+          </p:nvPr>
+        </p:nvSpPr>
+        <p:spPr/>
+        <p:txBody>
+          <a:bodyPr/>
+          <a:lstStyle/>
+          <a:p>
+            <a:r>
+              <a:rPr lang="pt-BR" dirty="0"/>
+              <a:t>Controlar o acionamento de uma lâmpada</a:t>
+            </a:r>
+          </a:p>
+        </p:txBody>
+      </p:sp>
+    </p:spTree>
+    <p:extLst>
+      <p:ext uri="{BB962C8B-B14F-4D97-AF65-F5344CB8AC3E}">
+        <p14:creationId xmlns:p14="http://schemas.microsoft.com/office/powerpoint/2010/main" val="1227597071"/>
+      </p:ext>
+    </p:extLst>
+  </p:cSld>
+  <p:clrMapOvr>
+    <a:masterClrMapping/>
+  </p:clrMapOvr>
+</p:sld>
+</file>
+
+<file path=ppt/slides/slide55.xml><?xml version="1.0" encoding="utf-8"?>
+<p:sld xmlns:a="http://schemas.openxmlformats.org/drawingml/2006/main" xmlns:r="http://schemas.openxmlformats.org/officeDocument/2006/relationships" xmlns:p="http://schemas.openxmlformats.org/presentationml/2006/main">
+  <p:cSld>
+    <p:spTree>
+      <p:nvGrpSpPr>
+        <p:cNvPr id="1" name=""/>
+        <p:cNvGrpSpPr/>
+        <p:nvPr/>
+      </p:nvGrpSpPr>
+      <p:grpSpPr>
+        <a:xfrm>
+          <a:off x="0" y="0"/>
+          <a:ext cx="0" cy="0"/>
+          <a:chOff x="0" y="0"/>
+          <a:chExt cx="0" cy="0"/>
+        </a:xfrm>
+      </p:grpSpPr>
+      <p:sp>
+        <p:nvSpPr>
+          <p:cNvPr id="2" name="Título 1"/>
+          <p:cNvSpPr>
+            <a:spLocks noGrp="1"/>
+          </p:cNvSpPr>
+          <p:nvPr>
+            <p:ph type="title"/>
+          </p:nvPr>
+        </p:nvSpPr>
+        <p:spPr/>
+        <p:txBody>
+          <a:bodyPr/>
+          <a:lstStyle/>
+          <a:p>
+            <a:r>
+              <a:rPr lang="pt-BR" dirty="0"/>
+              <a:t>Montagem do circuito - componentes</a:t>
+            </a:r>
+          </a:p>
+        </p:txBody>
+      </p:sp>
+      <p:sp>
+        <p:nvSpPr>
+          <p:cNvPr id="3" name="Espaço Reservado para Conteúdo 2"/>
+          <p:cNvSpPr>
+            <a:spLocks noGrp="1"/>
+          </p:cNvSpPr>
+          <p:nvPr>
+            <p:ph idx="1"/>
+          </p:nvPr>
+        </p:nvSpPr>
+        <p:spPr/>
+        <p:txBody>
+          <a:bodyPr>
+            <a:normAutofit fontScale="92500" lnSpcReduction="20000"/>
+          </a:bodyPr>
+          <a:lstStyle/>
+          <a:p>
+            <a:r>
+              <a:rPr lang="pt-BR" dirty="0"/>
+              <a:t>1 Arduino Uno</a:t>
+            </a:r>
+          </a:p>
+          <a:p>
+            <a:r>
+              <a:rPr lang="pt-BR" dirty="0"/>
+              <a:t>1 módulo relé;</a:t>
+            </a:r>
+          </a:p>
+          <a:p>
+            <a:r>
+              <a:rPr lang="pt-BR" dirty="0"/>
+              <a:t>1 </a:t>
+            </a:r>
+            <a:r>
+              <a:rPr lang="en-US" dirty="0"/>
+              <a:t>plug de </a:t>
+            </a:r>
+            <a:r>
+              <a:rPr lang="en-US" dirty="0" err="1"/>
+              <a:t>tomada</a:t>
+            </a:r>
+            <a:r>
+              <a:rPr lang="en-US" dirty="0"/>
+              <a:t> (macho);</a:t>
+            </a:r>
+          </a:p>
+          <a:p>
+            <a:r>
+              <a:rPr lang="en-US" dirty="0"/>
+              <a:t>1 </a:t>
+            </a:r>
+            <a:r>
+              <a:rPr lang="en-US" dirty="0" err="1"/>
+              <a:t>bocal</a:t>
+            </a:r>
+            <a:r>
+              <a:rPr lang="en-US" dirty="0"/>
+              <a:t> de </a:t>
+            </a:r>
+            <a:r>
+              <a:rPr lang="en-US" dirty="0" err="1"/>
+              <a:t>lâmpada</a:t>
+            </a:r>
+            <a:r>
+              <a:rPr lang="en-US" dirty="0"/>
+              <a:t>;</a:t>
+            </a:r>
+          </a:p>
+          <a:p>
+            <a:r>
+              <a:rPr lang="en-US" dirty="0"/>
+              <a:t>1 </a:t>
+            </a:r>
+            <a:r>
+              <a:rPr lang="en-US" dirty="0" err="1"/>
+              <a:t>lâmpada</a:t>
+            </a:r>
+            <a:r>
+              <a:rPr lang="en-US" dirty="0"/>
+              <a:t>;</a:t>
+            </a:r>
+          </a:p>
+          <a:p>
+            <a:r>
+              <a:rPr lang="en-US" dirty="0"/>
+              <a:t>2 m de </a:t>
+            </a:r>
+            <a:r>
+              <a:rPr lang="en-US" dirty="0" err="1"/>
+              <a:t>fio</a:t>
+            </a:r>
+            <a:r>
+              <a:rPr lang="en-US" dirty="0"/>
+              <a:t> de </a:t>
+            </a:r>
+            <a:r>
+              <a:rPr lang="en-US" dirty="0" err="1"/>
+              <a:t>cobre</a:t>
+            </a:r>
+            <a:r>
+              <a:rPr lang="en-US" dirty="0"/>
+              <a:t> de 1,5 mm;</a:t>
+            </a:r>
+          </a:p>
+          <a:p>
+            <a:r>
+              <a:rPr lang="en-US" dirty="0"/>
+              <a:t>1 </a:t>
+            </a:r>
+            <a:r>
+              <a:rPr lang="en-US" dirty="0" err="1"/>
+              <a:t>suporte</a:t>
+            </a:r>
+            <a:r>
+              <a:rPr lang="en-US" dirty="0"/>
+              <a:t> para 4 </a:t>
+            </a:r>
+            <a:r>
+              <a:rPr lang="en-US" dirty="0" err="1"/>
+              <a:t>pilhas</a:t>
+            </a:r>
+            <a:r>
+              <a:rPr lang="en-US" dirty="0"/>
+              <a:t>;</a:t>
+            </a:r>
+          </a:p>
+          <a:p>
+            <a:r>
+              <a:rPr lang="en-US" dirty="0"/>
+              <a:t>4 </a:t>
+            </a:r>
+            <a:r>
+              <a:rPr lang="en-US" dirty="0" err="1"/>
+              <a:t>pilhas</a:t>
+            </a:r>
+            <a:r>
+              <a:rPr lang="en-US" dirty="0"/>
+              <a:t>;</a:t>
+            </a:r>
+          </a:p>
+          <a:p>
+            <a:r>
+              <a:rPr lang="en-US" dirty="0"/>
+              <a:t>3 jumpers macho-</a:t>
+            </a:r>
+            <a:r>
+              <a:rPr lang="en-US" dirty="0" err="1"/>
+              <a:t>fêmea</a:t>
+            </a:r>
+            <a:r>
+              <a:rPr lang="pt-BR" dirty="0"/>
+              <a:t>; e</a:t>
+            </a:r>
+          </a:p>
+          <a:p>
+            <a:r>
+              <a:rPr lang="pt-BR" dirty="0"/>
+              <a:t>Alicate e fita isolante.</a:t>
+            </a:r>
+          </a:p>
+        </p:txBody>
+      </p:sp>
+    </p:spTree>
+    <p:extLst>
+      <p:ext uri="{BB962C8B-B14F-4D97-AF65-F5344CB8AC3E}">
+        <p14:creationId xmlns:p14="http://schemas.microsoft.com/office/powerpoint/2010/main" val="3844851714"/>
+      </p:ext>
+    </p:extLst>
+  </p:cSld>
+  <p:clrMapOvr>
+    <a:masterClrMapping/>
+  </p:clrMapOvr>
+</p:sld>
+</file>
+
+<file path=ppt/slides/slide56.xml><?xml version="1.0" encoding="utf-8"?>
+<p:sld xmlns:a="http://schemas.openxmlformats.org/drawingml/2006/main" xmlns:r="http://schemas.openxmlformats.org/officeDocument/2006/relationships" xmlns:p="http://schemas.openxmlformats.org/presentationml/2006/main">
+  <p:cSld>
+    <p:spTree>
+      <p:nvGrpSpPr>
+        <p:cNvPr id="1" name=""/>
+        <p:cNvGrpSpPr/>
+        <p:nvPr/>
+      </p:nvGrpSpPr>
+      <p:grpSpPr>
+        <a:xfrm>
+          <a:off x="0" y="0"/>
+          <a:ext cx="0" cy="0"/>
+          <a:chOff x="0" y="0"/>
+          <a:chExt cx="0" cy="0"/>
+        </a:xfrm>
+      </p:grpSpPr>
+      <p:sp>
+        <p:nvSpPr>
+          <p:cNvPr id="2" name="Título 1"/>
+          <p:cNvSpPr>
+            <a:spLocks noGrp="1"/>
+          </p:cNvSpPr>
+          <p:nvPr>
+            <p:ph type="title"/>
+          </p:nvPr>
+        </p:nvSpPr>
+        <p:spPr/>
+        <p:txBody>
+          <a:bodyPr/>
+          <a:lstStyle/>
+          <a:p>
+            <a:r>
+              <a:rPr lang="pt-BR" dirty="0"/>
+              <a:t>Montagem do circuito - conexões</a:t>
+            </a:r>
+          </a:p>
+        </p:txBody>
+      </p:sp>
+      <p:graphicFrame>
+        <p:nvGraphicFramePr>
+          <p:cNvPr id="6" name="Table 6">
+            <a:extLst>
+              <a:ext uri="{FF2B5EF4-FFF2-40B4-BE49-F238E27FC236}">
+                <a16:creationId xmlns:a16="http://schemas.microsoft.com/office/drawing/2014/main" id="{7B51FD96-09BB-45DA-B03E-0FD109EC320F}"/>
+              </a:ext>
+            </a:extLst>
+          </p:cNvPr>
+          <p:cNvGraphicFramePr>
+            <a:graphicFrameLocks noGrp="1"/>
+          </p:cNvGraphicFramePr>
+          <p:nvPr>
+            <p:ph idx="1"/>
+            <p:extLst>
+              <p:ext uri="{D42A27DB-BD31-4B8C-83A1-F6EECF244321}">
+                <p14:modId xmlns:p14="http://schemas.microsoft.com/office/powerpoint/2010/main" val="3110929381"/>
+              </p:ext>
+            </p:extLst>
+          </p:nvPr>
+        </p:nvGraphicFramePr>
+        <p:xfrm>
+          <a:off x="838200" y="1825625"/>
+          <a:ext cx="3525254" cy="1486360"/>
+        </p:xfrm>
+        <a:graphic>
+          <a:graphicData uri="http://schemas.openxmlformats.org/drawingml/2006/table">
+            <a:tbl>
+              <a:tblPr firstRow="1" bandRow="1">
+                <a:tableStyleId>{5C22544A-7EE6-4342-B048-85BDC9FD1C3A}</a:tableStyleId>
+              </a:tblPr>
+              <a:tblGrid>
+                <a:gridCol w="1762627">
+                  <a:extLst>
+                    <a:ext uri="{9D8B030D-6E8A-4147-A177-3AD203B41FA5}">
+                      <a16:colId xmlns:a16="http://schemas.microsoft.com/office/drawing/2014/main" val="3118275097"/>
+                    </a:ext>
+                  </a:extLst>
+                </a:gridCol>
+                <a:gridCol w="1762627">
+                  <a:extLst>
+                    <a:ext uri="{9D8B030D-6E8A-4147-A177-3AD203B41FA5}">
+                      <a16:colId xmlns:a16="http://schemas.microsoft.com/office/drawing/2014/main" val="2325954684"/>
+                    </a:ext>
+                  </a:extLst>
+                </a:gridCol>
+              </a:tblGrid>
+              <a:tr h="371590">
+                <a:tc>
+                  <a:txBody>
+                    <a:bodyPr/>
+                    <a:lstStyle/>
+                    <a:p>
+                      <a:r>
+                        <a:rPr lang="pt-BR" dirty="0"/>
+                        <a:t>Arduino</a:t>
+                      </a:r>
+                    </a:p>
+                  </a:txBody>
+                  <a:tcPr/>
+                </a:tc>
+                <a:tc>
+                  <a:txBody>
+                    <a:bodyPr/>
+                    <a:lstStyle/>
+                    <a:p>
+                      <a:r>
+                        <a:rPr lang="pt-BR" dirty="0"/>
+                        <a:t>Potenciômetro</a:t>
+                      </a:r>
+                    </a:p>
+                  </a:txBody>
+                  <a:tcPr/>
+                </a:tc>
+                <a:extLst>
+                  <a:ext uri="{0D108BD9-81ED-4DB2-BD59-A6C34878D82A}">
+                    <a16:rowId xmlns:a16="http://schemas.microsoft.com/office/drawing/2014/main" val="2846402877"/>
+                  </a:ext>
+                </a:extLst>
+              </a:tr>
+              <a:tr h="371590">
+                <a:tc>
+                  <a:txBody>
+                    <a:bodyPr/>
+                    <a:lstStyle/>
+                    <a:p>
+                      <a:r>
+                        <a:rPr lang="pt-BR" dirty="0"/>
+                        <a:t>5 V</a:t>
+                      </a:r>
+                    </a:p>
+                  </a:txBody>
+                  <a:tcPr/>
+                </a:tc>
+                <a:tc>
+                  <a:txBody>
+                    <a:bodyPr/>
+                    <a:lstStyle/>
+                    <a:p>
+                      <a:r>
+                        <a:rPr lang="pt-BR" dirty="0" err="1"/>
+                        <a:t>Vcc</a:t>
+                      </a:r>
+                      <a:endParaRPr lang="pt-BR" dirty="0"/>
+                    </a:p>
+                  </a:txBody>
+                  <a:tcPr/>
+                </a:tc>
+                <a:extLst>
+                  <a:ext uri="{0D108BD9-81ED-4DB2-BD59-A6C34878D82A}">
+                    <a16:rowId xmlns:a16="http://schemas.microsoft.com/office/drawing/2014/main" val="3387589238"/>
+                  </a:ext>
+                </a:extLst>
+              </a:tr>
+              <a:tr h="371590">
+                <a:tc>
+                  <a:txBody>
+                    <a:bodyPr/>
+                    <a:lstStyle/>
+                    <a:p>
+                      <a:r>
+                        <a:rPr lang="pt-BR" dirty="0"/>
+                        <a:t>Pino 13</a:t>
+                      </a:r>
+                    </a:p>
+                  </a:txBody>
+                  <a:tcPr/>
+                </a:tc>
+                <a:tc>
+                  <a:txBody>
+                    <a:bodyPr/>
+                    <a:lstStyle/>
+                    <a:p>
+                      <a:r>
+                        <a:rPr lang="pt-BR" dirty="0"/>
+                        <a:t>IN</a:t>
+                      </a:r>
+                    </a:p>
+                  </a:txBody>
+                  <a:tcPr/>
+                </a:tc>
+                <a:extLst>
+                  <a:ext uri="{0D108BD9-81ED-4DB2-BD59-A6C34878D82A}">
+                    <a16:rowId xmlns:a16="http://schemas.microsoft.com/office/drawing/2014/main" val="4078284695"/>
+                  </a:ext>
+                </a:extLst>
+              </a:tr>
+              <a:tr h="371590">
+                <a:tc>
+                  <a:txBody>
+                    <a:bodyPr/>
+                    <a:lstStyle/>
+                    <a:p>
+                      <a:r>
+                        <a:rPr lang="pt-BR" dirty="0"/>
+                        <a:t>GND</a:t>
+                      </a:r>
+                    </a:p>
+                  </a:txBody>
+                  <a:tcPr/>
+                </a:tc>
+                <a:tc>
+                  <a:txBody>
+                    <a:bodyPr/>
+                    <a:lstStyle/>
+                    <a:p>
+                      <a:r>
+                        <a:rPr lang="pt-BR" dirty="0"/>
+                        <a:t>GND</a:t>
+                      </a:r>
+                    </a:p>
+                  </a:txBody>
+                  <a:tcPr/>
+                </a:tc>
+                <a:extLst>
+                  <a:ext uri="{0D108BD9-81ED-4DB2-BD59-A6C34878D82A}">
+                    <a16:rowId xmlns:a16="http://schemas.microsoft.com/office/drawing/2014/main" val="494648561"/>
+                  </a:ext>
+                </a:extLst>
+              </a:tr>
+            </a:tbl>
+          </a:graphicData>
+        </a:graphic>
+      </p:graphicFrame>
+      <p:pic>
+        <p:nvPicPr>
+          <p:cNvPr id="5" name="Picture 4" descr="A circuit board&#10;&#10;Description automatically generated">
+            <a:extLst>
+              <a:ext uri="{FF2B5EF4-FFF2-40B4-BE49-F238E27FC236}">
+                <a16:creationId xmlns:a16="http://schemas.microsoft.com/office/drawing/2014/main" id="{0F6DB820-9CD6-416D-9D65-07D6645DA90C}"/>
+              </a:ext>
+            </a:extLst>
+          </p:cNvPr>
+          <p:cNvPicPr>
+            <a:picLocks noChangeAspect="1"/>
+          </p:cNvPicPr>
+          <p:nvPr/>
+        </p:nvPicPr>
+        <p:blipFill>
+          <a:blip r:embed="rId2">
+            <a:extLst>
+              <a:ext uri="{28A0092B-C50C-407E-A947-70E740481C1C}">
+                <a14:useLocalDpi xmlns:a14="http://schemas.microsoft.com/office/drawing/2010/main" val="0"/>
+              </a:ext>
+            </a:extLst>
+          </a:blip>
+          <a:stretch>
+            <a:fillRect/>
+          </a:stretch>
+        </p:blipFill>
+        <p:spPr>
+          <a:xfrm>
+            <a:off x="5101389" y="1825625"/>
+            <a:ext cx="6252411" cy="3159113"/>
+          </a:xfrm>
+          <a:prstGeom prst="rect">
+            <a:avLst/>
+          </a:prstGeom>
+        </p:spPr>
+      </p:pic>
+    </p:spTree>
+    <p:extLst>
+      <p:ext uri="{BB962C8B-B14F-4D97-AF65-F5344CB8AC3E}">
+        <p14:creationId xmlns:p14="http://schemas.microsoft.com/office/powerpoint/2010/main" val="3276070307"/>
+      </p:ext>
+    </p:extLst>
+  </p:cSld>
+  <p:clrMapOvr>
+    <a:masterClrMapping/>
+  </p:clrMapOvr>
+</p:sld>
+</file>
+
+<file path=ppt/slides/slide57.xml><?xml version="1.0" encoding="utf-8"?>
+<p:sld xmlns:a="http://schemas.openxmlformats.org/drawingml/2006/main" xmlns:r="http://schemas.openxmlformats.org/officeDocument/2006/relationships" xmlns:p="http://schemas.openxmlformats.org/presentationml/2006/main">
+  <p:cSld>
+    <p:spTree>
+      <p:nvGrpSpPr>
+        <p:cNvPr id="1" name=""/>
+        <p:cNvGrpSpPr/>
+        <p:nvPr/>
+      </p:nvGrpSpPr>
+      <p:grpSpPr>
+        <a:xfrm>
+          <a:off x="0" y="0"/>
+          <a:ext cx="0" cy="0"/>
+          <a:chOff x="0" y="0"/>
+          <a:chExt cx="0" cy="0"/>
+        </a:xfrm>
+      </p:grpSpPr>
+      <p:sp>
+        <p:nvSpPr>
+          <p:cNvPr id="2" name="Título 1"/>
+          <p:cNvSpPr>
+            <a:spLocks noGrp="1"/>
+          </p:cNvSpPr>
+          <p:nvPr>
+            <p:ph type="title"/>
+          </p:nvPr>
+        </p:nvSpPr>
+        <p:spPr/>
+        <p:txBody>
+          <a:bodyPr/>
+          <a:lstStyle/>
+          <a:p>
+            <a:r>
+              <a:rPr lang="pt-BR" dirty="0"/>
+              <a:t>Enviar código</a:t>
+            </a:r>
+          </a:p>
+        </p:txBody>
+      </p:sp>
+      <p:sp>
+        <p:nvSpPr>
+          <p:cNvPr id="3" name="Espaço Reservado para Conteúdo 2"/>
+          <p:cNvSpPr>
+            <a:spLocks noGrp="1"/>
+          </p:cNvSpPr>
+          <p:nvPr>
+            <p:ph idx="1"/>
+          </p:nvPr>
+        </p:nvSpPr>
+        <p:spPr/>
+        <p:txBody>
+          <a:bodyPr>
+            <a:normAutofit lnSpcReduction="10000"/>
+          </a:bodyPr>
+          <a:lstStyle/>
+          <a:p>
+            <a:pPr marL="0" indent="0">
+              <a:buNone/>
+            </a:pPr>
+            <a:r>
+              <a:rPr lang="en-US" dirty="0">
+                <a:latin typeface="Courier New" panose="02070309020205020404" pitchFamily="49" charset="0"/>
+                <a:cs typeface="Courier New" panose="02070309020205020404" pitchFamily="49" charset="0"/>
+              </a:rPr>
+              <a:t>const int </a:t>
+            </a:r>
+            <a:r>
+              <a:rPr lang="en-US" dirty="0" err="1">
+                <a:latin typeface="Courier New" panose="02070309020205020404" pitchFamily="49" charset="0"/>
+                <a:cs typeface="Courier New" panose="02070309020205020404" pitchFamily="49" charset="0"/>
+              </a:rPr>
+              <a:t>rele</a:t>
+            </a:r>
+            <a:r>
+              <a:rPr lang="en-US" dirty="0">
+                <a:latin typeface="Courier New" panose="02070309020205020404" pitchFamily="49" charset="0"/>
+                <a:cs typeface="Courier New" panose="02070309020205020404" pitchFamily="49" charset="0"/>
+              </a:rPr>
+              <a:t> = 13;</a:t>
+            </a:r>
+          </a:p>
+          <a:p>
+            <a:pPr marL="0" indent="0">
+              <a:buNone/>
+            </a:pPr>
+            <a:r>
+              <a:rPr lang="en-US" dirty="0">
+                <a:latin typeface="Courier New" panose="02070309020205020404" pitchFamily="49" charset="0"/>
+                <a:cs typeface="Courier New" panose="02070309020205020404" pitchFamily="49" charset="0"/>
+              </a:rPr>
+              <a:t>bool </a:t>
+            </a:r>
+            <a:r>
+              <a:rPr lang="en-US" dirty="0" err="1">
+                <a:latin typeface="Courier New" panose="02070309020205020404" pitchFamily="49" charset="0"/>
+                <a:cs typeface="Courier New" panose="02070309020205020404" pitchFamily="49" charset="0"/>
+              </a:rPr>
+              <a:t>estado</a:t>
+            </a:r>
+            <a:r>
+              <a:rPr lang="en-US" dirty="0">
+                <a:latin typeface="Courier New" panose="02070309020205020404" pitchFamily="49" charset="0"/>
+                <a:cs typeface="Courier New" panose="02070309020205020404" pitchFamily="49" charset="0"/>
+              </a:rPr>
+              <a:t> = true;</a:t>
+            </a:r>
+          </a:p>
+          <a:p>
+            <a:pPr marL="0" indent="0">
+              <a:buNone/>
+            </a:pPr>
+            <a:r>
+              <a:rPr lang="en-US" dirty="0">
+                <a:latin typeface="Courier New" panose="02070309020205020404" pitchFamily="49" charset="0"/>
+                <a:cs typeface="Courier New" panose="02070309020205020404" pitchFamily="49" charset="0"/>
+              </a:rPr>
+              <a:t>void setup(){</a:t>
+            </a:r>
+          </a:p>
+          <a:p>
+            <a:pPr marL="0" indent="0">
+              <a:buNone/>
+            </a:pPr>
+            <a:r>
+              <a:rPr lang="en-US" dirty="0">
+                <a:latin typeface="Courier New" panose="02070309020205020404" pitchFamily="49" charset="0"/>
+                <a:cs typeface="Courier New" panose="02070309020205020404" pitchFamily="49" charset="0"/>
+              </a:rPr>
+              <a:t>    </a:t>
+            </a:r>
+            <a:r>
+              <a:rPr lang="en-US" dirty="0" err="1">
+                <a:latin typeface="Courier New" panose="02070309020205020404" pitchFamily="49" charset="0"/>
+                <a:cs typeface="Courier New" panose="02070309020205020404" pitchFamily="49" charset="0"/>
+              </a:rPr>
+              <a:t>pinMode</a:t>
+            </a:r>
+            <a:r>
+              <a:rPr lang="en-US" dirty="0">
+                <a:latin typeface="Courier New" panose="02070309020205020404" pitchFamily="49" charset="0"/>
+                <a:cs typeface="Courier New" panose="02070309020205020404" pitchFamily="49" charset="0"/>
+              </a:rPr>
+              <a:t>(</a:t>
+            </a:r>
+            <a:r>
+              <a:rPr lang="en-US" dirty="0" err="1">
+                <a:latin typeface="Courier New" panose="02070309020205020404" pitchFamily="49" charset="0"/>
+                <a:cs typeface="Courier New" panose="02070309020205020404" pitchFamily="49" charset="0"/>
+              </a:rPr>
+              <a:t>rele</a:t>
+            </a:r>
+            <a:r>
+              <a:rPr lang="en-US" dirty="0">
+                <a:latin typeface="Courier New" panose="02070309020205020404" pitchFamily="49" charset="0"/>
+                <a:cs typeface="Courier New" panose="02070309020205020404" pitchFamily="49" charset="0"/>
+              </a:rPr>
+              <a:t>, OUTPUT); }</a:t>
+            </a:r>
+          </a:p>
+          <a:p>
+            <a:pPr marL="0" indent="0">
+              <a:buNone/>
+            </a:pPr>
+            <a:r>
+              <a:rPr lang="en-US" dirty="0">
+                <a:latin typeface="Courier New" panose="02070309020205020404" pitchFamily="49" charset="0"/>
+                <a:cs typeface="Courier New" panose="02070309020205020404" pitchFamily="49" charset="0"/>
+              </a:rPr>
+              <a:t>void loop(){</a:t>
+            </a:r>
+          </a:p>
+          <a:p>
+            <a:pPr marL="0" indent="0">
+              <a:buNone/>
+            </a:pPr>
+            <a:r>
+              <a:rPr lang="en-US" dirty="0">
+                <a:latin typeface="Courier New" panose="02070309020205020404" pitchFamily="49" charset="0"/>
+                <a:cs typeface="Courier New" panose="02070309020205020404" pitchFamily="49" charset="0"/>
+              </a:rPr>
+              <a:t>     if (</a:t>
+            </a:r>
+            <a:r>
+              <a:rPr lang="en-US" dirty="0" err="1">
+                <a:latin typeface="Courier New" panose="02070309020205020404" pitchFamily="49" charset="0"/>
+                <a:cs typeface="Courier New" panose="02070309020205020404" pitchFamily="49" charset="0"/>
+              </a:rPr>
+              <a:t>estado</a:t>
+            </a:r>
+            <a:r>
+              <a:rPr lang="en-US" dirty="0">
+                <a:latin typeface="Courier New" panose="02070309020205020404" pitchFamily="49" charset="0"/>
+                <a:cs typeface="Courier New" panose="02070309020205020404" pitchFamily="49" charset="0"/>
+              </a:rPr>
+              <a:t>) </a:t>
+            </a:r>
+            <a:r>
+              <a:rPr lang="en-US" dirty="0" err="1">
+                <a:latin typeface="Courier New" panose="02070309020205020404" pitchFamily="49" charset="0"/>
+                <a:cs typeface="Courier New" panose="02070309020205020404" pitchFamily="49" charset="0"/>
+              </a:rPr>
+              <a:t>digitalWrite</a:t>
+            </a:r>
+            <a:r>
+              <a:rPr lang="en-US" dirty="0">
+                <a:latin typeface="Courier New" panose="02070309020205020404" pitchFamily="49" charset="0"/>
+                <a:cs typeface="Courier New" panose="02070309020205020404" pitchFamily="49" charset="0"/>
+              </a:rPr>
+              <a:t>(</a:t>
+            </a:r>
+            <a:r>
+              <a:rPr lang="en-US" dirty="0" err="1">
+                <a:latin typeface="Courier New" panose="02070309020205020404" pitchFamily="49" charset="0"/>
+                <a:cs typeface="Courier New" panose="02070309020205020404" pitchFamily="49" charset="0"/>
+              </a:rPr>
+              <a:t>rele,LOW</a:t>
+            </a:r>
+            <a:r>
+              <a:rPr lang="en-US" dirty="0">
+                <a:latin typeface="Courier New" panose="02070309020205020404" pitchFamily="49" charset="0"/>
+                <a:cs typeface="Courier New" panose="02070309020205020404" pitchFamily="49" charset="0"/>
+              </a:rPr>
+              <a:t>);</a:t>
+            </a:r>
+          </a:p>
+          <a:p>
+            <a:pPr marL="0" indent="0">
+              <a:buNone/>
+            </a:pPr>
+            <a:r>
+              <a:rPr lang="en-US" dirty="0">
+                <a:latin typeface="Courier New" panose="02070309020205020404" pitchFamily="49" charset="0"/>
+                <a:cs typeface="Courier New" panose="02070309020205020404" pitchFamily="49" charset="0"/>
+              </a:rPr>
+              <a:t>     else </a:t>
+            </a:r>
+            <a:r>
+              <a:rPr lang="en-US" dirty="0" err="1">
+                <a:latin typeface="Courier New" panose="02070309020205020404" pitchFamily="49" charset="0"/>
+                <a:cs typeface="Courier New" panose="02070309020205020404" pitchFamily="49" charset="0"/>
+              </a:rPr>
+              <a:t>digitalWrite</a:t>
+            </a:r>
+            <a:r>
+              <a:rPr lang="en-US" dirty="0">
+                <a:latin typeface="Courier New" panose="02070309020205020404" pitchFamily="49" charset="0"/>
+                <a:cs typeface="Courier New" panose="02070309020205020404" pitchFamily="49" charset="0"/>
+              </a:rPr>
+              <a:t>(</a:t>
+            </a:r>
+            <a:r>
+              <a:rPr lang="en-US" dirty="0" err="1">
+                <a:latin typeface="Courier New" panose="02070309020205020404" pitchFamily="49" charset="0"/>
+                <a:cs typeface="Courier New" panose="02070309020205020404" pitchFamily="49" charset="0"/>
+              </a:rPr>
+              <a:t>rele,HIGH</a:t>
+            </a:r>
+            <a:r>
+              <a:rPr lang="en-US" dirty="0">
+                <a:latin typeface="Courier New" panose="02070309020205020404" pitchFamily="49" charset="0"/>
+                <a:cs typeface="Courier New" panose="02070309020205020404" pitchFamily="49" charset="0"/>
+              </a:rPr>
+              <a:t>);</a:t>
+            </a:r>
+          </a:p>
+          <a:p>
+            <a:pPr marL="0" indent="0">
+              <a:buNone/>
+            </a:pPr>
+            <a:r>
+              <a:rPr lang="en-US" dirty="0">
+                <a:latin typeface="Courier New" panose="02070309020205020404" pitchFamily="49" charset="0"/>
+                <a:cs typeface="Courier New" panose="02070309020205020404" pitchFamily="49" charset="0"/>
+              </a:rPr>
+              <a:t>     </a:t>
+            </a:r>
+            <a:r>
+              <a:rPr lang="en-US" dirty="0" err="1">
+                <a:latin typeface="Courier New" panose="02070309020205020404" pitchFamily="49" charset="0"/>
+                <a:cs typeface="Courier New" panose="02070309020205020404" pitchFamily="49" charset="0"/>
+              </a:rPr>
+              <a:t>estado</a:t>
+            </a:r>
+            <a:r>
+              <a:rPr lang="en-US" dirty="0">
+                <a:latin typeface="Courier New" panose="02070309020205020404" pitchFamily="49" charset="0"/>
+                <a:cs typeface="Courier New" panose="02070309020205020404" pitchFamily="49" charset="0"/>
+              </a:rPr>
+              <a:t> = !</a:t>
+            </a:r>
+            <a:r>
+              <a:rPr lang="en-US" dirty="0" err="1">
+                <a:latin typeface="Courier New" panose="02070309020205020404" pitchFamily="49" charset="0"/>
+                <a:cs typeface="Courier New" panose="02070309020205020404" pitchFamily="49" charset="0"/>
+              </a:rPr>
+              <a:t>estado</a:t>
+            </a:r>
+            <a:r>
+              <a:rPr lang="en-US" dirty="0">
+                <a:latin typeface="Courier New" panose="02070309020205020404" pitchFamily="49" charset="0"/>
+                <a:cs typeface="Courier New" panose="02070309020205020404" pitchFamily="49" charset="0"/>
+              </a:rPr>
+              <a:t>;</a:t>
+            </a:r>
+          </a:p>
+          <a:p>
+            <a:pPr marL="0" indent="0">
+              <a:buNone/>
+            </a:pPr>
+            <a:r>
+              <a:rPr lang="en-US" dirty="0">
+                <a:latin typeface="Courier New" panose="02070309020205020404" pitchFamily="49" charset="0"/>
+                <a:cs typeface="Courier New" panose="02070309020205020404" pitchFamily="49" charset="0"/>
+              </a:rPr>
+              <a:t>     delay(10000); }</a:t>
+            </a:r>
+            <a:endParaRPr lang="pt-BR" dirty="0">
+              <a:latin typeface="Courier New" panose="02070309020205020404" pitchFamily="49" charset="0"/>
+              <a:cs typeface="Courier New" panose="02070309020205020404" pitchFamily="49" charset="0"/>
+            </a:endParaRPr>
+          </a:p>
+        </p:txBody>
+      </p:sp>
+    </p:spTree>
+    <p:extLst>
+      <p:ext uri="{BB962C8B-B14F-4D97-AF65-F5344CB8AC3E}">
+        <p14:creationId xmlns:p14="http://schemas.microsoft.com/office/powerpoint/2010/main" val="864314380"/>
+      </p:ext>
+    </p:extLst>
+  </p:cSld>
+  <p:clrMapOvr>
+    <a:masterClrMapping/>
+  </p:clrMapOvr>
+</p:sld>
+</file>
+
+<file path=ppt/slides/slide58.xml><?xml version="1.0" encoding="utf-8"?>
+<p:sld xmlns:a="http://schemas.openxmlformats.org/drawingml/2006/main" xmlns:r="http://schemas.openxmlformats.org/officeDocument/2006/relationships" xmlns:p="http://schemas.openxmlformats.org/presentationml/2006/main">
+  <p:cSld>
+    <p:spTree>
+      <p:nvGrpSpPr>
+        <p:cNvPr id="1" name=""/>
+        <p:cNvGrpSpPr/>
+        <p:nvPr/>
+      </p:nvGrpSpPr>
+      <p:grpSpPr>
+        <a:xfrm>
+          <a:off x="0" y="0"/>
+          <a:ext cx="0" cy="0"/>
+          <a:chOff x="0" y="0"/>
+          <a:chExt cx="0" cy="0"/>
+        </a:xfrm>
+      </p:grpSpPr>
+      <p:sp>
+        <p:nvSpPr>
+          <p:cNvPr id="2" name="Title 1">
+            <a:extLst>
+              <a:ext uri="{FF2B5EF4-FFF2-40B4-BE49-F238E27FC236}">
+                <a16:creationId xmlns:a16="http://schemas.microsoft.com/office/drawing/2014/main" id="{37FAD547-BAAE-4693-B12A-129BF75888BE}"/>
+              </a:ext>
+            </a:extLst>
+          </p:cNvPr>
+          <p:cNvSpPr>
+            <a:spLocks noGrp="1"/>
+          </p:cNvSpPr>
+          <p:nvPr>
+            <p:ph type="title"/>
+          </p:nvPr>
+        </p:nvSpPr>
+        <p:spPr/>
+        <p:txBody>
+          <a:bodyPr/>
+          <a:lstStyle/>
+          <a:p>
+            <a:r>
+              <a:rPr lang="pt-BR" dirty="0"/>
+              <a:t>Exercícios</a:t>
+            </a:r>
+          </a:p>
+        </p:txBody>
+      </p:sp>
+      <p:sp>
+        <p:nvSpPr>
+          <p:cNvPr id="3" name="Content Placeholder 2">
+            <a:extLst>
+              <a:ext uri="{FF2B5EF4-FFF2-40B4-BE49-F238E27FC236}">
+                <a16:creationId xmlns:a16="http://schemas.microsoft.com/office/drawing/2014/main" id="{047201E5-C439-404E-8AD6-FAEECA44ED96}"/>
+              </a:ext>
+            </a:extLst>
+          </p:cNvPr>
+          <p:cNvSpPr>
+            <a:spLocks noGrp="1"/>
+          </p:cNvSpPr>
+          <p:nvPr>
+            <p:ph idx="1"/>
+          </p:nvPr>
+        </p:nvSpPr>
+        <p:spPr/>
+        <p:txBody>
+          <a:bodyPr/>
+          <a:lstStyle/>
+          <a:p>
+            <a:pPr marL="514350" indent="-514350">
+              <a:buFont typeface="+mj-lt"/>
+              <a:buAutoNum type="arabicPeriod"/>
+            </a:pPr>
+            <a:r>
+              <a:rPr lang="pt-BR" dirty="0"/>
+              <a:t>Acionar lâmpada via </a:t>
+            </a:r>
+            <a:r>
+              <a:rPr lang="pt-BR" dirty="0" err="1"/>
+              <a:t>bluetooth</a:t>
+            </a:r>
+            <a:r>
+              <a:rPr lang="pt-BR" dirty="0"/>
+              <a:t> do celular.</a:t>
+            </a:r>
+          </a:p>
+          <a:p>
+            <a:pPr marL="514350" indent="-514350">
+              <a:buFont typeface="+mj-lt"/>
+              <a:buAutoNum type="arabicPeriod"/>
+            </a:pPr>
+            <a:r>
+              <a:rPr lang="pt-BR" dirty="0"/>
+              <a:t>Acionar lâmpada a partir de uma determinada temperatura.</a:t>
+            </a:r>
+          </a:p>
+        </p:txBody>
+      </p:sp>
+    </p:spTree>
+    <p:extLst>
+      <p:ext uri="{BB962C8B-B14F-4D97-AF65-F5344CB8AC3E}">
+        <p14:creationId xmlns:p14="http://schemas.microsoft.com/office/powerpoint/2010/main" val="761909550"/>
+      </p:ext>
+    </p:extLst>
+  </p:cSld>
+  <p:clrMapOvr>
+    <a:masterClrMapping/>
+  </p:clrMapOvr>
+</p:sld>
+</file>
+
+<file path=ppt/slides/slide59.xml><?xml version="1.0" encoding="utf-8"?>
+<p:sld xmlns:a="http://schemas.openxmlformats.org/drawingml/2006/main" xmlns:r="http://schemas.openxmlformats.org/officeDocument/2006/relationships" xmlns:p="http://schemas.openxmlformats.org/presentationml/2006/main">
+  <p:cSld>
+    <p:spTree>
+      <p:nvGrpSpPr>
+        <p:cNvPr id="1" name=""/>
+        <p:cNvGrpSpPr/>
+        <p:nvPr/>
+      </p:nvGrpSpPr>
+      <p:grpSpPr>
+        <a:xfrm>
+          <a:off x="0" y="0"/>
+          <a:ext cx="0" cy="0"/>
+          <a:chOff x="0" y="0"/>
+          <a:chExt cx="0" cy="0"/>
+        </a:xfrm>
+      </p:grpSpPr>
+      <p:sp>
+        <p:nvSpPr>
+          <p:cNvPr id="2" name="Título 1"/>
+          <p:cNvSpPr>
+            <a:spLocks noGrp="1"/>
+          </p:cNvSpPr>
+          <p:nvPr>
+            <p:ph type="title"/>
+          </p:nvPr>
+        </p:nvSpPr>
+        <p:spPr/>
+        <p:txBody>
+          <a:bodyPr/>
+          <a:lstStyle/>
+          <a:p>
+            <a:r>
+              <a:rPr lang="pt-BR" dirty="0"/>
+              <a:t>Referências Bluetooth</a:t>
+            </a:r>
+          </a:p>
+        </p:txBody>
+      </p:sp>
+      <p:sp>
+        <p:nvSpPr>
+          <p:cNvPr id="3" name="Espaço Reservado para Conteúdo 2"/>
+          <p:cNvSpPr>
+            <a:spLocks noGrp="1"/>
+          </p:cNvSpPr>
+          <p:nvPr>
+            <p:ph idx="1"/>
+          </p:nvPr>
+        </p:nvSpPr>
+        <p:spPr/>
+        <p:txBody>
+          <a:bodyPr>
+            <a:normAutofit lnSpcReduction="10000"/>
+          </a:bodyPr>
+          <a:lstStyle/>
+          <a:p>
+            <a:r>
+              <a:rPr lang="pt-BR" dirty="0">
+                <a:hlinkClick r:id="rId2"/>
+              </a:rPr>
+              <a:t>https://www.electronicwings.com/sensors-modules/bluetooth-module-hc-05-</a:t>
+            </a:r>
+            <a:endParaRPr lang="pt-BR" dirty="0">
+              <a:hlinkClick r:id="rId3"/>
+            </a:endParaRPr>
+          </a:p>
+          <a:p>
+            <a:r>
+              <a:rPr lang="pt-BR" dirty="0">
+                <a:hlinkClick r:id="rId3"/>
+              </a:rPr>
+              <a:t>https://maker.pro/arduino/tutorial/bluetooth-basics-how-to-control-led-using-smartphone-arduino</a:t>
+            </a:r>
+            <a:endParaRPr lang="pt-BR" dirty="0"/>
+          </a:p>
+          <a:p>
+            <a:r>
+              <a:rPr lang="pt-BR" dirty="0">
+                <a:hlinkClick r:id="rId4"/>
+              </a:rPr>
+              <a:t>https://howtomechatronics.com/tutorials/arduino/arduino-and-hc-05-bluetooth-module-tutorial/</a:t>
+            </a:r>
+            <a:endParaRPr lang="pt-BR" dirty="0"/>
+          </a:p>
+          <a:p>
+            <a:r>
+              <a:rPr lang="pt-BR" dirty="0">
+                <a:hlinkClick r:id="rId5"/>
+              </a:rPr>
+              <a:t>http://www.instructables.com/id/Tutorial-Using-HC06-Bluetooth-to-Serial-Wireless-U/</a:t>
+            </a:r>
+            <a:endParaRPr lang="pt-BR" dirty="0"/>
+          </a:p>
+          <a:p>
+            <a:r>
+              <a:rPr lang="en-US" dirty="0">
+                <a:hlinkClick r:id="rId6"/>
+              </a:rPr>
+              <a:t>https://www.instructables.com/id/AT-command-mode-of-HC-05-Bluetooth-module/</a:t>
+            </a:r>
+            <a:endParaRPr lang="pt-BR" dirty="0"/>
+          </a:p>
+        </p:txBody>
+      </p:sp>
+    </p:spTree>
+    <p:extLst>
+      <p:ext uri="{BB962C8B-B14F-4D97-AF65-F5344CB8AC3E}">
+        <p14:creationId xmlns:p14="http://schemas.microsoft.com/office/powerpoint/2010/main" val="2022734056"/>
       </p:ext>
     </p:extLst>
   </p:cSld>
@@ -11925,6 +13484,114 @@
     <p:extLst>
       <p:ext uri="{BB962C8B-B14F-4D97-AF65-F5344CB8AC3E}">
         <p14:creationId xmlns:p14="http://schemas.microsoft.com/office/powerpoint/2010/main" val="1113634977"/>
+      </p:ext>
+    </p:extLst>
+  </p:cSld>
+  <p:clrMapOvr>
+    <a:masterClrMapping/>
+  </p:clrMapOvr>
+</p:sld>
+</file>
+
+<file path=ppt/slides/slide60.xml><?xml version="1.0" encoding="utf-8"?>
+<p:sld xmlns:a="http://schemas.openxmlformats.org/drawingml/2006/main" xmlns:r="http://schemas.openxmlformats.org/officeDocument/2006/relationships" xmlns:p="http://schemas.openxmlformats.org/presentationml/2006/main">
+  <p:cSld>
+    <p:spTree>
+      <p:nvGrpSpPr>
+        <p:cNvPr id="1" name=""/>
+        <p:cNvGrpSpPr/>
+        <p:nvPr/>
+      </p:nvGrpSpPr>
+      <p:grpSpPr>
+        <a:xfrm>
+          <a:off x="0" y="0"/>
+          <a:ext cx="0" cy="0"/>
+          <a:chOff x="0" y="0"/>
+          <a:chExt cx="0" cy="0"/>
+        </a:xfrm>
+      </p:grpSpPr>
+      <p:sp>
+        <p:nvSpPr>
+          <p:cNvPr id="2" name="Título 1"/>
+          <p:cNvSpPr>
+            <a:spLocks noGrp="1"/>
+          </p:cNvSpPr>
+          <p:nvPr>
+            <p:ph type="title"/>
+          </p:nvPr>
+        </p:nvSpPr>
+        <p:spPr/>
+        <p:txBody>
+          <a:bodyPr/>
+          <a:lstStyle/>
+          <a:p>
+            <a:r>
+              <a:rPr lang="pt-BR" dirty="0"/>
+              <a:t>Referências Relé</a:t>
+            </a:r>
+          </a:p>
+        </p:txBody>
+      </p:sp>
+      <p:sp>
+        <p:nvSpPr>
+          <p:cNvPr id="3" name="Espaço Reservado para Conteúdo 2"/>
+          <p:cNvSpPr>
+            <a:spLocks noGrp="1"/>
+          </p:cNvSpPr>
+          <p:nvPr>
+            <p:ph idx="1"/>
+          </p:nvPr>
+        </p:nvSpPr>
+        <p:spPr/>
+        <p:txBody>
+          <a:bodyPr>
+            <a:normAutofit/>
+          </a:bodyPr>
+          <a:lstStyle/>
+          <a:p>
+            <a:r>
+              <a:rPr lang="en-US" dirty="0">
+                <a:hlinkClick r:id="rId2"/>
+              </a:rPr>
+              <a:t>https://blogmasterwalkershop.com.br/arduino/arduino-utilizando-o-potenciometro-linear/</a:t>
+            </a:r>
+            <a:endParaRPr lang="en-US" dirty="0"/>
+          </a:p>
+          <a:p>
+            <a:r>
+              <a:rPr lang="en-US" dirty="0">
+                <a:hlinkClick r:id="rId3"/>
+              </a:rPr>
+              <a:t>https://portal.vidadesilicio.com.br/lm35-medindo-temperatura-com-arduino/</a:t>
+            </a:r>
+            <a:endParaRPr lang="en-US" dirty="0">
+              <a:hlinkClick r:id="rId4"/>
+            </a:endParaRPr>
+          </a:p>
+          <a:p>
+            <a:r>
+              <a:rPr lang="en-US" dirty="0">
+                <a:hlinkClick r:id="rId4"/>
+              </a:rPr>
+              <a:t>https://blogmasterwalkershop.com.br/arduino/como-usar-com-arduino-modulo-rele-5v-1-canal/</a:t>
+            </a:r>
+            <a:endParaRPr lang="en-US" dirty="0"/>
+          </a:p>
+          <a:p>
+            <a:r>
+              <a:rPr lang="pt-BR" dirty="0">
+                <a:hlinkClick r:id="rId5"/>
+              </a:rPr>
+              <a:t>https://portal.vidadesilicio.com.br/modulo-rele-com-arduino/</a:t>
+            </a:r>
+            <a:endParaRPr lang="pt-BR" dirty="0"/>
+          </a:p>
+        </p:txBody>
+      </p:sp>
+    </p:spTree>
+    <p:extLst>
+      <p:ext uri="{BB962C8B-B14F-4D97-AF65-F5344CB8AC3E}">
+        <p14:creationId xmlns:p14="http://schemas.microsoft.com/office/powerpoint/2010/main" val="1716499950"/>
       </p:ext>
     </p:extLst>
   </p:cSld>

</xml_diff>

<commit_message>
formatação das referências e do tema
</commit_message>
<xml_diff>
--- a/arduino-bluetooth.pptx
+++ b/arduino-bluetooth.pptx
@@ -427,7 +427,7 @@
           <a:p>
             <a:fld id="{63C9BDA7-C22B-4A92-921B-5E8BACDF8EBE}" type="slidenum">
               <a:rPr lang="pt-BR" smtClean="0"/>
-              <a:t>‹#›</a:t>
+              <a:t>‹nº›</a:t>
             </a:fld>
             <a:endParaRPr lang="pt-BR"/>
           </a:p>
@@ -1835,7 +1835,7 @@
           <a:p>
             <a:fld id="{90CE46F0-10D9-44E0-9B31-88DCFC46CB51}" type="slidenum">
               <a:rPr lang="pt-BR" smtClean="0"/>
-              <a:t>‹#›</a:t>
+              <a:t>‹nº›</a:t>
             </a:fld>
             <a:endParaRPr lang="pt-BR"/>
           </a:p>
@@ -2003,7 +2003,7 @@
           <a:p>
             <a:fld id="{90CE46F0-10D9-44E0-9B31-88DCFC46CB51}" type="slidenum">
               <a:rPr lang="pt-BR" smtClean="0"/>
-              <a:t>‹#›</a:t>
+              <a:t>‹nº›</a:t>
             </a:fld>
             <a:endParaRPr lang="pt-BR"/>
           </a:p>
@@ -2181,7 +2181,7 @@
           <a:p>
             <a:fld id="{90CE46F0-10D9-44E0-9B31-88DCFC46CB51}" type="slidenum">
               <a:rPr lang="pt-BR" smtClean="0"/>
-              <a:t>‹#›</a:t>
+              <a:t>‹nº›</a:t>
             </a:fld>
             <a:endParaRPr lang="pt-BR"/>
           </a:p>
@@ -2233,7 +2233,7 @@
           <a:lstStyle/>
           <a:p>
             <a:r>
-              <a:rPr lang="pt-BR"/>
+              <a:rPr lang="pt-BR" dirty="0"/>
               <a:t>Clique para editar o título mestre</a:t>
             </a:r>
           </a:p>
@@ -2349,7 +2349,7 @@
           <a:p>
             <a:fld id="{90CE46F0-10D9-44E0-9B31-88DCFC46CB51}" type="slidenum">
               <a:rPr lang="pt-BR" smtClean="0"/>
-              <a:t>‹#›</a:t>
+              <a:t>‹nº›</a:t>
             </a:fld>
             <a:endParaRPr lang="pt-BR"/>
           </a:p>
@@ -2410,7 +2410,7 @@
           </a:lstStyle>
           <a:p>
             <a:r>
-              <a:rPr lang="pt-BR"/>
+              <a:rPr lang="pt-BR" dirty="0"/>
               <a:t>Clique para editar o título mestre</a:t>
             </a:r>
           </a:p>
@@ -2594,7 +2594,7 @@
           <a:p>
             <a:fld id="{90CE46F0-10D9-44E0-9B31-88DCFC46CB51}" type="slidenum">
               <a:rPr lang="pt-BR" smtClean="0"/>
-              <a:t>‹#›</a:t>
+              <a:t>‹nº›</a:t>
             </a:fld>
             <a:endParaRPr lang="pt-BR"/>
           </a:p>
@@ -2823,7 +2823,7 @@
           <a:p>
             <a:fld id="{90CE46F0-10D9-44E0-9B31-88DCFC46CB51}" type="slidenum">
               <a:rPr lang="pt-BR" smtClean="0"/>
-              <a:t>‹#›</a:t>
+              <a:t>‹nº›</a:t>
             </a:fld>
             <a:endParaRPr lang="pt-BR"/>
           </a:p>
@@ -2880,7 +2880,7 @@
           <a:lstStyle/>
           <a:p>
             <a:r>
-              <a:rPr lang="pt-BR"/>
+              <a:rPr lang="pt-BR" dirty="0"/>
               <a:t>Clique para editar o título mestre</a:t>
             </a:r>
           </a:p>
@@ -3187,7 +3187,7 @@
           <a:p>
             <a:fld id="{90CE46F0-10D9-44E0-9B31-88DCFC46CB51}" type="slidenum">
               <a:rPr lang="pt-BR" smtClean="0"/>
-              <a:t>‹#›</a:t>
+              <a:t>‹nº›</a:t>
             </a:fld>
             <a:endParaRPr lang="pt-BR"/>
           </a:p>
@@ -3304,7 +3304,7 @@
           <a:p>
             <a:fld id="{90CE46F0-10D9-44E0-9B31-88DCFC46CB51}" type="slidenum">
               <a:rPr lang="pt-BR" smtClean="0"/>
-              <a:t>‹#›</a:t>
+              <a:t>‹nº›</a:t>
             </a:fld>
             <a:endParaRPr lang="pt-BR"/>
           </a:p>
@@ -3399,7 +3399,7 @@
           <a:p>
             <a:fld id="{90CE46F0-10D9-44E0-9B31-88DCFC46CB51}" type="slidenum">
               <a:rPr lang="pt-BR" smtClean="0"/>
-              <a:t>‹#›</a:t>
+              <a:t>‹nº›</a:t>
             </a:fld>
             <a:endParaRPr lang="pt-BR"/>
           </a:p>
@@ -3674,7 +3674,7 @@
           <a:p>
             <a:fld id="{90CE46F0-10D9-44E0-9B31-88DCFC46CB51}" type="slidenum">
               <a:rPr lang="pt-BR" smtClean="0"/>
-              <a:t>‹#›</a:t>
+              <a:t>‹nº›</a:t>
             </a:fld>
             <a:endParaRPr lang="pt-BR"/>
           </a:p>
@@ -3926,7 +3926,7 @@
           <a:p>
             <a:fld id="{90CE46F0-10D9-44E0-9B31-88DCFC46CB51}" type="slidenum">
               <a:rPr lang="pt-BR" smtClean="0"/>
-              <a:t>‹#›</a:t>
+              <a:t>‹nº›</a:t>
             </a:fld>
             <a:endParaRPr lang="pt-BR"/>
           </a:p>
@@ -3993,7 +3993,7 @@
           <a:lstStyle/>
           <a:p>
             <a:r>
-              <a:rPr lang="pt-BR"/>
+              <a:rPr lang="pt-BR" dirty="0"/>
               <a:t>Clique para editar o título mestre</a:t>
             </a:r>
           </a:p>
@@ -4173,7 +4173,7 @@
           <a:p>
             <a:fld id="{90CE46F0-10D9-44E0-9B31-88DCFC46CB51}" type="slidenum">
               <a:rPr lang="pt-BR" smtClean="0"/>
-              <a:t>‹#›</a:t>
+              <a:t>‹nº›</a:t>
             </a:fld>
             <a:endParaRPr lang="pt-BR"/>
           </a:p>
@@ -4210,7 +4210,7 @@
           <a:spcPct val="0"/>
         </a:spcBef>
         <a:buNone/>
-        <a:defRPr sz="4400" kern="1200">
+        <a:defRPr sz="4400" b="1" kern="1200">
           <a:solidFill>
             <a:schemeClr val="tx1"/>
           </a:solidFill>
@@ -13276,9 +13276,10 @@
           <a:lstStyle/>
           <a:p>
             <a:r>
-              <a:rPr lang="pt-BR" dirty="0"/>
-              <a:t>Referências Bluetooth</a:t>
-            </a:r>
+              <a:rPr lang="pt-BR" dirty="0" smtClean="0"/>
+              <a:t>Referências</a:t>
+            </a:r>
+            <a:endParaRPr lang="pt-BR" dirty="0"/>
           </a:p>
         </p:txBody>
       </p:sp>
@@ -13295,21 +13296,75 @@
         <p:spPr/>
         <p:txBody>
           <a:bodyPr>
-            <a:normAutofit lnSpcReduction="10000"/>
+            <a:normAutofit fontScale="77500" lnSpcReduction="20000"/>
           </a:bodyPr>
           <a:lstStyle/>
           <a:p>
+            <a:r>
+              <a:rPr lang="pt-BR" dirty="0" err="1"/>
+              <a:t>Electronic</a:t>
+            </a:r>
+            <a:r>
+              <a:rPr lang="pt-BR" dirty="0"/>
+              <a:t> </a:t>
+            </a:r>
+            <a:r>
+              <a:rPr lang="pt-BR" dirty="0" err="1"/>
+              <a:t>Wings</a:t>
+            </a:r>
+            <a:r>
+              <a:rPr lang="pt-BR" dirty="0"/>
+              <a:t>. </a:t>
+            </a:r>
+            <a:r>
+              <a:rPr lang="pt-BR" b="1" dirty="0"/>
+              <a:t>Bluetooth Module HC-05</a:t>
+            </a:r>
+            <a:r>
+              <a:rPr lang="pt-BR" dirty="0"/>
+              <a:t>. Disponível em:  </a:t>
+            </a:r>
             <a:r>
               <a:rPr lang="pt-BR" dirty="0">
                 <a:hlinkClick r:id="rId2"/>
               </a:rPr>
               <a:t>https://www.electronicwings.com/sensors-modules/bluetooth-module-hc-05-</a:t>
             </a:r>
-            <a:endParaRPr lang="pt-BR" dirty="0">
-              <a:hlinkClick r:id="rId3"/>
-            </a:endParaRPr>
-          </a:p>
-          <a:p>
+            <a:endParaRPr lang="pt-BR" dirty="0"/>
+          </a:p>
+          <a:p>
+            <a:r>
+              <a:rPr lang="pt-BR" dirty="0" err="1"/>
+              <a:t>Maker</a:t>
+            </a:r>
+            <a:r>
+              <a:rPr lang="pt-BR" dirty="0"/>
+              <a:t> Pro. </a:t>
+            </a:r>
+            <a:r>
+              <a:rPr lang="en-US" b="1" dirty="0"/>
+              <a:t>Bluetooth Basics: How to Control an LED Using a Smartphone and Arduino</a:t>
+            </a:r>
+            <a:r>
+              <a:rPr lang="en-US" dirty="0"/>
+              <a:t>. </a:t>
+            </a:r>
+            <a:r>
+              <a:rPr lang="en-US" dirty="0" err="1"/>
+              <a:t>Disponível</a:t>
+            </a:r>
+            <a:r>
+              <a:rPr lang="en-US" dirty="0"/>
+              <a:t> </a:t>
+            </a:r>
+            <a:r>
+              <a:rPr lang="en-US" dirty="0" err="1"/>
+              <a:t>em</a:t>
+            </a:r>
+            <a:r>
+              <a:rPr lang="en-US" dirty="0"/>
+              <a:t>: </a:t>
+            </a:r>
             <a:r>
               <a:rPr lang="pt-BR" dirty="0">
                 <a:hlinkClick r:id="rId3"/>
@@ -13320,6 +13375,54 @@
           </a:p>
           <a:p>
             <a:r>
+              <a:rPr lang="pt-BR" dirty="0" err="1"/>
+              <a:t>How</a:t>
+            </a:r>
+            <a:r>
+              <a:rPr lang="pt-BR" dirty="0"/>
+              <a:t> </a:t>
+            </a:r>
+            <a:r>
+              <a:rPr lang="pt-BR" dirty="0" err="1"/>
+              <a:t>to</a:t>
+            </a:r>
+            <a:r>
+              <a:rPr lang="pt-BR" dirty="0"/>
+              <a:t> </a:t>
+            </a:r>
+            <a:r>
+              <a:rPr lang="pt-BR" dirty="0" err="1"/>
+              <a:t>Mechatronics</a:t>
+            </a:r>
+            <a:r>
+              <a:rPr lang="pt-BR" dirty="0"/>
+              <a:t>. </a:t>
+            </a:r>
+            <a:r>
+              <a:rPr lang="en-US" b="1" dirty="0"/>
+              <a:t>Arduino and HC-05 Bluetooth Module Tutorial</a:t>
+            </a:r>
+            <a:r>
+              <a:rPr lang="en-US" dirty="0"/>
+              <a:t>. </a:t>
+            </a:r>
+            <a:r>
+              <a:rPr lang="en-US" dirty="0" err="1"/>
+              <a:t>Disponível</a:t>
+            </a:r>
+            <a:r>
+              <a:rPr lang="en-US" dirty="0"/>
+              <a:t> </a:t>
+            </a:r>
+            <a:r>
+              <a:rPr lang="en-US" dirty="0" err="1"/>
+              <a:t>em</a:t>
+            </a:r>
+            <a:r>
+              <a:rPr lang="en-US" dirty="0"/>
+              <a:t>: </a:t>
+            </a:r>
+            <a:r>
               <a:rPr lang="pt-BR" dirty="0">
                 <a:hlinkClick r:id="rId4"/>
               </a:rPr>
@@ -13329,6 +13432,50 @@
           </a:p>
           <a:p>
             <a:r>
+              <a:rPr lang="pt-BR" dirty="0" err="1"/>
+              <a:t>Instructables</a:t>
+            </a:r>
+            <a:r>
+              <a:rPr lang="pt-BR" dirty="0"/>
+              <a:t> </a:t>
+            </a:r>
+            <a:r>
+              <a:rPr lang="pt-BR" dirty="0" err="1"/>
+              <a:t>circuits</a:t>
+            </a:r>
+            <a:r>
+              <a:rPr lang="pt-BR" dirty="0"/>
+              <a:t>. </a:t>
+            </a:r>
+            <a:r>
+              <a:rPr lang="en-US" b="1" dirty="0"/>
+              <a:t>Tutorial - Using HC06 Bluetooth to Serial Wireless UART Adaptors With Arduino</a:t>
+            </a:r>
+            <a:r>
+              <a:rPr lang="en-US" dirty="0"/>
+              <a:t>. </a:t>
+            </a:r>
+            <a:r>
+              <a:rPr lang="en-US" dirty="0" err="1"/>
+              <a:t>Disponível</a:t>
+            </a:r>
+            <a:r>
+              <a:rPr lang="en-US" dirty="0"/>
+              <a:t> </a:t>
+            </a:r>
+            <a:r>
+              <a:rPr lang="en-US" dirty="0" err="1"/>
+              <a:t>em</a:t>
+            </a:r>
+            <a:r>
+              <a:rPr lang="en-US" dirty="0"/>
+              <a:t>: </a:t>
+            </a:r>
+            <a:r>
+              <a:rPr lang="en-US" b="1" dirty="0"/>
+              <a:t> </a:t>
+            </a:r>
+            <a:r>
               <a:rPr lang="pt-BR" dirty="0">
                 <a:hlinkClick r:id="rId5"/>
               </a:rPr>
@@ -13337,6 +13484,38 @@
             <a:endParaRPr lang="pt-BR" dirty="0"/>
           </a:p>
           <a:p>
+            <a:r>
+              <a:rPr lang="en-US" dirty="0" err="1"/>
+              <a:t>Instructables</a:t>
+            </a:r>
+            <a:r>
+              <a:rPr lang="en-US" dirty="0"/>
+              <a:t> circuits. </a:t>
+            </a:r>
+            <a:r>
+              <a:rPr lang="en-US" b="1" dirty="0"/>
+              <a:t>AT Command Mode of HC-05 and HC-06 Bluetooth Module</a:t>
+            </a:r>
+            <a:r>
+              <a:rPr lang="en-US" dirty="0"/>
+              <a:t>. </a:t>
+            </a:r>
+            <a:r>
+              <a:rPr lang="en-US" dirty="0" err="1"/>
+              <a:t>Disponível</a:t>
+            </a:r>
+            <a:r>
+              <a:rPr lang="en-US" dirty="0"/>
+              <a:t> </a:t>
+            </a:r>
+            <a:r>
+              <a:rPr lang="en-US" dirty="0" err="1"/>
+              <a:t>em</a:t>
+            </a:r>
+            <a:r>
+              <a:rPr lang="en-US" dirty="0"/>
+              <a:t>: </a:t>
+            </a:r>
             <a:r>
               <a:rPr lang="en-US" dirty="0">
                 <a:hlinkClick r:id="rId6"/>
@@ -13526,9 +13705,10 @@
           <a:lstStyle/>
           <a:p>
             <a:r>
-              <a:rPr lang="pt-BR" dirty="0"/>
-              <a:t>Referências Relé</a:t>
-            </a:r>
+              <a:rPr lang="pt-BR" dirty="0" smtClean="0"/>
+              <a:t>Referências</a:t>
+            </a:r>
+            <a:endParaRPr lang="pt-BR" dirty="0"/>
           </a:p>
         </p:txBody>
       </p:sp>
@@ -13545,10 +13725,36 @@
         <p:spPr/>
         <p:txBody>
           <a:bodyPr>
-            <a:normAutofit/>
+            <a:normAutofit fontScale="92500" lnSpcReduction="20000"/>
           </a:bodyPr>
           <a:lstStyle/>
           <a:p>
+            <a:r>
+              <a:rPr lang="en-US" dirty="0"/>
+              <a:t>Blog Master Walker Shop. </a:t>
+            </a:r>
+            <a:r>
+              <a:rPr lang="pt-BR" b="1" dirty="0"/>
+              <a:t>Como usar com </a:t>
+            </a:r>
+            <a:r>
+              <a:rPr lang="pt-BR" b="1" dirty="0" err="1"/>
+              <a:t>Arduino</a:t>
+            </a:r>
+            <a:r>
+              <a:rPr lang="pt-BR" b="1" dirty="0"/>
+              <a:t> – Potenciômetro Linear 10K com Eixo Estriado</a:t>
+            </a:r>
+            <a:r>
+              <a:rPr lang="pt-BR" dirty="0"/>
+              <a:t>. Disponível em: </a:t>
+            </a:r>
+            <a:r>
+              <a:rPr lang="pt-BR" dirty="0">
+                <a:hlinkClick r:id="rId2"/>
+              </a:rPr>
+              <a:t> </a:t>
+            </a:r>
             <a:r>
               <a:rPr lang="en-US" dirty="0">
                 <a:hlinkClick r:id="rId2"/>
@@ -13558,6 +13764,30 @@
             <a:endParaRPr lang="en-US" dirty="0"/>
           </a:p>
           <a:p>
+            <a:r>
+              <a:rPr lang="en-US" dirty="0"/>
+              <a:t>Vida de </a:t>
+            </a:r>
+            <a:r>
+              <a:rPr lang="en-US" dirty="0" err="1"/>
+              <a:t>Silicio</a:t>
+            </a:r>
+            <a:r>
+              <a:rPr lang="en-US" dirty="0"/>
+              <a:t>. </a:t>
+            </a:r>
+            <a:r>
+              <a:rPr lang="pt-BR" b="1" dirty="0"/>
+              <a:t>LM35 - Medindo temperatura com </a:t>
+            </a:r>
+            <a:r>
+              <a:rPr lang="pt-BR" b="1" dirty="0" err="1"/>
+              <a:t>arduino</a:t>
+            </a:r>
+            <a:r>
+              <a:rPr lang="pt-BR" dirty="0"/>
+              <a:t>. Disponível em: </a:t>
+            </a:r>
             <a:r>
               <a:rPr lang="en-US" dirty="0">
                 <a:hlinkClick r:id="rId3"/>
@@ -13570,6 +13800,26 @@
           </a:p>
           <a:p>
             <a:r>
+              <a:rPr lang="en-US" dirty="0"/>
+              <a:t>Blog Master Walker Shop. </a:t>
+            </a:r>
+            <a:r>
+              <a:rPr lang="pt-BR" b="1" dirty="0"/>
+              <a:t>Como usar com </a:t>
+            </a:r>
+            <a:r>
+              <a:rPr lang="pt-BR" b="1" dirty="0" err="1"/>
+              <a:t>Arduino</a:t>
+            </a:r>
+            <a:r>
+              <a:rPr lang="pt-BR" b="1" dirty="0"/>
+              <a:t> – Módulo Relé 5V 1 Canal</a:t>
+            </a:r>
+            <a:r>
+              <a:rPr lang="pt-BR" dirty="0"/>
+              <a:t>. Disponível em: </a:t>
+            </a:r>
+            <a:r>
               <a:rPr lang="en-US" dirty="0">
                 <a:hlinkClick r:id="rId4"/>
               </a:rPr>
@@ -13578,6 +13828,30 @@
             <a:endParaRPr lang="en-US" dirty="0"/>
           </a:p>
           <a:p>
+            <a:r>
+              <a:rPr lang="en-US" dirty="0"/>
+              <a:t>Vida de </a:t>
+            </a:r>
+            <a:r>
+              <a:rPr lang="en-US" dirty="0" err="1"/>
+              <a:t>Silicio</a:t>
+            </a:r>
+            <a:r>
+              <a:rPr lang="en-US" dirty="0"/>
+              <a:t>. </a:t>
+            </a:r>
+            <a:r>
+              <a:rPr lang="pt-BR" b="1" dirty="0"/>
+              <a:t>Módulo relé – Acionando cargas com </a:t>
+            </a:r>
+            <a:r>
+              <a:rPr lang="pt-BR" b="1" dirty="0" err="1"/>
+              <a:t>Arduino</a:t>
+            </a:r>
+            <a:r>
+              <a:rPr lang="pt-BR" dirty="0"/>
+              <a:t>. Disponível em: </a:t>
+            </a:r>
             <a:r>
               <a:rPr lang="pt-BR" dirty="0">
                 <a:hlinkClick r:id="rId5"/>

</xml_diff>